<commit_message>
Filled DI and Services slides with content, removed 'Custom Service' slide
Change-Id: I6175370bde42930461e203c7d2a4ba30dad90641
</commit_message>
<xml_diff>
--- a/Introduction to AngularJs.pptx
+++ b/Introduction to AngularJs.pptx
@@ -22,14 +22,12 @@
     <p:sldId id="277" r:id="rId16"/>
     <p:sldId id="278" r:id="rId17"/>
     <p:sldId id="265" r:id="rId18"/>
-    <p:sldId id="279" r:id="rId19"/>
-    <p:sldId id="280" r:id="rId20"/>
-    <p:sldId id="281" r:id="rId21"/>
-    <p:sldId id="282" r:id="rId22"/>
-    <p:sldId id="259" r:id="rId23"/>
-    <p:sldId id="260" r:id="rId24"/>
-    <p:sldId id="262" r:id="rId25"/>
-    <p:sldId id="261" r:id="rId26"/>
+    <p:sldId id="280" r:id="rId19"/>
+    <p:sldId id="281" r:id="rId20"/>
+    <p:sldId id="282" r:id="rId21"/>
+    <p:sldId id="260" r:id="rId22"/>
+    <p:sldId id="262" r:id="rId23"/>
+    <p:sldId id="261" r:id="rId24"/>
   </p:sldIdLst>
   <p:sldSz cx="9144000" cy="6858000" type="screen4x3"/>
   <p:notesSz cx="6858000" cy="9144000"/>
@@ -324,7 +322,7 @@
             <a:fld id="{7D0065BE-0657-4A47-90AD-C21C55E16B19}" type="datetime4">
               <a:rPr lang="en-US" smtClean="0"/>
               <a:pPr/>
-              <a:t>March 22, 2014</a:t>
+              <a:t>March 25, 2014</a:t>
             </a:fld>
             <a:endParaRPr lang="en-US"/>
           </a:p>
@@ -491,7 +489,7 @@
             <a:fld id="{A16C3AA4-67BE-44F7-809A-3582401494AF}" type="datetime4">
               <a:rPr lang="en-US" smtClean="0"/>
               <a:pPr/>
-              <a:t>March 22, 2014</a:t>
+              <a:t>March 25, 2014</a:t>
             </a:fld>
             <a:endParaRPr lang="en-US"/>
           </a:p>
@@ -668,7 +666,7 @@
             <a:fld id="{25172EEB-1769-4776-AD69-E7C1260563EB}" type="datetime4">
               <a:rPr lang="en-US" smtClean="0"/>
               <a:pPr/>
-              <a:t>March 22, 2014</a:t>
+              <a:t>March 25, 2014</a:t>
             </a:fld>
             <a:endParaRPr lang="en-US"/>
           </a:p>
@@ -853,7 +851,7 @@
             <a:fld id="{D47BB8AF-C16A-4836-A92D-61834B5F0BA5}" type="datetime4">
               <a:rPr lang="en-US" smtClean="0"/>
               <a:pPr/>
-              <a:t>March 22, 2014</a:t>
+              <a:t>March 25, 2014</a:t>
             </a:fld>
             <a:endParaRPr lang="en-US"/>
           </a:p>
@@ -1117,7 +1115,7 @@
             <a:fld id="{647D2193-4505-4A75-99BB-880C6989A757}" type="datetime4">
               <a:rPr lang="en-US" smtClean="0"/>
               <a:pPr/>
-              <a:t>March 22, 2014</a:t>
+              <a:t>March 25, 2014</a:t>
             </a:fld>
             <a:endParaRPr lang="en-US"/>
           </a:p>
@@ -1467,7 +1465,7 @@
             <a:fld id="{113A18F4-33C3-445B-924C-31108C51719C}" type="datetime4">
               <a:rPr lang="en-US" smtClean="0"/>
               <a:pPr/>
-              <a:t>March 22, 2014</a:t>
+              <a:t>March 25, 2014</a:t>
             </a:fld>
             <a:endParaRPr lang="en-US"/>
           </a:p>
@@ -1777,7 +1775,7 @@
             <a:fld id="{3AF7543A-E259-478F-9E0D-57BA40E442B7}" type="datetime4">
               <a:rPr lang="en-US" smtClean="0"/>
               <a:pPr/>
-              <a:t>March 22, 2014</a:t>
+              <a:t>March 25, 2014</a:t>
             </a:fld>
             <a:endParaRPr lang="en-US"/>
           </a:p>
@@ -2006,7 +2004,7 @@
             <a:fld id="{1EFB012D-77A1-44B0-BB26-329BA1EE55C9}" type="datetime4">
               <a:rPr lang="en-US" smtClean="0"/>
               <a:pPr/>
-              <a:t>March 22, 2014</a:t>
+              <a:t>March 25, 2014</a:t>
             </a:fld>
             <a:endParaRPr lang="en-US"/>
           </a:p>
@@ -2098,7 +2096,7 @@
             <a:fld id="{94B7499E-3031-413E-B01E-B94970708CAA}" type="datetime4">
               <a:rPr lang="en-US" smtClean="0"/>
               <a:pPr/>
-              <a:t>March 22, 2014</a:t>
+              <a:t>March 25, 2014</a:t>
             </a:fld>
             <a:endParaRPr lang="en-US"/>
           </a:p>
@@ -2388,7 +2386,7 @@
             <a:fld id="{DC7EAB0C-2220-4D0E-A0DD-DB7FA0F742F4}" type="datetime4">
               <a:rPr lang="en-US" smtClean="0"/>
               <a:pPr/>
-              <a:t>March 22, 2014</a:t>
+              <a:t>March 25, 2014</a:t>
             </a:fld>
             <a:endParaRPr lang="en-US"/>
           </a:p>
@@ -2658,7 +2656,7 @@
             <a:fld id="{E3416D63-31BF-4B94-B6C5-E20B2C63F515}" type="datetime4">
               <a:rPr lang="en-US" smtClean="0"/>
               <a:pPr/>
-              <a:t>March 22, 2014</a:t>
+              <a:t>March 25, 2014</a:t>
             </a:fld>
             <a:endParaRPr lang="en-US"/>
           </a:p>
@@ -2889,7 +2887,7 @@
             <a:fld id="{62B1B13E-D5AF-485E-81A1-82A140076526}" type="datetime4">
               <a:rPr lang="en-US" smtClean="0"/>
               <a:pPr/>
-              <a:t>March 22, 2014</a:t>
+              <a:t>March 25, 2014</a:t>
             </a:fld>
             <a:endParaRPr lang="en-US" dirty="0"/>
           </a:p>
@@ -4870,7 +4868,7 @@
         </p:nvSpPr>
         <p:spPr>
           <a:xfrm>
-            <a:off x="4420147" y="2944186"/>
+            <a:off x="4387018" y="2944186"/>
             <a:ext cx="762761" cy="369332"/>
           </a:xfrm>
           <a:prstGeom prst="rect">
@@ -5014,7 +5012,11 @@
           <a:p>
             <a:r>
               <a:rPr lang="en-US" sz="1600" dirty="0" smtClean="0"/>
-              <a:t>&lt;.</a:t>
+              <a:t>&lt;..</a:t>
+            </a:r>
+            <a:r>
+              <a:rPr lang="en-US" sz="1600" b="1" dirty="0" smtClean="0"/>
+              <a:t>.</a:t>
             </a:r>
             <a:r>
               <a:rPr lang="en-US" sz="1600" b="1" dirty="0" smtClean="0">
@@ -5022,7 +5024,7 @@
                   <a:srgbClr val="800080"/>
                 </a:solidFill>
               </a:rPr>
-              <a:t>. ng-controller</a:t>
+              <a:t> ng-controller</a:t>
             </a:r>
             <a:r>
               <a:rPr lang="en-US" sz="1600" dirty="0" smtClean="0"/>
@@ -5262,8 +5264,8 @@
         </p:blipFill>
         <p:spPr>
           <a:xfrm>
-            <a:off x="2178086" y="3788861"/>
-            <a:ext cx="1118680" cy="1118680"/>
+            <a:off x="1998868" y="3667388"/>
+            <a:ext cx="1342070" cy="1342070"/>
           </a:xfrm>
           <a:prstGeom prst="rect">
             <a:avLst/>
@@ -6107,58 +6109,102 @@
           </a:p>
           <a:p>
             <a:r>
-              <a:rPr lang="en-US" dirty="0" smtClean="0"/>
+              <a:rPr lang="en-US" dirty="0" smtClean="0">
+                <a:solidFill>
+                  <a:schemeClr val="tx1"/>
+                </a:solidFill>
+              </a:rPr>
               <a:t>Automatic update of  Model              View</a:t>
             </a:r>
-            <a:endParaRPr lang="en-US" dirty="0"/>
-          </a:p>
-          <a:p>
-            <a:endParaRPr lang="en-US" dirty="0" smtClean="0"/>
-          </a:p>
-          <a:p>
-            <a:r>
-              <a:rPr lang="en-US" dirty="0" smtClean="0"/>
+            <a:endParaRPr lang="en-US" dirty="0">
+              <a:solidFill>
+                <a:schemeClr val="tx1"/>
+              </a:solidFill>
+            </a:endParaRPr>
+          </a:p>
+          <a:p>
+            <a:endParaRPr lang="en-US" dirty="0" smtClean="0">
+              <a:solidFill>
+                <a:schemeClr val="tx1"/>
+              </a:solidFill>
+            </a:endParaRPr>
+          </a:p>
+          <a:p>
+            <a:r>
+              <a:rPr lang="en-US" dirty="0" smtClean="0">
+                <a:solidFill>
+                  <a:schemeClr val="tx1"/>
+                </a:solidFill>
+              </a:rPr>
               <a:t>Achieved through </a:t>
             </a:r>
           </a:p>
           <a:p>
             <a:pPr lvl="1"/>
             <a:r>
-              <a:rPr lang="en-US" dirty="0" smtClean="0"/>
+              <a:rPr lang="en-US" dirty="0" smtClean="0">
+                <a:solidFill>
+                  <a:schemeClr val="tx1"/>
+                </a:solidFill>
+              </a:rPr>
               <a:t>ng-model directive,</a:t>
             </a:r>
           </a:p>
           <a:p>
             <a:pPr lvl="1"/>
             <a:r>
-              <a:rPr lang="en-US" dirty="0" smtClean="0"/>
+              <a:rPr lang="en-US" dirty="0" smtClean="0">
+                <a:solidFill>
+                  <a:schemeClr val="tx1"/>
+                </a:solidFill>
+              </a:rPr>
               <a:t>$scope object</a:t>
             </a:r>
           </a:p>
           <a:p>
             <a:pPr lvl="1"/>
             <a:r>
-              <a:rPr lang="en-US" dirty="0" smtClean="0"/>
+              <a:rPr lang="en-US" dirty="0" smtClean="0">
+                <a:solidFill>
+                  <a:schemeClr val="tx1"/>
+                </a:solidFill>
+              </a:rPr>
               <a:t> {{ }} bindings, </a:t>
             </a:r>
           </a:p>
           <a:p>
             <a:pPr lvl="1"/>
             <a:r>
-              <a:rPr lang="en-US" dirty="0" smtClean="0"/>
+              <a:rPr lang="en-US" dirty="0" smtClean="0">
+                <a:solidFill>
+                  <a:schemeClr val="tx1"/>
+                </a:solidFill>
+              </a:rPr>
               <a:t>$watch method</a:t>
             </a:r>
           </a:p>
           <a:p>
             <a:pPr lvl="1"/>
-            <a:endParaRPr lang="en-US" dirty="0"/>
-          </a:p>
-          <a:p>
-            <a:r>
-              <a:rPr lang="en-US" dirty="0" smtClean="0"/>
+            <a:endParaRPr lang="en-US" dirty="0">
+              <a:solidFill>
+                <a:schemeClr val="tx1"/>
+              </a:solidFill>
+            </a:endParaRPr>
+          </a:p>
+          <a:p>
+            <a:r>
+              <a:rPr lang="en-US" dirty="0" smtClean="0">
+                <a:solidFill>
+                  <a:schemeClr val="tx1"/>
+                </a:solidFill>
+              </a:rPr>
               <a:t>Eliminates need of Event binding/handling</a:t>
             </a:r>
-            <a:endParaRPr lang="en-US" dirty="0"/>
+            <a:endParaRPr lang="en-US" dirty="0">
+              <a:solidFill>
+                <a:schemeClr val="tx1"/>
+              </a:solidFill>
+            </a:endParaRPr>
           </a:p>
         </p:txBody>
       </p:sp>
@@ -6398,108 +6444,256 @@
         </p:nvSpPr>
         <p:spPr/>
         <p:txBody>
-          <a:bodyPr/>
+          <a:bodyPr>
+            <a:normAutofit lnSpcReduction="10000"/>
+          </a:bodyPr>
           <a:lstStyle/>
           <a:p>
             <a:endParaRPr lang="en-US" dirty="0" smtClean="0"/>
           </a:p>
           <a:p>
             <a:r>
-              <a:rPr lang="en-US" dirty="0" smtClean="0"/>
-              <a:t>Binding – {{ &lt;expression&gt; | filter | </a:t>
-            </a:r>
-            <a:r>
-              <a:rPr lang="en-US" dirty="0" err="1" smtClean="0"/>
+              <a:rPr lang="en-US" dirty="0" smtClean="0">
+                <a:solidFill>
+                  <a:schemeClr val="tx1"/>
+                </a:solidFill>
+              </a:rPr>
+              <a:t>Binding – </a:t>
+            </a:r>
+            <a:r>
+              <a:rPr lang="en-US" b="1" dirty="0" smtClean="0">
+                <a:solidFill>
+                  <a:srgbClr val="FF0000"/>
+                </a:solidFill>
+              </a:rPr>
+              <a:t>{{</a:t>
+            </a:r>
+            <a:r>
+              <a:rPr lang="en-US" dirty="0" smtClean="0">
+                <a:solidFill>
+                  <a:schemeClr val="tx1"/>
+                </a:solidFill>
+              </a:rPr>
+              <a:t> &lt;expression&gt; | filter | </a:t>
+            </a:r>
+            <a:r>
+              <a:rPr lang="en-US" dirty="0" err="1" smtClean="0">
+                <a:solidFill>
+                  <a:schemeClr val="tx1"/>
+                </a:solidFill>
+              </a:rPr>
               <a:t>orderBy</a:t>
             </a:r>
             <a:r>
-              <a:rPr lang="en-US" dirty="0" smtClean="0"/>
-              <a:t> }}</a:t>
-            </a:r>
-            <a:endParaRPr lang="en-US" dirty="0"/>
-          </a:p>
-          <a:p>
-            <a:r>
-              <a:rPr lang="en-US" dirty="0" smtClean="0"/>
-              <a:t>Expressions –</a:t>
+              <a:rPr lang="en-US" dirty="0" smtClean="0">
+                <a:solidFill>
+                  <a:schemeClr val="tx1"/>
+                </a:solidFill>
+              </a:rPr>
+              <a:t> </a:t>
+            </a:r>
+            <a:r>
+              <a:rPr lang="en-US" dirty="0" smtClean="0">
+                <a:solidFill>
+                  <a:srgbClr val="FF0000"/>
+                </a:solidFill>
+              </a:rPr>
+              <a:t>}</a:t>
+            </a:r>
+            <a:r>
+              <a:rPr lang="en-US" dirty="0" smtClean="0">
+                <a:solidFill>
+                  <a:srgbClr val="FF0000"/>
+                </a:solidFill>
+              </a:rPr>
+              <a:t>}</a:t>
             </a:r>
           </a:p>
           <a:p>
             <a:pPr lvl="1"/>
             <a:r>
-              <a:rPr lang="en-US" dirty="0" smtClean="0"/>
+              <a:rPr lang="en-US" dirty="0" smtClean="0">
+                <a:solidFill>
+                  <a:srgbClr val="000000"/>
+                </a:solidFill>
+              </a:rPr>
+              <a:t>To be used in Views/HTML.</a:t>
+            </a:r>
+            <a:endParaRPr lang="en-US" dirty="0">
+              <a:solidFill>
+                <a:srgbClr val="000000"/>
+              </a:solidFill>
+            </a:endParaRPr>
+          </a:p>
+          <a:p>
+            <a:endParaRPr lang="en-US" dirty="0" smtClean="0">
+              <a:solidFill>
+                <a:schemeClr val="tx1"/>
+              </a:solidFill>
+            </a:endParaRPr>
+          </a:p>
+          <a:p>
+            <a:r>
+              <a:rPr lang="en-US" dirty="0" smtClean="0">
+                <a:solidFill>
+                  <a:schemeClr val="tx1"/>
+                </a:solidFill>
+              </a:rPr>
+              <a:t>Expressions </a:t>
+            </a:r>
+            <a:r>
+              <a:rPr lang="en-US" dirty="0" smtClean="0">
+                <a:solidFill>
+                  <a:schemeClr val="tx1"/>
+                </a:solidFill>
+              </a:rPr>
+              <a:t>–</a:t>
+            </a:r>
+          </a:p>
+          <a:p>
+            <a:pPr lvl="1"/>
+            <a:r>
+              <a:rPr lang="en-US" dirty="0" smtClean="0">
+                <a:solidFill>
+                  <a:schemeClr val="tx1"/>
+                </a:solidFill>
+              </a:rPr>
               <a:t>JavaScript *like* code-snippets – {{ 1 + 2  }}, {{ ‘hello World!’ }} </a:t>
             </a:r>
           </a:p>
           <a:p>
             <a:pPr lvl="1"/>
             <a:r>
-              <a:rPr lang="en-US" dirty="0" smtClean="0"/>
+              <a:rPr lang="en-US" dirty="0" smtClean="0">
+                <a:solidFill>
+                  <a:schemeClr val="tx1"/>
+                </a:solidFill>
+              </a:rPr>
               <a:t>Evaluated against a ‘$scope’ object – {{ a + b }}, {{ </a:t>
             </a:r>
             <a:r>
-              <a:rPr lang="en-US" dirty="0" err="1" smtClean="0"/>
+              <a:rPr lang="en-US" dirty="0" err="1" smtClean="0">
+                <a:solidFill>
+                  <a:schemeClr val="tx1"/>
+                </a:solidFill>
+              </a:rPr>
               <a:t>user.name</a:t>
             </a:r>
             <a:r>
-              <a:rPr lang="en-US" dirty="0" smtClean="0"/>
+              <a:rPr lang="en-US" dirty="0" smtClean="0">
+                <a:solidFill>
+                  <a:schemeClr val="tx1"/>
+                </a:solidFill>
+              </a:rPr>
               <a:t> }}, {{ items[index] }}, {{  </a:t>
             </a:r>
             <a:r>
-              <a:rPr lang="en-US" dirty="0" err="1" smtClean="0"/>
+              <a:rPr lang="en-US" dirty="0" err="1" smtClean="0">
+                <a:solidFill>
+                  <a:schemeClr val="tx1"/>
+                </a:solidFill>
+              </a:rPr>
               <a:t>doSomething</a:t>
             </a:r>
             <a:r>
-              <a:rPr lang="en-US" dirty="0" smtClean="0"/>
+              <a:rPr lang="en-US" dirty="0" smtClean="0">
+                <a:solidFill>
+                  <a:schemeClr val="tx1"/>
+                </a:solidFill>
+              </a:rPr>
               <a:t>() }} </a:t>
             </a:r>
           </a:p>
           <a:p>
             <a:pPr lvl="1"/>
             <a:r>
-              <a:rPr lang="en-US" dirty="0" smtClean="0"/>
+              <a:rPr lang="en-US" dirty="0" smtClean="0">
+                <a:solidFill>
+                  <a:schemeClr val="tx1"/>
+                </a:solidFill>
+              </a:rPr>
               <a:t>Cannot use conditionals, loops</a:t>
             </a:r>
             <a:r>
-              <a:rPr lang="en-US" dirty="0"/>
+              <a:rPr lang="en-US" dirty="0">
+                <a:solidFill>
+                  <a:schemeClr val="tx1"/>
+                </a:solidFill>
+              </a:rPr>
               <a:t> </a:t>
             </a:r>
             <a:r>
-              <a:rPr lang="en-US" dirty="0" smtClean="0"/>
+              <a:rPr lang="en-US" dirty="0" smtClean="0">
+                <a:solidFill>
+                  <a:schemeClr val="tx1"/>
+                </a:solidFill>
+              </a:rPr>
               <a:t>&amp; exceptions </a:t>
             </a:r>
           </a:p>
           <a:p>
-            <a:endParaRPr lang="en-US" dirty="0" smtClean="0"/>
-          </a:p>
-          <a:p>
-            <a:r>
-              <a:rPr lang="en-US" dirty="0" smtClean="0"/>
+            <a:endParaRPr lang="en-US" dirty="0" smtClean="0">
+              <a:solidFill>
+                <a:schemeClr val="tx1"/>
+              </a:solidFill>
+            </a:endParaRPr>
+          </a:p>
+          <a:p>
+            <a:r>
+              <a:rPr lang="en-US" dirty="0" smtClean="0">
+                <a:solidFill>
+                  <a:schemeClr val="tx1"/>
+                </a:solidFill>
+              </a:rPr>
               <a:t>Filters – Data formatters</a:t>
             </a:r>
           </a:p>
           <a:p>
             <a:pPr lvl="1"/>
             <a:r>
-              <a:rPr lang="en-US" dirty="0"/>
+              <a:rPr lang="en-US" dirty="0">
+                <a:solidFill>
+                  <a:schemeClr val="tx1"/>
+                </a:solidFill>
+              </a:rPr>
               <a:t>l</a:t>
             </a:r>
             <a:r>
-              <a:rPr lang="en-US" dirty="0" smtClean="0"/>
+              <a:rPr lang="en-US" dirty="0" smtClean="0">
+                <a:solidFill>
+                  <a:schemeClr val="tx1"/>
+                </a:solidFill>
+              </a:rPr>
               <a:t>owercase, currency, date &amp; any custom-filters</a:t>
             </a:r>
-            <a:endParaRPr lang="en-US" dirty="0"/>
-          </a:p>
-          <a:p>
-            <a:r>
-              <a:rPr lang="en-US" dirty="0" err="1" smtClean="0"/>
+            <a:endParaRPr lang="en-US" dirty="0">
+              <a:solidFill>
+                <a:schemeClr val="tx1"/>
+              </a:solidFill>
+            </a:endParaRPr>
+          </a:p>
+          <a:p>
+            <a:r>
+              <a:rPr lang="en-US" dirty="0" err="1" smtClean="0">
+                <a:solidFill>
+                  <a:schemeClr val="tx1"/>
+                </a:solidFill>
+              </a:rPr>
               <a:t>orderBy</a:t>
             </a:r>
             <a:r>
-              <a:rPr lang="en-US" dirty="0" smtClean="0"/>
-              <a:t> – Sorting filtered result-set</a:t>
-            </a:r>
-            <a:endParaRPr lang="en-US" dirty="0"/>
+              <a:rPr lang="en-US" dirty="0" smtClean="0">
+                <a:solidFill>
+                  <a:schemeClr val="tx1"/>
+                </a:solidFill>
+              </a:rPr>
+              <a:t> – Sorts filtered result-set</a:t>
+            </a:r>
+            <a:endParaRPr lang="en-US" dirty="0">
+              <a:solidFill>
+                <a:schemeClr val="tx1"/>
+              </a:solidFill>
+            </a:endParaRPr>
           </a:p>
         </p:txBody>
       </p:sp>
@@ -7519,9 +7713,1574 @@
   <p:timing>
     <p:tnLst>
       <p:par>
-        <p:cTn xmlns:p14="http://schemas.microsoft.com/office/powerpoint/2010/main" id="1" dur="indefinite" restart="never" nodeType="tmRoot"/>
+        <p:cTn xmlns:p14="http://schemas.microsoft.com/office/powerpoint/2010/main" id="1" dur="indefinite" restart="never" nodeType="tmRoot">
+          <p:childTnLst>
+            <p:seq concurrent="1" nextAc="seek">
+              <p:cTn id="2" dur="indefinite" nodeType="mainSeq">
+                <p:childTnLst>
+                  <p:par>
+                    <p:cTn id="3" fill="hold">
+                      <p:stCondLst>
+                        <p:cond delay="indefinite"/>
+                      </p:stCondLst>
+                      <p:childTnLst>
+                        <p:par>
+                          <p:cTn id="4" fill="hold">
+                            <p:stCondLst>
+                              <p:cond delay="0"/>
+                            </p:stCondLst>
+                            <p:childTnLst>
+                              <p:par>
+                                <p:cTn id="5" presetID="1" presetClass="entr" presetSubtype="0" fill="hold" grpId="0" nodeType="clickEffect">
+                                  <p:stCondLst>
+                                    <p:cond delay="0"/>
+                                  </p:stCondLst>
+                                  <p:childTnLst>
+                                    <p:set>
+                                      <p:cBhvr>
+                                        <p:cTn id="6" dur="1" fill="hold">
+                                          <p:stCondLst>
+                                            <p:cond delay="0"/>
+                                          </p:stCondLst>
+                                        </p:cTn>
+                                        <p:tgtEl>
+                                          <p:spTgt spid="6"/>
+                                        </p:tgtEl>
+                                        <p:attrNameLst>
+                                          <p:attrName>style.visibility</p:attrName>
+                                        </p:attrNameLst>
+                                      </p:cBhvr>
+                                      <p:to>
+                                        <p:strVal val="visible"/>
+                                      </p:to>
+                                    </p:set>
+                                  </p:childTnLst>
+                                </p:cTn>
+                              </p:par>
+                            </p:childTnLst>
+                          </p:cTn>
+                        </p:par>
+                      </p:childTnLst>
+                    </p:cTn>
+                  </p:par>
+                  <p:par>
+                    <p:cTn id="7" fill="hold">
+                      <p:stCondLst>
+                        <p:cond delay="indefinite"/>
+                      </p:stCondLst>
+                      <p:childTnLst>
+                        <p:par>
+                          <p:cTn id="8" fill="hold">
+                            <p:stCondLst>
+                              <p:cond delay="0"/>
+                            </p:stCondLst>
+                            <p:childTnLst>
+                              <p:par>
+                                <p:cTn id="9" presetID="53" presetClass="entr" presetSubtype="16" fill="hold" grpId="0" nodeType="clickEffect">
+                                  <p:stCondLst>
+                                    <p:cond delay="0"/>
+                                  </p:stCondLst>
+                                  <p:childTnLst>
+                                    <p:set>
+                                      <p:cBhvr>
+                                        <p:cTn id="10" dur="1" fill="hold">
+                                          <p:stCondLst>
+                                            <p:cond delay="0"/>
+                                          </p:stCondLst>
+                                        </p:cTn>
+                                        <p:tgtEl>
+                                          <p:spTgt spid="8"/>
+                                        </p:tgtEl>
+                                        <p:attrNameLst>
+                                          <p:attrName>style.visibility</p:attrName>
+                                        </p:attrNameLst>
+                                      </p:cBhvr>
+                                      <p:to>
+                                        <p:strVal val="visible"/>
+                                      </p:to>
+                                    </p:set>
+                                    <p:anim calcmode="lin" valueType="num">
+                                      <p:cBhvr>
+                                        <p:cTn id="11" dur="500" fill="hold"/>
+                                        <p:tgtEl>
+                                          <p:spTgt spid="8"/>
+                                        </p:tgtEl>
+                                        <p:attrNameLst>
+                                          <p:attrName>ppt_w</p:attrName>
+                                        </p:attrNameLst>
+                                      </p:cBhvr>
+                                      <p:tavLst>
+                                        <p:tav tm="0">
+                                          <p:val>
+                                            <p:fltVal val="0"/>
+                                          </p:val>
+                                        </p:tav>
+                                        <p:tav tm="100000">
+                                          <p:val>
+                                            <p:strVal val="#ppt_w"/>
+                                          </p:val>
+                                        </p:tav>
+                                      </p:tavLst>
+                                    </p:anim>
+                                    <p:anim calcmode="lin" valueType="num">
+                                      <p:cBhvr>
+                                        <p:cTn id="12" dur="500" fill="hold"/>
+                                        <p:tgtEl>
+                                          <p:spTgt spid="8"/>
+                                        </p:tgtEl>
+                                        <p:attrNameLst>
+                                          <p:attrName>ppt_h</p:attrName>
+                                        </p:attrNameLst>
+                                      </p:cBhvr>
+                                      <p:tavLst>
+                                        <p:tav tm="0">
+                                          <p:val>
+                                            <p:fltVal val="0"/>
+                                          </p:val>
+                                        </p:tav>
+                                        <p:tav tm="100000">
+                                          <p:val>
+                                            <p:strVal val="#ppt_h"/>
+                                          </p:val>
+                                        </p:tav>
+                                      </p:tavLst>
+                                    </p:anim>
+                                    <p:animEffect transition="in" filter="fade">
+                                      <p:cBhvr>
+                                        <p:cTn id="13" dur="500"/>
+                                        <p:tgtEl>
+                                          <p:spTgt spid="8"/>
+                                        </p:tgtEl>
+                                      </p:cBhvr>
+                                    </p:animEffect>
+                                  </p:childTnLst>
+                                </p:cTn>
+                              </p:par>
+                              <p:par>
+                                <p:cTn id="14" presetID="53" presetClass="entr" presetSubtype="16" fill="hold" grpId="0" nodeType="withEffect">
+                                  <p:stCondLst>
+                                    <p:cond delay="0"/>
+                                  </p:stCondLst>
+                                  <p:childTnLst>
+                                    <p:set>
+                                      <p:cBhvr>
+                                        <p:cTn id="15" dur="1" fill="hold">
+                                          <p:stCondLst>
+                                            <p:cond delay="0"/>
+                                          </p:stCondLst>
+                                        </p:cTn>
+                                        <p:tgtEl>
+                                          <p:spTgt spid="9"/>
+                                        </p:tgtEl>
+                                        <p:attrNameLst>
+                                          <p:attrName>style.visibility</p:attrName>
+                                        </p:attrNameLst>
+                                      </p:cBhvr>
+                                      <p:to>
+                                        <p:strVal val="visible"/>
+                                      </p:to>
+                                    </p:set>
+                                    <p:anim calcmode="lin" valueType="num">
+                                      <p:cBhvr>
+                                        <p:cTn id="16" dur="500" fill="hold"/>
+                                        <p:tgtEl>
+                                          <p:spTgt spid="9"/>
+                                        </p:tgtEl>
+                                        <p:attrNameLst>
+                                          <p:attrName>ppt_w</p:attrName>
+                                        </p:attrNameLst>
+                                      </p:cBhvr>
+                                      <p:tavLst>
+                                        <p:tav tm="0">
+                                          <p:val>
+                                            <p:fltVal val="0"/>
+                                          </p:val>
+                                        </p:tav>
+                                        <p:tav tm="100000">
+                                          <p:val>
+                                            <p:strVal val="#ppt_w"/>
+                                          </p:val>
+                                        </p:tav>
+                                      </p:tavLst>
+                                    </p:anim>
+                                    <p:anim calcmode="lin" valueType="num">
+                                      <p:cBhvr>
+                                        <p:cTn id="17" dur="500" fill="hold"/>
+                                        <p:tgtEl>
+                                          <p:spTgt spid="9"/>
+                                        </p:tgtEl>
+                                        <p:attrNameLst>
+                                          <p:attrName>ppt_h</p:attrName>
+                                        </p:attrNameLst>
+                                      </p:cBhvr>
+                                      <p:tavLst>
+                                        <p:tav tm="0">
+                                          <p:val>
+                                            <p:fltVal val="0"/>
+                                          </p:val>
+                                        </p:tav>
+                                        <p:tav tm="100000">
+                                          <p:val>
+                                            <p:strVal val="#ppt_h"/>
+                                          </p:val>
+                                        </p:tav>
+                                      </p:tavLst>
+                                    </p:anim>
+                                    <p:animEffect transition="in" filter="fade">
+                                      <p:cBhvr>
+                                        <p:cTn id="18" dur="500"/>
+                                        <p:tgtEl>
+                                          <p:spTgt spid="9"/>
+                                        </p:tgtEl>
+                                      </p:cBhvr>
+                                    </p:animEffect>
+                                  </p:childTnLst>
+                                </p:cTn>
+                              </p:par>
+                              <p:par>
+                                <p:cTn id="19" presetID="53" presetClass="entr" presetSubtype="16" fill="hold" grpId="0" nodeType="withEffect">
+                                  <p:stCondLst>
+                                    <p:cond delay="0"/>
+                                  </p:stCondLst>
+                                  <p:childTnLst>
+                                    <p:set>
+                                      <p:cBhvr>
+                                        <p:cTn id="20" dur="1" fill="hold">
+                                          <p:stCondLst>
+                                            <p:cond delay="0"/>
+                                          </p:stCondLst>
+                                        </p:cTn>
+                                        <p:tgtEl>
+                                          <p:spTgt spid="10"/>
+                                        </p:tgtEl>
+                                        <p:attrNameLst>
+                                          <p:attrName>style.visibility</p:attrName>
+                                        </p:attrNameLst>
+                                      </p:cBhvr>
+                                      <p:to>
+                                        <p:strVal val="visible"/>
+                                      </p:to>
+                                    </p:set>
+                                    <p:anim calcmode="lin" valueType="num">
+                                      <p:cBhvr>
+                                        <p:cTn id="21" dur="500" fill="hold"/>
+                                        <p:tgtEl>
+                                          <p:spTgt spid="10"/>
+                                        </p:tgtEl>
+                                        <p:attrNameLst>
+                                          <p:attrName>ppt_w</p:attrName>
+                                        </p:attrNameLst>
+                                      </p:cBhvr>
+                                      <p:tavLst>
+                                        <p:tav tm="0">
+                                          <p:val>
+                                            <p:fltVal val="0"/>
+                                          </p:val>
+                                        </p:tav>
+                                        <p:tav tm="100000">
+                                          <p:val>
+                                            <p:strVal val="#ppt_w"/>
+                                          </p:val>
+                                        </p:tav>
+                                      </p:tavLst>
+                                    </p:anim>
+                                    <p:anim calcmode="lin" valueType="num">
+                                      <p:cBhvr>
+                                        <p:cTn id="22" dur="500" fill="hold"/>
+                                        <p:tgtEl>
+                                          <p:spTgt spid="10"/>
+                                        </p:tgtEl>
+                                        <p:attrNameLst>
+                                          <p:attrName>ppt_h</p:attrName>
+                                        </p:attrNameLst>
+                                      </p:cBhvr>
+                                      <p:tavLst>
+                                        <p:tav tm="0">
+                                          <p:val>
+                                            <p:fltVal val="0"/>
+                                          </p:val>
+                                        </p:tav>
+                                        <p:tav tm="100000">
+                                          <p:val>
+                                            <p:strVal val="#ppt_h"/>
+                                          </p:val>
+                                        </p:tav>
+                                      </p:tavLst>
+                                    </p:anim>
+                                    <p:animEffect transition="in" filter="fade">
+                                      <p:cBhvr>
+                                        <p:cTn id="23" dur="500"/>
+                                        <p:tgtEl>
+                                          <p:spTgt spid="10"/>
+                                        </p:tgtEl>
+                                      </p:cBhvr>
+                                    </p:animEffect>
+                                  </p:childTnLst>
+                                </p:cTn>
+                              </p:par>
+                              <p:par>
+                                <p:cTn id="24" presetID="53" presetClass="entr" presetSubtype="16" fill="hold" grpId="0" nodeType="withEffect">
+                                  <p:stCondLst>
+                                    <p:cond delay="0"/>
+                                  </p:stCondLst>
+                                  <p:childTnLst>
+                                    <p:set>
+                                      <p:cBhvr>
+                                        <p:cTn id="25" dur="1" fill="hold">
+                                          <p:stCondLst>
+                                            <p:cond delay="0"/>
+                                          </p:stCondLst>
+                                        </p:cTn>
+                                        <p:tgtEl>
+                                          <p:spTgt spid="11"/>
+                                        </p:tgtEl>
+                                        <p:attrNameLst>
+                                          <p:attrName>style.visibility</p:attrName>
+                                        </p:attrNameLst>
+                                      </p:cBhvr>
+                                      <p:to>
+                                        <p:strVal val="visible"/>
+                                      </p:to>
+                                    </p:set>
+                                    <p:anim calcmode="lin" valueType="num">
+                                      <p:cBhvr>
+                                        <p:cTn id="26" dur="500" fill="hold"/>
+                                        <p:tgtEl>
+                                          <p:spTgt spid="11"/>
+                                        </p:tgtEl>
+                                        <p:attrNameLst>
+                                          <p:attrName>ppt_w</p:attrName>
+                                        </p:attrNameLst>
+                                      </p:cBhvr>
+                                      <p:tavLst>
+                                        <p:tav tm="0">
+                                          <p:val>
+                                            <p:fltVal val="0"/>
+                                          </p:val>
+                                        </p:tav>
+                                        <p:tav tm="100000">
+                                          <p:val>
+                                            <p:strVal val="#ppt_w"/>
+                                          </p:val>
+                                        </p:tav>
+                                      </p:tavLst>
+                                    </p:anim>
+                                    <p:anim calcmode="lin" valueType="num">
+                                      <p:cBhvr>
+                                        <p:cTn id="27" dur="500" fill="hold"/>
+                                        <p:tgtEl>
+                                          <p:spTgt spid="11"/>
+                                        </p:tgtEl>
+                                        <p:attrNameLst>
+                                          <p:attrName>ppt_h</p:attrName>
+                                        </p:attrNameLst>
+                                      </p:cBhvr>
+                                      <p:tavLst>
+                                        <p:tav tm="0">
+                                          <p:val>
+                                            <p:fltVal val="0"/>
+                                          </p:val>
+                                        </p:tav>
+                                        <p:tav tm="100000">
+                                          <p:val>
+                                            <p:strVal val="#ppt_h"/>
+                                          </p:val>
+                                        </p:tav>
+                                      </p:tavLst>
+                                    </p:anim>
+                                    <p:animEffect transition="in" filter="fade">
+                                      <p:cBhvr>
+                                        <p:cTn id="28" dur="500"/>
+                                        <p:tgtEl>
+                                          <p:spTgt spid="11"/>
+                                        </p:tgtEl>
+                                      </p:cBhvr>
+                                    </p:animEffect>
+                                  </p:childTnLst>
+                                </p:cTn>
+                              </p:par>
+                              <p:par>
+                                <p:cTn id="29" presetID="53" presetClass="entr" presetSubtype="16" fill="hold" grpId="0" nodeType="withEffect">
+                                  <p:stCondLst>
+                                    <p:cond delay="0"/>
+                                  </p:stCondLst>
+                                  <p:childTnLst>
+                                    <p:set>
+                                      <p:cBhvr>
+                                        <p:cTn id="30" dur="1" fill="hold">
+                                          <p:stCondLst>
+                                            <p:cond delay="0"/>
+                                          </p:stCondLst>
+                                        </p:cTn>
+                                        <p:tgtEl>
+                                          <p:spTgt spid="12"/>
+                                        </p:tgtEl>
+                                        <p:attrNameLst>
+                                          <p:attrName>style.visibility</p:attrName>
+                                        </p:attrNameLst>
+                                      </p:cBhvr>
+                                      <p:to>
+                                        <p:strVal val="visible"/>
+                                      </p:to>
+                                    </p:set>
+                                    <p:anim calcmode="lin" valueType="num">
+                                      <p:cBhvr>
+                                        <p:cTn id="31" dur="500" fill="hold"/>
+                                        <p:tgtEl>
+                                          <p:spTgt spid="12"/>
+                                        </p:tgtEl>
+                                        <p:attrNameLst>
+                                          <p:attrName>ppt_w</p:attrName>
+                                        </p:attrNameLst>
+                                      </p:cBhvr>
+                                      <p:tavLst>
+                                        <p:tav tm="0">
+                                          <p:val>
+                                            <p:fltVal val="0"/>
+                                          </p:val>
+                                        </p:tav>
+                                        <p:tav tm="100000">
+                                          <p:val>
+                                            <p:strVal val="#ppt_w"/>
+                                          </p:val>
+                                        </p:tav>
+                                      </p:tavLst>
+                                    </p:anim>
+                                    <p:anim calcmode="lin" valueType="num">
+                                      <p:cBhvr>
+                                        <p:cTn id="32" dur="500" fill="hold"/>
+                                        <p:tgtEl>
+                                          <p:spTgt spid="12"/>
+                                        </p:tgtEl>
+                                        <p:attrNameLst>
+                                          <p:attrName>ppt_h</p:attrName>
+                                        </p:attrNameLst>
+                                      </p:cBhvr>
+                                      <p:tavLst>
+                                        <p:tav tm="0">
+                                          <p:val>
+                                            <p:fltVal val="0"/>
+                                          </p:val>
+                                        </p:tav>
+                                        <p:tav tm="100000">
+                                          <p:val>
+                                            <p:strVal val="#ppt_h"/>
+                                          </p:val>
+                                        </p:tav>
+                                      </p:tavLst>
+                                    </p:anim>
+                                    <p:animEffect transition="in" filter="fade">
+                                      <p:cBhvr>
+                                        <p:cTn id="33" dur="500"/>
+                                        <p:tgtEl>
+                                          <p:spTgt spid="12"/>
+                                        </p:tgtEl>
+                                      </p:cBhvr>
+                                    </p:animEffect>
+                                  </p:childTnLst>
+                                </p:cTn>
+                              </p:par>
+                              <p:par>
+                                <p:cTn id="34" presetID="53" presetClass="entr" presetSubtype="16" fill="hold" grpId="0" nodeType="withEffect">
+                                  <p:stCondLst>
+                                    <p:cond delay="0"/>
+                                  </p:stCondLst>
+                                  <p:childTnLst>
+                                    <p:set>
+                                      <p:cBhvr>
+                                        <p:cTn id="35" dur="1" fill="hold">
+                                          <p:stCondLst>
+                                            <p:cond delay="0"/>
+                                          </p:stCondLst>
+                                        </p:cTn>
+                                        <p:tgtEl>
+                                          <p:spTgt spid="13"/>
+                                        </p:tgtEl>
+                                        <p:attrNameLst>
+                                          <p:attrName>style.visibility</p:attrName>
+                                        </p:attrNameLst>
+                                      </p:cBhvr>
+                                      <p:to>
+                                        <p:strVal val="visible"/>
+                                      </p:to>
+                                    </p:set>
+                                    <p:anim calcmode="lin" valueType="num">
+                                      <p:cBhvr>
+                                        <p:cTn id="36" dur="500" fill="hold"/>
+                                        <p:tgtEl>
+                                          <p:spTgt spid="13"/>
+                                        </p:tgtEl>
+                                        <p:attrNameLst>
+                                          <p:attrName>ppt_w</p:attrName>
+                                        </p:attrNameLst>
+                                      </p:cBhvr>
+                                      <p:tavLst>
+                                        <p:tav tm="0">
+                                          <p:val>
+                                            <p:fltVal val="0"/>
+                                          </p:val>
+                                        </p:tav>
+                                        <p:tav tm="100000">
+                                          <p:val>
+                                            <p:strVal val="#ppt_w"/>
+                                          </p:val>
+                                        </p:tav>
+                                      </p:tavLst>
+                                    </p:anim>
+                                    <p:anim calcmode="lin" valueType="num">
+                                      <p:cBhvr>
+                                        <p:cTn id="37" dur="500" fill="hold"/>
+                                        <p:tgtEl>
+                                          <p:spTgt spid="13"/>
+                                        </p:tgtEl>
+                                        <p:attrNameLst>
+                                          <p:attrName>ppt_h</p:attrName>
+                                        </p:attrNameLst>
+                                      </p:cBhvr>
+                                      <p:tavLst>
+                                        <p:tav tm="0">
+                                          <p:val>
+                                            <p:fltVal val="0"/>
+                                          </p:val>
+                                        </p:tav>
+                                        <p:tav tm="100000">
+                                          <p:val>
+                                            <p:strVal val="#ppt_h"/>
+                                          </p:val>
+                                        </p:tav>
+                                      </p:tavLst>
+                                    </p:anim>
+                                    <p:animEffect transition="in" filter="fade">
+                                      <p:cBhvr>
+                                        <p:cTn id="38" dur="500"/>
+                                        <p:tgtEl>
+                                          <p:spTgt spid="13"/>
+                                        </p:tgtEl>
+                                      </p:cBhvr>
+                                    </p:animEffect>
+                                  </p:childTnLst>
+                                </p:cTn>
+                              </p:par>
+                              <p:par>
+                                <p:cTn id="39" presetID="53" presetClass="entr" presetSubtype="16" fill="hold" grpId="0" nodeType="withEffect">
+                                  <p:stCondLst>
+                                    <p:cond delay="0"/>
+                                  </p:stCondLst>
+                                  <p:childTnLst>
+                                    <p:set>
+                                      <p:cBhvr>
+                                        <p:cTn id="40" dur="1" fill="hold">
+                                          <p:stCondLst>
+                                            <p:cond delay="0"/>
+                                          </p:stCondLst>
+                                        </p:cTn>
+                                        <p:tgtEl>
+                                          <p:spTgt spid="23"/>
+                                        </p:tgtEl>
+                                        <p:attrNameLst>
+                                          <p:attrName>style.visibility</p:attrName>
+                                        </p:attrNameLst>
+                                      </p:cBhvr>
+                                      <p:to>
+                                        <p:strVal val="visible"/>
+                                      </p:to>
+                                    </p:set>
+                                    <p:anim calcmode="lin" valueType="num">
+                                      <p:cBhvr>
+                                        <p:cTn id="41" dur="500" fill="hold"/>
+                                        <p:tgtEl>
+                                          <p:spTgt spid="23"/>
+                                        </p:tgtEl>
+                                        <p:attrNameLst>
+                                          <p:attrName>ppt_w</p:attrName>
+                                        </p:attrNameLst>
+                                      </p:cBhvr>
+                                      <p:tavLst>
+                                        <p:tav tm="0">
+                                          <p:val>
+                                            <p:fltVal val="0"/>
+                                          </p:val>
+                                        </p:tav>
+                                        <p:tav tm="100000">
+                                          <p:val>
+                                            <p:strVal val="#ppt_w"/>
+                                          </p:val>
+                                        </p:tav>
+                                      </p:tavLst>
+                                    </p:anim>
+                                    <p:anim calcmode="lin" valueType="num">
+                                      <p:cBhvr>
+                                        <p:cTn id="42" dur="500" fill="hold"/>
+                                        <p:tgtEl>
+                                          <p:spTgt spid="23"/>
+                                        </p:tgtEl>
+                                        <p:attrNameLst>
+                                          <p:attrName>ppt_h</p:attrName>
+                                        </p:attrNameLst>
+                                      </p:cBhvr>
+                                      <p:tavLst>
+                                        <p:tav tm="0">
+                                          <p:val>
+                                            <p:fltVal val="0"/>
+                                          </p:val>
+                                        </p:tav>
+                                        <p:tav tm="100000">
+                                          <p:val>
+                                            <p:strVal val="#ppt_h"/>
+                                          </p:val>
+                                        </p:tav>
+                                      </p:tavLst>
+                                    </p:anim>
+                                    <p:animEffect transition="in" filter="fade">
+                                      <p:cBhvr>
+                                        <p:cTn id="43" dur="500"/>
+                                        <p:tgtEl>
+                                          <p:spTgt spid="23"/>
+                                        </p:tgtEl>
+                                      </p:cBhvr>
+                                    </p:animEffect>
+                                  </p:childTnLst>
+                                </p:cTn>
+                              </p:par>
+                              <p:par>
+                                <p:cTn id="44" presetID="53" presetClass="entr" presetSubtype="16" fill="hold" grpId="0" nodeType="withEffect">
+                                  <p:stCondLst>
+                                    <p:cond delay="0"/>
+                                  </p:stCondLst>
+                                  <p:childTnLst>
+                                    <p:set>
+                                      <p:cBhvr>
+                                        <p:cTn id="45" dur="1" fill="hold">
+                                          <p:stCondLst>
+                                            <p:cond delay="0"/>
+                                          </p:stCondLst>
+                                        </p:cTn>
+                                        <p:tgtEl>
+                                          <p:spTgt spid="25"/>
+                                        </p:tgtEl>
+                                        <p:attrNameLst>
+                                          <p:attrName>style.visibility</p:attrName>
+                                        </p:attrNameLst>
+                                      </p:cBhvr>
+                                      <p:to>
+                                        <p:strVal val="visible"/>
+                                      </p:to>
+                                    </p:set>
+                                    <p:anim calcmode="lin" valueType="num">
+                                      <p:cBhvr>
+                                        <p:cTn id="46" dur="500" fill="hold"/>
+                                        <p:tgtEl>
+                                          <p:spTgt spid="25"/>
+                                        </p:tgtEl>
+                                        <p:attrNameLst>
+                                          <p:attrName>ppt_w</p:attrName>
+                                        </p:attrNameLst>
+                                      </p:cBhvr>
+                                      <p:tavLst>
+                                        <p:tav tm="0">
+                                          <p:val>
+                                            <p:fltVal val="0"/>
+                                          </p:val>
+                                        </p:tav>
+                                        <p:tav tm="100000">
+                                          <p:val>
+                                            <p:strVal val="#ppt_w"/>
+                                          </p:val>
+                                        </p:tav>
+                                      </p:tavLst>
+                                    </p:anim>
+                                    <p:anim calcmode="lin" valueType="num">
+                                      <p:cBhvr>
+                                        <p:cTn id="47" dur="500" fill="hold"/>
+                                        <p:tgtEl>
+                                          <p:spTgt spid="25"/>
+                                        </p:tgtEl>
+                                        <p:attrNameLst>
+                                          <p:attrName>ppt_h</p:attrName>
+                                        </p:attrNameLst>
+                                      </p:cBhvr>
+                                      <p:tavLst>
+                                        <p:tav tm="0">
+                                          <p:val>
+                                            <p:fltVal val="0"/>
+                                          </p:val>
+                                        </p:tav>
+                                        <p:tav tm="100000">
+                                          <p:val>
+                                            <p:strVal val="#ppt_h"/>
+                                          </p:val>
+                                        </p:tav>
+                                      </p:tavLst>
+                                    </p:anim>
+                                    <p:animEffect transition="in" filter="fade">
+                                      <p:cBhvr>
+                                        <p:cTn id="48" dur="500"/>
+                                        <p:tgtEl>
+                                          <p:spTgt spid="25"/>
+                                        </p:tgtEl>
+                                      </p:cBhvr>
+                                    </p:animEffect>
+                                  </p:childTnLst>
+                                </p:cTn>
+                              </p:par>
+                              <p:par>
+                                <p:cTn id="49" presetID="53" presetClass="entr" presetSubtype="16" fill="hold" grpId="0" nodeType="withEffect">
+                                  <p:stCondLst>
+                                    <p:cond delay="0"/>
+                                  </p:stCondLst>
+                                  <p:childTnLst>
+                                    <p:set>
+                                      <p:cBhvr>
+                                        <p:cTn id="50" dur="1" fill="hold">
+                                          <p:stCondLst>
+                                            <p:cond delay="0"/>
+                                          </p:stCondLst>
+                                        </p:cTn>
+                                        <p:tgtEl>
+                                          <p:spTgt spid="7"/>
+                                        </p:tgtEl>
+                                        <p:attrNameLst>
+                                          <p:attrName>style.visibility</p:attrName>
+                                        </p:attrNameLst>
+                                      </p:cBhvr>
+                                      <p:to>
+                                        <p:strVal val="visible"/>
+                                      </p:to>
+                                    </p:set>
+                                    <p:anim calcmode="lin" valueType="num">
+                                      <p:cBhvr>
+                                        <p:cTn id="51" dur="500" fill="hold"/>
+                                        <p:tgtEl>
+                                          <p:spTgt spid="7"/>
+                                        </p:tgtEl>
+                                        <p:attrNameLst>
+                                          <p:attrName>ppt_w</p:attrName>
+                                        </p:attrNameLst>
+                                      </p:cBhvr>
+                                      <p:tavLst>
+                                        <p:tav tm="0">
+                                          <p:val>
+                                            <p:fltVal val="0"/>
+                                          </p:val>
+                                        </p:tav>
+                                        <p:tav tm="100000">
+                                          <p:val>
+                                            <p:strVal val="#ppt_w"/>
+                                          </p:val>
+                                        </p:tav>
+                                      </p:tavLst>
+                                    </p:anim>
+                                    <p:anim calcmode="lin" valueType="num">
+                                      <p:cBhvr>
+                                        <p:cTn id="52" dur="500" fill="hold"/>
+                                        <p:tgtEl>
+                                          <p:spTgt spid="7"/>
+                                        </p:tgtEl>
+                                        <p:attrNameLst>
+                                          <p:attrName>ppt_h</p:attrName>
+                                        </p:attrNameLst>
+                                      </p:cBhvr>
+                                      <p:tavLst>
+                                        <p:tav tm="0">
+                                          <p:val>
+                                            <p:fltVal val="0"/>
+                                          </p:val>
+                                        </p:tav>
+                                        <p:tav tm="100000">
+                                          <p:val>
+                                            <p:strVal val="#ppt_h"/>
+                                          </p:val>
+                                        </p:tav>
+                                      </p:tavLst>
+                                    </p:anim>
+                                    <p:animEffect transition="in" filter="fade">
+                                      <p:cBhvr>
+                                        <p:cTn id="53" dur="500"/>
+                                        <p:tgtEl>
+                                          <p:spTgt spid="7"/>
+                                        </p:tgtEl>
+                                      </p:cBhvr>
+                                    </p:animEffect>
+                                  </p:childTnLst>
+                                </p:cTn>
+                              </p:par>
+                              <p:par>
+                                <p:cTn id="54" presetID="53" presetClass="entr" presetSubtype="16" fill="hold" grpId="0" nodeType="withEffect">
+                                  <p:stCondLst>
+                                    <p:cond delay="0"/>
+                                  </p:stCondLst>
+                                  <p:childTnLst>
+                                    <p:set>
+                                      <p:cBhvr>
+                                        <p:cTn id="55" dur="1" fill="hold">
+                                          <p:stCondLst>
+                                            <p:cond delay="0"/>
+                                          </p:stCondLst>
+                                        </p:cTn>
+                                        <p:tgtEl>
+                                          <p:spTgt spid="14"/>
+                                        </p:tgtEl>
+                                        <p:attrNameLst>
+                                          <p:attrName>style.visibility</p:attrName>
+                                        </p:attrNameLst>
+                                      </p:cBhvr>
+                                      <p:to>
+                                        <p:strVal val="visible"/>
+                                      </p:to>
+                                    </p:set>
+                                    <p:anim calcmode="lin" valueType="num">
+                                      <p:cBhvr>
+                                        <p:cTn id="56" dur="500" fill="hold"/>
+                                        <p:tgtEl>
+                                          <p:spTgt spid="14"/>
+                                        </p:tgtEl>
+                                        <p:attrNameLst>
+                                          <p:attrName>ppt_w</p:attrName>
+                                        </p:attrNameLst>
+                                      </p:cBhvr>
+                                      <p:tavLst>
+                                        <p:tav tm="0">
+                                          <p:val>
+                                            <p:fltVal val="0"/>
+                                          </p:val>
+                                        </p:tav>
+                                        <p:tav tm="100000">
+                                          <p:val>
+                                            <p:strVal val="#ppt_w"/>
+                                          </p:val>
+                                        </p:tav>
+                                      </p:tavLst>
+                                    </p:anim>
+                                    <p:anim calcmode="lin" valueType="num">
+                                      <p:cBhvr>
+                                        <p:cTn id="57" dur="500" fill="hold"/>
+                                        <p:tgtEl>
+                                          <p:spTgt spid="14"/>
+                                        </p:tgtEl>
+                                        <p:attrNameLst>
+                                          <p:attrName>ppt_h</p:attrName>
+                                        </p:attrNameLst>
+                                      </p:cBhvr>
+                                      <p:tavLst>
+                                        <p:tav tm="0">
+                                          <p:val>
+                                            <p:fltVal val="0"/>
+                                          </p:val>
+                                        </p:tav>
+                                        <p:tav tm="100000">
+                                          <p:val>
+                                            <p:strVal val="#ppt_h"/>
+                                          </p:val>
+                                        </p:tav>
+                                      </p:tavLst>
+                                    </p:anim>
+                                    <p:animEffect transition="in" filter="fade">
+                                      <p:cBhvr>
+                                        <p:cTn id="58" dur="500"/>
+                                        <p:tgtEl>
+                                          <p:spTgt spid="14"/>
+                                        </p:tgtEl>
+                                      </p:cBhvr>
+                                    </p:animEffect>
+                                  </p:childTnLst>
+                                </p:cTn>
+                              </p:par>
+                              <p:par>
+                                <p:cTn id="59" presetID="53" presetClass="entr" presetSubtype="16" fill="hold" grpId="0" nodeType="withEffect">
+                                  <p:stCondLst>
+                                    <p:cond delay="0"/>
+                                  </p:stCondLst>
+                                  <p:childTnLst>
+                                    <p:set>
+                                      <p:cBhvr>
+                                        <p:cTn id="60" dur="1" fill="hold">
+                                          <p:stCondLst>
+                                            <p:cond delay="0"/>
+                                          </p:stCondLst>
+                                        </p:cTn>
+                                        <p:tgtEl>
+                                          <p:spTgt spid="15"/>
+                                        </p:tgtEl>
+                                        <p:attrNameLst>
+                                          <p:attrName>style.visibility</p:attrName>
+                                        </p:attrNameLst>
+                                      </p:cBhvr>
+                                      <p:to>
+                                        <p:strVal val="visible"/>
+                                      </p:to>
+                                    </p:set>
+                                    <p:anim calcmode="lin" valueType="num">
+                                      <p:cBhvr>
+                                        <p:cTn id="61" dur="500" fill="hold"/>
+                                        <p:tgtEl>
+                                          <p:spTgt spid="15"/>
+                                        </p:tgtEl>
+                                        <p:attrNameLst>
+                                          <p:attrName>ppt_w</p:attrName>
+                                        </p:attrNameLst>
+                                      </p:cBhvr>
+                                      <p:tavLst>
+                                        <p:tav tm="0">
+                                          <p:val>
+                                            <p:fltVal val="0"/>
+                                          </p:val>
+                                        </p:tav>
+                                        <p:tav tm="100000">
+                                          <p:val>
+                                            <p:strVal val="#ppt_w"/>
+                                          </p:val>
+                                        </p:tav>
+                                      </p:tavLst>
+                                    </p:anim>
+                                    <p:anim calcmode="lin" valueType="num">
+                                      <p:cBhvr>
+                                        <p:cTn id="62" dur="500" fill="hold"/>
+                                        <p:tgtEl>
+                                          <p:spTgt spid="15"/>
+                                        </p:tgtEl>
+                                        <p:attrNameLst>
+                                          <p:attrName>ppt_h</p:attrName>
+                                        </p:attrNameLst>
+                                      </p:cBhvr>
+                                      <p:tavLst>
+                                        <p:tav tm="0">
+                                          <p:val>
+                                            <p:fltVal val="0"/>
+                                          </p:val>
+                                        </p:tav>
+                                        <p:tav tm="100000">
+                                          <p:val>
+                                            <p:strVal val="#ppt_h"/>
+                                          </p:val>
+                                        </p:tav>
+                                      </p:tavLst>
+                                    </p:anim>
+                                    <p:animEffect transition="in" filter="fade">
+                                      <p:cBhvr>
+                                        <p:cTn id="63" dur="500"/>
+                                        <p:tgtEl>
+                                          <p:spTgt spid="15"/>
+                                        </p:tgtEl>
+                                      </p:cBhvr>
+                                    </p:animEffect>
+                                  </p:childTnLst>
+                                </p:cTn>
+                              </p:par>
+                              <p:par>
+                                <p:cTn id="64" presetID="53" presetClass="entr" presetSubtype="16" fill="hold" grpId="0" nodeType="withEffect">
+                                  <p:stCondLst>
+                                    <p:cond delay="0"/>
+                                  </p:stCondLst>
+                                  <p:childTnLst>
+                                    <p:set>
+                                      <p:cBhvr>
+                                        <p:cTn id="65" dur="1" fill="hold">
+                                          <p:stCondLst>
+                                            <p:cond delay="0"/>
+                                          </p:stCondLst>
+                                        </p:cTn>
+                                        <p:tgtEl>
+                                          <p:spTgt spid="17"/>
+                                        </p:tgtEl>
+                                        <p:attrNameLst>
+                                          <p:attrName>style.visibility</p:attrName>
+                                        </p:attrNameLst>
+                                      </p:cBhvr>
+                                      <p:to>
+                                        <p:strVal val="visible"/>
+                                      </p:to>
+                                    </p:set>
+                                    <p:anim calcmode="lin" valueType="num">
+                                      <p:cBhvr>
+                                        <p:cTn id="66" dur="500" fill="hold"/>
+                                        <p:tgtEl>
+                                          <p:spTgt spid="17"/>
+                                        </p:tgtEl>
+                                        <p:attrNameLst>
+                                          <p:attrName>ppt_w</p:attrName>
+                                        </p:attrNameLst>
+                                      </p:cBhvr>
+                                      <p:tavLst>
+                                        <p:tav tm="0">
+                                          <p:val>
+                                            <p:fltVal val="0"/>
+                                          </p:val>
+                                        </p:tav>
+                                        <p:tav tm="100000">
+                                          <p:val>
+                                            <p:strVal val="#ppt_w"/>
+                                          </p:val>
+                                        </p:tav>
+                                      </p:tavLst>
+                                    </p:anim>
+                                    <p:anim calcmode="lin" valueType="num">
+                                      <p:cBhvr>
+                                        <p:cTn id="67" dur="500" fill="hold"/>
+                                        <p:tgtEl>
+                                          <p:spTgt spid="17"/>
+                                        </p:tgtEl>
+                                        <p:attrNameLst>
+                                          <p:attrName>ppt_h</p:attrName>
+                                        </p:attrNameLst>
+                                      </p:cBhvr>
+                                      <p:tavLst>
+                                        <p:tav tm="0">
+                                          <p:val>
+                                            <p:fltVal val="0"/>
+                                          </p:val>
+                                        </p:tav>
+                                        <p:tav tm="100000">
+                                          <p:val>
+                                            <p:strVal val="#ppt_h"/>
+                                          </p:val>
+                                        </p:tav>
+                                      </p:tavLst>
+                                    </p:anim>
+                                    <p:animEffect transition="in" filter="fade">
+                                      <p:cBhvr>
+                                        <p:cTn id="68" dur="500"/>
+                                        <p:tgtEl>
+                                          <p:spTgt spid="17"/>
+                                        </p:tgtEl>
+                                      </p:cBhvr>
+                                    </p:animEffect>
+                                  </p:childTnLst>
+                                </p:cTn>
+                              </p:par>
+                              <p:par>
+                                <p:cTn id="69" presetID="53" presetClass="entr" presetSubtype="16" fill="hold" grpId="0" nodeType="withEffect">
+                                  <p:stCondLst>
+                                    <p:cond delay="0"/>
+                                  </p:stCondLst>
+                                  <p:childTnLst>
+                                    <p:set>
+                                      <p:cBhvr>
+                                        <p:cTn id="70" dur="1" fill="hold">
+                                          <p:stCondLst>
+                                            <p:cond delay="0"/>
+                                          </p:stCondLst>
+                                        </p:cTn>
+                                        <p:tgtEl>
+                                          <p:spTgt spid="18"/>
+                                        </p:tgtEl>
+                                        <p:attrNameLst>
+                                          <p:attrName>style.visibility</p:attrName>
+                                        </p:attrNameLst>
+                                      </p:cBhvr>
+                                      <p:to>
+                                        <p:strVal val="visible"/>
+                                      </p:to>
+                                    </p:set>
+                                    <p:anim calcmode="lin" valueType="num">
+                                      <p:cBhvr>
+                                        <p:cTn id="71" dur="500" fill="hold"/>
+                                        <p:tgtEl>
+                                          <p:spTgt spid="18"/>
+                                        </p:tgtEl>
+                                        <p:attrNameLst>
+                                          <p:attrName>ppt_w</p:attrName>
+                                        </p:attrNameLst>
+                                      </p:cBhvr>
+                                      <p:tavLst>
+                                        <p:tav tm="0">
+                                          <p:val>
+                                            <p:fltVal val="0"/>
+                                          </p:val>
+                                        </p:tav>
+                                        <p:tav tm="100000">
+                                          <p:val>
+                                            <p:strVal val="#ppt_w"/>
+                                          </p:val>
+                                        </p:tav>
+                                      </p:tavLst>
+                                    </p:anim>
+                                    <p:anim calcmode="lin" valueType="num">
+                                      <p:cBhvr>
+                                        <p:cTn id="72" dur="500" fill="hold"/>
+                                        <p:tgtEl>
+                                          <p:spTgt spid="18"/>
+                                        </p:tgtEl>
+                                        <p:attrNameLst>
+                                          <p:attrName>ppt_h</p:attrName>
+                                        </p:attrNameLst>
+                                      </p:cBhvr>
+                                      <p:tavLst>
+                                        <p:tav tm="0">
+                                          <p:val>
+                                            <p:fltVal val="0"/>
+                                          </p:val>
+                                        </p:tav>
+                                        <p:tav tm="100000">
+                                          <p:val>
+                                            <p:strVal val="#ppt_h"/>
+                                          </p:val>
+                                        </p:tav>
+                                      </p:tavLst>
+                                    </p:anim>
+                                    <p:animEffect transition="in" filter="fade">
+                                      <p:cBhvr>
+                                        <p:cTn id="73" dur="500"/>
+                                        <p:tgtEl>
+                                          <p:spTgt spid="18"/>
+                                        </p:tgtEl>
+                                      </p:cBhvr>
+                                    </p:animEffect>
+                                  </p:childTnLst>
+                                </p:cTn>
+                              </p:par>
+                              <p:par>
+                                <p:cTn id="74" presetID="53" presetClass="entr" presetSubtype="16" fill="hold" grpId="0" nodeType="withEffect">
+                                  <p:stCondLst>
+                                    <p:cond delay="0"/>
+                                  </p:stCondLst>
+                                  <p:childTnLst>
+                                    <p:set>
+                                      <p:cBhvr>
+                                        <p:cTn id="75" dur="1" fill="hold">
+                                          <p:stCondLst>
+                                            <p:cond delay="0"/>
+                                          </p:stCondLst>
+                                        </p:cTn>
+                                        <p:tgtEl>
+                                          <p:spTgt spid="19"/>
+                                        </p:tgtEl>
+                                        <p:attrNameLst>
+                                          <p:attrName>style.visibility</p:attrName>
+                                        </p:attrNameLst>
+                                      </p:cBhvr>
+                                      <p:to>
+                                        <p:strVal val="visible"/>
+                                      </p:to>
+                                    </p:set>
+                                    <p:anim calcmode="lin" valueType="num">
+                                      <p:cBhvr>
+                                        <p:cTn id="76" dur="500" fill="hold"/>
+                                        <p:tgtEl>
+                                          <p:spTgt spid="19"/>
+                                        </p:tgtEl>
+                                        <p:attrNameLst>
+                                          <p:attrName>ppt_w</p:attrName>
+                                        </p:attrNameLst>
+                                      </p:cBhvr>
+                                      <p:tavLst>
+                                        <p:tav tm="0">
+                                          <p:val>
+                                            <p:fltVal val="0"/>
+                                          </p:val>
+                                        </p:tav>
+                                        <p:tav tm="100000">
+                                          <p:val>
+                                            <p:strVal val="#ppt_w"/>
+                                          </p:val>
+                                        </p:tav>
+                                      </p:tavLst>
+                                    </p:anim>
+                                    <p:anim calcmode="lin" valueType="num">
+                                      <p:cBhvr>
+                                        <p:cTn id="77" dur="500" fill="hold"/>
+                                        <p:tgtEl>
+                                          <p:spTgt spid="19"/>
+                                        </p:tgtEl>
+                                        <p:attrNameLst>
+                                          <p:attrName>ppt_h</p:attrName>
+                                        </p:attrNameLst>
+                                      </p:cBhvr>
+                                      <p:tavLst>
+                                        <p:tav tm="0">
+                                          <p:val>
+                                            <p:fltVal val="0"/>
+                                          </p:val>
+                                        </p:tav>
+                                        <p:tav tm="100000">
+                                          <p:val>
+                                            <p:strVal val="#ppt_h"/>
+                                          </p:val>
+                                        </p:tav>
+                                      </p:tavLst>
+                                    </p:anim>
+                                    <p:animEffect transition="in" filter="fade">
+                                      <p:cBhvr>
+                                        <p:cTn id="78" dur="500"/>
+                                        <p:tgtEl>
+                                          <p:spTgt spid="19"/>
+                                        </p:tgtEl>
+                                      </p:cBhvr>
+                                    </p:animEffect>
+                                  </p:childTnLst>
+                                </p:cTn>
+                              </p:par>
+                              <p:par>
+                                <p:cTn id="79" presetID="53" presetClass="entr" presetSubtype="16" fill="hold" grpId="0" nodeType="withEffect">
+                                  <p:stCondLst>
+                                    <p:cond delay="0"/>
+                                  </p:stCondLst>
+                                  <p:childTnLst>
+                                    <p:set>
+                                      <p:cBhvr>
+                                        <p:cTn id="80" dur="1" fill="hold">
+                                          <p:stCondLst>
+                                            <p:cond delay="0"/>
+                                          </p:stCondLst>
+                                        </p:cTn>
+                                        <p:tgtEl>
+                                          <p:spTgt spid="20"/>
+                                        </p:tgtEl>
+                                        <p:attrNameLst>
+                                          <p:attrName>style.visibility</p:attrName>
+                                        </p:attrNameLst>
+                                      </p:cBhvr>
+                                      <p:to>
+                                        <p:strVal val="visible"/>
+                                      </p:to>
+                                    </p:set>
+                                    <p:anim calcmode="lin" valueType="num">
+                                      <p:cBhvr>
+                                        <p:cTn id="81" dur="500" fill="hold"/>
+                                        <p:tgtEl>
+                                          <p:spTgt spid="20"/>
+                                        </p:tgtEl>
+                                        <p:attrNameLst>
+                                          <p:attrName>ppt_w</p:attrName>
+                                        </p:attrNameLst>
+                                      </p:cBhvr>
+                                      <p:tavLst>
+                                        <p:tav tm="0">
+                                          <p:val>
+                                            <p:fltVal val="0"/>
+                                          </p:val>
+                                        </p:tav>
+                                        <p:tav tm="100000">
+                                          <p:val>
+                                            <p:strVal val="#ppt_w"/>
+                                          </p:val>
+                                        </p:tav>
+                                      </p:tavLst>
+                                    </p:anim>
+                                    <p:anim calcmode="lin" valueType="num">
+                                      <p:cBhvr>
+                                        <p:cTn id="82" dur="500" fill="hold"/>
+                                        <p:tgtEl>
+                                          <p:spTgt spid="20"/>
+                                        </p:tgtEl>
+                                        <p:attrNameLst>
+                                          <p:attrName>ppt_h</p:attrName>
+                                        </p:attrNameLst>
+                                      </p:cBhvr>
+                                      <p:tavLst>
+                                        <p:tav tm="0">
+                                          <p:val>
+                                            <p:fltVal val="0"/>
+                                          </p:val>
+                                        </p:tav>
+                                        <p:tav tm="100000">
+                                          <p:val>
+                                            <p:strVal val="#ppt_h"/>
+                                          </p:val>
+                                        </p:tav>
+                                      </p:tavLst>
+                                    </p:anim>
+                                    <p:animEffect transition="in" filter="fade">
+                                      <p:cBhvr>
+                                        <p:cTn id="83" dur="500"/>
+                                        <p:tgtEl>
+                                          <p:spTgt spid="20"/>
+                                        </p:tgtEl>
+                                      </p:cBhvr>
+                                    </p:animEffect>
+                                  </p:childTnLst>
+                                </p:cTn>
+                              </p:par>
+                              <p:par>
+                                <p:cTn id="84" presetID="53" presetClass="entr" presetSubtype="16" fill="hold" grpId="0" nodeType="withEffect">
+                                  <p:stCondLst>
+                                    <p:cond delay="0"/>
+                                  </p:stCondLst>
+                                  <p:childTnLst>
+                                    <p:set>
+                                      <p:cBhvr>
+                                        <p:cTn id="85" dur="1" fill="hold">
+                                          <p:stCondLst>
+                                            <p:cond delay="0"/>
+                                          </p:stCondLst>
+                                        </p:cTn>
+                                        <p:tgtEl>
+                                          <p:spTgt spid="21"/>
+                                        </p:tgtEl>
+                                        <p:attrNameLst>
+                                          <p:attrName>style.visibility</p:attrName>
+                                        </p:attrNameLst>
+                                      </p:cBhvr>
+                                      <p:to>
+                                        <p:strVal val="visible"/>
+                                      </p:to>
+                                    </p:set>
+                                    <p:anim calcmode="lin" valueType="num">
+                                      <p:cBhvr>
+                                        <p:cTn id="86" dur="500" fill="hold"/>
+                                        <p:tgtEl>
+                                          <p:spTgt spid="21"/>
+                                        </p:tgtEl>
+                                        <p:attrNameLst>
+                                          <p:attrName>ppt_w</p:attrName>
+                                        </p:attrNameLst>
+                                      </p:cBhvr>
+                                      <p:tavLst>
+                                        <p:tav tm="0">
+                                          <p:val>
+                                            <p:fltVal val="0"/>
+                                          </p:val>
+                                        </p:tav>
+                                        <p:tav tm="100000">
+                                          <p:val>
+                                            <p:strVal val="#ppt_w"/>
+                                          </p:val>
+                                        </p:tav>
+                                      </p:tavLst>
+                                    </p:anim>
+                                    <p:anim calcmode="lin" valueType="num">
+                                      <p:cBhvr>
+                                        <p:cTn id="87" dur="500" fill="hold"/>
+                                        <p:tgtEl>
+                                          <p:spTgt spid="21"/>
+                                        </p:tgtEl>
+                                        <p:attrNameLst>
+                                          <p:attrName>ppt_h</p:attrName>
+                                        </p:attrNameLst>
+                                      </p:cBhvr>
+                                      <p:tavLst>
+                                        <p:tav tm="0">
+                                          <p:val>
+                                            <p:fltVal val="0"/>
+                                          </p:val>
+                                        </p:tav>
+                                        <p:tav tm="100000">
+                                          <p:val>
+                                            <p:strVal val="#ppt_h"/>
+                                          </p:val>
+                                        </p:tav>
+                                      </p:tavLst>
+                                    </p:anim>
+                                    <p:animEffect transition="in" filter="fade">
+                                      <p:cBhvr>
+                                        <p:cTn id="88" dur="500"/>
+                                        <p:tgtEl>
+                                          <p:spTgt spid="21"/>
+                                        </p:tgtEl>
+                                      </p:cBhvr>
+                                    </p:animEffect>
+                                  </p:childTnLst>
+                                </p:cTn>
+                              </p:par>
+                              <p:par>
+                                <p:cTn id="89" presetID="53" presetClass="entr" presetSubtype="16" fill="hold" grpId="0" nodeType="withEffect">
+                                  <p:stCondLst>
+                                    <p:cond delay="0"/>
+                                  </p:stCondLst>
+                                  <p:childTnLst>
+                                    <p:set>
+                                      <p:cBhvr>
+                                        <p:cTn id="90" dur="1" fill="hold">
+                                          <p:stCondLst>
+                                            <p:cond delay="0"/>
+                                          </p:stCondLst>
+                                        </p:cTn>
+                                        <p:tgtEl>
+                                          <p:spTgt spid="22"/>
+                                        </p:tgtEl>
+                                        <p:attrNameLst>
+                                          <p:attrName>style.visibility</p:attrName>
+                                        </p:attrNameLst>
+                                      </p:cBhvr>
+                                      <p:to>
+                                        <p:strVal val="visible"/>
+                                      </p:to>
+                                    </p:set>
+                                    <p:anim calcmode="lin" valueType="num">
+                                      <p:cBhvr>
+                                        <p:cTn id="91" dur="500" fill="hold"/>
+                                        <p:tgtEl>
+                                          <p:spTgt spid="22"/>
+                                        </p:tgtEl>
+                                        <p:attrNameLst>
+                                          <p:attrName>ppt_w</p:attrName>
+                                        </p:attrNameLst>
+                                      </p:cBhvr>
+                                      <p:tavLst>
+                                        <p:tav tm="0">
+                                          <p:val>
+                                            <p:fltVal val="0"/>
+                                          </p:val>
+                                        </p:tav>
+                                        <p:tav tm="100000">
+                                          <p:val>
+                                            <p:strVal val="#ppt_w"/>
+                                          </p:val>
+                                        </p:tav>
+                                      </p:tavLst>
+                                    </p:anim>
+                                    <p:anim calcmode="lin" valueType="num">
+                                      <p:cBhvr>
+                                        <p:cTn id="92" dur="500" fill="hold"/>
+                                        <p:tgtEl>
+                                          <p:spTgt spid="22"/>
+                                        </p:tgtEl>
+                                        <p:attrNameLst>
+                                          <p:attrName>ppt_h</p:attrName>
+                                        </p:attrNameLst>
+                                      </p:cBhvr>
+                                      <p:tavLst>
+                                        <p:tav tm="0">
+                                          <p:val>
+                                            <p:fltVal val="0"/>
+                                          </p:val>
+                                        </p:tav>
+                                        <p:tav tm="100000">
+                                          <p:val>
+                                            <p:strVal val="#ppt_h"/>
+                                          </p:val>
+                                        </p:tav>
+                                      </p:tavLst>
+                                    </p:anim>
+                                    <p:animEffect transition="in" filter="fade">
+                                      <p:cBhvr>
+                                        <p:cTn id="93" dur="500"/>
+                                        <p:tgtEl>
+                                          <p:spTgt spid="22"/>
+                                        </p:tgtEl>
+                                      </p:cBhvr>
+                                    </p:animEffect>
+                                  </p:childTnLst>
+                                </p:cTn>
+                              </p:par>
+                              <p:par>
+                                <p:cTn id="94" presetID="53" presetClass="entr" presetSubtype="16" fill="hold" grpId="0" nodeType="withEffect">
+                                  <p:stCondLst>
+                                    <p:cond delay="0"/>
+                                  </p:stCondLst>
+                                  <p:childTnLst>
+                                    <p:set>
+                                      <p:cBhvr>
+                                        <p:cTn id="95" dur="1" fill="hold">
+                                          <p:stCondLst>
+                                            <p:cond delay="0"/>
+                                          </p:stCondLst>
+                                        </p:cTn>
+                                        <p:tgtEl>
+                                          <p:spTgt spid="24"/>
+                                        </p:tgtEl>
+                                        <p:attrNameLst>
+                                          <p:attrName>style.visibility</p:attrName>
+                                        </p:attrNameLst>
+                                      </p:cBhvr>
+                                      <p:to>
+                                        <p:strVal val="visible"/>
+                                      </p:to>
+                                    </p:set>
+                                    <p:anim calcmode="lin" valueType="num">
+                                      <p:cBhvr>
+                                        <p:cTn id="96" dur="500" fill="hold"/>
+                                        <p:tgtEl>
+                                          <p:spTgt spid="24"/>
+                                        </p:tgtEl>
+                                        <p:attrNameLst>
+                                          <p:attrName>ppt_w</p:attrName>
+                                        </p:attrNameLst>
+                                      </p:cBhvr>
+                                      <p:tavLst>
+                                        <p:tav tm="0">
+                                          <p:val>
+                                            <p:fltVal val="0"/>
+                                          </p:val>
+                                        </p:tav>
+                                        <p:tav tm="100000">
+                                          <p:val>
+                                            <p:strVal val="#ppt_w"/>
+                                          </p:val>
+                                        </p:tav>
+                                      </p:tavLst>
+                                    </p:anim>
+                                    <p:anim calcmode="lin" valueType="num">
+                                      <p:cBhvr>
+                                        <p:cTn id="97" dur="500" fill="hold"/>
+                                        <p:tgtEl>
+                                          <p:spTgt spid="24"/>
+                                        </p:tgtEl>
+                                        <p:attrNameLst>
+                                          <p:attrName>ppt_h</p:attrName>
+                                        </p:attrNameLst>
+                                      </p:cBhvr>
+                                      <p:tavLst>
+                                        <p:tav tm="0">
+                                          <p:val>
+                                            <p:fltVal val="0"/>
+                                          </p:val>
+                                        </p:tav>
+                                        <p:tav tm="100000">
+                                          <p:val>
+                                            <p:strVal val="#ppt_h"/>
+                                          </p:val>
+                                        </p:tav>
+                                      </p:tavLst>
+                                    </p:anim>
+                                    <p:animEffect transition="in" filter="fade">
+                                      <p:cBhvr>
+                                        <p:cTn id="98" dur="500"/>
+                                        <p:tgtEl>
+                                          <p:spTgt spid="24"/>
+                                        </p:tgtEl>
+                                      </p:cBhvr>
+                                    </p:animEffect>
+                                  </p:childTnLst>
+                                </p:cTn>
+                              </p:par>
+                            </p:childTnLst>
+                          </p:cTn>
+                        </p:par>
+                      </p:childTnLst>
+                    </p:cTn>
+                  </p:par>
+                </p:childTnLst>
+              </p:cTn>
+              <p:prevCondLst>
+                <p:cond evt="onPrev" delay="0">
+                  <p:tgtEl>
+                    <p:sldTgt/>
+                  </p:tgtEl>
+                </p:cond>
+              </p:prevCondLst>
+              <p:nextCondLst>
+                <p:cond evt="onNext" delay="0">
+                  <p:tgtEl>
+                    <p:sldTgt/>
+                  </p:tgtEl>
+                </p:cond>
+              </p:nextCondLst>
+            </p:seq>
+          </p:childTnLst>
+        </p:cTn>
       </p:par>
     </p:tnLst>
+    <p:bldLst>
+      <p:bldP spid="6" grpId="0" animBg="1"/>
+      <p:bldP spid="7" grpId="0" animBg="1"/>
+      <p:bldP spid="8" grpId="0" animBg="1"/>
+      <p:bldP spid="9" grpId="0" animBg="1"/>
+      <p:bldP spid="10" grpId="0" animBg="1"/>
+      <p:bldP spid="11" grpId="0" animBg="1"/>
+      <p:bldP spid="12" grpId="0" animBg="1"/>
+      <p:bldP spid="13" grpId="0" animBg="1"/>
+      <p:bldP spid="14" grpId="0" animBg="1"/>
+      <p:bldP spid="15" grpId="0" animBg="1"/>
+      <p:bldP spid="17" grpId="0" animBg="1"/>
+      <p:bldP spid="18" grpId="0" animBg="1"/>
+      <p:bldP spid="19" grpId="0" animBg="1"/>
+      <p:bldP spid="20" grpId="0" animBg="1"/>
+      <p:bldP spid="21" grpId="0" animBg="1"/>
+      <p:bldP spid="22" grpId="0" animBg="1"/>
+      <p:bldP spid="23" grpId="0" animBg="1"/>
+      <p:bldP spid="24" grpId="0" animBg="1"/>
+      <p:bldP spid="25" grpId="0" animBg="1"/>
+    </p:bldLst>
   </p:timing>
 </p:sld>
 </file>
@@ -7553,7 +9312,12 @@
             <p:ph type="title"/>
           </p:nvPr>
         </p:nvSpPr>
-        <p:spPr/>
+        <p:spPr>
+          <a:xfrm>
+            <a:off x="457200" y="-287131"/>
+            <a:ext cx="8229600" cy="1600200"/>
+          </a:xfrm>
+        </p:spPr>
         <p:txBody>
           <a:bodyPr/>
           <a:lstStyle/>
@@ -7576,39 +9340,533 @@
             <p:ph idx="1"/>
           </p:nvPr>
         </p:nvSpPr>
-        <p:spPr/>
-        <p:txBody>
-          <a:bodyPr/>
+        <p:spPr>
+          <a:xfrm>
+            <a:off x="457200" y="1323008"/>
+            <a:ext cx="8229600" cy="4525963"/>
+          </a:xfrm>
+        </p:spPr>
+        <p:txBody>
+          <a:bodyPr>
+            <a:normAutofit lnSpcReduction="10000"/>
+          </a:bodyPr>
           <a:lstStyle/>
           <a:p>
             <a:r>
-              <a:rPr lang="en-US" dirty="0" smtClean="0"/>
-              <a:t>Services</a:t>
-            </a:r>
+              <a:rPr lang="en-US" dirty="0" smtClean="0">
+                <a:solidFill>
+                  <a:srgbClr val="000000"/>
+                </a:solidFill>
+              </a:rPr>
+              <a:t>Services – </a:t>
+            </a:r>
+            <a:endParaRPr lang="en-US" dirty="0" smtClean="0">
+              <a:solidFill>
+                <a:srgbClr val="000000"/>
+              </a:solidFill>
+            </a:endParaRPr>
           </a:p>
           <a:p>
             <a:pPr lvl="1"/>
             <a:r>
-              <a:rPr lang="en-US" dirty="0" smtClean="0"/>
-              <a:t>TBD</a:t>
-            </a:r>
-          </a:p>
-          <a:p>
-            <a:r>
-              <a:rPr lang="en-US" dirty="0" smtClean="0"/>
-              <a:t>Factories</a:t>
-            </a:r>
-          </a:p>
-          <a:p>
-            <a:r>
-              <a:rPr lang="en-US" dirty="0"/>
-              <a:t>P</a:t>
-            </a:r>
-            <a:r>
-              <a:rPr lang="en-US" dirty="0" smtClean="0"/>
-              <a:t>roviders</a:t>
-            </a:r>
-            <a:endParaRPr lang="en-US" dirty="0"/>
+              <a:rPr lang="en-US" dirty="0" smtClean="0">
+                <a:solidFill>
+                  <a:srgbClr val="000000"/>
+                </a:solidFill>
+              </a:rPr>
+              <a:t>Reusable business logic independent of views</a:t>
+            </a:r>
+          </a:p>
+          <a:p>
+            <a:pPr lvl="1"/>
+            <a:r>
+              <a:rPr lang="en-US" dirty="0" smtClean="0">
+                <a:solidFill>
+                  <a:srgbClr val="000000"/>
+                </a:solidFill>
+              </a:rPr>
+              <a:t>Can be used by controllers and other services/components</a:t>
+            </a:r>
+          </a:p>
+          <a:p>
+            <a:pPr lvl="1"/>
+            <a:endParaRPr lang="en-US" dirty="0">
+              <a:solidFill>
+                <a:srgbClr val="000000"/>
+              </a:solidFill>
+            </a:endParaRPr>
+          </a:p>
+          <a:p>
+            <a:endParaRPr lang="en-US" dirty="0" smtClean="0">
+              <a:solidFill>
+                <a:srgbClr val="000000"/>
+              </a:solidFill>
+            </a:endParaRPr>
+          </a:p>
+          <a:p>
+            <a:endParaRPr lang="en-US" dirty="0">
+              <a:solidFill>
+                <a:srgbClr val="000000"/>
+              </a:solidFill>
+            </a:endParaRPr>
+          </a:p>
+          <a:p>
+            <a:endParaRPr lang="en-US" dirty="0" smtClean="0">
+              <a:solidFill>
+                <a:srgbClr val="000000"/>
+              </a:solidFill>
+            </a:endParaRPr>
+          </a:p>
+          <a:p>
+            <a:endParaRPr lang="en-US" dirty="0">
+              <a:solidFill>
+                <a:srgbClr val="000000"/>
+              </a:solidFill>
+            </a:endParaRPr>
+          </a:p>
+          <a:p>
+            <a:endParaRPr lang="en-US" dirty="0" smtClean="0">
+              <a:solidFill>
+                <a:srgbClr val="000000"/>
+              </a:solidFill>
+            </a:endParaRPr>
+          </a:p>
+          <a:p>
+            <a:endParaRPr lang="en-US" dirty="0" smtClean="0">
+              <a:solidFill>
+                <a:srgbClr val="000000"/>
+              </a:solidFill>
+            </a:endParaRPr>
+          </a:p>
+          <a:p>
+            <a:r>
+              <a:rPr lang="en-US" dirty="0" smtClean="0">
+                <a:solidFill>
+                  <a:srgbClr val="000000"/>
+                </a:solidFill>
+              </a:rPr>
+              <a:t>Many flavors – Services, factories &amp; providers</a:t>
+            </a:r>
+          </a:p>
+          <a:p>
+            <a:pPr lvl="1"/>
+            <a:r>
+              <a:rPr lang="en-US" dirty="0" smtClean="0">
+                <a:solidFill>
+                  <a:srgbClr val="000000"/>
+                </a:solidFill>
+              </a:rPr>
+              <a:t>Mainly differ in the creational pattern</a:t>
+            </a:r>
+            <a:endParaRPr lang="en-US" dirty="0">
+              <a:solidFill>
+                <a:srgbClr val="000000"/>
+              </a:solidFill>
+            </a:endParaRPr>
+          </a:p>
+        </p:txBody>
+      </p:sp>
+      <p:sp>
+        <p:nvSpPr>
+          <p:cNvPr id="4" name="TextBox 3"/>
+          <p:cNvSpPr txBox="1"/>
+          <p:nvPr/>
+        </p:nvSpPr>
+        <p:spPr>
+          <a:xfrm>
+            <a:off x="1015989" y="2341206"/>
+            <a:ext cx="6256815" cy="2492990"/>
+          </a:xfrm>
+          <a:prstGeom prst="rect">
+            <a:avLst/>
+          </a:prstGeom>
+          <a:noFill/>
+          <a:ln>
+            <a:solidFill>
+              <a:schemeClr val="tx1"/>
+            </a:solidFill>
+          </a:ln>
+        </p:spPr>
+        <p:txBody>
+          <a:bodyPr wrap="square" rtlCol="0">
+            <a:spAutoFit/>
+          </a:bodyPr>
+          <a:lstStyle/>
+          <a:p>
+            <a:pPr lvl="1"/>
+            <a:r>
+              <a:rPr lang="en-US" sz="1200" dirty="0" err="1">
+                <a:solidFill>
+                  <a:srgbClr val="000000"/>
+                </a:solidFill>
+                <a:latin typeface="Courier New"/>
+                <a:cs typeface="Courier New"/>
+              </a:rPr>
+              <a:t>angular.module</a:t>
+            </a:r>
+            <a:r>
+              <a:rPr lang="en-US" sz="1200" dirty="0">
+                <a:solidFill>
+                  <a:srgbClr val="000000"/>
+                </a:solidFill>
+                <a:latin typeface="Courier New"/>
+                <a:cs typeface="Courier New"/>
+              </a:rPr>
+              <a:t>('</a:t>
+            </a:r>
+            <a:r>
+              <a:rPr lang="en-US" sz="1200" dirty="0" err="1">
+                <a:solidFill>
+                  <a:srgbClr val="000000"/>
+                </a:solidFill>
+                <a:latin typeface="Courier New"/>
+                <a:cs typeface="Courier New"/>
+              </a:rPr>
+              <a:t>myModule</a:t>
+            </a:r>
+            <a:r>
+              <a:rPr lang="en-US" sz="1200" dirty="0">
+                <a:solidFill>
+                  <a:srgbClr val="000000"/>
+                </a:solidFill>
+                <a:latin typeface="Courier New"/>
+                <a:cs typeface="Courier New"/>
+              </a:rPr>
+              <a:t>', []).</a:t>
+            </a:r>
+          </a:p>
+          <a:p>
+            <a:pPr lvl="1"/>
+            <a:r>
+              <a:rPr lang="en-US" sz="1200" dirty="0">
+                <a:solidFill>
+                  <a:srgbClr val="000000"/>
+                </a:solidFill>
+                <a:latin typeface="Courier New"/>
+                <a:cs typeface="Courier New"/>
+              </a:rPr>
+              <a:t>  </a:t>
+            </a:r>
+            <a:r>
+              <a:rPr lang="en-US" sz="1200" b="1" dirty="0">
+                <a:solidFill>
+                  <a:srgbClr val="000000"/>
+                </a:solidFill>
+                <a:latin typeface="Courier New"/>
+                <a:cs typeface="Courier New"/>
+              </a:rPr>
+              <a:t>factory</a:t>
+            </a:r>
+            <a:r>
+              <a:rPr lang="en-US" sz="1200" dirty="0">
+                <a:solidFill>
+                  <a:srgbClr val="000000"/>
+                </a:solidFill>
+                <a:latin typeface="Courier New"/>
+                <a:cs typeface="Courier New"/>
+              </a:rPr>
+              <a:t>('</a:t>
+            </a:r>
+            <a:r>
+              <a:rPr lang="en-US" sz="1200" b="1" dirty="0">
+                <a:solidFill>
+                  <a:srgbClr val="000000"/>
+                </a:solidFill>
+                <a:latin typeface="Courier New"/>
+                <a:cs typeface="Courier New"/>
+              </a:rPr>
+              <a:t>greeter</a:t>
+            </a:r>
+            <a:r>
+              <a:rPr lang="en-US" sz="1200" dirty="0">
+                <a:solidFill>
+                  <a:srgbClr val="000000"/>
+                </a:solidFill>
+                <a:latin typeface="Courier New"/>
+                <a:cs typeface="Courier New"/>
+              </a:rPr>
+              <a:t>', function(</a:t>
+            </a:r>
+            <a:r>
+              <a:rPr lang="en-US" sz="1200" b="1" dirty="0" err="1">
+                <a:solidFill>
+                  <a:srgbClr val="000000"/>
+                </a:solidFill>
+                <a:latin typeface="Courier New"/>
+                <a:cs typeface="Courier New"/>
+              </a:rPr>
+              <a:t>someDependency</a:t>
+            </a:r>
+            <a:r>
+              <a:rPr lang="en-US" sz="1200" dirty="0">
+                <a:solidFill>
+                  <a:srgbClr val="000000"/>
+                </a:solidFill>
+                <a:latin typeface="Courier New"/>
+                <a:cs typeface="Courier New"/>
+              </a:rPr>
+              <a:t>) {</a:t>
+            </a:r>
+          </a:p>
+          <a:p>
+            <a:pPr lvl="1"/>
+            <a:endParaRPr lang="en-US" sz="1200" dirty="0">
+              <a:solidFill>
+                <a:srgbClr val="000000"/>
+              </a:solidFill>
+              <a:latin typeface="Courier New"/>
+              <a:cs typeface="Courier New"/>
+            </a:endParaRPr>
+          </a:p>
+          <a:p>
+            <a:pPr lvl="1"/>
+            <a:r>
+              <a:rPr lang="en-US" sz="1200" dirty="0">
+                <a:solidFill>
+                  <a:srgbClr val="000000"/>
+                </a:solidFill>
+                <a:latin typeface="Courier New"/>
+                <a:cs typeface="Courier New"/>
+              </a:rPr>
+              <a:t>    // do some </a:t>
+            </a:r>
+            <a:r>
+              <a:rPr lang="en-US" sz="1200" dirty="0" smtClean="0">
+                <a:solidFill>
+                  <a:srgbClr val="000000"/>
+                </a:solidFill>
+                <a:latin typeface="Courier New"/>
+                <a:cs typeface="Courier New"/>
+              </a:rPr>
+              <a:t>initialization </a:t>
+            </a:r>
+            <a:r>
+              <a:rPr lang="en-US" sz="1200" dirty="0">
+                <a:solidFill>
+                  <a:srgbClr val="000000"/>
+                </a:solidFill>
+                <a:latin typeface="Courier New"/>
+                <a:cs typeface="Courier New"/>
+              </a:rPr>
+              <a:t>here, </a:t>
+            </a:r>
+            <a:r>
+              <a:rPr lang="en-US" sz="1200" dirty="0" smtClean="0">
+                <a:solidFill>
+                  <a:srgbClr val="000000"/>
+                </a:solidFill>
+                <a:latin typeface="Courier New"/>
+                <a:cs typeface="Courier New"/>
+              </a:rPr>
+              <a:t>any internal </a:t>
+            </a:r>
+            <a:r>
+              <a:rPr lang="en-US" sz="1200" dirty="0">
+                <a:solidFill>
+                  <a:srgbClr val="000000"/>
+                </a:solidFill>
+                <a:latin typeface="Courier New"/>
+                <a:cs typeface="Courier New"/>
+              </a:rPr>
+              <a:t>methods,</a:t>
+            </a:r>
+          </a:p>
+          <a:p>
+            <a:pPr lvl="1"/>
+            <a:r>
+              <a:rPr lang="en-US" sz="1200" dirty="0">
+                <a:solidFill>
+                  <a:srgbClr val="000000"/>
+                </a:solidFill>
+                <a:latin typeface="Courier New"/>
+                <a:cs typeface="Courier New"/>
+              </a:rPr>
+              <a:t>    // if required</a:t>
+            </a:r>
+          </a:p>
+          <a:p>
+            <a:pPr lvl="1"/>
+            <a:endParaRPr lang="en-US" sz="1200" dirty="0">
+              <a:solidFill>
+                <a:srgbClr val="000000"/>
+              </a:solidFill>
+              <a:latin typeface="Courier New"/>
+              <a:cs typeface="Courier New"/>
+            </a:endParaRPr>
+          </a:p>
+          <a:p>
+            <a:pPr lvl="1"/>
+            <a:r>
+              <a:rPr lang="en-US" sz="1200" dirty="0">
+                <a:solidFill>
+                  <a:srgbClr val="000000"/>
+                </a:solidFill>
+                <a:latin typeface="Courier New"/>
+                <a:cs typeface="Courier New"/>
+              </a:rPr>
+              <a:t>    </a:t>
+            </a:r>
+            <a:r>
+              <a:rPr lang="en-US" sz="1200" b="1" dirty="0">
+                <a:solidFill>
+                  <a:srgbClr val="000000"/>
+                </a:solidFill>
+                <a:latin typeface="Courier New"/>
+                <a:cs typeface="Courier New"/>
+              </a:rPr>
+              <a:t>return</a:t>
+            </a:r>
+            <a:r>
+              <a:rPr lang="en-US" sz="1200" dirty="0">
+                <a:solidFill>
+                  <a:srgbClr val="000000"/>
+                </a:solidFill>
+                <a:latin typeface="Courier New"/>
+                <a:cs typeface="Courier New"/>
+              </a:rPr>
+              <a:t> </a:t>
+            </a:r>
+            <a:r>
+              <a:rPr lang="en-US" sz="1200" b="1" dirty="0">
+                <a:solidFill>
+                  <a:srgbClr val="000000"/>
+                </a:solidFill>
+                <a:latin typeface="Courier New"/>
+                <a:cs typeface="Courier New"/>
+              </a:rPr>
+              <a:t>{</a:t>
+            </a:r>
+          </a:p>
+          <a:p>
+            <a:pPr lvl="1"/>
+            <a:r>
+              <a:rPr lang="en-US" sz="1200" dirty="0">
+                <a:solidFill>
+                  <a:srgbClr val="000000"/>
+                </a:solidFill>
+                <a:latin typeface="Courier New"/>
+                <a:cs typeface="Courier New"/>
+              </a:rPr>
+              <a:t>      </a:t>
+            </a:r>
+            <a:r>
+              <a:rPr lang="en-US" sz="1200" i="1" dirty="0" err="1">
+                <a:solidFill>
+                  <a:srgbClr val="000000"/>
+                </a:solidFill>
+                <a:latin typeface="Courier New"/>
+                <a:cs typeface="Courier New"/>
+              </a:rPr>
+              <a:t>myMethod</a:t>
+            </a:r>
+            <a:r>
+              <a:rPr lang="en-US" sz="1200" dirty="0">
+                <a:solidFill>
+                  <a:srgbClr val="000000"/>
+                </a:solidFill>
+                <a:latin typeface="Courier New"/>
+                <a:cs typeface="Courier New"/>
+              </a:rPr>
+              <a:t>: function(text) {</a:t>
+            </a:r>
+          </a:p>
+          <a:p>
+            <a:pPr lvl="1"/>
+            <a:r>
+              <a:rPr lang="en-US" sz="1200" dirty="0">
+                <a:solidFill>
+                  <a:srgbClr val="000000"/>
+                </a:solidFill>
+                <a:latin typeface="Courier New"/>
+                <a:cs typeface="Courier New"/>
+              </a:rPr>
+              <a:t>        return </a:t>
+            </a:r>
+            <a:r>
+              <a:rPr lang="en-US" sz="1200" dirty="0" err="1">
+                <a:solidFill>
+                  <a:srgbClr val="000000"/>
+                </a:solidFill>
+                <a:latin typeface="Courier New"/>
+                <a:cs typeface="Courier New"/>
+              </a:rPr>
+              <a:t>text.toUpperCase</a:t>
+            </a:r>
+            <a:r>
+              <a:rPr lang="en-US" sz="1200" dirty="0">
+                <a:solidFill>
+                  <a:srgbClr val="000000"/>
+                </a:solidFill>
+                <a:latin typeface="Courier New"/>
+                <a:cs typeface="Courier New"/>
+              </a:rPr>
+              <a:t>();</a:t>
+            </a:r>
+          </a:p>
+          <a:p>
+            <a:pPr lvl="1"/>
+            <a:r>
+              <a:rPr lang="en-US" sz="1200" dirty="0">
+                <a:solidFill>
+                  <a:srgbClr val="000000"/>
+                </a:solidFill>
+                <a:latin typeface="Courier New"/>
+                <a:cs typeface="Courier New"/>
+              </a:rPr>
+              <a:t>      }</a:t>
+            </a:r>
+          </a:p>
+          <a:p>
+            <a:pPr lvl="1"/>
+            <a:r>
+              <a:rPr lang="en-US" sz="1200" dirty="0">
+                <a:solidFill>
+                  <a:srgbClr val="000000"/>
+                </a:solidFill>
+                <a:latin typeface="Courier New"/>
+                <a:cs typeface="Courier New"/>
+              </a:rPr>
+              <a:t>    </a:t>
+            </a:r>
+            <a:r>
+              <a:rPr lang="en-US" sz="1200" b="1" dirty="0">
+                <a:solidFill>
+                  <a:srgbClr val="000000"/>
+                </a:solidFill>
+                <a:latin typeface="Courier New"/>
+                <a:cs typeface="Courier New"/>
+              </a:rPr>
+              <a:t>}</a:t>
+            </a:r>
+            <a:r>
+              <a:rPr lang="en-US" sz="1200" dirty="0">
+                <a:solidFill>
+                  <a:srgbClr val="000000"/>
+                </a:solidFill>
+                <a:latin typeface="Courier New"/>
+                <a:cs typeface="Courier New"/>
+              </a:rPr>
+              <a:t>;</a:t>
+            </a:r>
+          </a:p>
+          <a:p>
+            <a:pPr lvl="1"/>
+            <a:r>
+              <a:rPr lang="en-US" sz="1200" dirty="0">
+                <a:solidFill>
+                  <a:srgbClr val="000000"/>
+                </a:solidFill>
+                <a:latin typeface="Courier New"/>
+                <a:cs typeface="Courier New"/>
+              </a:rPr>
+              <a:t>  });</a:t>
+            </a:r>
+          </a:p>
+          <a:p>
+            <a:endParaRPr lang="en-US" sz="1200" dirty="0">
+              <a:latin typeface="Courier New"/>
+              <a:cs typeface="Courier New"/>
+            </a:endParaRPr>
           </a:p>
         </p:txBody>
       </p:sp>
@@ -7659,7 +9917,12 @@
             <p:ph type="title"/>
           </p:nvPr>
         </p:nvSpPr>
-        <p:spPr/>
+        <p:spPr>
+          <a:xfrm>
+            <a:off x="457200" y="-198772"/>
+            <a:ext cx="8229600" cy="1600200"/>
+          </a:xfrm>
+        </p:spPr>
         <p:txBody>
           <a:bodyPr/>
           <a:lstStyle/>
@@ -7684,32 +9947,181 @@
         </p:nvSpPr>
         <p:spPr/>
         <p:txBody>
-          <a:bodyPr/>
+          <a:bodyPr>
+            <a:normAutofit fontScale="92500" lnSpcReduction="20000"/>
+          </a:bodyPr>
           <a:lstStyle/>
           <a:p>
             <a:r>
-              <a:rPr lang="en-US" dirty="0" smtClean="0"/>
-              <a:t>TBD</a:t>
-            </a:r>
-          </a:p>
-          <a:p>
-            <a:r>
-              <a:rPr lang="en-US" dirty="0" smtClean="0"/>
-              <a:t>Note about Angular and </a:t>
-            </a:r>
-            <a:r>
-              <a:rPr lang="en-US" dirty="0" err="1" smtClean="0"/>
+              <a:rPr lang="en-US" dirty="0">
+                <a:solidFill>
+                  <a:srgbClr val="000000"/>
+                </a:solidFill>
+              </a:rPr>
+              <a:t>Everything </a:t>
+            </a:r>
+            <a:r>
+              <a:rPr lang="en-US" dirty="0" smtClean="0">
+                <a:solidFill>
+                  <a:srgbClr val="000000"/>
+                </a:solidFill>
+              </a:rPr>
+              <a:t>is </a:t>
+            </a:r>
+            <a:r>
+              <a:rPr lang="en-US" dirty="0">
+                <a:solidFill>
+                  <a:srgbClr val="000000"/>
+                </a:solidFill>
+              </a:rPr>
+              <a:t>created and wired using dependency </a:t>
+            </a:r>
+            <a:r>
+              <a:rPr lang="en-US" dirty="0" smtClean="0">
+                <a:solidFill>
+                  <a:srgbClr val="000000"/>
+                </a:solidFill>
+              </a:rPr>
+              <a:t>injection (DI)</a:t>
+            </a:r>
+          </a:p>
+          <a:p>
+            <a:endParaRPr lang="en-US" dirty="0" smtClean="0">
+              <a:solidFill>
+                <a:srgbClr val="000000"/>
+              </a:solidFill>
+            </a:endParaRPr>
+          </a:p>
+          <a:p>
+            <a:r>
+              <a:rPr lang="en-US" dirty="0" smtClean="0">
+                <a:solidFill>
+                  <a:srgbClr val="000000"/>
+                </a:solidFill>
+              </a:rPr>
+              <a:t>Freedom from creating and managing services, internal dependencies</a:t>
+            </a:r>
+          </a:p>
+          <a:p>
+            <a:pPr lvl="1"/>
+            <a:r>
+              <a:rPr lang="en-US" dirty="0" smtClean="0">
+                <a:solidFill>
+                  <a:srgbClr val="000000"/>
+                </a:solidFill>
+              </a:rPr>
+              <a:t>No need of ‘new’</a:t>
+            </a:r>
+          </a:p>
+          <a:p>
+            <a:pPr lvl="1"/>
+            <a:r>
+              <a:rPr lang="en-US" dirty="0" smtClean="0">
+                <a:solidFill>
+                  <a:srgbClr val="000000"/>
+                </a:solidFill>
+              </a:rPr>
+              <a:t>No more dependency management</a:t>
+            </a:r>
+          </a:p>
+          <a:p>
+            <a:endParaRPr lang="en-US" dirty="0" smtClean="0">
+              <a:solidFill>
+                <a:srgbClr val="000000"/>
+              </a:solidFill>
+            </a:endParaRPr>
+          </a:p>
+          <a:p>
+            <a:r>
+              <a:rPr lang="en-US" dirty="0" err="1" smtClean="0">
+                <a:solidFill>
+                  <a:srgbClr val="000000"/>
+                </a:solidFill>
+              </a:rPr>
+              <a:t>Angular’s</a:t>
+            </a:r>
+            <a:r>
+              <a:rPr lang="en-US" dirty="0" smtClean="0">
+                <a:solidFill>
+                  <a:srgbClr val="000000"/>
+                </a:solidFill>
+              </a:rPr>
+              <a:t> Injector sub-system handles DIs</a:t>
+            </a:r>
+          </a:p>
+          <a:p>
+            <a:endParaRPr lang="en-US" dirty="0" smtClean="0">
+              <a:solidFill>
+                <a:srgbClr val="000000"/>
+              </a:solidFill>
+            </a:endParaRPr>
+          </a:p>
+          <a:p>
+            <a:r>
+              <a:rPr lang="en-US" dirty="0" smtClean="0">
+                <a:solidFill>
+                  <a:srgbClr val="000000"/>
+                </a:solidFill>
+              </a:rPr>
+              <a:t>All services, modules registered via Ids – $scope, $http, greeter etc.</a:t>
+            </a:r>
+          </a:p>
+          <a:p>
+            <a:pPr lvl="1"/>
+            <a:r>
+              <a:rPr lang="en-US" dirty="0" smtClean="0">
+                <a:solidFill>
+                  <a:srgbClr val="000000"/>
+                </a:solidFill>
+              </a:rPr>
+              <a:t>Modules assist in registering their own components</a:t>
+            </a:r>
+          </a:p>
+          <a:p>
+            <a:endParaRPr lang="en-US" dirty="0" smtClean="0">
+              <a:solidFill>
+                <a:srgbClr val="000000"/>
+              </a:solidFill>
+            </a:endParaRPr>
+          </a:p>
+          <a:p>
+            <a:r>
+              <a:rPr lang="en-US" dirty="0" smtClean="0">
+                <a:solidFill>
+                  <a:srgbClr val="000000"/>
+                </a:solidFill>
+              </a:rPr>
+              <a:t>Angular sub-system !== </a:t>
+            </a:r>
+            <a:r>
+              <a:rPr lang="en-US" dirty="0" err="1" smtClean="0">
+                <a:solidFill>
+                  <a:srgbClr val="000000"/>
+                </a:solidFill>
+              </a:rPr>
               <a:t>requireJS</a:t>
             </a:r>
             <a:r>
-              <a:rPr lang="en-US" dirty="0" smtClean="0"/>
+              <a:rPr lang="en-US" dirty="0" smtClean="0">
+                <a:solidFill>
+                  <a:srgbClr val="000000"/>
+                </a:solidFill>
+              </a:rPr>
               <a:t>/ </a:t>
             </a:r>
             <a:r>
-              <a:rPr lang="en-US" dirty="0" err="1" smtClean="0"/>
+              <a:rPr lang="en-US" dirty="0" err="1" smtClean="0">
+                <a:solidFill>
+                  <a:srgbClr val="000000"/>
+                </a:solidFill>
+              </a:rPr>
               <a:t>AMD.js</a:t>
             </a:r>
-            <a:endParaRPr lang="en-US" dirty="0"/>
+            <a:endParaRPr lang="en-US" dirty="0">
+              <a:solidFill>
+                <a:srgbClr val="000000"/>
+              </a:solidFill>
+            </a:endParaRPr>
           </a:p>
         </p:txBody>
       </p:sp>
@@ -7861,7 +10273,7 @@
       </p:grpSpPr>
       <p:sp>
         <p:nvSpPr>
-          <p:cNvPr id="4" name="Title 3"/>
+          <p:cNvPr id="2" name="Title 1"/>
           <p:cNvSpPr>
             <a:spLocks noGrp="1"/>
           </p:cNvSpPr>
@@ -7876,7 +10288,7 @@
           <a:p>
             <a:r>
               <a:rPr lang="en-US" dirty="0" smtClean="0"/>
-              <a:t>Custom Services</a:t>
+              <a:t>Custom Directives</a:t>
             </a:r>
             <a:endParaRPr lang="en-US" dirty="0"/>
           </a:p>
@@ -7884,7 +10296,7 @@
       </p:sp>
       <p:sp>
         <p:nvSpPr>
-          <p:cNvPr id="5" name="Content Placeholder 4"/>
+          <p:cNvPr id="3" name="Content Placeholder 2"/>
           <p:cNvSpPr>
             <a:spLocks noGrp="1"/>
           </p:cNvSpPr>
@@ -7898,17 +10310,25 @@
           <a:lstStyle/>
           <a:p>
             <a:r>
-              <a:rPr lang="en-US" dirty="0" smtClean="0"/>
+              <a:rPr lang="en-US" dirty="0" smtClean="0">
+                <a:solidFill>
+                  <a:srgbClr val="000000"/>
+                </a:solidFill>
+              </a:rPr>
               <a:t>TBD</a:t>
             </a:r>
-            <a:endParaRPr lang="en-US" dirty="0"/>
+            <a:endParaRPr lang="en-US" dirty="0">
+              <a:solidFill>
+                <a:srgbClr val="000000"/>
+              </a:solidFill>
+            </a:endParaRPr>
           </a:p>
         </p:txBody>
       </p:sp>
     </p:spTree>
     <p:extLst>
       <p:ext uri="{BB962C8B-B14F-4D97-AF65-F5344CB8AC3E}">
-        <p14:creationId xmlns:p14="http://schemas.microsoft.com/office/powerpoint/2010/main" val="3413280658"/>
+        <p14:creationId xmlns:p14="http://schemas.microsoft.com/office/powerpoint/2010/main" val="3272432926"/>
       </p:ext>
     </p:extLst>
   </p:cSld>
@@ -7959,7 +10379,7 @@
           <a:p>
             <a:r>
               <a:rPr lang="en-US" dirty="0" smtClean="0"/>
-              <a:t>Custom Directives</a:t>
+              <a:t>Best Practices</a:t>
             </a:r>
             <a:endParaRPr lang="en-US" dirty="0"/>
           </a:p>
@@ -7977,21 +10397,163 @@
         </p:nvSpPr>
         <p:spPr/>
         <p:txBody>
-          <a:bodyPr/>
+          <a:bodyPr>
+            <a:normAutofit lnSpcReduction="10000"/>
+          </a:bodyPr>
           <a:lstStyle/>
           <a:p>
             <a:r>
-              <a:rPr lang="en-US" dirty="0" smtClean="0"/>
-              <a:t>TBD</a:t>
-            </a:r>
-            <a:endParaRPr lang="en-US" dirty="0"/>
+              <a:rPr lang="en-US" dirty="0" smtClean="0">
+                <a:solidFill>
+                  <a:srgbClr val="000000"/>
+                </a:solidFill>
+              </a:rPr>
+              <a:t>In HTML views,</a:t>
+            </a:r>
+          </a:p>
+          <a:p>
+            <a:pPr lvl="1"/>
+            <a:r>
+              <a:rPr lang="en-US" dirty="0" smtClean="0">
+                <a:solidFill>
+                  <a:srgbClr val="000000"/>
+                </a:solidFill>
+              </a:rPr>
+              <a:t>Use Directives for common markups, extensions</a:t>
+            </a:r>
+          </a:p>
+          <a:p>
+            <a:pPr lvl="1"/>
+            <a:r>
+              <a:rPr lang="en-US" dirty="0" smtClean="0">
+                <a:solidFill>
+                  <a:srgbClr val="000000"/>
+                </a:solidFill>
+              </a:rPr>
+              <a:t>Do not use complex expressions in bindings. Move them to Controllers</a:t>
+            </a:r>
+          </a:p>
+          <a:p>
+            <a:pPr lvl="1"/>
+            <a:r>
+              <a:rPr lang="en-US" dirty="0" smtClean="0">
+                <a:solidFill>
+                  <a:srgbClr val="000000"/>
+                </a:solidFill>
+              </a:rPr>
+              <a:t>Optimize use of bindings. Lesser, the faster your application gets</a:t>
+            </a:r>
+            <a:endParaRPr lang="en-US" dirty="0">
+              <a:solidFill>
+                <a:srgbClr val="000000"/>
+              </a:solidFill>
+            </a:endParaRPr>
+          </a:p>
+          <a:p>
+            <a:r>
+              <a:rPr lang="en-US" dirty="0" smtClean="0">
+                <a:solidFill>
+                  <a:srgbClr val="000000"/>
+                </a:solidFill>
+              </a:rPr>
+              <a:t>In Controllers, </a:t>
+            </a:r>
+          </a:p>
+          <a:p>
+            <a:pPr lvl="1"/>
+            <a:r>
+              <a:rPr lang="en-US" dirty="0" smtClean="0">
+                <a:solidFill>
+                  <a:srgbClr val="000000"/>
+                </a:solidFill>
+              </a:rPr>
+              <a:t>Keep them light. Use Services to offload functionality</a:t>
+            </a:r>
+          </a:p>
+          <a:p>
+            <a:pPr lvl="1"/>
+            <a:r>
+              <a:rPr lang="en-US" dirty="0" smtClean="0">
+                <a:solidFill>
+                  <a:srgbClr val="000000"/>
+                </a:solidFill>
+              </a:rPr>
+              <a:t>No DOM manipulations! Delegate them to directives</a:t>
+            </a:r>
+            <a:endParaRPr lang="en-US" dirty="0">
+              <a:solidFill>
+                <a:srgbClr val="000000"/>
+              </a:solidFill>
+            </a:endParaRPr>
+          </a:p>
+          <a:p>
+            <a:r>
+              <a:rPr lang="en-US" dirty="0" smtClean="0">
+                <a:solidFill>
+                  <a:srgbClr val="000000"/>
+                </a:solidFill>
+              </a:rPr>
+              <a:t>In Directives,</a:t>
+            </a:r>
+          </a:p>
+          <a:p>
+            <a:pPr lvl="1"/>
+            <a:r>
+              <a:rPr lang="en-US" dirty="0" smtClean="0">
+                <a:solidFill>
+                  <a:srgbClr val="000000"/>
+                </a:solidFill>
+              </a:rPr>
+              <a:t>Notify Angular about direct changes on DOM, via $</a:t>
+            </a:r>
+            <a:r>
+              <a:rPr lang="en-US" dirty="0" err="1" smtClean="0">
+                <a:solidFill>
+                  <a:srgbClr val="000000"/>
+                </a:solidFill>
+              </a:rPr>
+              <a:t>scope.$apply</a:t>
+            </a:r>
+            <a:endParaRPr lang="en-US" dirty="0" smtClean="0">
+              <a:solidFill>
+                <a:srgbClr val="000000"/>
+              </a:solidFill>
+            </a:endParaRPr>
+          </a:p>
+          <a:p>
+            <a:r>
+              <a:rPr lang="en-US" dirty="0" smtClean="0">
+                <a:solidFill>
+                  <a:srgbClr val="000000"/>
+                </a:solidFill>
+              </a:rPr>
+              <a:t>Create modules to group controllers, services, directives etc.</a:t>
+            </a:r>
+          </a:p>
+          <a:p>
+            <a:r>
+              <a:rPr lang="en-US" dirty="0" smtClean="0">
+                <a:solidFill>
+                  <a:srgbClr val="000000"/>
+                </a:solidFill>
+              </a:rPr>
+              <a:t>Test (unit &amp; E2E) each component – Services, Controllers, Directives etc.</a:t>
+            </a:r>
+          </a:p>
+          <a:p>
+            <a:pPr lvl="1"/>
+            <a:endParaRPr lang="en-US" dirty="0">
+              <a:solidFill>
+                <a:srgbClr val="000000"/>
+              </a:solidFill>
+            </a:endParaRPr>
           </a:p>
         </p:txBody>
       </p:sp>
     </p:spTree>
     <p:extLst>
       <p:ext uri="{BB962C8B-B14F-4D97-AF65-F5344CB8AC3E}">
-        <p14:creationId xmlns:p14="http://schemas.microsoft.com/office/powerpoint/2010/main" val="3272432926"/>
+        <p14:creationId xmlns:p14="http://schemas.microsoft.com/office/powerpoint/2010/main" val="2159949293"/>
       </p:ext>
     </p:extLst>
   </p:cSld>
@@ -8076,118 +10638,189 @@
           <a:lstStyle/>
           <a:p>
             <a:r>
-              <a:rPr lang="en-US" dirty="0" smtClean="0"/>
+              <a:rPr lang="en-US" dirty="0" smtClean="0">
+                <a:solidFill>
+                  <a:srgbClr val="000000"/>
+                </a:solidFill>
+              </a:rPr>
               <a:t>Why </a:t>
             </a:r>
             <a:r>
               <a:rPr lang="en-US" dirty="0" smtClean="0">
+                <a:solidFill>
+                  <a:srgbClr val="000000"/>
+                </a:solidFill>
                 <a:latin typeface="+mn-lt"/>
                 <a:cs typeface="Lucida Grande"/>
               </a:rPr>
               <a:t>AngularJs</a:t>
             </a:r>
             <a:r>
-              <a:rPr lang="en-US" dirty="0" smtClean="0"/>
+              <a:rPr lang="en-US" dirty="0" smtClean="0">
+                <a:solidFill>
+                  <a:srgbClr val="000000"/>
+                </a:solidFill>
+              </a:rPr>
               <a:t>?</a:t>
             </a:r>
-            <a:endParaRPr lang="en-US" dirty="0" smtClean="0"/>
-          </a:p>
-          <a:p>
-            <a:r>
-              <a:rPr lang="en-US" dirty="0" smtClean="0"/>
+          </a:p>
+          <a:p>
+            <a:r>
+              <a:rPr lang="en-US" dirty="0" smtClean="0">
+                <a:solidFill>
+                  <a:srgbClr val="000000"/>
+                </a:solidFill>
+              </a:rPr>
               <a:t>What is AngularJs?</a:t>
             </a:r>
           </a:p>
           <a:p>
             <a:r>
-              <a:rPr lang="en-US" dirty="0" smtClean="0"/>
+              <a:rPr lang="en-US" dirty="0" smtClean="0">
+                <a:solidFill>
+                  <a:srgbClr val="000000"/>
+                </a:solidFill>
+              </a:rPr>
               <a:t>Getting started</a:t>
             </a:r>
           </a:p>
           <a:p>
             <a:pPr lvl="1"/>
             <a:r>
-              <a:rPr lang="en-US" dirty="0" smtClean="0"/>
+              <a:rPr lang="en-US" dirty="0" smtClean="0">
+                <a:solidFill>
+                  <a:srgbClr val="000000"/>
+                </a:solidFill>
+              </a:rPr>
               <a:t>Anatomy of an Angular app</a:t>
             </a:r>
           </a:p>
           <a:p>
             <a:pPr lvl="1"/>
             <a:r>
-              <a:rPr lang="en-US" dirty="0" smtClean="0"/>
+              <a:rPr lang="en-US" dirty="0" smtClean="0">
+                <a:solidFill>
+                  <a:srgbClr val="000000"/>
+                </a:solidFill>
+              </a:rPr>
               <a:t>MVC</a:t>
             </a:r>
           </a:p>
           <a:p>
             <a:pPr lvl="1"/>
             <a:r>
-              <a:rPr lang="en-US" dirty="0" smtClean="0"/>
+              <a:rPr lang="en-US" dirty="0" smtClean="0">
+                <a:solidFill>
+                  <a:srgbClr val="000000"/>
+                </a:solidFill>
+              </a:rPr>
               <a:t>Data-binding</a:t>
             </a:r>
           </a:p>
           <a:p>
             <a:pPr lvl="1"/>
             <a:r>
-              <a:rPr lang="en-US" dirty="0" smtClean="0"/>
+              <a:rPr lang="en-US" dirty="0" smtClean="0">
+                <a:solidFill>
+                  <a:srgbClr val="000000"/>
+                </a:solidFill>
+              </a:rPr>
               <a:t>Bindings, expressions, filters</a:t>
             </a:r>
           </a:p>
           <a:p>
             <a:pPr lvl="1"/>
             <a:r>
-              <a:rPr lang="en-US" dirty="0" smtClean="0"/>
+              <a:rPr lang="en-US" dirty="0" smtClean="0">
+                <a:solidFill>
+                  <a:srgbClr val="000000"/>
+                </a:solidFill>
+              </a:rPr>
               <a:t>Directives</a:t>
             </a:r>
           </a:p>
           <a:p>
             <a:pPr lvl="1"/>
             <a:r>
-              <a:rPr lang="en-US" dirty="0" smtClean="0"/>
+              <a:rPr lang="en-US" dirty="0" smtClean="0">
+                <a:solidFill>
+                  <a:srgbClr val="000000"/>
+                </a:solidFill>
+              </a:rPr>
               <a:t>Services</a:t>
             </a:r>
           </a:p>
           <a:p>
             <a:pPr lvl="1"/>
             <a:r>
-              <a:rPr lang="en-US" dirty="0"/>
+              <a:rPr lang="en-US" dirty="0">
+                <a:solidFill>
+                  <a:srgbClr val="000000"/>
+                </a:solidFill>
+              </a:rPr>
               <a:t>Dependency </a:t>
             </a:r>
             <a:r>
-              <a:rPr lang="en-US" dirty="0" smtClean="0"/>
+              <a:rPr lang="en-US" dirty="0" smtClean="0">
+                <a:solidFill>
+                  <a:srgbClr val="000000"/>
+                </a:solidFill>
+              </a:rPr>
               <a:t>Injections</a:t>
             </a:r>
-            <a:endParaRPr lang="en-US" dirty="0" smtClean="0"/>
-          </a:p>
-          <a:p>
-            <a:r>
-              <a:rPr lang="en-US" dirty="0" smtClean="0"/>
+          </a:p>
+          <a:p>
+            <a:r>
+              <a:rPr lang="en-US" dirty="0" smtClean="0">
+                <a:solidFill>
+                  <a:srgbClr val="000000"/>
+                </a:solidFill>
+              </a:rPr>
               <a:t>Demo</a:t>
             </a:r>
           </a:p>
           <a:p>
             <a:r>
-              <a:rPr lang="en-US" dirty="0"/>
-              <a:t>Custom services &amp; Custom </a:t>
-            </a:r>
-            <a:r>
-              <a:rPr lang="en-US" dirty="0" smtClean="0"/>
+              <a:rPr lang="en-US" dirty="0" smtClean="0">
+                <a:solidFill>
+                  <a:srgbClr val="000000"/>
+                </a:solidFill>
+              </a:rPr>
+              <a:t>Custom </a:t>
+            </a:r>
+            <a:r>
+              <a:rPr lang="en-US" dirty="0" smtClean="0">
+                <a:solidFill>
+                  <a:srgbClr val="000000"/>
+                </a:solidFill>
+              </a:rPr>
               <a:t>Directives</a:t>
             </a:r>
-            <a:endParaRPr lang="en-US" dirty="0" smtClean="0"/>
-          </a:p>
-          <a:p>
-            <a:r>
-              <a:rPr lang="en-US" dirty="0" smtClean="0"/>
+          </a:p>
+          <a:p>
+            <a:r>
+              <a:rPr lang="en-US" dirty="0" smtClean="0">
+                <a:solidFill>
+                  <a:srgbClr val="000000"/>
+                </a:solidFill>
+              </a:rPr>
               <a:t>Best practices</a:t>
             </a:r>
-            <a:endParaRPr lang="en-US" dirty="0" smtClean="0"/>
-          </a:p>
-          <a:p>
-            <a:r>
-              <a:rPr lang="en-US" dirty="0" smtClean="0"/>
+          </a:p>
+          <a:p>
+            <a:r>
+              <a:rPr lang="en-US" dirty="0" smtClean="0">
+                <a:solidFill>
+                  <a:srgbClr val="000000"/>
+                </a:solidFill>
+              </a:rPr>
               <a:t>Q&amp;A</a:t>
             </a:r>
-            <a:endParaRPr lang="en-US" dirty="0"/>
+            <a:endParaRPr lang="en-US" dirty="0">
+              <a:solidFill>
+                <a:srgbClr val="000000"/>
+              </a:solidFill>
+            </a:endParaRPr>
           </a:p>
         </p:txBody>
       </p:sp>
@@ -8275,7 +10908,7 @@
           <a:p>
             <a:r>
               <a:rPr lang="en-US" dirty="0" smtClean="0"/>
-              <a:t>Best Practices</a:t>
+              <a:t>Best Practices..</a:t>
             </a:r>
             <a:endParaRPr lang="en-US" dirty="0"/>
           </a:p>
@@ -8294,87 +10927,60 @@
         <p:spPr/>
         <p:txBody>
           <a:bodyPr>
-            <a:normAutofit lnSpcReduction="10000"/>
+            <a:normAutofit/>
           </a:bodyPr>
           <a:lstStyle/>
           <a:p>
             <a:r>
-              <a:rPr lang="en-US" dirty="0" smtClean="0"/>
-              <a:t>In HTML views,</a:t>
-            </a:r>
-          </a:p>
-          <a:p>
-            <a:pPr lvl="1"/>
-            <a:r>
-              <a:rPr lang="en-US" dirty="0" smtClean="0"/>
-              <a:t>Use Directives for common markups, extensions</a:t>
-            </a:r>
-          </a:p>
-          <a:p>
-            <a:pPr lvl="1"/>
-            <a:r>
-              <a:rPr lang="en-US" dirty="0" smtClean="0"/>
-              <a:t>Do not use complex expressions in bindings. Move them to Controllers</a:t>
-            </a:r>
-          </a:p>
-          <a:p>
-            <a:pPr lvl="1"/>
-            <a:r>
-              <a:rPr lang="en-US" dirty="0" smtClean="0"/>
-              <a:t>Optimize use of bindings. Lesser, the faster your application gets</a:t>
-            </a:r>
-            <a:endParaRPr lang="en-US" dirty="0"/>
-          </a:p>
-          <a:p>
-            <a:r>
-              <a:rPr lang="en-US" dirty="0" smtClean="0"/>
-              <a:t>In Controllers, </a:t>
-            </a:r>
-          </a:p>
-          <a:p>
-            <a:pPr lvl="1"/>
-            <a:r>
-              <a:rPr lang="en-US" dirty="0" smtClean="0"/>
-              <a:t>Keep them light. Use Services to offload functionality</a:t>
-            </a:r>
-          </a:p>
-          <a:p>
-            <a:pPr lvl="1"/>
-            <a:r>
-              <a:rPr lang="en-US" dirty="0" smtClean="0"/>
-              <a:t>No DOM manipulations! Delegate them to directives</a:t>
-            </a:r>
-            <a:endParaRPr lang="en-US" dirty="0"/>
-          </a:p>
-          <a:p>
-            <a:r>
-              <a:rPr lang="en-US" dirty="0" smtClean="0"/>
-              <a:t>In Directives,</a:t>
-            </a:r>
-          </a:p>
-          <a:p>
-            <a:pPr lvl="1"/>
-            <a:r>
-              <a:rPr lang="en-US" dirty="0" smtClean="0"/>
-              <a:t>Notify Angular about direct changes on DOM, via $</a:t>
-            </a:r>
-            <a:r>
-              <a:rPr lang="en-US" dirty="0" err="1" smtClean="0"/>
-              <a:t>scope.$apply</a:t>
-            </a:r>
+              <a:rPr lang="en-US" dirty="0" smtClean="0">
+                <a:solidFill>
+                  <a:srgbClr val="000000"/>
+                </a:solidFill>
+              </a:rPr>
+              <a:t>Use $inject pattern for defining components. Avoids breakages when minifying</a:t>
+            </a:r>
+          </a:p>
+          <a:p>
+            <a:r>
+              <a:rPr lang="en-US" dirty="0" smtClean="0">
+                <a:solidFill>
+                  <a:srgbClr val="000000"/>
+                </a:solidFill>
+              </a:rPr>
+              <a:t>Do not create $ and $$ prefixed APIs. They represent </a:t>
+            </a:r>
+            <a:r>
+              <a:rPr lang="en-US" dirty="0" err="1" smtClean="0">
+                <a:solidFill>
+                  <a:srgbClr val="000000"/>
+                </a:solidFill>
+              </a:rPr>
+              <a:t>Angular’s</a:t>
+            </a:r>
+            <a:r>
+              <a:rPr lang="en-US" dirty="0" smtClean="0">
+                <a:solidFill>
+                  <a:srgbClr val="000000"/>
+                </a:solidFill>
+              </a:rPr>
+              <a:t> internal APIs, could lead to collisions </a:t>
+            </a:r>
+          </a:p>
+          <a:p>
+            <a:r>
+              <a:rPr lang="en-US" dirty="0" smtClean="0">
+                <a:solidFill>
+                  <a:srgbClr val="000000"/>
+                </a:solidFill>
+              </a:rPr>
+              <a:t>Prefer ‘data-’ prefix when using directives</a:t>
+            </a:r>
+          </a:p>
+          <a:p>
             <a:endParaRPr lang="en-US" dirty="0" smtClean="0"/>
           </a:p>
           <a:p>
-            <a:r>
-              <a:rPr lang="en-US" dirty="0" smtClean="0"/>
-              <a:t>Create modules to group controllers, services, directives etc.</a:t>
-            </a:r>
-          </a:p>
-          <a:p>
-            <a:r>
-              <a:rPr lang="en-US" dirty="0" smtClean="0"/>
-              <a:t>Test (unit &amp; E2E) each component – Services, Controllers, Directives etc.</a:t>
-            </a:r>
+            <a:endParaRPr lang="en-US" dirty="0" smtClean="0"/>
           </a:p>
           <a:p>
             <a:pPr lvl="1"/>
@@ -8385,7 +10991,7 @@
     </p:spTree>
     <p:extLst>
       <p:ext uri="{BB962C8B-B14F-4D97-AF65-F5344CB8AC3E}">
-        <p14:creationId xmlns:p14="http://schemas.microsoft.com/office/powerpoint/2010/main" val="2159949293"/>
+        <p14:creationId xmlns:p14="http://schemas.microsoft.com/office/powerpoint/2010/main" val="839905389"/>
       </p:ext>
     </p:extLst>
   </p:cSld>
@@ -8421,7 +11027,7 @@
       </p:grpSpPr>
       <p:sp>
         <p:nvSpPr>
-          <p:cNvPr id="2" name="Title 1"/>
+          <p:cNvPr id="4" name="Title 3"/>
           <p:cNvSpPr>
             <a:spLocks noGrp="1"/>
           </p:cNvSpPr>
@@ -8429,14 +11035,19 @@
             <p:ph type="title"/>
           </p:nvPr>
         </p:nvSpPr>
-        <p:spPr/>
+        <p:spPr>
+          <a:xfrm>
+            <a:off x="722313" y="1084470"/>
+            <a:ext cx="7772400" cy="2505075"/>
+          </a:xfrm>
+        </p:spPr>
         <p:txBody>
           <a:bodyPr/>
           <a:lstStyle/>
           <a:p>
             <a:r>
               <a:rPr lang="en-US" dirty="0" smtClean="0"/>
-              <a:t>Best Practices..</a:t>
+              <a:t>Questions?</a:t>
             </a:r>
             <a:endParaRPr lang="en-US" dirty="0"/>
           </a:p>
@@ -8444,70 +11055,27 @@
       </p:sp>
       <p:sp>
         <p:nvSpPr>
-          <p:cNvPr id="3" name="Content Placeholder 2"/>
+          <p:cNvPr id="5" name="Text Placeholder 4"/>
           <p:cNvSpPr>
             <a:spLocks noGrp="1"/>
           </p:cNvSpPr>
           <p:nvPr>
-            <p:ph idx="1"/>
+            <p:ph type="body" idx="1"/>
           </p:nvPr>
         </p:nvSpPr>
         <p:spPr/>
         <p:txBody>
-          <a:bodyPr>
-            <a:normAutofit/>
-          </a:bodyPr>
+          <a:bodyPr/>
           <a:lstStyle/>
           <a:p>
-            <a:r>
-              <a:rPr lang="en-US" dirty="0" smtClean="0"/>
-              <a:t>Use $inject pattern for defining components. Avoids breakages when minifying</a:t>
-            </a:r>
-          </a:p>
-          <a:p>
-            <a:r>
-              <a:rPr lang="en-US" dirty="0" smtClean="0"/>
-              <a:t>Do not create $ and $$ prefixed APIs. They represent Angular internal </a:t>
-            </a:r>
-            <a:r>
-              <a:rPr lang="en-US" dirty="0" err="1" smtClean="0"/>
-              <a:t>Apis</a:t>
-            </a:r>
-            <a:r>
-              <a:rPr lang="en-US" dirty="0" smtClean="0"/>
-              <a:t>, could lead to </a:t>
-            </a:r>
-            <a:r>
-              <a:rPr lang="en-US" dirty="0" err="1" smtClean="0"/>
-              <a:t>collissions</a:t>
-            </a:r>
-            <a:r>
-              <a:rPr lang="en-US" dirty="0" smtClean="0"/>
-              <a:t> </a:t>
-            </a:r>
-          </a:p>
-          <a:p>
-            <a:r>
-              <a:rPr lang="en-US" dirty="0" smtClean="0"/>
-              <a:t>Prefer ‘data-’ prefix when using directives</a:t>
-            </a:r>
-          </a:p>
-          <a:p>
-            <a:endParaRPr lang="en-US" dirty="0" smtClean="0"/>
-          </a:p>
-          <a:p>
-            <a:endParaRPr lang="en-US" dirty="0" smtClean="0"/>
-          </a:p>
-          <a:p>
-            <a:pPr lvl="1"/>
-            <a:endParaRPr lang="en-US" dirty="0"/>
+            <a:endParaRPr lang="en-US"/>
           </a:p>
         </p:txBody>
       </p:sp>
     </p:spTree>
     <p:extLst>
       <p:ext uri="{BB962C8B-B14F-4D97-AF65-F5344CB8AC3E}">
-        <p14:creationId xmlns:p14="http://schemas.microsoft.com/office/powerpoint/2010/main" val="839905389"/>
+        <p14:creationId xmlns:p14="http://schemas.microsoft.com/office/powerpoint/2010/main" val="265151762"/>
       </p:ext>
     </p:extLst>
   </p:cSld>
@@ -8558,7 +11126,7 @@
           <a:p>
             <a:r>
               <a:rPr lang="en-US" dirty="0" smtClean="0"/>
-              <a:t>What we covered..</a:t>
+              <a:t>References</a:t>
             </a:r>
             <a:endParaRPr lang="en-US" dirty="0"/>
           </a:p>
@@ -8566,7 +11134,7 @@
       </p:sp>
       <p:sp>
         <p:nvSpPr>
-          <p:cNvPr id="3" name="Content Placeholder 2"/>
+          <p:cNvPr id="4" name="Content Placeholder 3"/>
           <p:cNvSpPr>
             <a:spLocks noGrp="1"/>
           </p:cNvSpPr>
@@ -8580,83 +11148,20 @@
           <a:lstStyle/>
           <a:p>
             <a:r>
-              <a:rPr lang="en-US" dirty="0" smtClean="0"/>
-              <a:t>Getting </a:t>
-            </a:r>
-            <a:r>
-              <a:rPr lang="en-US" dirty="0"/>
-              <a:t>Started</a:t>
-            </a:r>
-          </a:p>
-          <a:p>
-            <a:r>
-              <a:rPr lang="en-US" dirty="0"/>
-              <a:t>Key Features</a:t>
-            </a:r>
-          </a:p>
-          <a:p>
-            <a:pPr lvl="1"/>
-            <a:r>
-              <a:rPr lang="en-US" dirty="0"/>
-              <a:t>Data-binding, Filters</a:t>
-            </a:r>
-          </a:p>
-          <a:p>
-            <a:pPr lvl="1"/>
-            <a:r>
-              <a:rPr lang="en-US" dirty="0"/>
-              <a:t>Model-View-Controller</a:t>
-            </a:r>
-          </a:p>
-          <a:p>
-            <a:pPr lvl="1"/>
-            <a:r>
-              <a:rPr lang="en-US" dirty="0"/>
-              <a:t>Dependency Injections</a:t>
-            </a:r>
-          </a:p>
-          <a:p>
-            <a:pPr lvl="1"/>
-            <a:r>
-              <a:rPr lang="en-US" dirty="0"/>
-              <a:t>Services</a:t>
-            </a:r>
-          </a:p>
-          <a:p>
-            <a:pPr lvl="1"/>
-            <a:r>
-              <a:rPr lang="en-US" dirty="0"/>
-              <a:t>Directives</a:t>
-            </a:r>
-          </a:p>
-          <a:p>
-            <a:pPr lvl="1"/>
-            <a:r>
-              <a:rPr lang="en-US" dirty="0"/>
-              <a:t>Utilities – Forms, $http, $</a:t>
-            </a:r>
-            <a:r>
-              <a:rPr lang="en-US" dirty="0" err="1"/>
-              <a:t>routeProvider</a:t>
-            </a:r>
-            <a:r>
-              <a:rPr lang="en-US" dirty="0"/>
-              <a:t> etc.</a:t>
-            </a:r>
-          </a:p>
-          <a:p>
-            <a:r>
-              <a:rPr lang="en-US" dirty="0"/>
-              <a:t>Examples</a:t>
-            </a:r>
-          </a:p>
-          <a:p>
-            <a:r>
-              <a:rPr lang="en-US" dirty="0"/>
-              <a:t>Recommended Guidelines</a:t>
-            </a:r>
-          </a:p>
-          <a:p>
+              <a:rPr lang="en-US" dirty="0" smtClean="0">
+                <a:hlinkClick r:id="rId2"/>
+              </a:rPr>
+              <a:t>Introduction to AngularJs Unit Testing </a:t>
+            </a:r>
+            <a:endParaRPr lang="en-US" dirty="0" smtClean="0"/>
+          </a:p>
+          <a:p>
+            <a:r>
+              <a:rPr lang="en-US" dirty="0" smtClean="0">
+                <a:hlinkClick r:id="rId3"/>
+              </a:rPr>
+              <a:t>End to End testing of AngularJs apps with Protractor</a:t>
+            </a:r>
             <a:endParaRPr lang="en-US" dirty="0"/>
           </a:p>
         </p:txBody>
@@ -8664,7 +11169,7 @@
     </p:spTree>
     <p:extLst>
       <p:ext uri="{BB962C8B-B14F-4D97-AF65-F5344CB8AC3E}">
-        <p14:creationId xmlns:p14="http://schemas.microsoft.com/office/powerpoint/2010/main" val="3960094506"/>
+        <p14:creationId xmlns:p14="http://schemas.microsoft.com/office/powerpoint/2010/main" val="1195882354"/>
       </p:ext>
     </p:extLst>
   </p:cSld>
@@ -8700,7 +11205,7 @@
       </p:grpSpPr>
       <p:sp>
         <p:nvSpPr>
-          <p:cNvPr id="4" name="Title 3"/>
+          <p:cNvPr id="2" name="Title 1"/>
           <p:cNvSpPr>
             <a:spLocks noGrp="1"/>
           </p:cNvSpPr>
@@ -8720,7 +11225,7 @@
           <a:p>
             <a:r>
               <a:rPr lang="en-US" dirty="0" smtClean="0"/>
-              <a:t>Questions?</a:t>
+              <a:t>Thank you!</a:t>
             </a:r>
             <a:endParaRPr lang="en-US" dirty="0"/>
           </a:p>
@@ -8728,7 +11233,7 @@
       </p:sp>
       <p:sp>
         <p:nvSpPr>
-          <p:cNvPr id="5" name="Text Placeholder 4"/>
+          <p:cNvPr id="3" name="Text Placeholder 2"/>
           <p:cNvSpPr>
             <a:spLocks noGrp="1"/>
           </p:cNvSpPr>
@@ -8748,7 +11253,7 @@
     </p:spTree>
     <p:extLst>
       <p:ext uri="{BB962C8B-B14F-4D97-AF65-F5344CB8AC3E}">
-        <p14:creationId xmlns:p14="http://schemas.microsoft.com/office/powerpoint/2010/main" val="265151762"/>
+        <p14:creationId xmlns:p14="http://schemas.microsoft.com/office/powerpoint/2010/main" val="2272829992"/>
       </p:ext>
     </p:extLst>
   </p:cSld>
@@ -8762,177 +11267,6 @@
       </p:par>
     </p:tnLst>
   </p:timing>
-</p:sld>
-</file>
-
-<file path=ppt/slides/slide24.xml><?xml version="1.0" encoding="utf-8"?>
-<p:sld xmlns:a="http://schemas.openxmlformats.org/drawingml/2006/main" xmlns:r="http://schemas.openxmlformats.org/officeDocument/2006/relationships" xmlns:p="http://schemas.openxmlformats.org/presentationml/2006/main">
-  <p:cSld>
-    <p:spTree>
-      <p:nvGrpSpPr>
-        <p:cNvPr id="1" name=""/>
-        <p:cNvGrpSpPr/>
-        <p:nvPr/>
-      </p:nvGrpSpPr>
-      <p:grpSpPr>
-        <a:xfrm>
-          <a:off x="0" y="0"/>
-          <a:ext cx="0" cy="0"/>
-          <a:chOff x="0" y="0"/>
-          <a:chExt cx="0" cy="0"/>
-        </a:xfrm>
-      </p:grpSpPr>
-      <p:sp>
-        <p:nvSpPr>
-          <p:cNvPr id="2" name="Title 1"/>
-          <p:cNvSpPr>
-            <a:spLocks noGrp="1"/>
-          </p:cNvSpPr>
-          <p:nvPr>
-            <p:ph type="title"/>
-          </p:nvPr>
-        </p:nvSpPr>
-        <p:spPr/>
-        <p:txBody>
-          <a:bodyPr/>
-          <a:lstStyle/>
-          <a:p>
-            <a:r>
-              <a:rPr lang="en-US" dirty="0" smtClean="0"/>
-              <a:t>References</a:t>
-            </a:r>
-            <a:endParaRPr lang="en-US" dirty="0"/>
-          </a:p>
-        </p:txBody>
-      </p:sp>
-      <p:sp>
-        <p:nvSpPr>
-          <p:cNvPr id="4" name="Content Placeholder 3"/>
-          <p:cNvSpPr>
-            <a:spLocks noGrp="1"/>
-          </p:cNvSpPr>
-          <p:nvPr>
-            <p:ph idx="1"/>
-          </p:nvPr>
-        </p:nvSpPr>
-        <p:spPr/>
-        <p:txBody>
-          <a:bodyPr/>
-          <a:lstStyle/>
-          <a:p>
-            <a:r>
-              <a:rPr lang="en-US" dirty="0" smtClean="0">
-                <a:hlinkClick r:id="rId2"/>
-              </a:rPr>
-              <a:t>Introduction to AngularJs Unit Testing </a:t>
-            </a:r>
-            <a:endParaRPr lang="en-US" dirty="0" smtClean="0"/>
-          </a:p>
-          <a:p>
-            <a:r>
-              <a:rPr lang="en-US" dirty="0" smtClean="0">
-                <a:hlinkClick r:id="rId3"/>
-              </a:rPr>
-              <a:t>End to End testing of AngularJs apps with Protractor</a:t>
-            </a:r>
-            <a:endParaRPr lang="en-US" dirty="0"/>
-          </a:p>
-        </p:txBody>
-      </p:sp>
-    </p:spTree>
-    <p:extLst>
-      <p:ext uri="{BB962C8B-B14F-4D97-AF65-F5344CB8AC3E}">
-        <p14:creationId xmlns:p14="http://schemas.microsoft.com/office/powerpoint/2010/main" val="1195882354"/>
-      </p:ext>
-    </p:extLst>
-  </p:cSld>
-  <p:clrMapOvr>
-    <a:masterClrMapping/>
-  </p:clrMapOvr>
-  <p:timing>
-    <p:tnLst>
-      <p:par>
-        <p:cTn xmlns:p14="http://schemas.microsoft.com/office/powerpoint/2010/main" id="1" dur="indefinite" restart="never" nodeType="tmRoot"/>
-      </p:par>
-    </p:tnLst>
-  </p:timing>
-</p:sld>
-</file>
-
-<file path=ppt/slides/slide25.xml><?xml version="1.0" encoding="utf-8"?>
-<p:sld xmlns:a="http://schemas.openxmlformats.org/drawingml/2006/main" xmlns:r="http://schemas.openxmlformats.org/officeDocument/2006/relationships" xmlns:p="http://schemas.openxmlformats.org/presentationml/2006/main">
-  <p:cSld>
-    <p:spTree>
-      <p:nvGrpSpPr>
-        <p:cNvPr id="1" name=""/>
-        <p:cNvGrpSpPr/>
-        <p:nvPr/>
-      </p:nvGrpSpPr>
-      <p:grpSpPr>
-        <a:xfrm>
-          <a:off x="0" y="0"/>
-          <a:ext cx="0" cy="0"/>
-          <a:chOff x="0" y="0"/>
-          <a:chExt cx="0" cy="0"/>
-        </a:xfrm>
-      </p:grpSpPr>
-      <p:sp>
-        <p:nvSpPr>
-          <p:cNvPr id="2" name="Title 1"/>
-          <p:cNvSpPr>
-            <a:spLocks noGrp="1"/>
-          </p:cNvSpPr>
-          <p:nvPr>
-            <p:ph type="title"/>
-          </p:nvPr>
-        </p:nvSpPr>
-        <p:spPr>
-          <a:xfrm>
-            <a:off x="722313" y="1084470"/>
-            <a:ext cx="7772400" cy="2505075"/>
-          </a:xfrm>
-        </p:spPr>
-        <p:txBody>
-          <a:bodyPr/>
-          <a:lstStyle/>
-          <a:p>
-            <a:r>
-              <a:rPr lang="en-US" dirty="0" smtClean="0"/>
-              <a:t>Thank you!</a:t>
-            </a:r>
-            <a:endParaRPr lang="en-US" dirty="0"/>
-          </a:p>
-        </p:txBody>
-      </p:sp>
-      <p:sp>
-        <p:nvSpPr>
-          <p:cNvPr id="3" name="Text Placeholder 2"/>
-          <p:cNvSpPr>
-            <a:spLocks noGrp="1"/>
-          </p:cNvSpPr>
-          <p:nvPr>
-            <p:ph type="body" idx="1"/>
-          </p:nvPr>
-        </p:nvSpPr>
-        <p:spPr/>
-        <p:txBody>
-          <a:bodyPr/>
-          <a:lstStyle/>
-          <a:p>
-            <a:endParaRPr lang="en-US"/>
-          </a:p>
-        </p:txBody>
-      </p:sp>
-    </p:spTree>
-    <p:extLst>
-      <p:ext uri="{BB962C8B-B14F-4D97-AF65-F5344CB8AC3E}">
-        <p14:creationId xmlns:p14="http://schemas.microsoft.com/office/powerpoint/2010/main" val="2272829992"/>
-      </p:ext>
-    </p:extLst>
-  </p:cSld>
-  <p:clrMapOvr>
-    <a:masterClrMapping/>
-  </p:clrMapOvr>
 </p:sld>
 </file>
 
@@ -8997,76 +11331,144 @@
           <a:lstStyle/>
           <a:p>
             <a:r>
-              <a:rPr lang="en-US" dirty="0"/>
+              <a:rPr lang="en-US" dirty="0">
+                <a:solidFill>
+                  <a:srgbClr val="000000"/>
+                </a:solidFill>
+              </a:rPr>
               <a:t>A</a:t>
             </a:r>
             <a:r>
-              <a:rPr lang="en-US" dirty="0" smtClean="0"/>
+              <a:rPr lang="en-US" dirty="0" smtClean="0">
+                <a:solidFill>
+                  <a:srgbClr val="000000"/>
+                </a:solidFill>
+              </a:rPr>
               <a:t>ttempt </a:t>
             </a:r>
             <a:r>
-              <a:rPr lang="en-US" dirty="0"/>
+              <a:rPr lang="en-US" dirty="0">
+                <a:solidFill>
+                  <a:srgbClr val="000000"/>
+                </a:solidFill>
+              </a:rPr>
               <a:t>to make static HTML </a:t>
             </a:r>
             <a:r>
-              <a:rPr lang="en-US" dirty="0" smtClean="0"/>
+              <a:rPr lang="en-US" dirty="0" smtClean="0">
+                <a:solidFill>
+                  <a:srgbClr val="000000"/>
+                </a:solidFill>
+              </a:rPr>
               <a:t>-&gt; </a:t>
             </a:r>
             <a:r>
-              <a:rPr lang="en-US" dirty="0"/>
+              <a:rPr lang="en-US" dirty="0">
+                <a:solidFill>
+                  <a:srgbClr val="000000"/>
+                </a:solidFill>
+              </a:rPr>
               <a:t>dynamic, easier and </a:t>
             </a:r>
             <a:r>
-              <a:rPr lang="en-US" dirty="0" smtClean="0"/>
+              <a:rPr lang="en-US" dirty="0" smtClean="0">
+                <a:solidFill>
+                  <a:srgbClr val="000000"/>
+                </a:solidFill>
+              </a:rPr>
               <a:t>fun</a:t>
             </a:r>
           </a:p>
           <a:p>
-            <a:endParaRPr lang="en-US" dirty="0" smtClean="0"/>
-          </a:p>
-          <a:p>
-            <a:r>
-              <a:rPr lang="en-US" dirty="0" smtClean="0"/>
+            <a:endParaRPr lang="en-US" dirty="0" smtClean="0">
+              <a:solidFill>
+                <a:srgbClr val="000000"/>
+              </a:solidFill>
+            </a:endParaRPr>
+          </a:p>
+          <a:p>
+            <a:r>
+              <a:rPr lang="en-US" dirty="0" smtClean="0">
+                <a:solidFill>
+                  <a:srgbClr val="000000"/>
+                </a:solidFill>
+              </a:rPr>
               <a:t>Flexible &amp; extensible</a:t>
             </a:r>
           </a:p>
           <a:p>
-            <a:endParaRPr lang="en-US" dirty="0" smtClean="0"/>
-          </a:p>
-          <a:p>
-            <a:r>
-              <a:rPr lang="en-US" dirty="0" smtClean="0"/>
+            <a:endParaRPr lang="en-US" dirty="0" smtClean="0">
+              <a:solidFill>
+                <a:srgbClr val="000000"/>
+              </a:solidFill>
+            </a:endParaRPr>
+          </a:p>
+          <a:p>
+            <a:r>
+              <a:rPr lang="en-US" dirty="0" smtClean="0">
+                <a:solidFill>
+                  <a:srgbClr val="000000"/>
+                </a:solidFill>
+              </a:rPr>
               <a:t>Well organized - highly modular</a:t>
             </a:r>
           </a:p>
           <a:p>
-            <a:endParaRPr lang="en-US" dirty="0" smtClean="0"/>
-          </a:p>
-          <a:p>
-            <a:r>
-              <a:rPr lang="en-US" dirty="0" smtClean="0"/>
+            <a:endParaRPr lang="en-US" dirty="0" smtClean="0">
+              <a:solidFill>
+                <a:srgbClr val="000000"/>
+              </a:solidFill>
+            </a:endParaRPr>
+          </a:p>
+          <a:p>
+            <a:r>
+              <a:rPr lang="en-US" dirty="0" smtClean="0">
+                <a:solidFill>
+                  <a:srgbClr val="000000"/>
+                </a:solidFill>
+              </a:rPr>
               <a:t>Focus </a:t>
             </a:r>
             <a:r>
-              <a:rPr lang="en-US" dirty="0"/>
+              <a:rPr lang="en-US" dirty="0">
+                <a:solidFill>
+                  <a:srgbClr val="000000"/>
+                </a:solidFill>
+              </a:rPr>
               <a:t>on </a:t>
             </a:r>
             <a:r>
-              <a:rPr lang="en-US" dirty="0" smtClean="0"/>
+              <a:rPr lang="en-US" dirty="0" smtClean="0">
+                <a:solidFill>
+                  <a:srgbClr val="000000"/>
+                </a:solidFill>
+              </a:rPr>
               <a:t>testing – Jasmine, Karma, Protractor etc.</a:t>
             </a:r>
           </a:p>
           <a:p>
-            <a:endParaRPr lang="en-US" dirty="0" smtClean="0"/>
-          </a:p>
-          <a:p>
-            <a:r>
-              <a:rPr lang="en-US" dirty="0" smtClean="0"/>
+            <a:endParaRPr lang="en-US" dirty="0" smtClean="0">
+              <a:solidFill>
+                <a:srgbClr val="000000"/>
+              </a:solidFill>
+            </a:endParaRPr>
+          </a:p>
+          <a:p>
+            <a:r>
+              <a:rPr lang="en-US" dirty="0" smtClean="0">
+                <a:solidFill>
+                  <a:srgbClr val="000000"/>
+                </a:solidFill>
+              </a:rPr>
               <a:t>Versatile - works well with other libraries</a:t>
             </a:r>
           </a:p>
           <a:p>
-            <a:endParaRPr lang="en-US" dirty="0"/>
+            <a:endParaRPr lang="en-US" dirty="0">
+              <a:solidFill>
+                <a:srgbClr val="000000"/>
+              </a:solidFill>
+            </a:endParaRPr>
           </a:p>
         </p:txBody>
       </p:sp>
@@ -9153,76 +11555,111 @@
           <a:lstStyle/>
           <a:p>
             <a:r>
-              <a:rPr lang="en-US" sz="2200" dirty="0" smtClean="0"/>
+              <a:rPr lang="en-US" sz="2200" dirty="0" smtClean="0">
+                <a:solidFill>
+                  <a:srgbClr val="000000"/>
+                </a:solidFill>
+              </a:rPr>
               <a:t>Framework</a:t>
             </a:r>
           </a:p>
           <a:p>
-            <a:endParaRPr lang="en-US" dirty="0" smtClean="0"/>
-          </a:p>
-          <a:p>
-            <a:r>
-              <a:rPr lang="en-US" sz="2200" dirty="0" smtClean="0"/>
+            <a:endParaRPr lang="en-US" dirty="0" smtClean="0">
+              <a:solidFill>
+                <a:srgbClr val="000000"/>
+              </a:solidFill>
+            </a:endParaRPr>
+          </a:p>
+          <a:p>
+            <a:r>
+              <a:rPr lang="en-US" sz="2200" dirty="0" smtClean="0">
+                <a:solidFill>
+                  <a:srgbClr val="000000"/>
+                </a:solidFill>
+              </a:rPr>
               <a:t>Free &amp; open source (MIT License)</a:t>
             </a:r>
           </a:p>
           <a:p>
-            <a:endParaRPr lang="en-US" dirty="0" smtClean="0"/>
-          </a:p>
-          <a:p>
-            <a:r>
-              <a:rPr lang="en-US" sz="2200" dirty="0" smtClean="0"/>
-              <a:t>Current </a:t>
-            </a:r>
-            <a:r>
-              <a:rPr lang="en-US" sz="2200" dirty="0" smtClean="0"/>
-              <a:t>version – </a:t>
-            </a:r>
-            <a:r>
-              <a:rPr lang="en-US" sz="2200" dirty="0" smtClean="0"/>
-              <a:t>1.2.15</a:t>
-            </a:r>
-          </a:p>
-          <a:p>
-            <a:endParaRPr lang="en-US" dirty="0"/>
-          </a:p>
-          <a:p>
-            <a:r>
-              <a:rPr lang="en-US" sz="2200" dirty="0" smtClean="0"/>
+            <a:endParaRPr lang="en-US" dirty="0" smtClean="0">
+              <a:solidFill>
+                <a:srgbClr val="000000"/>
+              </a:solidFill>
+            </a:endParaRPr>
+          </a:p>
+          <a:p>
+            <a:r>
+              <a:rPr lang="en-US" sz="2200" dirty="0" smtClean="0">
+                <a:solidFill>
+                  <a:srgbClr val="000000"/>
+                </a:solidFill>
+              </a:rPr>
+              <a:t>Current version – 1.2.15</a:t>
+            </a:r>
+          </a:p>
+          <a:p>
+            <a:endParaRPr lang="en-US" dirty="0">
+              <a:solidFill>
+                <a:srgbClr val="000000"/>
+              </a:solidFill>
+            </a:endParaRPr>
+          </a:p>
+          <a:p>
+            <a:r>
+              <a:rPr lang="en-US" sz="2200" dirty="0" smtClean="0">
+                <a:solidFill>
+                  <a:srgbClr val="000000"/>
+                </a:solidFill>
+              </a:rPr>
               <a:t>Whose using it?</a:t>
             </a:r>
             <a:r>
-              <a:rPr lang="en-US" sz="2200" dirty="0"/>
+              <a:rPr lang="en-US" sz="2200" dirty="0">
+                <a:solidFill>
+                  <a:srgbClr val="000000"/>
+                </a:solidFill>
+              </a:rPr>
               <a:t>  </a:t>
             </a:r>
             <a:r>
-              <a:rPr lang="en-US" sz="1600" dirty="0" smtClean="0"/>
+              <a:rPr lang="en-US" sz="1600" dirty="0" smtClean="0">
+                <a:solidFill>
+                  <a:srgbClr val="000000"/>
+                </a:solidFill>
+              </a:rPr>
               <a:t>YouTube on PS3</a:t>
             </a:r>
             <a:r>
-              <a:rPr lang="en-US" sz="1600" dirty="0"/>
+              <a:rPr lang="en-US" sz="1600" dirty="0">
+                <a:solidFill>
+                  <a:srgbClr val="000000"/>
+                </a:solidFill>
+              </a:rPr>
               <a:t>, </a:t>
             </a:r>
             <a:r>
-              <a:rPr lang="en-US" sz="1600" dirty="0" smtClean="0"/>
-              <a:t>Plunker, DoubleClick </a:t>
-            </a:r>
-            <a:r>
-              <a:rPr lang="en-US" sz="1600" dirty="0" smtClean="0"/>
-              <a:t>and many </a:t>
-            </a:r>
-            <a:r>
-              <a:rPr lang="en-US" sz="1600" dirty="0" smtClean="0"/>
-              <a:t>more! (</a:t>
-            </a:r>
-            <a:r>
               <a:rPr lang="en-US" sz="1600" dirty="0" smtClean="0">
+                <a:solidFill>
+                  <a:srgbClr val="000000"/>
+                </a:solidFill>
+              </a:rPr>
+              <a:t>Plunker, DoubleClick and many more! (</a:t>
+            </a:r>
+            <a:r>
+              <a:rPr lang="en-US" sz="1600" dirty="0" smtClean="0">
+                <a:solidFill>
+                  <a:srgbClr val="000000"/>
+                </a:solidFill>
                 <a:hlinkClick r:id="rId2"/>
               </a:rPr>
               <a:t>builtwith.angularjs.org</a:t>
             </a:r>
             <a:r>
-              <a:rPr lang="en-US" sz="1600" dirty="0" smtClean="0"/>
+              <a:rPr lang="en-US" sz="1600" dirty="0" smtClean="0">
+                <a:solidFill>
+                  <a:srgbClr val="000000"/>
+                </a:solidFill>
+              </a:rPr>
               <a:t>)</a:t>
             </a:r>
           </a:p>
@@ -9231,46 +11668,69 @@
               <a:buNone/>
             </a:pPr>
             <a:r>
-              <a:rPr lang="en-US" sz="1800" dirty="0" smtClean="0"/>
+              <a:rPr lang="en-US" sz="1800" dirty="0" smtClean="0">
+                <a:solidFill>
+                  <a:srgbClr val="000000"/>
+                </a:solidFill>
+              </a:rPr>
               <a:t> </a:t>
             </a:r>
-            <a:endParaRPr lang="en-US" sz="1800" dirty="0" smtClean="0"/>
-          </a:p>
-          <a:p>
-            <a:r>
-              <a:rPr lang="en-US" sz="2200" dirty="0" smtClean="0"/>
-              <a:t>Vibrant </a:t>
-            </a:r>
-            <a:r>
-              <a:rPr lang="en-US" sz="2200" dirty="0" smtClean="0"/>
-              <a:t>and growing community –</a:t>
-            </a:r>
-            <a:r>
-              <a:rPr lang="en-US" dirty="0" smtClean="0"/>
+          </a:p>
+          <a:p>
+            <a:r>
+              <a:rPr lang="en-US" sz="2200" dirty="0" smtClean="0">
+                <a:solidFill>
+                  <a:srgbClr val="000000"/>
+                </a:solidFill>
+              </a:rPr>
+              <a:t>Vibrant and growing community –</a:t>
+            </a:r>
+            <a:r>
+              <a:rPr lang="en-US" dirty="0" smtClean="0">
+                <a:solidFill>
+                  <a:srgbClr val="000000"/>
+                </a:solidFill>
+              </a:rPr>
               <a:t> </a:t>
             </a:r>
             <a:r>
-              <a:rPr lang="en-US" sz="1600" dirty="0" smtClean="0"/>
-              <a:t>Good documentation, tons of articles &amp; videos </a:t>
-            </a:r>
-            <a:r>
-              <a:rPr lang="en-US" sz="1600" dirty="0" smtClean="0"/>
-              <a:t>available</a:t>
-            </a:r>
-          </a:p>
-          <a:p>
-            <a:endParaRPr lang="en-US" sz="1600" dirty="0" smtClean="0"/>
-          </a:p>
-          <a:p>
-            <a:r>
-              <a:rPr lang="en-US" sz="2200" dirty="0" smtClean="0"/>
+              <a:rPr lang="en-US" sz="1600" dirty="0" smtClean="0">
+                <a:solidFill>
+                  <a:srgbClr val="000000"/>
+                </a:solidFill>
+              </a:rPr>
+              <a:t>Good documentation, tons of articles &amp; videos available</a:t>
+            </a:r>
+          </a:p>
+          <a:p>
+            <a:endParaRPr lang="en-US" sz="1600" dirty="0" smtClean="0">
+              <a:solidFill>
+                <a:srgbClr val="000000"/>
+              </a:solidFill>
+            </a:endParaRPr>
+          </a:p>
+          <a:p>
+            <a:r>
+              <a:rPr lang="en-US" sz="2200" dirty="0" smtClean="0">
+                <a:solidFill>
+                  <a:srgbClr val="000000"/>
+                </a:solidFill>
+              </a:rPr>
               <a:t>Browser support - </a:t>
             </a:r>
             <a:r>
-              <a:rPr lang="en-US" sz="2000" dirty="0" smtClean="0"/>
+              <a:rPr lang="en-US" sz="2000" dirty="0" smtClean="0">
+                <a:solidFill>
+                  <a:srgbClr val="000000"/>
+                </a:solidFill>
+              </a:rPr>
               <a:t>IE8+*, Chrome, Firefox &amp; Safari</a:t>
             </a:r>
-            <a:endParaRPr lang="en-US" sz="2000" dirty="0"/>
+            <a:endParaRPr lang="en-US" sz="2000" dirty="0">
+              <a:solidFill>
+                <a:srgbClr val="000000"/>
+              </a:solidFill>
+            </a:endParaRPr>
           </a:p>
         </p:txBody>
       </p:sp>

</xml_diff>

<commit_message>
Updated to simplify DI slide content
Change-Id: I750eee9a6fbba1a307cd64356654ea8521b58e61
</commit_message>
<xml_diff>
--- a/Introduction to AngularJs.pptx
+++ b/Introduction to AngularJs.pptx
@@ -6474,39 +6474,15 @@
                   <a:schemeClr val="tx1"/>
                 </a:solidFill>
               </a:rPr>
-              <a:t> &lt;expression&gt; | filter | </a:t>
-            </a:r>
-            <a:r>
-              <a:rPr lang="en-US" dirty="0" err="1" smtClean="0">
-                <a:solidFill>
-                  <a:schemeClr val="tx1"/>
-                </a:solidFill>
-              </a:rPr>
-              <a:t>orderBy</a:t>
+              <a:t> &lt;expression&gt; | filter | orderBy </a:t>
             </a:r>
             <a:r>
               <a:rPr lang="en-US" dirty="0" smtClean="0">
                 <a:solidFill>
-                  <a:schemeClr val="tx1"/>
-                </a:solidFill>
-              </a:rPr>
-              <a:t> </a:t>
-            </a:r>
-            <a:r>
-              <a:rPr lang="en-US" dirty="0" smtClean="0">
-                <a:solidFill>
                   <a:srgbClr val="FF0000"/>
                 </a:solidFill>
               </a:rPr>
-              <a:t>}</a:t>
-            </a:r>
-            <a:r>
-              <a:rPr lang="en-US" dirty="0" smtClean="0">
-                <a:solidFill>
-                  <a:srgbClr val="FF0000"/>
-                </a:solidFill>
-              </a:rPr>
-              <a:t>}</a:t>
+              <a:t>}}</a:t>
             </a:r>
           </a:p>
           <a:p>
@@ -6539,15 +6515,18 @@
                   <a:schemeClr val="tx1"/>
                 </a:solidFill>
               </a:rPr>
-              <a:t>Expressions </a:t>
-            </a:r>
+              <a:t>Expressions –</a:t>
+            </a:r>
+          </a:p>
+          <a:p>
+            <a:pPr lvl="1"/>
             <a:r>
               <a:rPr lang="en-US" dirty="0" smtClean="0">
                 <a:solidFill>
                   <a:schemeClr val="tx1"/>
                 </a:solidFill>
               </a:rPr>
-              <a:t>–</a:t>
+              <a:t>JavaScript *like* code-snippets – {{ 1 + 2  }}, {{ ‘hello World!’ }} </a:t>
             </a:r>
           </a:p>
           <a:p>
@@ -6558,50 +6537,7 @@
                   <a:schemeClr val="tx1"/>
                 </a:solidFill>
               </a:rPr>
-              <a:t>JavaScript *like* code-snippets – {{ 1 + 2  }}, {{ ‘hello World!’ }} </a:t>
-            </a:r>
-          </a:p>
-          <a:p>
-            <a:pPr lvl="1"/>
-            <a:r>
-              <a:rPr lang="en-US" dirty="0" smtClean="0">
-                <a:solidFill>
-                  <a:schemeClr val="tx1"/>
-                </a:solidFill>
-              </a:rPr>
-              <a:t>Evaluated against a ‘$scope’ object – {{ a + b }}, {{ </a:t>
-            </a:r>
-            <a:r>
-              <a:rPr lang="en-US" dirty="0" err="1" smtClean="0">
-                <a:solidFill>
-                  <a:schemeClr val="tx1"/>
-                </a:solidFill>
-              </a:rPr>
-              <a:t>user.name</a:t>
-            </a:r>
-            <a:r>
-              <a:rPr lang="en-US" dirty="0" smtClean="0">
-                <a:solidFill>
-                  <a:schemeClr val="tx1"/>
-                </a:solidFill>
-              </a:rPr>
-              <a:t> }}, {{ items[index] }}, {{  </a:t>
-            </a:r>
-            <a:r>
-              <a:rPr lang="en-US" dirty="0" err="1" smtClean="0">
-                <a:solidFill>
-                  <a:schemeClr val="tx1"/>
-                </a:solidFill>
-              </a:rPr>
-              <a:t>doSomething</a:t>
-            </a:r>
-            <a:r>
-              <a:rPr lang="en-US" dirty="0" smtClean="0">
-                <a:solidFill>
-                  <a:schemeClr val="tx1"/>
-                </a:solidFill>
-              </a:rPr>
-              <a:t>() }} </a:t>
+              <a:t>Evaluated against a ‘$scope’ object – {{ a + b }}, {{ user.name }}, {{ items[index] }}, {{  doSomething() }} </a:t>
             </a:r>
           </a:p>
           <a:p>
@@ -6674,20 +6610,12 @@
           </a:p>
           <a:p>
             <a:r>
-              <a:rPr lang="en-US" dirty="0" err="1" smtClean="0">
+              <a:rPr lang="en-US" dirty="0" smtClean="0">
                 <a:solidFill>
                   <a:schemeClr val="tx1"/>
                 </a:solidFill>
               </a:rPr>
-              <a:t>orderBy</a:t>
-            </a:r>
-            <a:r>
-              <a:rPr lang="en-US" dirty="0" smtClean="0">
-                <a:solidFill>
-                  <a:schemeClr val="tx1"/>
-                </a:solidFill>
-              </a:rPr>
-              <a:t> – Sorts filtered result-set</a:t>
+              <a:t>orderBy – Sorts filtered result-set</a:t>
             </a:r>
             <a:endParaRPr lang="en-US" dirty="0">
               <a:solidFill>
@@ -9360,11 +9288,6 @@
               </a:rPr>
               <a:t>Services – </a:t>
             </a:r>
-            <a:endParaRPr lang="en-US" dirty="0" smtClean="0">
-              <a:solidFill>
-                <a:srgbClr val="000000"/>
-              </a:solidFill>
-            </a:endParaRPr>
           </a:p>
           <a:p>
             <a:pPr lvl="1"/>
@@ -9953,36 +9876,12 @@
           <a:lstStyle/>
           <a:p>
             <a:r>
-              <a:rPr lang="en-US" dirty="0">
+              <a:rPr lang="en-US" dirty="0" smtClean="0">
                 <a:solidFill>
                   <a:srgbClr val="000000"/>
                 </a:solidFill>
               </a:rPr>
-              <a:t>Everything </a:t>
-            </a:r>
-            <a:r>
-              <a:rPr lang="en-US" dirty="0" smtClean="0">
-                <a:solidFill>
-                  <a:srgbClr val="000000"/>
-                </a:solidFill>
-              </a:rPr>
-              <a:t>is </a:t>
-            </a:r>
-            <a:r>
-              <a:rPr lang="en-US" dirty="0">
-                <a:solidFill>
-                  <a:srgbClr val="000000"/>
-                </a:solidFill>
-              </a:rPr>
-              <a:t>created and wired using dependency </a:t>
-            </a:r>
-            <a:r>
-              <a:rPr lang="en-US" dirty="0" smtClean="0">
-                <a:solidFill>
-                  <a:srgbClr val="000000"/>
-                </a:solidFill>
-              </a:rPr>
-              <a:t>injection (DI)</a:t>
+              <a:t>Creates and wires objects/functions</a:t>
             </a:r>
           </a:p>
           <a:p>
@@ -10033,20 +9932,12 @@
           </a:p>
           <a:p>
             <a:r>
-              <a:rPr lang="en-US" dirty="0" err="1" smtClean="0">
+              <a:rPr lang="en-US" dirty="0" smtClean="0">
                 <a:solidFill>
                   <a:srgbClr val="000000"/>
                 </a:solidFill>
               </a:rPr>
-              <a:t>Angular’s</a:t>
-            </a:r>
-            <a:r>
-              <a:rPr lang="en-US" dirty="0" smtClean="0">
-                <a:solidFill>
-                  <a:srgbClr val="000000"/>
-                </a:solidFill>
-              </a:rPr>
-              <a:t> Injector sub-system handles DIs</a:t>
+              <a:t>Angular’s Injector sub-system handles DIs</a:t>
             </a:r>
           </a:p>
           <a:p>
@@ -10786,15 +10677,7 @@
                   <a:srgbClr val="000000"/>
                 </a:solidFill>
               </a:rPr>
-              <a:t>Custom </a:t>
-            </a:r>
-            <a:r>
-              <a:rPr lang="en-US" dirty="0" smtClean="0">
-                <a:solidFill>
-                  <a:srgbClr val="000000"/>
-                </a:solidFill>
-              </a:rPr>
-              <a:t>Directives</a:t>
+              <a:t>Custom Directives</a:t>
             </a:r>
           </a:p>
           <a:p>
@@ -10947,23 +10830,7 @@
                   <a:srgbClr val="000000"/>
                 </a:solidFill>
               </a:rPr>
-              <a:t>Do not create $ and $$ prefixed APIs. They represent </a:t>
-            </a:r>
-            <a:r>
-              <a:rPr lang="en-US" dirty="0" err="1" smtClean="0">
-                <a:solidFill>
-                  <a:srgbClr val="000000"/>
-                </a:solidFill>
-              </a:rPr>
-              <a:t>Angular’s</a:t>
-            </a:r>
-            <a:r>
-              <a:rPr lang="en-US" dirty="0" smtClean="0">
-                <a:solidFill>
-                  <a:srgbClr val="000000"/>
-                </a:solidFill>
-              </a:rPr>
-              <a:t> internal APIs, could lead to collisions </a:t>
+              <a:t>Do not create $ and $$ prefixed APIs. They represent Angular’s internal APIs, could lead to collisions </a:t>
             </a:r>
           </a:p>
           <a:p>

</xml_diff>

<commit_message>
Fixed typos, grammer in DI slide
Change-Id: I7898f01aa18fbf92d22504f6e0045c49c624930d
</commit_message>
<xml_diff>
--- a/Introduction to AngularJs.pptx
+++ b/Introduction to AngularJs.pptx
@@ -5174,6 +5174,7 @@
             <a:solidFill>
               <a:srgbClr val="000000"/>
             </a:solidFill>
+            <a:prstDash val="dash"/>
           </a:ln>
         </p:spPr>
       </p:pic>
@@ -5209,6 +5210,7 @@
             <a:solidFill>
               <a:srgbClr val="000000"/>
             </a:solidFill>
+            <a:prstDash val="dash"/>
           </a:ln>
         </p:spPr>
       </p:pic>
@@ -5264,7 +5266,7 @@
         </p:blipFill>
         <p:spPr>
           <a:xfrm>
-            <a:off x="1998868" y="3667388"/>
+            <a:off x="1998868" y="3623216"/>
             <a:ext cx="1342070" cy="1342070"/>
           </a:xfrm>
           <a:prstGeom prst="rect">
@@ -6416,7 +6418,7 @@
         </p:nvSpPr>
         <p:spPr>
           <a:xfrm>
-            <a:off x="457200" y="-209817"/>
+            <a:off x="457200" y="-187731"/>
             <a:ext cx="8229600" cy="1600200"/>
           </a:xfrm>
         </p:spPr>
@@ -6526,7 +6528,7 @@
                   <a:schemeClr val="tx1"/>
                 </a:solidFill>
               </a:rPr>
-              <a:t>JavaScript *like* code-snippets – {{ 1 + 2  }}, {{ ‘hello World!’ }} </a:t>
+              <a:t>JavaScript *like* code-snippets – {{ 1 + 2 }}, {{ ‘hello World!’ }} </a:t>
             </a:r>
           </a:p>
           <a:p>
@@ -9276,7 +9278,7 @@
         </p:spPr>
         <p:txBody>
           <a:bodyPr>
-            <a:normAutofit lnSpcReduction="10000"/>
+            <a:normAutofit fontScale="92500" lnSpcReduction="10000"/>
           </a:bodyPr>
           <a:lstStyle/>
           <a:p>
@@ -9310,6 +9312,25 @@
               </a:rPr>
               <a:t>Can be used by controllers and other services/components</a:t>
             </a:r>
+          </a:p>
+          <a:p>
+            <a:pPr lvl="1"/>
+            <a:r>
+              <a:rPr lang="en-US" dirty="0" smtClean="0">
+                <a:solidFill>
+                  <a:srgbClr val="000000"/>
+                </a:solidFill>
+              </a:rPr>
+              <a:t>Defined like this –</a:t>
+            </a:r>
+          </a:p>
+          <a:p>
+            <a:pPr lvl="1"/>
+            <a:endParaRPr lang="en-US" dirty="0" smtClean="0">
+              <a:solidFill>
+                <a:srgbClr val="000000"/>
+              </a:solidFill>
+            </a:endParaRPr>
           </a:p>
           <a:p>
             <a:pPr lvl="1"/>
@@ -9379,7 +9400,7 @@
                   <a:srgbClr val="000000"/>
                 </a:solidFill>
               </a:rPr>
-              <a:t>Mainly differ in the creational pattern</a:t>
+              <a:t>Mainly differ in their creational pattern</a:t>
             </a:r>
             <a:endParaRPr lang="en-US" dirty="0">
               <a:solidFill>
@@ -9397,17 +9418,20 @@
         </p:nvSpPr>
         <p:spPr>
           <a:xfrm>
-            <a:off x="1015989" y="2341206"/>
-            <a:ext cx="6256815" cy="2492990"/>
+            <a:off x="1004946" y="2595195"/>
+            <a:ext cx="6256815" cy="2308324"/>
           </a:xfrm>
           <a:prstGeom prst="rect">
             <a:avLst/>
           </a:prstGeom>
-          <a:noFill/>
+          <a:solidFill>
+            <a:schemeClr val="bg1"/>
+          </a:solidFill>
           <a:ln>
             <a:solidFill>
               <a:schemeClr val="tx1"/>
             </a:solidFill>
+            <a:prstDash val="dash"/>
           </a:ln>
         </p:spPr>
         <p:txBody>
@@ -9782,11 +9806,22 @@
                 <a:latin typeface="Courier New"/>
                 <a:cs typeface="Courier New"/>
               </a:rPr>
-              <a:t>  });</a:t>
-            </a:r>
-          </a:p>
-          <a:p>
+              <a:t>  })</a:t>
+            </a:r>
+            <a:r>
+              <a:rPr lang="en-US" sz="1200" dirty="0" smtClean="0">
+                <a:solidFill>
+                  <a:srgbClr val="000000"/>
+                </a:solidFill>
+                <a:latin typeface="Courier New"/>
+                <a:cs typeface="Courier New"/>
+              </a:rPr>
+              <a:t>;</a:t>
+            </a:r>
             <a:endParaRPr lang="en-US" sz="1200" dirty="0">
+              <a:solidFill>
+                <a:srgbClr val="000000"/>
+              </a:solidFill>
               <a:latin typeface="Courier New"/>
               <a:cs typeface="Courier New"/>
             </a:endParaRPr>
@@ -9909,7 +9944,7 @@
                   <a:srgbClr val="000000"/>
                 </a:solidFill>
               </a:rPr>
-              <a:t>No need of ‘new’</a:t>
+              <a:t>No need of doing ‘new’ for components</a:t>
             </a:r>
           </a:p>
           <a:p>
@@ -9920,7 +9955,7 @@
                   <a:srgbClr val="000000"/>
                 </a:solidFill>
               </a:rPr>
-              <a:t>No more dependency management</a:t>
+              <a:t>No more inter-dependency management</a:t>
             </a:r>
           </a:p>
           <a:p>
@@ -9982,7 +10017,23 @@
                   <a:srgbClr val="000000"/>
                 </a:solidFill>
               </a:rPr>
-              <a:t>Angular sub-system !== </a:t>
+              <a:t>Angular sub-system  </a:t>
+            </a:r>
+            <a:r>
+              <a:rPr lang="en-US" b="1" dirty="0" smtClean="0">
+                <a:solidFill>
+                  <a:srgbClr val="FF0000"/>
+                </a:solidFill>
+              </a:rPr>
+              <a:t>!=</a:t>
+            </a:r>
+            <a:r>
+              <a:rPr lang="en-US" dirty="0" smtClean="0">
+                <a:solidFill>
+                  <a:srgbClr val="000000"/>
+                </a:solidFill>
+              </a:rPr>
+              <a:t>  </a:t>
             </a:r>
             <a:r>
               <a:rPr lang="en-US" dirty="0" err="1" smtClean="0">
@@ -10172,7 +10223,12 @@
             <p:ph type="title"/>
           </p:nvPr>
         </p:nvSpPr>
-        <p:spPr/>
+        <p:spPr>
+          <a:xfrm>
+            <a:off x="457200" y="-132516"/>
+            <a:ext cx="8229600" cy="1600200"/>
+          </a:xfrm>
+        </p:spPr>
         <p:txBody>
           <a:bodyPr/>
           <a:lstStyle/>
@@ -10263,7 +10319,12 @@
             <p:ph type="title"/>
           </p:nvPr>
         </p:nvSpPr>
-        <p:spPr/>
+        <p:spPr>
+          <a:xfrm>
+            <a:off x="457200" y="-154602"/>
+            <a:ext cx="8229600" cy="1600200"/>
+          </a:xfrm>
+        </p:spPr>
         <p:txBody>
           <a:bodyPr/>
           <a:lstStyle/>
@@ -10784,7 +10845,12 @@
             <p:ph type="title"/>
           </p:nvPr>
         </p:nvSpPr>
-        <p:spPr/>
+        <p:spPr>
+          <a:xfrm>
+            <a:off x="457200" y="-143559"/>
+            <a:ext cx="8229600" cy="1600200"/>
+          </a:xfrm>
+        </p:spPr>
         <p:txBody>
           <a:bodyPr/>
           <a:lstStyle/>

</xml_diff>

<commit_message>
Added some more animations (before previous)
Change-Id: I49ee057f4c13e0e09da3c1b7dcb5340823b87b81
</commit_message>
<xml_diff>
--- a/Introduction to AngularJs.pptx
+++ b/Introduction to AngularJs.pptx
@@ -7718,33 +7718,15 @@
                                   </p:childTnLst>
                                 </p:cTn>
                               </p:par>
-                            </p:childTnLst>
-                          </p:cTn>
-                        </p:par>
-                      </p:childTnLst>
-                    </p:cTn>
-                  </p:par>
-                  <p:par>
-                    <p:cTn id="8" fill="hold">
-                      <p:stCondLst>
-                        <p:cond delay="indefinite"/>
-                      </p:stCondLst>
-                      <p:childTnLst>
-                        <p:par>
-                          <p:cTn id="9" fill="hold">
-                            <p:stCondLst>
-                              <p:cond delay="0"/>
-                            </p:stCondLst>
-                            <p:childTnLst>
                               <p:par>
-                                <p:cTn id="10" presetID="55" presetClass="entr" presetSubtype="0" fill="hold" nodeType="clickEffect">
+                                <p:cTn id="8" presetID="55" presetClass="entr" presetSubtype="0" fill="hold" nodeType="withEffect">
                                   <p:stCondLst>
                                     <p:cond delay="0"/>
                                   </p:stCondLst>
                                   <p:childTnLst>
                                     <p:set>
                                       <p:cBhvr>
-                                        <p:cTn id="11" dur="1" fill="hold">
+                                        <p:cTn id="9" dur="1" fill="hold">
                                           <p:stCondLst>
                                             <p:cond delay="0"/>
                                           </p:stCondLst>
@@ -7762,7 +7744,7 @@
                                     </p:set>
                                     <p:anim calcmode="lin" valueType="num">
                                       <p:cBhvr>
-                                        <p:cTn id="12" dur="1000" fill="hold"/>
+                                        <p:cTn id="10" dur="1000" fill="hold"/>
                                         <p:tgtEl>
                                           <p:spTgt spid="5"/>
                                         </p:tgtEl>
@@ -7785,7 +7767,7 @@
                                     </p:anim>
                                     <p:anim calcmode="lin" valueType="num">
                                       <p:cBhvr>
-                                        <p:cTn id="13" dur="1000" fill="hold"/>
+                                        <p:cTn id="11" dur="1000" fill="hold"/>
                                         <p:tgtEl>
                                           <p:spTgt spid="5"/>
                                         </p:tgtEl>
@@ -7808,7 +7790,7 @@
                                     </p:anim>
                                     <p:animEffect transition="in" filter="fade">
                                       <p:cBhvr>
-                                        <p:cTn id="14" dur="1000"/>
+                                        <p:cTn id="12" dur="1000"/>
                                         <p:tgtEl>
                                           <p:spTgt spid="5"/>
                                         </p:tgtEl>
@@ -7824,26 +7806,26 @@
                     </p:cTn>
                   </p:par>
                   <p:par>
-                    <p:cTn id="15" fill="hold">
+                    <p:cTn id="13" fill="hold">
                       <p:stCondLst>
                         <p:cond delay="indefinite"/>
                       </p:stCondLst>
                       <p:childTnLst>
                         <p:par>
-                          <p:cTn id="16" fill="hold">
+                          <p:cTn id="14" fill="hold">
                             <p:stCondLst>
                               <p:cond delay="0"/>
                             </p:stCondLst>
                             <p:childTnLst>
                               <p:par>
-                                <p:cTn id="17" presetID="10" presetClass="entr" presetSubtype="0" fill="hold" nodeType="clickEffect">
+                                <p:cTn id="15" presetID="10" presetClass="entr" presetSubtype="0" fill="hold" nodeType="clickEffect">
                                   <p:stCondLst>
                                     <p:cond delay="0"/>
                                   </p:stCondLst>
                                   <p:childTnLst>
                                     <p:set>
                                       <p:cBhvr>
-                                        <p:cTn id="18" dur="1" fill="hold">
+                                        <p:cTn id="16" dur="1" fill="hold">
                                           <p:stCondLst>
                                             <p:cond delay="0"/>
                                           </p:stCondLst>
@@ -7865,7 +7847,7 @@
                                     </p:set>
                                     <p:animEffect transition="in" filter="fade">
                                       <p:cBhvr>
-                                        <p:cTn id="19" dur="500"/>
+                                        <p:cTn id="17" dur="500"/>
                                         <p:tgtEl>
                                           <p:spTgt spid="3">
                                             <p:txEl>
@@ -7879,14 +7861,14 @@
                                 </p:cTn>
                               </p:par>
                               <p:par>
-                                <p:cTn id="20" presetID="10" presetClass="entr" presetSubtype="0" fill="hold" nodeType="withEffect">
+                                <p:cTn id="18" presetID="10" presetClass="entr" presetSubtype="0" fill="hold" nodeType="withEffect">
                                   <p:stCondLst>
                                     <p:cond delay="0"/>
                                   </p:stCondLst>
                                   <p:childTnLst>
                                     <p:set>
                                       <p:cBhvr>
-                                        <p:cTn id="21" dur="1" fill="hold">
+                                        <p:cTn id="19" dur="1" fill="hold">
                                           <p:stCondLst>
                                             <p:cond delay="0"/>
                                           </p:stCondLst>
@@ -7908,7 +7890,7 @@
                                     </p:set>
                                     <p:animEffect transition="in" filter="fade">
                                       <p:cBhvr>
-                                        <p:cTn id="22" dur="500"/>
+                                        <p:cTn id="20" dur="500"/>
                                         <p:tgtEl>
                                           <p:spTgt spid="3">
                                             <p:txEl>
@@ -7922,14 +7904,14 @@
                                 </p:cTn>
                               </p:par>
                               <p:par>
-                                <p:cTn id="23" presetID="10" presetClass="entr" presetSubtype="0" fill="hold" nodeType="withEffect">
+                                <p:cTn id="21" presetID="10" presetClass="entr" presetSubtype="0" fill="hold" nodeType="withEffect">
                                   <p:stCondLst>
                                     <p:cond delay="0"/>
                                   </p:stCondLst>
                                   <p:childTnLst>
                                     <p:set>
                                       <p:cBhvr>
-                                        <p:cTn id="24" dur="1" fill="hold">
+                                        <p:cTn id="22" dur="1" fill="hold">
                                           <p:stCondLst>
                                             <p:cond delay="0"/>
                                           </p:stCondLst>
@@ -7951,7 +7933,7 @@
                                     </p:set>
                                     <p:animEffect transition="in" filter="fade">
                                       <p:cBhvr>
-                                        <p:cTn id="25" dur="500"/>
+                                        <p:cTn id="23" dur="500"/>
                                         <p:tgtEl>
                                           <p:spTgt spid="3">
                                             <p:txEl>
@@ -7965,14 +7947,14 @@
                                 </p:cTn>
                               </p:par>
                               <p:par>
-                                <p:cTn id="26" presetID="10" presetClass="entr" presetSubtype="0" fill="hold" nodeType="withEffect">
+                                <p:cTn id="24" presetID="10" presetClass="entr" presetSubtype="0" fill="hold" nodeType="withEffect">
                                   <p:stCondLst>
                                     <p:cond delay="0"/>
                                   </p:stCondLst>
                                   <p:childTnLst>
                                     <p:set>
                                       <p:cBhvr>
-                                        <p:cTn id="27" dur="1" fill="hold">
+                                        <p:cTn id="25" dur="1" fill="hold">
                                           <p:stCondLst>
                                             <p:cond delay="0"/>
                                           </p:stCondLst>
@@ -7994,7 +7976,7 @@
                                     </p:set>
                                     <p:animEffect transition="in" filter="fade">
                                       <p:cBhvr>
-                                        <p:cTn id="28" dur="500"/>
+                                        <p:cTn id="26" dur="500"/>
                                         <p:tgtEl>
                                           <p:spTgt spid="3">
                                             <p:txEl>
@@ -8008,14 +7990,14 @@
                                 </p:cTn>
                               </p:par>
                               <p:par>
-                                <p:cTn id="29" presetID="10" presetClass="entr" presetSubtype="0" fill="hold" nodeType="withEffect">
+                                <p:cTn id="27" presetID="10" presetClass="entr" presetSubtype="0" fill="hold" nodeType="withEffect">
                                   <p:stCondLst>
                                     <p:cond delay="0"/>
                                   </p:stCondLst>
                                   <p:childTnLst>
                                     <p:set>
                                       <p:cBhvr>
-                                        <p:cTn id="30" dur="1" fill="hold">
+                                        <p:cTn id="28" dur="1" fill="hold">
                                           <p:stCondLst>
                                             <p:cond delay="0"/>
                                           </p:stCondLst>
@@ -8037,7 +8019,7 @@
                                     </p:set>
                                     <p:animEffect transition="in" filter="fade">
                                       <p:cBhvr>
-                                        <p:cTn id="31" dur="500"/>
+                                        <p:cTn id="29" dur="500"/>
                                         <p:tgtEl>
                                           <p:spTgt spid="3">
                                             <p:txEl>
@@ -8057,26 +8039,26 @@
                     </p:cTn>
                   </p:par>
                   <p:par>
-                    <p:cTn id="32" fill="hold">
+                    <p:cTn id="30" fill="hold">
                       <p:stCondLst>
                         <p:cond delay="indefinite"/>
                       </p:stCondLst>
                       <p:childTnLst>
                         <p:par>
-                          <p:cTn id="33" fill="hold">
+                          <p:cTn id="31" fill="hold">
                             <p:stCondLst>
                               <p:cond delay="0"/>
                             </p:stCondLst>
                             <p:childTnLst>
                               <p:par>
-                                <p:cTn id="34" presetID="10" presetClass="entr" presetSubtype="0" fill="hold" nodeType="clickEffect">
+                                <p:cTn id="32" presetID="10" presetClass="entr" presetSubtype="0" fill="hold" nodeType="clickEffect">
                                   <p:stCondLst>
                                     <p:cond delay="0"/>
                                   </p:stCondLst>
                                   <p:childTnLst>
                                     <p:set>
                                       <p:cBhvr>
-                                        <p:cTn id="35" dur="1" fill="hold">
+                                        <p:cTn id="33" dur="1" fill="hold">
                                           <p:stCondLst>
                                             <p:cond delay="0"/>
                                           </p:stCondLst>
@@ -8098,7 +8080,7 @@
                                     </p:set>
                                     <p:animEffect transition="in" filter="fade">
                                       <p:cBhvr>
-                                        <p:cTn id="36" dur="500"/>
+                                        <p:cTn id="34" dur="500"/>
                                         <p:tgtEl>
                                           <p:spTgt spid="3">
                                             <p:txEl>
@@ -8407,6 +8389,9 @@
                     <p:cTn id="3" fill="hold">
                       <p:stCondLst>
                         <p:cond delay="indefinite"/>
+                        <p:cond evt="onBegin" delay="0">
+                          <p:tn val="2"/>
+                        </p:cond>
                       </p:stCondLst>
                       <p:childTnLst>
                         <p:par>
@@ -8416,7 +8401,7 @@
                             </p:stCondLst>
                             <p:childTnLst>
                               <p:par>
-                                <p:cTn id="5" presetID="42" presetClass="entr" presetSubtype="0" fill="hold" nodeType="clickEffect">
+                                <p:cTn id="5" presetID="42" presetClass="entr" presetSubtype="0" fill="hold" nodeType="withEffect">
                                   <p:stCondLst>
                                     <p:cond delay="0"/>
                                   </p:stCondLst>
@@ -8445,7 +8430,7 @@
                                     </p:set>
                                     <p:animEffect transition="in" filter="fade">
                                       <p:cBhvr>
-                                        <p:cTn id="7" dur="1000"/>
+                                        <p:cTn id="7" dur="500"/>
                                         <p:tgtEl>
                                           <p:spTgt spid="3">
                                             <p:txEl>
@@ -8457,7 +8442,7 @@
                                     </p:animEffect>
                                     <p:anim calcmode="lin" valueType="num">
                                       <p:cBhvr>
-                                        <p:cTn id="8" dur="1000" fill="hold"/>
+                                        <p:cTn id="8" dur="500" fill="hold"/>
                                         <p:tgtEl>
                                           <p:spTgt spid="3">
                                             <p:txEl>
@@ -8484,7 +8469,7 @@
                                     </p:anim>
                                     <p:anim calcmode="lin" valueType="num">
                                       <p:cBhvr>
-                                        <p:cTn id="9" dur="1000" fill="hold"/>
+                                        <p:cTn id="9" dur="500" fill="hold"/>
                                         <p:tgtEl>
                                           <p:spTgt spid="3">
                                             <p:txEl>
@@ -8542,7 +8527,7 @@
                                     </p:set>
                                     <p:animEffect transition="in" filter="fade">
                                       <p:cBhvr>
-                                        <p:cTn id="12" dur="1000"/>
+                                        <p:cTn id="12" dur="500"/>
                                         <p:tgtEl>
                                           <p:spTgt spid="3">
                                             <p:txEl>
@@ -8554,7 +8539,7 @@
                                     </p:animEffect>
                                     <p:anim calcmode="lin" valueType="num">
                                       <p:cBhvr>
-                                        <p:cTn id="13" dur="1000" fill="hold"/>
+                                        <p:cTn id="13" dur="500" fill="hold"/>
                                         <p:tgtEl>
                                           <p:spTgt spid="3">
                                             <p:txEl>
@@ -8581,7 +8566,7 @@
                                     </p:anim>
                                     <p:anim calcmode="lin" valueType="num">
                                       <p:cBhvr>
-                                        <p:cTn id="14" dur="1000" fill="hold"/>
+                                        <p:cTn id="14" dur="500" fill="hold"/>
                                         <p:tgtEl>
                                           <p:spTgt spid="3">
                                             <p:txEl>
@@ -8657,7 +8642,7 @@
                                     </p:set>
                                     <p:animEffect transition="in" filter="fade">
                                       <p:cBhvr>
-                                        <p:cTn id="19" dur="1000"/>
+                                        <p:cTn id="19" dur="500"/>
                                         <p:tgtEl>
                                           <p:spTgt spid="3">
                                             <p:txEl>
@@ -8669,7 +8654,7 @@
                                     </p:animEffect>
                                     <p:anim calcmode="lin" valueType="num">
                                       <p:cBhvr>
-                                        <p:cTn id="20" dur="1000" fill="hold"/>
+                                        <p:cTn id="20" dur="500" fill="hold"/>
                                         <p:tgtEl>
                                           <p:spTgt spid="3">
                                             <p:txEl>
@@ -8696,7 +8681,7 @@
                                     </p:anim>
                                     <p:anim calcmode="lin" valueType="num">
                                       <p:cBhvr>
-                                        <p:cTn id="21" dur="1000" fill="hold"/>
+                                        <p:cTn id="21" dur="500" fill="hold"/>
                                         <p:tgtEl>
                                           <p:spTgt spid="3">
                                             <p:txEl>
@@ -8754,7 +8739,7 @@
                                     </p:set>
                                     <p:animEffect transition="in" filter="fade">
                                       <p:cBhvr>
-                                        <p:cTn id="24" dur="1000"/>
+                                        <p:cTn id="24" dur="500"/>
                                         <p:tgtEl>
                                           <p:spTgt spid="3">
                                             <p:txEl>
@@ -8766,7 +8751,7 @@
                                     </p:animEffect>
                                     <p:anim calcmode="lin" valueType="num">
                                       <p:cBhvr>
-                                        <p:cTn id="25" dur="1000" fill="hold"/>
+                                        <p:cTn id="25" dur="500" fill="hold"/>
                                         <p:tgtEl>
                                           <p:spTgt spid="3">
                                             <p:txEl>
@@ -8793,7 +8778,7 @@
                                     </p:anim>
                                     <p:anim calcmode="lin" valueType="num">
                                       <p:cBhvr>
-                                        <p:cTn id="26" dur="1000" fill="hold"/>
+                                        <p:cTn id="26" dur="500" fill="hold"/>
                                         <p:tgtEl>
                                           <p:spTgt spid="3">
                                             <p:txEl>
@@ -8851,7 +8836,7 @@
                                     </p:set>
                                     <p:animEffect transition="in" filter="fade">
                                       <p:cBhvr>
-                                        <p:cTn id="29" dur="1000"/>
+                                        <p:cTn id="29" dur="500"/>
                                         <p:tgtEl>
                                           <p:spTgt spid="3">
                                             <p:txEl>
@@ -8863,7 +8848,7 @@
                                     </p:animEffect>
                                     <p:anim calcmode="lin" valueType="num">
                                       <p:cBhvr>
-                                        <p:cTn id="30" dur="1000" fill="hold"/>
+                                        <p:cTn id="30" dur="500" fill="hold"/>
                                         <p:tgtEl>
                                           <p:spTgt spid="3">
                                             <p:txEl>
@@ -8890,7 +8875,7 @@
                                     </p:anim>
                                     <p:anim calcmode="lin" valueType="num">
                                       <p:cBhvr>
-                                        <p:cTn id="31" dur="1000" fill="hold"/>
+                                        <p:cTn id="31" dur="500" fill="hold"/>
                                         <p:tgtEl>
                                           <p:spTgt spid="3">
                                             <p:txEl>
@@ -8948,7 +8933,7 @@
                                     </p:set>
                                     <p:animEffect transition="in" filter="fade">
                                       <p:cBhvr>
-                                        <p:cTn id="34" dur="1000"/>
+                                        <p:cTn id="34" dur="500"/>
                                         <p:tgtEl>
                                           <p:spTgt spid="3">
                                             <p:txEl>
@@ -8960,7 +8945,7 @@
                                     </p:animEffect>
                                     <p:anim calcmode="lin" valueType="num">
                                       <p:cBhvr>
-                                        <p:cTn id="35" dur="1000" fill="hold"/>
+                                        <p:cTn id="35" dur="500" fill="hold"/>
                                         <p:tgtEl>
                                           <p:spTgt spid="3">
                                             <p:txEl>
@@ -8987,7 +8972,7 @@
                                     </p:anim>
                                     <p:anim calcmode="lin" valueType="num">
                                       <p:cBhvr>
-                                        <p:cTn id="36" dur="1000" fill="hold"/>
+                                        <p:cTn id="36" dur="500" fill="hold"/>
                                         <p:tgtEl>
                                           <p:spTgt spid="3">
                                             <p:txEl>
@@ -9063,7 +9048,7 @@
                                     </p:set>
                                     <p:animEffect transition="in" filter="fade">
                                       <p:cBhvr>
-                                        <p:cTn id="41" dur="1000"/>
+                                        <p:cTn id="41" dur="500"/>
                                         <p:tgtEl>
                                           <p:spTgt spid="3">
                                             <p:txEl>
@@ -9075,7 +9060,7 @@
                                     </p:animEffect>
                                     <p:anim calcmode="lin" valueType="num">
                                       <p:cBhvr>
-                                        <p:cTn id="42" dur="1000" fill="hold"/>
+                                        <p:cTn id="42" dur="500" fill="hold"/>
                                         <p:tgtEl>
                                           <p:spTgt spid="3">
                                             <p:txEl>
@@ -9102,7 +9087,7 @@
                                     </p:anim>
                                     <p:anim calcmode="lin" valueType="num">
                                       <p:cBhvr>
-                                        <p:cTn id="43" dur="1000" fill="hold"/>
+                                        <p:cTn id="43" dur="500" fill="hold"/>
                                         <p:tgtEl>
                                           <p:spTgt spid="3">
                                             <p:txEl>
@@ -9160,7 +9145,7 @@
                                     </p:set>
                                     <p:animEffect transition="in" filter="fade">
                                       <p:cBhvr>
-                                        <p:cTn id="46" dur="1000"/>
+                                        <p:cTn id="46" dur="500"/>
                                         <p:tgtEl>
                                           <p:spTgt spid="3">
                                             <p:txEl>
@@ -9172,7 +9157,7 @@
                                     </p:animEffect>
                                     <p:anim calcmode="lin" valueType="num">
                                       <p:cBhvr>
-                                        <p:cTn id="47" dur="1000" fill="hold"/>
+                                        <p:cTn id="47" dur="500" fill="hold"/>
                                         <p:tgtEl>
                                           <p:spTgt spid="3">
                                             <p:txEl>
@@ -9199,7 +9184,7 @@
                                     </p:anim>
                                     <p:anim calcmode="lin" valueType="num">
                                       <p:cBhvr>
-                                        <p:cTn id="48" dur="1000" fill="hold"/>
+                                        <p:cTn id="48" dur="500" fill="hold"/>
                                         <p:tgtEl>
                                           <p:spTgt spid="3">
                                             <p:txEl>
@@ -9275,7 +9260,7 @@
                                     </p:set>
                                     <p:animEffect transition="in" filter="fade">
                                       <p:cBhvr>
-                                        <p:cTn id="53" dur="1000"/>
+                                        <p:cTn id="53" dur="500"/>
                                         <p:tgtEl>
                                           <p:spTgt spid="3">
                                             <p:txEl>
@@ -9287,7 +9272,7 @@
                                     </p:animEffect>
                                     <p:anim calcmode="lin" valueType="num">
                                       <p:cBhvr>
-                                        <p:cTn id="54" dur="1000" fill="hold"/>
+                                        <p:cTn id="54" dur="500" fill="hold"/>
                                         <p:tgtEl>
                                           <p:spTgt spid="3">
                                             <p:txEl>
@@ -9314,7 +9299,7 @@
                                     </p:anim>
                                     <p:anim calcmode="lin" valueType="num">
                                       <p:cBhvr>
-                                        <p:cTn id="55" dur="1000" fill="hold"/>
+                                        <p:cTn id="55" dur="500" fill="hold"/>
                                         <p:tgtEl>
                                           <p:spTgt spid="3">
                                             <p:txEl>
@@ -10378,6 +10363,9 @@
                     <p:cTn id="3" fill="hold">
                       <p:stCondLst>
                         <p:cond delay="indefinite"/>
+                        <p:cond evt="onBegin" delay="0">
+                          <p:tn val="2"/>
+                        </p:cond>
                       </p:stCondLst>
                       <p:childTnLst>
                         <p:par>
@@ -10387,7 +10375,7 @@
                             </p:stCondLst>
                             <p:childTnLst>
                               <p:par>
-                                <p:cTn id="5" presetID="1" presetClass="entr" presetSubtype="0" fill="hold" grpId="0" nodeType="clickEffect">
+                                <p:cTn id="5" presetID="1" presetClass="entr" presetSubtype="0" fill="hold" grpId="0" nodeType="withEffect">
                                   <p:stCondLst>
                                     <p:cond delay="0"/>
                                   </p:stCondLst>
@@ -23117,6 +23105,9 @@
                     <p:cTn id="3" fill="hold">
                       <p:stCondLst>
                         <p:cond delay="indefinite"/>
+                        <p:cond evt="onBegin" delay="0">
+                          <p:tn val="2"/>
+                        </p:cond>
                       </p:stCondLst>
                       <p:childTnLst>
                         <p:par>
@@ -23126,7 +23117,7 @@
                             </p:stCondLst>
                             <p:childTnLst>
                               <p:par>
-                                <p:cTn id="5" presetID="12" presetClass="entr" presetSubtype="4" fill="hold" nodeType="clickEffect">
+                                <p:cTn id="5" presetID="12" presetClass="entr" presetSubtype="4" fill="hold" nodeType="withEffect">
                                   <p:stCondLst>
                                     <p:cond delay="0"/>
                                   </p:stCondLst>
@@ -23187,76 +23178,6 @@
                                           <p:spTgt spid="3">
                                             <p:txEl>
                                               <p:pRg st="0" end="0"/>
-                                            </p:txEl>
-                                          </p:spTgt>
-                                        </p:tgtEl>
-                                      </p:cBhvr>
-                                    </p:animEffect>
-                                  </p:childTnLst>
-                                </p:cTn>
-                              </p:par>
-                              <p:par>
-                                <p:cTn id="9" presetID="12" presetClass="entr" presetSubtype="4" fill="hold" nodeType="withEffect">
-                                  <p:stCondLst>
-                                    <p:cond delay="0"/>
-                                  </p:stCondLst>
-                                  <p:childTnLst>
-                                    <p:set>
-                                      <p:cBhvr>
-                                        <p:cTn id="10" dur="1" fill="hold">
-                                          <p:stCondLst>
-                                            <p:cond delay="0"/>
-                                          </p:stCondLst>
-                                        </p:cTn>
-                                        <p:tgtEl>
-                                          <p:spTgt spid="3">
-                                            <p:txEl>
-                                              <p:pRg st="1" end="1"/>
-                                            </p:txEl>
-                                          </p:spTgt>
-                                        </p:tgtEl>
-                                        <p:attrNameLst>
-                                          <p:attrName>style.visibility</p:attrName>
-                                        </p:attrNameLst>
-                                      </p:cBhvr>
-                                      <p:to>
-                                        <p:strVal val="visible"/>
-                                      </p:to>
-                                    </p:set>
-                                    <p:anim calcmode="lin" valueType="num">
-                                      <p:cBhvr additive="base">
-                                        <p:cTn id="11" dur="500"/>
-                                        <p:tgtEl>
-                                          <p:spTgt spid="3">
-                                            <p:txEl>
-                                              <p:pRg st="1" end="1"/>
-                                            </p:txEl>
-                                          </p:spTgt>
-                                        </p:tgtEl>
-                                        <p:attrNameLst>
-                                          <p:attrName>ppt_y</p:attrName>
-                                        </p:attrNameLst>
-                                      </p:cBhvr>
-                                      <p:tavLst>
-                                        <p:tav tm="0">
-                                          <p:val>
-                                            <p:strVal val="#ppt_y+#ppt_h*1.125000"/>
-                                          </p:val>
-                                        </p:tav>
-                                        <p:tav tm="100000">
-                                          <p:val>
-                                            <p:strVal val="#ppt_y"/>
-                                          </p:val>
-                                        </p:tav>
-                                      </p:tavLst>
-                                    </p:anim>
-                                    <p:animEffect transition="in" filter="wipe(up)">
-                                      <p:cBhvr>
-                                        <p:cTn id="12" dur="500"/>
-                                        <p:tgtEl>
-                                          <p:spTgt spid="3">
-                                            <p:txEl>
-                                              <p:pRg st="1" end="1"/>
                                             </p:txEl>
                                           </p:spTgt>
                                         </p:tgtEl>
@@ -23272,26 +23193,26 @@
                     </p:cTn>
                   </p:par>
                   <p:par>
-                    <p:cTn id="13" fill="hold">
+                    <p:cTn id="9" fill="hold">
                       <p:stCondLst>
                         <p:cond delay="indefinite"/>
                       </p:stCondLst>
                       <p:childTnLst>
                         <p:par>
-                          <p:cTn id="14" fill="hold">
+                          <p:cTn id="10" fill="hold">
                             <p:stCondLst>
                               <p:cond delay="0"/>
                             </p:stCondLst>
                             <p:childTnLst>
                               <p:par>
-                                <p:cTn id="15" presetID="12" presetClass="entr" presetSubtype="4" fill="hold" nodeType="clickEffect">
+                                <p:cTn id="11" presetID="12" presetClass="entr" presetSubtype="4" fill="hold" nodeType="clickEffect">
                                   <p:stCondLst>
                                     <p:cond delay="0"/>
                                   </p:stCondLst>
                                   <p:childTnLst>
                                     <p:set>
                                       <p:cBhvr>
-                                        <p:cTn id="16" dur="1" fill="hold">
+                                        <p:cTn id="12" dur="1" fill="hold">
                                           <p:stCondLst>
                                             <p:cond delay="0"/>
                                           </p:stCondLst>
@@ -23299,7 +23220,7 @@
                                         <p:tgtEl>
                                           <p:spTgt spid="3">
                                             <p:txEl>
-                                              <p:pRg st="2" end="2"/>
+                                              <p:pRg st="1" end="1"/>
                                             </p:txEl>
                                           </p:spTgt>
                                         </p:tgtEl>
@@ -23313,11 +23234,11 @@
                                     </p:set>
                                     <p:anim calcmode="lin" valueType="num">
                                       <p:cBhvr additive="base">
-                                        <p:cTn id="17" dur="500"/>
-                                        <p:tgtEl>
-                                          <p:spTgt spid="3">
-                                            <p:txEl>
-                                              <p:pRg st="2" end="2"/>
+                                        <p:cTn id="13" dur="500"/>
+                                        <p:tgtEl>
+                                          <p:spTgt spid="3">
+                                            <p:txEl>
+                                              <p:pRg st="1" end="1"/>
                                             </p:txEl>
                                           </p:spTgt>
                                         </p:tgtEl>
@@ -23340,501 +23261,11 @@
                                     </p:anim>
                                     <p:animEffect transition="in" filter="wipe(up)">
                                       <p:cBhvr>
-                                        <p:cTn id="18" dur="500"/>
-                                        <p:tgtEl>
-                                          <p:spTgt spid="3">
-                                            <p:txEl>
-                                              <p:pRg st="2" end="2"/>
-                                            </p:txEl>
-                                          </p:spTgt>
-                                        </p:tgtEl>
-                                      </p:cBhvr>
-                                    </p:animEffect>
-                                  </p:childTnLst>
-                                </p:cTn>
-                              </p:par>
-                              <p:par>
-                                <p:cTn id="19" presetID="12" presetClass="entr" presetSubtype="4" fill="hold" nodeType="withEffect">
-                                  <p:stCondLst>
-                                    <p:cond delay="0"/>
-                                  </p:stCondLst>
-                                  <p:childTnLst>
-                                    <p:set>
-                                      <p:cBhvr>
-                                        <p:cTn id="20" dur="1" fill="hold">
-                                          <p:stCondLst>
-                                            <p:cond delay="0"/>
-                                          </p:stCondLst>
-                                        </p:cTn>
-                                        <p:tgtEl>
-                                          <p:spTgt spid="3">
-                                            <p:txEl>
-                                              <p:pRg st="3" end="3"/>
-                                            </p:txEl>
-                                          </p:spTgt>
-                                        </p:tgtEl>
-                                        <p:attrNameLst>
-                                          <p:attrName>style.visibility</p:attrName>
-                                        </p:attrNameLst>
-                                      </p:cBhvr>
-                                      <p:to>
-                                        <p:strVal val="visible"/>
-                                      </p:to>
-                                    </p:set>
-                                    <p:anim calcmode="lin" valueType="num">
-                                      <p:cBhvr additive="base">
-                                        <p:cTn id="21" dur="500"/>
-                                        <p:tgtEl>
-                                          <p:spTgt spid="3">
-                                            <p:txEl>
-                                              <p:pRg st="3" end="3"/>
-                                            </p:txEl>
-                                          </p:spTgt>
-                                        </p:tgtEl>
-                                        <p:attrNameLst>
-                                          <p:attrName>ppt_y</p:attrName>
-                                        </p:attrNameLst>
-                                      </p:cBhvr>
-                                      <p:tavLst>
-                                        <p:tav tm="0">
-                                          <p:val>
-                                            <p:strVal val="#ppt_y+#ppt_h*1.125000"/>
-                                          </p:val>
-                                        </p:tav>
-                                        <p:tav tm="100000">
-                                          <p:val>
-                                            <p:strVal val="#ppt_y"/>
-                                          </p:val>
-                                        </p:tav>
-                                      </p:tavLst>
-                                    </p:anim>
-                                    <p:animEffect transition="in" filter="wipe(up)">
-                                      <p:cBhvr>
-                                        <p:cTn id="22" dur="500"/>
-                                        <p:tgtEl>
-                                          <p:spTgt spid="3">
-                                            <p:txEl>
-                                              <p:pRg st="3" end="3"/>
-                                            </p:txEl>
-                                          </p:spTgt>
-                                        </p:tgtEl>
-                                      </p:cBhvr>
-                                    </p:animEffect>
-                                  </p:childTnLst>
-                                </p:cTn>
-                              </p:par>
-                              <p:par>
-                                <p:cTn id="23" presetID="12" presetClass="entr" presetSubtype="4" fill="hold" nodeType="withEffect">
-                                  <p:stCondLst>
-                                    <p:cond delay="0"/>
-                                  </p:stCondLst>
-                                  <p:childTnLst>
-                                    <p:set>
-                                      <p:cBhvr>
-                                        <p:cTn id="24" dur="1" fill="hold">
-                                          <p:stCondLst>
-                                            <p:cond delay="0"/>
-                                          </p:stCondLst>
-                                        </p:cTn>
-                                        <p:tgtEl>
-                                          <p:spTgt spid="3">
-                                            <p:txEl>
-                                              <p:pRg st="4" end="4"/>
-                                            </p:txEl>
-                                          </p:spTgt>
-                                        </p:tgtEl>
-                                        <p:attrNameLst>
-                                          <p:attrName>style.visibility</p:attrName>
-                                        </p:attrNameLst>
-                                      </p:cBhvr>
-                                      <p:to>
-                                        <p:strVal val="visible"/>
-                                      </p:to>
-                                    </p:set>
-                                    <p:anim calcmode="lin" valueType="num">
-                                      <p:cBhvr additive="base">
-                                        <p:cTn id="25" dur="500"/>
-                                        <p:tgtEl>
-                                          <p:spTgt spid="3">
-                                            <p:txEl>
-                                              <p:pRg st="4" end="4"/>
-                                            </p:txEl>
-                                          </p:spTgt>
-                                        </p:tgtEl>
-                                        <p:attrNameLst>
-                                          <p:attrName>ppt_y</p:attrName>
-                                        </p:attrNameLst>
-                                      </p:cBhvr>
-                                      <p:tavLst>
-                                        <p:tav tm="0">
-                                          <p:val>
-                                            <p:strVal val="#ppt_y+#ppt_h*1.125000"/>
-                                          </p:val>
-                                        </p:tav>
-                                        <p:tav tm="100000">
-                                          <p:val>
-                                            <p:strVal val="#ppt_y"/>
-                                          </p:val>
-                                        </p:tav>
-                                      </p:tavLst>
-                                    </p:anim>
-                                    <p:animEffect transition="in" filter="wipe(up)">
-                                      <p:cBhvr>
-                                        <p:cTn id="26" dur="500"/>
-                                        <p:tgtEl>
-                                          <p:spTgt spid="3">
-                                            <p:txEl>
-                                              <p:pRg st="4" end="4"/>
-                                            </p:txEl>
-                                          </p:spTgt>
-                                        </p:tgtEl>
-                                      </p:cBhvr>
-                                    </p:animEffect>
-                                  </p:childTnLst>
-                                </p:cTn>
-                              </p:par>
-                              <p:par>
-                                <p:cTn id="27" presetID="12" presetClass="entr" presetSubtype="4" fill="hold" nodeType="withEffect">
-                                  <p:stCondLst>
-                                    <p:cond delay="0"/>
-                                  </p:stCondLst>
-                                  <p:childTnLst>
-                                    <p:set>
-                                      <p:cBhvr>
-                                        <p:cTn id="28" dur="1" fill="hold">
-                                          <p:stCondLst>
-                                            <p:cond delay="0"/>
-                                          </p:stCondLst>
-                                        </p:cTn>
-                                        <p:tgtEl>
-                                          <p:spTgt spid="3">
-                                            <p:txEl>
-                                              <p:pRg st="5" end="5"/>
-                                            </p:txEl>
-                                          </p:spTgt>
-                                        </p:tgtEl>
-                                        <p:attrNameLst>
-                                          <p:attrName>style.visibility</p:attrName>
-                                        </p:attrNameLst>
-                                      </p:cBhvr>
-                                      <p:to>
-                                        <p:strVal val="visible"/>
-                                      </p:to>
-                                    </p:set>
-                                    <p:anim calcmode="lin" valueType="num">
-                                      <p:cBhvr additive="base">
-                                        <p:cTn id="29" dur="500"/>
-                                        <p:tgtEl>
-                                          <p:spTgt spid="3">
-                                            <p:txEl>
-                                              <p:pRg st="5" end="5"/>
-                                            </p:txEl>
-                                          </p:spTgt>
-                                        </p:tgtEl>
-                                        <p:attrNameLst>
-                                          <p:attrName>ppt_y</p:attrName>
-                                        </p:attrNameLst>
-                                      </p:cBhvr>
-                                      <p:tavLst>
-                                        <p:tav tm="0">
-                                          <p:val>
-                                            <p:strVal val="#ppt_y+#ppt_h*1.125000"/>
-                                          </p:val>
-                                        </p:tav>
-                                        <p:tav tm="100000">
-                                          <p:val>
-                                            <p:strVal val="#ppt_y"/>
-                                          </p:val>
-                                        </p:tav>
-                                      </p:tavLst>
-                                    </p:anim>
-                                    <p:animEffect transition="in" filter="wipe(up)">
-                                      <p:cBhvr>
-                                        <p:cTn id="30" dur="500"/>
-                                        <p:tgtEl>
-                                          <p:spTgt spid="3">
-                                            <p:txEl>
-                                              <p:pRg st="5" end="5"/>
-                                            </p:txEl>
-                                          </p:spTgt>
-                                        </p:tgtEl>
-                                      </p:cBhvr>
-                                    </p:animEffect>
-                                  </p:childTnLst>
-                                </p:cTn>
-                              </p:par>
-                              <p:par>
-                                <p:cTn id="31" presetID="12" presetClass="entr" presetSubtype="4" fill="hold" nodeType="withEffect">
-                                  <p:stCondLst>
-                                    <p:cond delay="0"/>
-                                  </p:stCondLst>
-                                  <p:childTnLst>
-                                    <p:set>
-                                      <p:cBhvr>
-                                        <p:cTn id="32" dur="1" fill="hold">
-                                          <p:stCondLst>
-                                            <p:cond delay="0"/>
-                                          </p:stCondLst>
-                                        </p:cTn>
-                                        <p:tgtEl>
-                                          <p:spTgt spid="3">
-                                            <p:txEl>
-                                              <p:pRg st="6" end="6"/>
-                                            </p:txEl>
-                                          </p:spTgt>
-                                        </p:tgtEl>
-                                        <p:attrNameLst>
-                                          <p:attrName>style.visibility</p:attrName>
-                                        </p:attrNameLst>
-                                      </p:cBhvr>
-                                      <p:to>
-                                        <p:strVal val="visible"/>
-                                      </p:to>
-                                    </p:set>
-                                    <p:anim calcmode="lin" valueType="num">
-                                      <p:cBhvr additive="base">
-                                        <p:cTn id="33" dur="500"/>
-                                        <p:tgtEl>
-                                          <p:spTgt spid="3">
-                                            <p:txEl>
-                                              <p:pRg st="6" end="6"/>
-                                            </p:txEl>
-                                          </p:spTgt>
-                                        </p:tgtEl>
-                                        <p:attrNameLst>
-                                          <p:attrName>ppt_y</p:attrName>
-                                        </p:attrNameLst>
-                                      </p:cBhvr>
-                                      <p:tavLst>
-                                        <p:tav tm="0">
-                                          <p:val>
-                                            <p:strVal val="#ppt_y+#ppt_h*1.125000"/>
-                                          </p:val>
-                                        </p:tav>
-                                        <p:tav tm="100000">
-                                          <p:val>
-                                            <p:strVal val="#ppt_y"/>
-                                          </p:val>
-                                        </p:tav>
-                                      </p:tavLst>
-                                    </p:anim>
-                                    <p:animEffect transition="in" filter="wipe(up)">
-                                      <p:cBhvr>
-                                        <p:cTn id="34" dur="500"/>
-                                        <p:tgtEl>
-                                          <p:spTgt spid="3">
-                                            <p:txEl>
-                                              <p:pRg st="6" end="6"/>
-                                            </p:txEl>
-                                          </p:spTgt>
-                                        </p:tgtEl>
-                                      </p:cBhvr>
-                                    </p:animEffect>
-                                  </p:childTnLst>
-                                </p:cTn>
-                              </p:par>
-                              <p:par>
-                                <p:cTn id="35" presetID="12" presetClass="entr" presetSubtype="4" fill="hold" nodeType="withEffect">
-                                  <p:stCondLst>
-                                    <p:cond delay="0"/>
-                                  </p:stCondLst>
-                                  <p:childTnLst>
-                                    <p:set>
-                                      <p:cBhvr>
-                                        <p:cTn id="36" dur="1" fill="hold">
-                                          <p:stCondLst>
-                                            <p:cond delay="0"/>
-                                          </p:stCondLst>
-                                        </p:cTn>
-                                        <p:tgtEl>
-                                          <p:spTgt spid="3">
-                                            <p:txEl>
-                                              <p:pRg st="7" end="7"/>
-                                            </p:txEl>
-                                          </p:spTgt>
-                                        </p:tgtEl>
-                                        <p:attrNameLst>
-                                          <p:attrName>style.visibility</p:attrName>
-                                        </p:attrNameLst>
-                                      </p:cBhvr>
-                                      <p:to>
-                                        <p:strVal val="visible"/>
-                                      </p:to>
-                                    </p:set>
-                                    <p:anim calcmode="lin" valueType="num">
-                                      <p:cBhvr additive="base">
-                                        <p:cTn id="37" dur="500"/>
-                                        <p:tgtEl>
-                                          <p:spTgt spid="3">
-                                            <p:txEl>
-                                              <p:pRg st="7" end="7"/>
-                                            </p:txEl>
-                                          </p:spTgt>
-                                        </p:tgtEl>
-                                        <p:attrNameLst>
-                                          <p:attrName>ppt_y</p:attrName>
-                                        </p:attrNameLst>
-                                      </p:cBhvr>
-                                      <p:tavLst>
-                                        <p:tav tm="0">
-                                          <p:val>
-                                            <p:strVal val="#ppt_y+#ppt_h*1.125000"/>
-                                          </p:val>
-                                        </p:tav>
-                                        <p:tav tm="100000">
-                                          <p:val>
-                                            <p:strVal val="#ppt_y"/>
-                                          </p:val>
-                                        </p:tav>
-                                      </p:tavLst>
-                                    </p:anim>
-                                    <p:animEffect transition="in" filter="wipe(up)">
-                                      <p:cBhvr>
-                                        <p:cTn id="38" dur="500"/>
-                                        <p:tgtEl>
-                                          <p:spTgt spid="3">
-                                            <p:txEl>
-                                              <p:pRg st="7" end="7"/>
-                                            </p:txEl>
-                                          </p:spTgt>
-                                        </p:tgtEl>
-                                      </p:cBhvr>
-                                    </p:animEffect>
-                                  </p:childTnLst>
-                                </p:cTn>
-                              </p:par>
-                              <p:par>
-                                <p:cTn id="39" presetID="12" presetClass="entr" presetSubtype="4" fill="hold" nodeType="withEffect">
-                                  <p:stCondLst>
-                                    <p:cond delay="0"/>
-                                  </p:stCondLst>
-                                  <p:childTnLst>
-                                    <p:set>
-                                      <p:cBhvr>
-                                        <p:cTn id="40" dur="1" fill="hold">
-                                          <p:stCondLst>
-                                            <p:cond delay="0"/>
-                                          </p:stCondLst>
-                                        </p:cTn>
-                                        <p:tgtEl>
-                                          <p:spTgt spid="3">
-                                            <p:txEl>
-                                              <p:pRg st="8" end="8"/>
-                                            </p:txEl>
-                                          </p:spTgt>
-                                        </p:tgtEl>
-                                        <p:attrNameLst>
-                                          <p:attrName>style.visibility</p:attrName>
-                                        </p:attrNameLst>
-                                      </p:cBhvr>
-                                      <p:to>
-                                        <p:strVal val="visible"/>
-                                      </p:to>
-                                    </p:set>
-                                    <p:anim calcmode="lin" valueType="num">
-                                      <p:cBhvr additive="base">
-                                        <p:cTn id="41" dur="500"/>
-                                        <p:tgtEl>
-                                          <p:spTgt spid="3">
-                                            <p:txEl>
-                                              <p:pRg st="8" end="8"/>
-                                            </p:txEl>
-                                          </p:spTgt>
-                                        </p:tgtEl>
-                                        <p:attrNameLst>
-                                          <p:attrName>ppt_y</p:attrName>
-                                        </p:attrNameLst>
-                                      </p:cBhvr>
-                                      <p:tavLst>
-                                        <p:tav tm="0">
-                                          <p:val>
-                                            <p:strVal val="#ppt_y+#ppt_h*1.125000"/>
-                                          </p:val>
-                                        </p:tav>
-                                        <p:tav tm="100000">
-                                          <p:val>
-                                            <p:strVal val="#ppt_y"/>
-                                          </p:val>
-                                        </p:tav>
-                                      </p:tavLst>
-                                    </p:anim>
-                                    <p:animEffect transition="in" filter="wipe(up)">
-                                      <p:cBhvr>
-                                        <p:cTn id="42" dur="500"/>
-                                        <p:tgtEl>
-                                          <p:spTgt spid="3">
-                                            <p:txEl>
-                                              <p:pRg st="8" end="8"/>
-                                            </p:txEl>
-                                          </p:spTgt>
-                                        </p:tgtEl>
-                                      </p:cBhvr>
-                                    </p:animEffect>
-                                  </p:childTnLst>
-                                </p:cTn>
-                              </p:par>
-                              <p:par>
-                                <p:cTn id="43" presetID="12" presetClass="entr" presetSubtype="4" fill="hold" nodeType="withEffect">
-                                  <p:stCondLst>
-                                    <p:cond delay="0"/>
-                                  </p:stCondLst>
-                                  <p:childTnLst>
-                                    <p:set>
-                                      <p:cBhvr>
-                                        <p:cTn id="44" dur="1" fill="hold">
-                                          <p:stCondLst>
-                                            <p:cond delay="0"/>
-                                          </p:stCondLst>
-                                        </p:cTn>
-                                        <p:tgtEl>
-                                          <p:spTgt spid="3">
-                                            <p:txEl>
-                                              <p:pRg st="9" end="9"/>
-                                            </p:txEl>
-                                          </p:spTgt>
-                                        </p:tgtEl>
-                                        <p:attrNameLst>
-                                          <p:attrName>style.visibility</p:attrName>
-                                        </p:attrNameLst>
-                                      </p:cBhvr>
-                                      <p:to>
-                                        <p:strVal val="visible"/>
-                                      </p:to>
-                                    </p:set>
-                                    <p:anim calcmode="lin" valueType="num">
-                                      <p:cBhvr additive="base">
-                                        <p:cTn id="45" dur="500"/>
-                                        <p:tgtEl>
-                                          <p:spTgt spid="3">
-                                            <p:txEl>
-                                              <p:pRg st="9" end="9"/>
-                                            </p:txEl>
-                                          </p:spTgt>
-                                        </p:tgtEl>
-                                        <p:attrNameLst>
-                                          <p:attrName>ppt_y</p:attrName>
-                                        </p:attrNameLst>
-                                      </p:cBhvr>
-                                      <p:tavLst>
-                                        <p:tav tm="0">
-                                          <p:val>
-                                            <p:strVal val="#ppt_y+#ppt_h*1.125000"/>
-                                          </p:val>
-                                        </p:tav>
-                                        <p:tav tm="100000">
-                                          <p:val>
-                                            <p:strVal val="#ppt_y"/>
-                                          </p:val>
-                                        </p:tav>
-                                      </p:tavLst>
-                                    </p:anim>
-                                    <p:animEffect transition="in" filter="wipe(up)">
-                                      <p:cBhvr>
-                                        <p:cTn id="46" dur="500"/>
-                                        <p:tgtEl>
-                                          <p:spTgt spid="3">
-                                            <p:txEl>
-                                              <p:pRg st="9" end="9"/>
+                                        <p:cTn id="14" dur="500"/>
+                                        <p:tgtEl>
+                                          <p:spTgt spid="3">
+                                            <p:txEl>
+                                              <p:pRg st="1" end="1"/>
                                             </p:txEl>
                                           </p:spTgt>
                                         </p:tgtEl>
@@ -23850,26 +23281,26 @@
                     </p:cTn>
                   </p:par>
                   <p:par>
-                    <p:cTn id="47" fill="hold">
+                    <p:cTn id="15" fill="hold">
                       <p:stCondLst>
                         <p:cond delay="indefinite"/>
                       </p:stCondLst>
                       <p:childTnLst>
                         <p:par>
-                          <p:cTn id="48" fill="hold">
+                          <p:cTn id="16" fill="hold">
                             <p:stCondLst>
                               <p:cond delay="0"/>
                             </p:stCondLst>
                             <p:childTnLst>
                               <p:par>
-                                <p:cTn id="49" presetID="12" presetClass="entr" presetSubtype="4" fill="hold" nodeType="clickEffect">
+                                <p:cTn id="17" presetID="12" presetClass="entr" presetSubtype="4" fill="hold" nodeType="clickEffect">
                                   <p:stCondLst>
                                     <p:cond delay="0"/>
                                   </p:stCondLst>
                                   <p:childTnLst>
                                     <p:set>
                                       <p:cBhvr>
-                                        <p:cTn id="50" dur="1" fill="hold">
+                                        <p:cTn id="18" dur="1" fill="hold">
                                           <p:stCondLst>
                                             <p:cond delay="0"/>
                                           </p:stCondLst>
@@ -23877,7 +23308,7 @@
                                         <p:tgtEl>
                                           <p:spTgt spid="3">
                                             <p:txEl>
-                                              <p:pRg st="10" end="10"/>
+                                              <p:pRg st="2" end="2"/>
                                             </p:txEl>
                                           </p:spTgt>
                                         </p:tgtEl>
@@ -23891,11 +23322,11 @@
                                     </p:set>
                                     <p:anim calcmode="lin" valueType="num">
                                       <p:cBhvr additive="base">
-                                        <p:cTn id="51" dur="500"/>
-                                        <p:tgtEl>
-                                          <p:spTgt spid="3">
-                                            <p:txEl>
-                                              <p:pRg st="10" end="10"/>
+                                        <p:cTn id="19" dur="500"/>
+                                        <p:tgtEl>
+                                          <p:spTgt spid="3">
+                                            <p:txEl>
+                                              <p:pRg st="2" end="2"/>
                                             </p:txEl>
                                           </p:spTgt>
                                         </p:tgtEl>
@@ -23918,11 +23349,501 @@
                                     </p:anim>
                                     <p:animEffect transition="in" filter="wipe(up)">
                                       <p:cBhvr>
-                                        <p:cTn id="52" dur="500"/>
-                                        <p:tgtEl>
-                                          <p:spTgt spid="3">
-                                            <p:txEl>
-                                              <p:pRg st="10" end="10"/>
+                                        <p:cTn id="20" dur="500"/>
+                                        <p:tgtEl>
+                                          <p:spTgt spid="3">
+                                            <p:txEl>
+                                              <p:pRg st="2" end="2"/>
+                                            </p:txEl>
+                                          </p:spTgt>
+                                        </p:tgtEl>
+                                      </p:cBhvr>
+                                    </p:animEffect>
+                                  </p:childTnLst>
+                                </p:cTn>
+                              </p:par>
+                              <p:par>
+                                <p:cTn id="21" presetID="12" presetClass="entr" presetSubtype="4" fill="hold" nodeType="withEffect">
+                                  <p:stCondLst>
+                                    <p:cond delay="0"/>
+                                  </p:stCondLst>
+                                  <p:childTnLst>
+                                    <p:set>
+                                      <p:cBhvr>
+                                        <p:cTn id="22" dur="1" fill="hold">
+                                          <p:stCondLst>
+                                            <p:cond delay="0"/>
+                                          </p:stCondLst>
+                                        </p:cTn>
+                                        <p:tgtEl>
+                                          <p:spTgt spid="3">
+                                            <p:txEl>
+                                              <p:pRg st="3" end="3"/>
+                                            </p:txEl>
+                                          </p:spTgt>
+                                        </p:tgtEl>
+                                        <p:attrNameLst>
+                                          <p:attrName>style.visibility</p:attrName>
+                                        </p:attrNameLst>
+                                      </p:cBhvr>
+                                      <p:to>
+                                        <p:strVal val="visible"/>
+                                      </p:to>
+                                    </p:set>
+                                    <p:anim calcmode="lin" valueType="num">
+                                      <p:cBhvr additive="base">
+                                        <p:cTn id="23" dur="500"/>
+                                        <p:tgtEl>
+                                          <p:spTgt spid="3">
+                                            <p:txEl>
+                                              <p:pRg st="3" end="3"/>
+                                            </p:txEl>
+                                          </p:spTgt>
+                                        </p:tgtEl>
+                                        <p:attrNameLst>
+                                          <p:attrName>ppt_y</p:attrName>
+                                        </p:attrNameLst>
+                                      </p:cBhvr>
+                                      <p:tavLst>
+                                        <p:tav tm="0">
+                                          <p:val>
+                                            <p:strVal val="#ppt_y+#ppt_h*1.125000"/>
+                                          </p:val>
+                                        </p:tav>
+                                        <p:tav tm="100000">
+                                          <p:val>
+                                            <p:strVal val="#ppt_y"/>
+                                          </p:val>
+                                        </p:tav>
+                                      </p:tavLst>
+                                    </p:anim>
+                                    <p:animEffect transition="in" filter="wipe(up)">
+                                      <p:cBhvr>
+                                        <p:cTn id="24" dur="500"/>
+                                        <p:tgtEl>
+                                          <p:spTgt spid="3">
+                                            <p:txEl>
+                                              <p:pRg st="3" end="3"/>
+                                            </p:txEl>
+                                          </p:spTgt>
+                                        </p:tgtEl>
+                                      </p:cBhvr>
+                                    </p:animEffect>
+                                  </p:childTnLst>
+                                </p:cTn>
+                              </p:par>
+                              <p:par>
+                                <p:cTn id="25" presetID="12" presetClass="entr" presetSubtype="4" fill="hold" nodeType="withEffect">
+                                  <p:stCondLst>
+                                    <p:cond delay="0"/>
+                                  </p:stCondLst>
+                                  <p:childTnLst>
+                                    <p:set>
+                                      <p:cBhvr>
+                                        <p:cTn id="26" dur="1" fill="hold">
+                                          <p:stCondLst>
+                                            <p:cond delay="0"/>
+                                          </p:stCondLst>
+                                        </p:cTn>
+                                        <p:tgtEl>
+                                          <p:spTgt spid="3">
+                                            <p:txEl>
+                                              <p:pRg st="4" end="4"/>
+                                            </p:txEl>
+                                          </p:spTgt>
+                                        </p:tgtEl>
+                                        <p:attrNameLst>
+                                          <p:attrName>style.visibility</p:attrName>
+                                        </p:attrNameLst>
+                                      </p:cBhvr>
+                                      <p:to>
+                                        <p:strVal val="visible"/>
+                                      </p:to>
+                                    </p:set>
+                                    <p:anim calcmode="lin" valueType="num">
+                                      <p:cBhvr additive="base">
+                                        <p:cTn id="27" dur="500"/>
+                                        <p:tgtEl>
+                                          <p:spTgt spid="3">
+                                            <p:txEl>
+                                              <p:pRg st="4" end="4"/>
+                                            </p:txEl>
+                                          </p:spTgt>
+                                        </p:tgtEl>
+                                        <p:attrNameLst>
+                                          <p:attrName>ppt_y</p:attrName>
+                                        </p:attrNameLst>
+                                      </p:cBhvr>
+                                      <p:tavLst>
+                                        <p:tav tm="0">
+                                          <p:val>
+                                            <p:strVal val="#ppt_y+#ppt_h*1.125000"/>
+                                          </p:val>
+                                        </p:tav>
+                                        <p:tav tm="100000">
+                                          <p:val>
+                                            <p:strVal val="#ppt_y"/>
+                                          </p:val>
+                                        </p:tav>
+                                      </p:tavLst>
+                                    </p:anim>
+                                    <p:animEffect transition="in" filter="wipe(up)">
+                                      <p:cBhvr>
+                                        <p:cTn id="28" dur="500"/>
+                                        <p:tgtEl>
+                                          <p:spTgt spid="3">
+                                            <p:txEl>
+                                              <p:pRg st="4" end="4"/>
+                                            </p:txEl>
+                                          </p:spTgt>
+                                        </p:tgtEl>
+                                      </p:cBhvr>
+                                    </p:animEffect>
+                                  </p:childTnLst>
+                                </p:cTn>
+                              </p:par>
+                              <p:par>
+                                <p:cTn id="29" presetID="12" presetClass="entr" presetSubtype="4" fill="hold" nodeType="withEffect">
+                                  <p:stCondLst>
+                                    <p:cond delay="0"/>
+                                  </p:stCondLst>
+                                  <p:childTnLst>
+                                    <p:set>
+                                      <p:cBhvr>
+                                        <p:cTn id="30" dur="1" fill="hold">
+                                          <p:stCondLst>
+                                            <p:cond delay="0"/>
+                                          </p:stCondLst>
+                                        </p:cTn>
+                                        <p:tgtEl>
+                                          <p:spTgt spid="3">
+                                            <p:txEl>
+                                              <p:pRg st="5" end="5"/>
+                                            </p:txEl>
+                                          </p:spTgt>
+                                        </p:tgtEl>
+                                        <p:attrNameLst>
+                                          <p:attrName>style.visibility</p:attrName>
+                                        </p:attrNameLst>
+                                      </p:cBhvr>
+                                      <p:to>
+                                        <p:strVal val="visible"/>
+                                      </p:to>
+                                    </p:set>
+                                    <p:anim calcmode="lin" valueType="num">
+                                      <p:cBhvr additive="base">
+                                        <p:cTn id="31" dur="500"/>
+                                        <p:tgtEl>
+                                          <p:spTgt spid="3">
+                                            <p:txEl>
+                                              <p:pRg st="5" end="5"/>
+                                            </p:txEl>
+                                          </p:spTgt>
+                                        </p:tgtEl>
+                                        <p:attrNameLst>
+                                          <p:attrName>ppt_y</p:attrName>
+                                        </p:attrNameLst>
+                                      </p:cBhvr>
+                                      <p:tavLst>
+                                        <p:tav tm="0">
+                                          <p:val>
+                                            <p:strVal val="#ppt_y+#ppt_h*1.125000"/>
+                                          </p:val>
+                                        </p:tav>
+                                        <p:tav tm="100000">
+                                          <p:val>
+                                            <p:strVal val="#ppt_y"/>
+                                          </p:val>
+                                        </p:tav>
+                                      </p:tavLst>
+                                    </p:anim>
+                                    <p:animEffect transition="in" filter="wipe(up)">
+                                      <p:cBhvr>
+                                        <p:cTn id="32" dur="500"/>
+                                        <p:tgtEl>
+                                          <p:spTgt spid="3">
+                                            <p:txEl>
+                                              <p:pRg st="5" end="5"/>
+                                            </p:txEl>
+                                          </p:spTgt>
+                                        </p:tgtEl>
+                                      </p:cBhvr>
+                                    </p:animEffect>
+                                  </p:childTnLst>
+                                </p:cTn>
+                              </p:par>
+                              <p:par>
+                                <p:cTn id="33" presetID="12" presetClass="entr" presetSubtype="4" fill="hold" nodeType="withEffect">
+                                  <p:stCondLst>
+                                    <p:cond delay="0"/>
+                                  </p:stCondLst>
+                                  <p:childTnLst>
+                                    <p:set>
+                                      <p:cBhvr>
+                                        <p:cTn id="34" dur="1" fill="hold">
+                                          <p:stCondLst>
+                                            <p:cond delay="0"/>
+                                          </p:stCondLst>
+                                        </p:cTn>
+                                        <p:tgtEl>
+                                          <p:spTgt spid="3">
+                                            <p:txEl>
+                                              <p:pRg st="6" end="6"/>
+                                            </p:txEl>
+                                          </p:spTgt>
+                                        </p:tgtEl>
+                                        <p:attrNameLst>
+                                          <p:attrName>style.visibility</p:attrName>
+                                        </p:attrNameLst>
+                                      </p:cBhvr>
+                                      <p:to>
+                                        <p:strVal val="visible"/>
+                                      </p:to>
+                                    </p:set>
+                                    <p:anim calcmode="lin" valueType="num">
+                                      <p:cBhvr additive="base">
+                                        <p:cTn id="35" dur="500"/>
+                                        <p:tgtEl>
+                                          <p:spTgt spid="3">
+                                            <p:txEl>
+                                              <p:pRg st="6" end="6"/>
+                                            </p:txEl>
+                                          </p:spTgt>
+                                        </p:tgtEl>
+                                        <p:attrNameLst>
+                                          <p:attrName>ppt_y</p:attrName>
+                                        </p:attrNameLst>
+                                      </p:cBhvr>
+                                      <p:tavLst>
+                                        <p:tav tm="0">
+                                          <p:val>
+                                            <p:strVal val="#ppt_y+#ppt_h*1.125000"/>
+                                          </p:val>
+                                        </p:tav>
+                                        <p:tav tm="100000">
+                                          <p:val>
+                                            <p:strVal val="#ppt_y"/>
+                                          </p:val>
+                                        </p:tav>
+                                      </p:tavLst>
+                                    </p:anim>
+                                    <p:animEffect transition="in" filter="wipe(up)">
+                                      <p:cBhvr>
+                                        <p:cTn id="36" dur="500"/>
+                                        <p:tgtEl>
+                                          <p:spTgt spid="3">
+                                            <p:txEl>
+                                              <p:pRg st="6" end="6"/>
+                                            </p:txEl>
+                                          </p:spTgt>
+                                        </p:tgtEl>
+                                      </p:cBhvr>
+                                    </p:animEffect>
+                                  </p:childTnLst>
+                                </p:cTn>
+                              </p:par>
+                              <p:par>
+                                <p:cTn id="37" presetID="12" presetClass="entr" presetSubtype="4" fill="hold" nodeType="withEffect">
+                                  <p:stCondLst>
+                                    <p:cond delay="0"/>
+                                  </p:stCondLst>
+                                  <p:childTnLst>
+                                    <p:set>
+                                      <p:cBhvr>
+                                        <p:cTn id="38" dur="1" fill="hold">
+                                          <p:stCondLst>
+                                            <p:cond delay="0"/>
+                                          </p:stCondLst>
+                                        </p:cTn>
+                                        <p:tgtEl>
+                                          <p:spTgt spid="3">
+                                            <p:txEl>
+                                              <p:pRg st="7" end="7"/>
+                                            </p:txEl>
+                                          </p:spTgt>
+                                        </p:tgtEl>
+                                        <p:attrNameLst>
+                                          <p:attrName>style.visibility</p:attrName>
+                                        </p:attrNameLst>
+                                      </p:cBhvr>
+                                      <p:to>
+                                        <p:strVal val="visible"/>
+                                      </p:to>
+                                    </p:set>
+                                    <p:anim calcmode="lin" valueType="num">
+                                      <p:cBhvr additive="base">
+                                        <p:cTn id="39" dur="500"/>
+                                        <p:tgtEl>
+                                          <p:spTgt spid="3">
+                                            <p:txEl>
+                                              <p:pRg st="7" end="7"/>
+                                            </p:txEl>
+                                          </p:spTgt>
+                                        </p:tgtEl>
+                                        <p:attrNameLst>
+                                          <p:attrName>ppt_y</p:attrName>
+                                        </p:attrNameLst>
+                                      </p:cBhvr>
+                                      <p:tavLst>
+                                        <p:tav tm="0">
+                                          <p:val>
+                                            <p:strVal val="#ppt_y+#ppt_h*1.125000"/>
+                                          </p:val>
+                                        </p:tav>
+                                        <p:tav tm="100000">
+                                          <p:val>
+                                            <p:strVal val="#ppt_y"/>
+                                          </p:val>
+                                        </p:tav>
+                                      </p:tavLst>
+                                    </p:anim>
+                                    <p:animEffect transition="in" filter="wipe(up)">
+                                      <p:cBhvr>
+                                        <p:cTn id="40" dur="500"/>
+                                        <p:tgtEl>
+                                          <p:spTgt spid="3">
+                                            <p:txEl>
+                                              <p:pRg st="7" end="7"/>
+                                            </p:txEl>
+                                          </p:spTgt>
+                                        </p:tgtEl>
+                                      </p:cBhvr>
+                                    </p:animEffect>
+                                  </p:childTnLst>
+                                </p:cTn>
+                              </p:par>
+                              <p:par>
+                                <p:cTn id="41" presetID="12" presetClass="entr" presetSubtype="4" fill="hold" nodeType="withEffect">
+                                  <p:stCondLst>
+                                    <p:cond delay="0"/>
+                                  </p:stCondLst>
+                                  <p:childTnLst>
+                                    <p:set>
+                                      <p:cBhvr>
+                                        <p:cTn id="42" dur="1" fill="hold">
+                                          <p:stCondLst>
+                                            <p:cond delay="0"/>
+                                          </p:stCondLst>
+                                        </p:cTn>
+                                        <p:tgtEl>
+                                          <p:spTgt spid="3">
+                                            <p:txEl>
+                                              <p:pRg st="8" end="8"/>
+                                            </p:txEl>
+                                          </p:spTgt>
+                                        </p:tgtEl>
+                                        <p:attrNameLst>
+                                          <p:attrName>style.visibility</p:attrName>
+                                        </p:attrNameLst>
+                                      </p:cBhvr>
+                                      <p:to>
+                                        <p:strVal val="visible"/>
+                                      </p:to>
+                                    </p:set>
+                                    <p:anim calcmode="lin" valueType="num">
+                                      <p:cBhvr additive="base">
+                                        <p:cTn id="43" dur="500"/>
+                                        <p:tgtEl>
+                                          <p:spTgt spid="3">
+                                            <p:txEl>
+                                              <p:pRg st="8" end="8"/>
+                                            </p:txEl>
+                                          </p:spTgt>
+                                        </p:tgtEl>
+                                        <p:attrNameLst>
+                                          <p:attrName>ppt_y</p:attrName>
+                                        </p:attrNameLst>
+                                      </p:cBhvr>
+                                      <p:tavLst>
+                                        <p:tav tm="0">
+                                          <p:val>
+                                            <p:strVal val="#ppt_y+#ppt_h*1.125000"/>
+                                          </p:val>
+                                        </p:tav>
+                                        <p:tav tm="100000">
+                                          <p:val>
+                                            <p:strVal val="#ppt_y"/>
+                                          </p:val>
+                                        </p:tav>
+                                      </p:tavLst>
+                                    </p:anim>
+                                    <p:animEffect transition="in" filter="wipe(up)">
+                                      <p:cBhvr>
+                                        <p:cTn id="44" dur="500"/>
+                                        <p:tgtEl>
+                                          <p:spTgt spid="3">
+                                            <p:txEl>
+                                              <p:pRg st="8" end="8"/>
+                                            </p:txEl>
+                                          </p:spTgt>
+                                        </p:tgtEl>
+                                      </p:cBhvr>
+                                    </p:animEffect>
+                                  </p:childTnLst>
+                                </p:cTn>
+                              </p:par>
+                              <p:par>
+                                <p:cTn id="45" presetID="12" presetClass="entr" presetSubtype="4" fill="hold" nodeType="withEffect">
+                                  <p:stCondLst>
+                                    <p:cond delay="0"/>
+                                  </p:stCondLst>
+                                  <p:childTnLst>
+                                    <p:set>
+                                      <p:cBhvr>
+                                        <p:cTn id="46" dur="1" fill="hold">
+                                          <p:stCondLst>
+                                            <p:cond delay="0"/>
+                                          </p:stCondLst>
+                                        </p:cTn>
+                                        <p:tgtEl>
+                                          <p:spTgt spid="3">
+                                            <p:txEl>
+                                              <p:pRg st="9" end="9"/>
+                                            </p:txEl>
+                                          </p:spTgt>
+                                        </p:tgtEl>
+                                        <p:attrNameLst>
+                                          <p:attrName>style.visibility</p:attrName>
+                                        </p:attrNameLst>
+                                      </p:cBhvr>
+                                      <p:to>
+                                        <p:strVal val="visible"/>
+                                      </p:to>
+                                    </p:set>
+                                    <p:anim calcmode="lin" valueType="num">
+                                      <p:cBhvr additive="base">
+                                        <p:cTn id="47" dur="500"/>
+                                        <p:tgtEl>
+                                          <p:spTgt spid="3">
+                                            <p:txEl>
+                                              <p:pRg st="9" end="9"/>
+                                            </p:txEl>
+                                          </p:spTgt>
+                                        </p:tgtEl>
+                                        <p:attrNameLst>
+                                          <p:attrName>ppt_y</p:attrName>
+                                        </p:attrNameLst>
+                                      </p:cBhvr>
+                                      <p:tavLst>
+                                        <p:tav tm="0">
+                                          <p:val>
+                                            <p:strVal val="#ppt_y+#ppt_h*1.125000"/>
+                                          </p:val>
+                                        </p:tav>
+                                        <p:tav tm="100000">
+                                          <p:val>
+                                            <p:strVal val="#ppt_y"/>
+                                          </p:val>
+                                        </p:tav>
+                                      </p:tavLst>
+                                    </p:anim>
+                                    <p:animEffect transition="in" filter="wipe(up)">
+                                      <p:cBhvr>
+                                        <p:cTn id="48" dur="500"/>
+                                        <p:tgtEl>
+                                          <p:spTgt spid="3">
+                                            <p:txEl>
+                                              <p:pRg st="9" end="9"/>
                                             </p:txEl>
                                           </p:spTgt>
                                         </p:tgtEl>
@@ -23938,26 +23859,26 @@
                     </p:cTn>
                   </p:par>
                   <p:par>
-                    <p:cTn id="53" fill="hold">
+                    <p:cTn id="49" fill="hold">
                       <p:stCondLst>
                         <p:cond delay="indefinite"/>
                       </p:stCondLst>
                       <p:childTnLst>
                         <p:par>
-                          <p:cTn id="54" fill="hold">
+                          <p:cTn id="50" fill="hold">
                             <p:stCondLst>
                               <p:cond delay="0"/>
                             </p:stCondLst>
                             <p:childTnLst>
                               <p:par>
-                                <p:cTn id="55" presetID="12" presetClass="entr" presetSubtype="4" fill="hold" nodeType="clickEffect">
+                                <p:cTn id="51" presetID="12" presetClass="entr" presetSubtype="4" fill="hold" nodeType="clickEffect">
                                   <p:stCondLst>
                                     <p:cond delay="0"/>
                                   </p:stCondLst>
                                   <p:childTnLst>
                                     <p:set>
                                       <p:cBhvr>
-                                        <p:cTn id="56" dur="1" fill="hold">
+                                        <p:cTn id="52" dur="1" fill="hold">
                                           <p:stCondLst>
                                             <p:cond delay="0"/>
                                           </p:stCondLst>
@@ -23965,7 +23886,7 @@
                                         <p:tgtEl>
                                           <p:spTgt spid="3">
                                             <p:txEl>
-                                              <p:pRg st="11" end="11"/>
+                                              <p:pRg st="10" end="10"/>
                                             </p:txEl>
                                           </p:spTgt>
                                         </p:tgtEl>
@@ -23979,11 +23900,11 @@
                                     </p:set>
                                     <p:anim calcmode="lin" valueType="num">
                                       <p:cBhvr additive="base">
-                                        <p:cTn id="57" dur="500"/>
-                                        <p:tgtEl>
-                                          <p:spTgt spid="3">
-                                            <p:txEl>
-                                              <p:pRg st="11" end="11"/>
+                                        <p:cTn id="53" dur="500"/>
+                                        <p:tgtEl>
+                                          <p:spTgt spid="3">
+                                            <p:txEl>
+                                              <p:pRg st="10" end="10"/>
                                             </p:txEl>
                                           </p:spTgt>
                                         </p:tgtEl>
@@ -24006,81 +23927,11 @@
                                     </p:anim>
                                     <p:animEffect transition="in" filter="wipe(up)">
                                       <p:cBhvr>
-                                        <p:cTn id="58" dur="500"/>
-                                        <p:tgtEl>
-                                          <p:spTgt spid="3">
-                                            <p:txEl>
-                                              <p:pRg st="11" end="11"/>
-                                            </p:txEl>
-                                          </p:spTgt>
-                                        </p:tgtEl>
-                                      </p:cBhvr>
-                                    </p:animEffect>
-                                  </p:childTnLst>
-                                </p:cTn>
-                              </p:par>
-                              <p:par>
-                                <p:cTn id="59" presetID="12" presetClass="entr" presetSubtype="4" fill="hold" nodeType="withEffect">
-                                  <p:stCondLst>
-                                    <p:cond delay="0"/>
-                                  </p:stCondLst>
-                                  <p:childTnLst>
-                                    <p:set>
-                                      <p:cBhvr>
-                                        <p:cTn id="60" dur="1" fill="hold">
-                                          <p:stCondLst>
-                                            <p:cond delay="0"/>
-                                          </p:stCondLst>
-                                        </p:cTn>
-                                        <p:tgtEl>
-                                          <p:spTgt spid="3">
-                                            <p:txEl>
-                                              <p:pRg st="12" end="12"/>
-                                            </p:txEl>
-                                          </p:spTgt>
-                                        </p:tgtEl>
-                                        <p:attrNameLst>
-                                          <p:attrName>style.visibility</p:attrName>
-                                        </p:attrNameLst>
-                                      </p:cBhvr>
-                                      <p:to>
-                                        <p:strVal val="visible"/>
-                                      </p:to>
-                                    </p:set>
-                                    <p:anim calcmode="lin" valueType="num">
-                                      <p:cBhvr additive="base">
-                                        <p:cTn id="61" dur="500"/>
-                                        <p:tgtEl>
-                                          <p:spTgt spid="3">
-                                            <p:txEl>
-                                              <p:pRg st="12" end="12"/>
-                                            </p:txEl>
-                                          </p:spTgt>
-                                        </p:tgtEl>
-                                        <p:attrNameLst>
-                                          <p:attrName>ppt_y</p:attrName>
-                                        </p:attrNameLst>
-                                      </p:cBhvr>
-                                      <p:tavLst>
-                                        <p:tav tm="0">
-                                          <p:val>
-                                            <p:strVal val="#ppt_y+#ppt_h*1.125000"/>
-                                          </p:val>
-                                        </p:tav>
-                                        <p:tav tm="100000">
-                                          <p:val>
-                                            <p:strVal val="#ppt_y"/>
-                                          </p:val>
-                                        </p:tav>
-                                      </p:tavLst>
-                                    </p:anim>
-                                    <p:animEffect transition="in" filter="wipe(up)">
-                                      <p:cBhvr>
-                                        <p:cTn id="62" dur="500"/>
-                                        <p:tgtEl>
-                                          <p:spTgt spid="3">
-                                            <p:txEl>
-                                              <p:pRg st="12" end="12"/>
+                                        <p:cTn id="54" dur="500"/>
+                                        <p:tgtEl>
+                                          <p:spTgt spid="3">
+                                            <p:txEl>
+                                              <p:pRg st="10" end="10"/>
                                             </p:txEl>
                                           </p:spTgt>
                                         </p:tgtEl>
@@ -24096,26 +23947,26 @@
                     </p:cTn>
                   </p:par>
                   <p:par>
-                    <p:cTn id="63" fill="hold">
+                    <p:cTn id="55" fill="hold">
                       <p:stCondLst>
                         <p:cond delay="indefinite"/>
                       </p:stCondLst>
                       <p:childTnLst>
                         <p:par>
-                          <p:cTn id="64" fill="hold">
+                          <p:cTn id="56" fill="hold">
                             <p:stCondLst>
                               <p:cond delay="0"/>
                             </p:stCondLst>
                             <p:childTnLst>
                               <p:par>
-                                <p:cTn id="65" presetID="12" presetClass="entr" presetSubtype="4" fill="hold" nodeType="clickEffect">
+                                <p:cTn id="57" presetID="12" presetClass="entr" presetSubtype="4" fill="hold" nodeType="clickEffect">
                                   <p:stCondLst>
                                     <p:cond delay="0"/>
                                   </p:stCondLst>
                                   <p:childTnLst>
                                     <p:set>
                                       <p:cBhvr>
-                                        <p:cTn id="66" dur="1" fill="hold">
+                                        <p:cTn id="58" dur="1" fill="hold">
                                           <p:stCondLst>
                                             <p:cond delay="0"/>
                                           </p:stCondLst>
@@ -24123,7 +23974,7 @@
                                         <p:tgtEl>
                                           <p:spTgt spid="3">
                                             <p:txEl>
-                                              <p:pRg st="13" end="13"/>
+                                              <p:pRg st="11" end="11"/>
                                             </p:txEl>
                                           </p:spTgt>
                                         </p:tgtEl>
@@ -24137,11 +23988,11 @@
                                     </p:set>
                                     <p:anim calcmode="lin" valueType="num">
                                       <p:cBhvr additive="base">
-                                        <p:cTn id="67" dur="500"/>
-                                        <p:tgtEl>
-                                          <p:spTgt spid="3">
-                                            <p:txEl>
-                                              <p:pRg st="13" end="13"/>
+                                        <p:cTn id="59" dur="500"/>
+                                        <p:tgtEl>
+                                          <p:spTgt spid="3">
+                                            <p:txEl>
+                                              <p:pRg st="11" end="11"/>
                                             </p:txEl>
                                           </p:spTgt>
                                         </p:tgtEl>
@@ -24164,7 +24015,165 @@
                                     </p:anim>
                                     <p:animEffect transition="in" filter="wipe(up)">
                                       <p:cBhvr>
-                                        <p:cTn id="68" dur="500"/>
+                                        <p:cTn id="60" dur="500"/>
+                                        <p:tgtEl>
+                                          <p:spTgt spid="3">
+                                            <p:txEl>
+                                              <p:pRg st="11" end="11"/>
+                                            </p:txEl>
+                                          </p:spTgt>
+                                        </p:tgtEl>
+                                      </p:cBhvr>
+                                    </p:animEffect>
+                                  </p:childTnLst>
+                                </p:cTn>
+                              </p:par>
+                              <p:par>
+                                <p:cTn id="61" presetID="12" presetClass="entr" presetSubtype="4" fill="hold" nodeType="withEffect">
+                                  <p:stCondLst>
+                                    <p:cond delay="0"/>
+                                  </p:stCondLst>
+                                  <p:childTnLst>
+                                    <p:set>
+                                      <p:cBhvr>
+                                        <p:cTn id="62" dur="1" fill="hold">
+                                          <p:stCondLst>
+                                            <p:cond delay="0"/>
+                                          </p:stCondLst>
+                                        </p:cTn>
+                                        <p:tgtEl>
+                                          <p:spTgt spid="3">
+                                            <p:txEl>
+                                              <p:pRg st="12" end="12"/>
+                                            </p:txEl>
+                                          </p:spTgt>
+                                        </p:tgtEl>
+                                        <p:attrNameLst>
+                                          <p:attrName>style.visibility</p:attrName>
+                                        </p:attrNameLst>
+                                      </p:cBhvr>
+                                      <p:to>
+                                        <p:strVal val="visible"/>
+                                      </p:to>
+                                    </p:set>
+                                    <p:anim calcmode="lin" valueType="num">
+                                      <p:cBhvr additive="base">
+                                        <p:cTn id="63" dur="500"/>
+                                        <p:tgtEl>
+                                          <p:spTgt spid="3">
+                                            <p:txEl>
+                                              <p:pRg st="12" end="12"/>
+                                            </p:txEl>
+                                          </p:spTgt>
+                                        </p:tgtEl>
+                                        <p:attrNameLst>
+                                          <p:attrName>ppt_y</p:attrName>
+                                        </p:attrNameLst>
+                                      </p:cBhvr>
+                                      <p:tavLst>
+                                        <p:tav tm="0">
+                                          <p:val>
+                                            <p:strVal val="#ppt_y+#ppt_h*1.125000"/>
+                                          </p:val>
+                                        </p:tav>
+                                        <p:tav tm="100000">
+                                          <p:val>
+                                            <p:strVal val="#ppt_y"/>
+                                          </p:val>
+                                        </p:tav>
+                                      </p:tavLst>
+                                    </p:anim>
+                                    <p:animEffect transition="in" filter="wipe(up)">
+                                      <p:cBhvr>
+                                        <p:cTn id="64" dur="500"/>
+                                        <p:tgtEl>
+                                          <p:spTgt spid="3">
+                                            <p:txEl>
+                                              <p:pRg st="12" end="12"/>
+                                            </p:txEl>
+                                          </p:spTgt>
+                                        </p:tgtEl>
+                                      </p:cBhvr>
+                                    </p:animEffect>
+                                  </p:childTnLst>
+                                </p:cTn>
+                              </p:par>
+                            </p:childTnLst>
+                          </p:cTn>
+                        </p:par>
+                      </p:childTnLst>
+                    </p:cTn>
+                  </p:par>
+                  <p:par>
+                    <p:cTn id="65" fill="hold">
+                      <p:stCondLst>
+                        <p:cond delay="indefinite"/>
+                      </p:stCondLst>
+                      <p:childTnLst>
+                        <p:par>
+                          <p:cTn id="66" fill="hold">
+                            <p:stCondLst>
+                              <p:cond delay="0"/>
+                            </p:stCondLst>
+                            <p:childTnLst>
+                              <p:par>
+                                <p:cTn id="67" presetID="12" presetClass="entr" presetSubtype="4" fill="hold" nodeType="clickEffect">
+                                  <p:stCondLst>
+                                    <p:cond delay="0"/>
+                                  </p:stCondLst>
+                                  <p:childTnLst>
+                                    <p:set>
+                                      <p:cBhvr>
+                                        <p:cTn id="68" dur="1" fill="hold">
+                                          <p:stCondLst>
+                                            <p:cond delay="0"/>
+                                          </p:stCondLst>
+                                        </p:cTn>
+                                        <p:tgtEl>
+                                          <p:spTgt spid="3">
+                                            <p:txEl>
+                                              <p:pRg st="13" end="13"/>
+                                            </p:txEl>
+                                          </p:spTgt>
+                                        </p:tgtEl>
+                                        <p:attrNameLst>
+                                          <p:attrName>style.visibility</p:attrName>
+                                        </p:attrNameLst>
+                                      </p:cBhvr>
+                                      <p:to>
+                                        <p:strVal val="visible"/>
+                                      </p:to>
+                                    </p:set>
+                                    <p:anim calcmode="lin" valueType="num">
+                                      <p:cBhvr additive="base">
+                                        <p:cTn id="69" dur="500"/>
+                                        <p:tgtEl>
+                                          <p:spTgt spid="3">
+                                            <p:txEl>
+                                              <p:pRg st="13" end="13"/>
+                                            </p:txEl>
+                                          </p:spTgt>
+                                        </p:tgtEl>
+                                        <p:attrNameLst>
+                                          <p:attrName>ppt_y</p:attrName>
+                                        </p:attrNameLst>
+                                      </p:cBhvr>
+                                      <p:tavLst>
+                                        <p:tav tm="0">
+                                          <p:val>
+                                            <p:strVal val="#ppt_y+#ppt_h*1.125000"/>
+                                          </p:val>
+                                        </p:tav>
+                                        <p:tav tm="100000">
+                                          <p:val>
+                                            <p:strVal val="#ppt_y"/>
+                                          </p:val>
+                                        </p:tav>
+                                      </p:tavLst>
+                                    </p:anim>
+                                    <p:animEffect transition="in" filter="wipe(up)">
+                                      <p:cBhvr>
+                                        <p:cTn id="70" dur="500"/>
                                         <p:tgtEl>
                                           <p:spTgt spid="3">
                                             <p:txEl>
@@ -24476,6 +24485,9 @@
                     <p:cTn id="3" fill="hold">
                       <p:stCondLst>
                         <p:cond delay="indefinite"/>
+                        <p:cond evt="onBegin" delay="0">
+                          <p:tn val="2"/>
+                        </p:cond>
                       </p:stCondLst>
                       <p:childTnLst>
                         <p:par>
@@ -24485,7 +24497,7 @@
                             </p:stCondLst>
                             <p:childTnLst>
                               <p:par>
-                                <p:cTn id="5" presetID="12" presetClass="entr" presetSubtype="4" fill="hold" nodeType="clickEffect">
+                                <p:cTn id="5" presetID="12" presetClass="entr" presetSubtype="4" fill="hold" nodeType="withEffect">
                                   <p:stCondLst>
                                     <p:cond delay="0"/>
                                   </p:stCondLst>
@@ -30593,6 +30605,9 @@
                     <p:cTn id="3" fill="hold">
                       <p:stCondLst>
                         <p:cond delay="indefinite"/>
+                        <p:cond evt="onBegin" delay="0">
+                          <p:tn val="2"/>
+                        </p:cond>
                       </p:stCondLst>
                       <p:childTnLst>
                         <p:par>
@@ -30602,7 +30617,7 @@
                             </p:stCondLst>
                             <p:childTnLst>
                               <p:par>
-                                <p:cTn id="5" presetID="12" presetClass="entr" presetSubtype="4" fill="hold" nodeType="clickEffect">
+                                <p:cTn id="5" presetID="12" presetClass="entr" presetSubtype="4" fill="hold" nodeType="withEffect">
                                   <p:stCondLst>
                                     <p:cond delay="0"/>
                                   </p:stCondLst>

</xml_diff>

<commit_message>
No magic line in directive slide - smiley added
Change-Id: Iaceeaea5913d00cb268e7b04749a5ef474052c05
</commit_message>
<xml_diff>
--- a/Introduction to AngularJs.pptx
+++ b/Introduction to AngularJs.pptx
@@ -12173,7 +12173,7 @@
                   <a:schemeClr val="tx1"/>
                 </a:solidFill>
               </a:rPr>
-              <a:t> in tag’s ‘class’ attribute</a:t>
+              <a:t> in an element’s ‘class’ attribute</a:t>
             </a:r>
           </a:p>
           <a:p>
@@ -12229,7 +12229,16 @@
                 </a:solidFill>
                 <a:sym typeface="Wingdings"/>
               </a:rPr>
-              <a:t>No magic, written purely in JavaScript </a:t>
+              <a:t>No magic, written purely in </a:t>
+            </a:r>
+            <a:r>
+              <a:rPr lang="en-US" smtClean="0">
+                <a:solidFill>
+                  <a:schemeClr val="tx1"/>
+                </a:solidFill>
+                <a:sym typeface="Wingdings"/>
+              </a:rPr>
+              <a:t>JavaScript </a:t>
             </a:r>
             <a:endParaRPr lang="en-US" dirty="0">
               <a:solidFill>
@@ -13113,7 +13122,7 @@
           <a:lstStyle/>
           <a:p>
             <a:r>
-              <a:rPr lang="en-US" sz="3600" dirty="0" smtClean="0"/>
+              <a:rPr lang="en-US" sz="2400" dirty="0" smtClean="0"/>
               <a:t>Mini</a:t>
             </a:r>
             <a:r>

</xml_diff>

<commit_message>
Fixed animation ordering on directives slide
Change-Id: Ib45f03bd1bb5536b787092e88c7f330ae2efaee1
</commit_message>
<xml_diff>
--- a/Introduction to AngularJs.pptx
+++ b/Introduction to AngularJs.pptx
@@ -326,7 +326,7 @@
             <a:fld id="{7D0065BE-0657-4A47-90AD-C21C55E16B19}" type="datetime4">
               <a:rPr lang="en-US" smtClean="0"/>
               <a:pPr/>
-              <a:t>April 6, 2014</a:t>
+              <a:t>April 7, 2014</a:t>
             </a:fld>
             <a:endParaRPr lang="en-US"/>
           </a:p>
@@ -493,7 +493,7 @@
             <a:fld id="{A16C3AA4-67BE-44F7-809A-3582401494AF}" type="datetime4">
               <a:rPr lang="en-US" smtClean="0"/>
               <a:pPr/>
-              <a:t>April 6, 2014</a:t>
+              <a:t>April 7, 2014</a:t>
             </a:fld>
             <a:endParaRPr lang="en-US"/>
           </a:p>
@@ -670,7 +670,7 @@
             <a:fld id="{25172EEB-1769-4776-AD69-E7C1260563EB}" type="datetime4">
               <a:rPr lang="en-US" smtClean="0"/>
               <a:pPr/>
-              <a:t>April 6, 2014</a:t>
+              <a:t>April 7, 2014</a:t>
             </a:fld>
             <a:endParaRPr lang="en-US"/>
           </a:p>
@@ -855,7 +855,7 @@
             <a:fld id="{D47BB8AF-C16A-4836-A92D-61834B5F0BA5}" type="datetime4">
               <a:rPr lang="en-US" smtClean="0"/>
               <a:pPr/>
-              <a:t>April 6, 2014</a:t>
+              <a:t>April 7, 2014</a:t>
             </a:fld>
             <a:endParaRPr lang="en-US"/>
           </a:p>
@@ -1119,7 +1119,7 @@
             <a:fld id="{647D2193-4505-4A75-99BB-880C6989A757}" type="datetime4">
               <a:rPr lang="en-US" smtClean="0"/>
               <a:pPr/>
-              <a:t>April 6, 2014</a:t>
+              <a:t>April 7, 2014</a:t>
             </a:fld>
             <a:endParaRPr lang="en-US"/>
           </a:p>
@@ -1469,7 +1469,7 @@
             <a:fld id="{113A18F4-33C3-445B-924C-31108C51719C}" type="datetime4">
               <a:rPr lang="en-US" smtClean="0"/>
               <a:pPr/>
-              <a:t>April 6, 2014</a:t>
+              <a:t>April 7, 2014</a:t>
             </a:fld>
             <a:endParaRPr lang="en-US"/>
           </a:p>
@@ -1779,7 +1779,7 @@
             <a:fld id="{3AF7543A-E259-478F-9E0D-57BA40E442B7}" type="datetime4">
               <a:rPr lang="en-US" smtClean="0"/>
               <a:pPr/>
-              <a:t>April 6, 2014</a:t>
+              <a:t>April 7, 2014</a:t>
             </a:fld>
             <a:endParaRPr lang="en-US"/>
           </a:p>
@@ -2008,7 +2008,7 @@
             <a:fld id="{1EFB012D-77A1-44B0-BB26-329BA1EE55C9}" type="datetime4">
               <a:rPr lang="en-US" smtClean="0"/>
               <a:pPr/>
-              <a:t>April 6, 2014</a:t>
+              <a:t>April 7, 2014</a:t>
             </a:fld>
             <a:endParaRPr lang="en-US"/>
           </a:p>
@@ -2100,7 +2100,7 @@
             <a:fld id="{94B7499E-3031-413E-B01E-B94970708CAA}" type="datetime4">
               <a:rPr lang="en-US" smtClean="0"/>
               <a:pPr/>
-              <a:t>April 6, 2014</a:t>
+              <a:t>April 7, 2014</a:t>
             </a:fld>
             <a:endParaRPr lang="en-US"/>
           </a:p>
@@ -2390,7 +2390,7 @@
             <a:fld id="{DC7EAB0C-2220-4D0E-A0DD-DB7FA0F742F4}" type="datetime4">
               <a:rPr lang="en-US" smtClean="0"/>
               <a:pPr/>
-              <a:t>April 6, 2014</a:t>
+              <a:t>April 7, 2014</a:t>
             </a:fld>
             <a:endParaRPr lang="en-US"/>
           </a:p>
@@ -2660,7 +2660,7 @@
             <a:fld id="{E3416D63-31BF-4B94-B6C5-E20B2C63F515}" type="datetime4">
               <a:rPr lang="en-US" smtClean="0"/>
               <a:pPr/>
-              <a:t>April 6, 2014</a:t>
+              <a:t>April 7, 2014</a:t>
             </a:fld>
             <a:endParaRPr lang="en-US"/>
           </a:p>
@@ -2891,7 +2891,7 @@
             <a:fld id="{62B1B13E-D5AF-485E-81A1-82A140076526}" type="datetime4">
               <a:rPr lang="en-US" smtClean="0"/>
               <a:pPr/>
-              <a:t>April 6, 2014</a:t>
+              <a:t>April 7, 2014</a:t>
             </a:fld>
             <a:endParaRPr lang="en-US" dirty="0"/>
           </a:p>
@@ -5254,14 +5254,7 @@
                 <a:latin typeface="Courier New"/>
                 <a:cs typeface="Courier New"/>
               </a:rPr>
-              <a:t>’, </a:t>
-            </a:r>
-            <a:r>
-              <a:rPr lang="tr-TR" sz="1200" dirty="0" smtClean="0">
-                <a:latin typeface="Courier New"/>
-                <a:cs typeface="Courier New"/>
-              </a:rPr>
-              <a:t>[‘$</a:t>
+              <a:t>’, [‘$</a:t>
             </a:r>
             <a:r>
               <a:rPr lang="tr-TR" sz="1200" dirty="0" err="1" smtClean="0">
@@ -5359,14 +5352,7 @@
                 <a:latin typeface="Courier New"/>
                 <a:cs typeface="Courier New"/>
               </a:rPr>
-              <a:t>}])</a:t>
-            </a:r>
-            <a:r>
-              <a:rPr lang="tr-TR" sz="1200" dirty="0" smtClean="0">
-                <a:latin typeface="Courier New"/>
-                <a:cs typeface="Courier New"/>
-              </a:rPr>
-              <a:t>;</a:t>
+              <a:t>}]);</a:t>
             </a:r>
           </a:p>
           <a:p>
@@ -12009,7 +11995,9 @@
           </a:xfrm>
         </p:spPr>
         <p:txBody>
-          <a:bodyPr/>
+          <a:bodyPr>
+            <a:normAutofit/>
+          </a:bodyPr>
           <a:lstStyle/>
           <a:p>
             <a:endParaRPr lang="en-US" dirty="0" smtClean="0">
@@ -12229,16 +12217,43 @@
                 </a:solidFill>
                 <a:sym typeface="Wingdings"/>
               </a:rPr>
-              <a:t>No magic, written purely in </a:t>
-            </a:r>
-            <a:r>
-              <a:rPr lang="en-US" smtClean="0">
+              <a:t>No magic, </a:t>
+            </a:r>
+            <a:r>
+              <a:rPr lang="en-US" dirty="0" smtClean="0">
                 <a:solidFill>
                   <a:schemeClr val="tx1"/>
                 </a:solidFill>
                 <a:sym typeface="Wingdings"/>
               </a:rPr>
-              <a:t>JavaScript </a:t>
+              <a:t>implemented purely </a:t>
+            </a:r>
+            <a:r>
+              <a:rPr lang="en-US" dirty="0" smtClean="0">
+                <a:solidFill>
+                  <a:schemeClr val="tx1"/>
+                </a:solidFill>
+                <a:sym typeface="Wingdings"/>
+              </a:rPr>
+              <a:t>using </a:t>
+            </a:r>
+            <a:r>
+              <a:rPr lang="en-US" dirty="0" smtClean="0">
+                <a:solidFill>
+                  <a:schemeClr val="tx1"/>
+                </a:solidFill>
+                <a:sym typeface="Wingdings"/>
+              </a:rPr>
+              <a:t>JS and HMTL </a:t>
+            </a:r>
+            <a:r>
+              <a:rPr lang="en-US" dirty="0" smtClean="0">
+                <a:solidFill>
+                  <a:schemeClr val="tx1"/>
+                </a:solidFill>
+                <a:sym typeface="Wingdings"/>
+              </a:rPr>
+              <a:t></a:t>
             </a:r>
             <a:endParaRPr lang="en-US" dirty="0">
               <a:solidFill>
@@ -12258,11 +12273,11 @@
   <p:clrMapOvr>
     <a:masterClrMapping/>
   </p:clrMapOvr>
-  <mc:AlternateContent xmlns:mc="http://schemas.openxmlformats.org/markup-compatibility/2006">
-    <mc:Choice xmlns:p14="http://schemas.microsoft.com/office/powerpoint/2010/main" Requires="p14">
+  <mc:AlternateContent xmlns:mc="http://schemas.openxmlformats.org/markup-compatibility/2006" xmlns:p14="http://schemas.microsoft.com/office/powerpoint/2010/main">
+    <mc:Choice Requires="p14">
       <p:transition spd="slow" p14:dur="2000"/>
     </mc:Choice>
-    <mc:Fallback>
+    <mc:Fallback xmlns="">
       <p:transition xmlns:p14="http://schemas.microsoft.com/office/powerpoint/2010/main" spd="slow"/>
     </mc:Fallback>
   </mc:AlternateContent>
@@ -12672,33 +12687,15 @@
                                   </p:childTnLst>
                                 </p:cTn>
                               </p:par>
-                            </p:childTnLst>
-                          </p:cTn>
-                        </p:par>
-                      </p:childTnLst>
-                    </p:cTn>
-                  </p:par>
-                  <p:par>
-                    <p:cTn id="29" fill="hold">
-                      <p:stCondLst>
-                        <p:cond delay="indefinite"/>
-                      </p:stCondLst>
-                      <p:childTnLst>
-                        <p:par>
-                          <p:cTn id="30" fill="hold">
-                            <p:stCondLst>
-                              <p:cond delay="0"/>
-                            </p:stCondLst>
-                            <p:childTnLst>
                               <p:par>
-                                <p:cTn id="31" presetID="12" presetClass="entr" presetSubtype="4" fill="hold" nodeType="clickEffect">
+                                <p:cTn id="29" presetID="12" presetClass="entr" presetSubtype="4" fill="hold" nodeType="withEffect">
                                   <p:stCondLst>
                                     <p:cond delay="0"/>
                                   </p:stCondLst>
                                   <p:childTnLst>
                                     <p:set>
                                       <p:cBhvr>
-                                        <p:cTn id="32" dur="1" fill="hold">
+                                        <p:cTn id="30" dur="1" fill="hold">
                                           <p:stCondLst>
                                             <p:cond delay="0"/>
                                           </p:stCondLst>
@@ -12720,7 +12717,7 @@
                                     </p:set>
                                     <p:anim calcmode="lin" valueType="num">
                                       <p:cBhvr additive="base">
-                                        <p:cTn id="33" dur="500"/>
+                                        <p:cTn id="31" dur="500"/>
                                         <p:tgtEl>
                                           <p:spTgt spid="5">
                                             <p:txEl>
@@ -12747,7 +12744,7 @@
                                     </p:anim>
                                     <p:animEffect transition="in" filter="wipe(up)">
                                       <p:cBhvr>
-                                        <p:cTn id="34" dur="500"/>
+                                        <p:cTn id="32" dur="500"/>
                                         <p:tgtEl>
                                           <p:spTgt spid="5">
                                             <p:txEl>
@@ -12761,14 +12758,14 @@
                                 </p:cTn>
                               </p:par>
                               <p:par>
-                                <p:cTn id="35" presetID="12" presetClass="entr" presetSubtype="4" fill="hold" nodeType="withEffect">
+                                <p:cTn id="33" presetID="12" presetClass="entr" presetSubtype="4" fill="hold" nodeType="withEffect">
                                   <p:stCondLst>
                                     <p:cond delay="0"/>
                                   </p:stCondLst>
                                   <p:childTnLst>
                                     <p:set>
                                       <p:cBhvr>
-                                        <p:cTn id="36" dur="1" fill="hold">
+                                        <p:cTn id="34" dur="1" fill="hold">
                                           <p:stCondLst>
                                             <p:cond delay="0"/>
                                           </p:stCondLst>
@@ -12790,7 +12787,7 @@
                                     </p:set>
                                     <p:anim calcmode="lin" valueType="num">
                                       <p:cBhvr additive="base">
-                                        <p:cTn id="37" dur="500"/>
+                                        <p:cTn id="35" dur="500"/>
                                         <p:tgtEl>
                                           <p:spTgt spid="5">
                                             <p:txEl>
@@ -12817,7 +12814,7 @@
                                     </p:anim>
                                     <p:animEffect transition="in" filter="wipe(up)">
                                       <p:cBhvr>
-                                        <p:cTn id="38" dur="500"/>
+                                        <p:cTn id="36" dur="500"/>
                                         <p:tgtEl>
                                           <p:spTgt spid="5">
                                             <p:txEl>
@@ -12831,14 +12828,14 @@
                                 </p:cTn>
                               </p:par>
                               <p:par>
-                                <p:cTn id="39" presetID="12" presetClass="entr" presetSubtype="4" fill="hold" nodeType="withEffect">
+                                <p:cTn id="37" presetID="12" presetClass="entr" presetSubtype="4" fill="hold" nodeType="withEffect">
                                   <p:stCondLst>
                                     <p:cond delay="0"/>
                                   </p:stCondLst>
                                   <p:childTnLst>
                                     <p:set>
                                       <p:cBhvr>
-                                        <p:cTn id="40" dur="1" fill="hold">
+                                        <p:cTn id="38" dur="1" fill="hold">
                                           <p:stCondLst>
                                             <p:cond delay="0"/>
                                           </p:stCondLst>
@@ -12860,7 +12857,7 @@
                                     </p:set>
                                     <p:anim calcmode="lin" valueType="num">
                                       <p:cBhvr additive="base">
-                                        <p:cTn id="41" dur="500"/>
+                                        <p:cTn id="39" dur="500"/>
                                         <p:tgtEl>
                                           <p:spTgt spid="5">
                                             <p:txEl>
@@ -12887,7 +12884,7 @@
                                     </p:anim>
                                     <p:animEffect transition="in" filter="wipe(up)">
                                       <p:cBhvr>
-                                        <p:cTn id="42" dur="500"/>
+                                        <p:cTn id="40" dur="500"/>
                                         <p:tgtEl>
                                           <p:spTgt spid="5">
                                             <p:txEl>
@@ -12901,14 +12898,14 @@
                                 </p:cTn>
                               </p:par>
                               <p:par>
-                                <p:cTn id="43" presetID="12" presetClass="entr" presetSubtype="4" fill="hold" nodeType="withEffect">
+                                <p:cTn id="41" presetID="12" presetClass="entr" presetSubtype="4" fill="hold" nodeType="withEffect">
                                   <p:stCondLst>
                                     <p:cond delay="0"/>
                                   </p:stCondLst>
                                   <p:childTnLst>
                                     <p:set>
                                       <p:cBhvr>
-                                        <p:cTn id="44" dur="1" fill="hold">
+                                        <p:cTn id="42" dur="1" fill="hold">
                                           <p:stCondLst>
                                             <p:cond delay="0"/>
                                           </p:stCondLst>
@@ -12930,7 +12927,7 @@
                                     </p:set>
                                     <p:anim calcmode="lin" valueType="num">
                                       <p:cBhvr additive="base">
-                                        <p:cTn id="45" dur="500"/>
+                                        <p:cTn id="43" dur="500"/>
                                         <p:tgtEl>
                                           <p:spTgt spid="5">
                                             <p:txEl>
@@ -12957,7 +12954,7 @@
                                     </p:anim>
                                     <p:animEffect transition="in" filter="wipe(up)">
                                       <p:cBhvr>
-                                        <p:cTn id="46" dur="500"/>
+                                        <p:cTn id="44" dur="500"/>
                                         <p:tgtEl>
                                           <p:spTgt spid="5">
                                             <p:txEl>
@@ -12977,26 +12974,26 @@
                     </p:cTn>
                   </p:par>
                   <p:par>
-                    <p:cTn id="47" fill="hold">
+                    <p:cTn id="45" fill="hold">
                       <p:stCondLst>
                         <p:cond delay="indefinite"/>
                       </p:stCondLst>
                       <p:childTnLst>
                         <p:par>
-                          <p:cTn id="48" fill="hold">
+                          <p:cTn id="46" fill="hold">
                             <p:stCondLst>
                               <p:cond delay="0"/>
                             </p:stCondLst>
                             <p:childTnLst>
                               <p:par>
-                                <p:cTn id="49" presetID="12" presetClass="entr" presetSubtype="4" fill="hold" nodeType="clickEffect">
+                                <p:cTn id="47" presetID="12" presetClass="entr" presetSubtype="4" fill="hold" nodeType="clickEffect">
                                   <p:stCondLst>
                                     <p:cond delay="0"/>
                                   </p:stCondLst>
                                   <p:childTnLst>
                                     <p:set>
                                       <p:cBhvr>
-                                        <p:cTn id="50" dur="1" fill="hold">
+                                        <p:cTn id="48" dur="1" fill="hold">
                                           <p:stCondLst>
                                             <p:cond delay="0"/>
                                           </p:stCondLst>
@@ -13018,7 +13015,7 @@
                                     </p:set>
                                     <p:anim calcmode="lin" valueType="num">
                                       <p:cBhvr additive="base">
-                                        <p:cTn id="51" dur="500"/>
+                                        <p:cTn id="49" dur="500"/>
                                         <p:tgtEl>
                                           <p:spTgt spid="5">
                                             <p:txEl>
@@ -13045,7 +13042,7 @@
                                     </p:anim>
                                     <p:animEffect transition="in" filter="wipe(up)">
                                       <p:cBhvr>
-                                        <p:cTn id="52" dur="500"/>
+                                        <p:cTn id="50" dur="500"/>
                                         <p:tgtEl>
                                           <p:spTgt spid="5">
                                             <p:txEl>
@@ -13282,31 +13279,7 @@
                   <a:srgbClr val="000000"/>
                 </a:solidFill>
               </a:rPr>
-              <a:t>Reusable </a:t>
-            </a:r>
-            <a:r>
-              <a:rPr lang="en-US" dirty="0" smtClean="0">
-                <a:solidFill>
-                  <a:srgbClr val="000000"/>
-                </a:solidFill>
-              </a:rPr>
-              <a:t>business </a:t>
-            </a:r>
-            <a:r>
-              <a:rPr lang="en-US" dirty="0" smtClean="0">
-                <a:solidFill>
-                  <a:srgbClr val="000000"/>
-                </a:solidFill>
-              </a:rPr>
-              <a:t>logic, </a:t>
-            </a:r>
-            <a:r>
-              <a:rPr lang="en-US" dirty="0" smtClean="0">
-                <a:solidFill>
-                  <a:srgbClr val="000000"/>
-                </a:solidFill>
-              </a:rPr>
-              <a:t>independent of views</a:t>
+              <a:t>Reusable business logic, independent of views</a:t>
             </a:r>
           </a:p>
           <a:p>
@@ -13410,23 +13383,7 @@
                   <a:srgbClr val="000000"/>
                 </a:solidFill>
               </a:rPr>
-              <a:t>, services </a:t>
-            </a:r>
-            <a:r>
-              <a:rPr lang="en-US" dirty="0" smtClean="0">
-                <a:solidFill>
-                  <a:srgbClr val="000000"/>
-                </a:solidFill>
-              </a:rPr>
-              <a:t>&amp; </a:t>
-            </a:r>
-            <a:r>
-              <a:rPr lang="en-US" dirty="0" smtClean="0">
-                <a:solidFill>
-                  <a:srgbClr val="000000"/>
-                </a:solidFill>
-              </a:rPr>
-              <a:t>providers</a:t>
+              <a:t>, services &amp; providers</a:t>
             </a:r>
           </a:p>
           <a:p>
@@ -14482,11 +14439,7 @@
           <a:p>
             <a:r>
               <a:rPr lang="en-US" dirty="0" smtClean="0"/>
-              <a:t>Dependency </a:t>
-            </a:r>
-            <a:r>
-              <a:rPr lang="en-US" dirty="0" smtClean="0"/>
-              <a:t>Injections (DI)</a:t>
+              <a:t>Dependency Injections (DI)</a:t>
             </a:r>
             <a:endParaRPr lang="en-US" dirty="0"/>
           </a:p>
@@ -14571,39 +14524,7 @@
                   <a:srgbClr val="000000"/>
                 </a:solidFill>
               </a:rPr>
-              <a:t>Handled by </a:t>
-            </a:r>
-            <a:r>
-              <a:rPr lang="en-US" dirty="0" smtClean="0">
-                <a:solidFill>
-                  <a:srgbClr val="000000"/>
-                </a:solidFill>
-              </a:rPr>
-              <a:t>‘Injector</a:t>
-            </a:r>
-            <a:r>
-              <a:rPr lang="en-US" dirty="0" smtClean="0">
-                <a:solidFill>
-                  <a:srgbClr val="000000"/>
-                </a:solidFill>
-              </a:rPr>
-              <a:t>’</a:t>
-            </a:r>
-            <a:r>
-              <a:rPr lang="en-US" dirty="0" smtClean="0">
-                <a:solidFill>
-                  <a:srgbClr val="000000"/>
-                </a:solidFill>
-              </a:rPr>
-              <a:t> </a:t>
-            </a:r>
-            <a:r>
-              <a:rPr lang="en-US" dirty="0" smtClean="0">
-                <a:solidFill>
-                  <a:srgbClr val="000000"/>
-                </a:solidFill>
-              </a:rPr>
-              <a:t>sub-system</a:t>
+              <a:t>Handled by ‘Injector’ sub-system</a:t>
             </a:r>
           </a:p>
           <a:p>
@@ -14631,7 +14552,18 @@
                   <a:srgbClr val="000000"/>
                 </a:solidFill>
               </a:rPr>
-              <a:t>Modules assist in registering their own </a:t>
+              <a:t>Modules assist in registering their own components</a:t>
+            </a:r>
+          </a:p>
+          <a:p>
+            <a:pPr lvl="1"/>
+            <a:r>
+              <a:rPr lang="en-US" b="1" dirty="0" smtClean="0">
+                <a:solidFill>
+                  <a:srgbClr val="000000"/>
+                </a:solidFill>
+              </a:rPr>
+              <a:t>Crucial</a:t>
             </a:r>
             <a:r>
               <a:rPr lang="en-US" dirty="0" smtClean="0">
@@ -14639,32 +14571,8 @@
                   <a:srgbClr val="000000"/>
                 </a:solidFill>
               </a:rPr>
-              <a:t>components</a:t>
-            </a:r>
-          </a:p>
-          <a:p>
-            <a:pPr lvl="1"/>
-            <a:r>
-              <a:rPr lang="en-US" b="1" dirty="0" smtClean="0">
-                <a:solidFill>
-                  <a:srgbClr val="000000"/>
-                </a:solidFill>
-              </a:rPr>
-              <a:t>Crucial</a:t>
-            </a:r>
-            <a:r>
-              <a:rPr lang="en-US" dirty="0" smtClean="0">
-                <a:solidFill>
-                  <a:srgbClr val="000000"/>
-                </a:solidFill>
-              </a:rPr>
               <a:t> in writing unit and end-to-end tests</a:t>
             </a:r>
-            <a:endParaRPr lang="en-US" dirty="0" smtClean="0">
-              <a:solidFill>
-                <a:srgbClr val="000000"/>
-              </a:solidFill>
-            </a:endParaRPr>
           </a:p>
           <a:p>
             <a:endParaRPr lang="en-US" dirty="0" smtClean="0">
@@ -15569,15 +15477,7 @@
                   <a:srgbClr val="000000"/>
                 </a:solidFill>
               </a:rPr>
-              <a:t>Software</a:t>
-            </a:r>
-            <a:r>
-              <a:rPr lang="en-US" dirty="0" smtClean="0">
-                <a:solidFill>
-                  <a:srgbClr val="000000"/>
-                </a:solidFill>
-              </a:rPr>
-              <a:t>/UI Developer @ </a:t>
+              <a:t>Software/UI Developer @ </a:t>
             </a:r>
             <a:r>
               <a:rPr lang="en-US" dirty="0" err="1" smtClean="0">
@@ -21789,15 +21689,7 @@
                   <a:srgbClr val="000000"/>
                 </a:solidFill>
               </a:rPr>
-              <a:t>ould </a:t>
-            </a:r>
-            <a:r>
-              <a:rPr lang="en-US" dirty="0" smtClean="0">
-                <a:solidFill>
-                  <a:srgbClr val="000000"/>
-                </a:solidFill>
-              </a:rPr>
-              <a:t>lead to collisions </a:t>
+              <a:t>ould lead to collisions </a:t>
             </a:r>
           </a:p>
           <a:p>
@@ -22541,13 +22433,7 @@
               <a:rPr lang="en-US" dirty="0" smtClean="0">
                 <a:hlinkClick r:id="rId8"/>
               </a:rPr>
-              <a:t>Introduction </a:t>
-            </a:r>
-            <a:r>
-              <a:rPr lang="en-US" dirty="0" smtClean="0">
-                <a:hlinkClick r:id="rId8"/>
-              </a:rPr>
-              <a:t>to AngularJs Unit Testing </a:t>
+              <a:t>Introduction to AngularJs Unit Testing </a:t>
             </a:r>
             <a:endParaRPr lang="en-US" dirty="0"/>
           </a:p>
@@ -22557,13 +22443,7 @@
               <a:rPr lang="en-US" dirty="0" smtClean="0">
                 <a:hlinkClick r:id="rId9"/>
               </a:rPr>
-              <a:t>End </a:t>
-            </a:r>
-            <a:r>
-              <a:rPr lang="en-US" dirty="0" smtClean="0">
-                <a:hlinkClick r:id="rId9"/>
-              </a:rPr>
-              <a:t>to End testing of AngularJs apps with Protractor</a:t>
+              <a:t>End to End testing of AngularJs apps with Protractor</a:t>
             </a:r>
             <a:endParaRPr lang="en-US" dirty="0"/>
           </a:p>
@@ -25219,15 +25099,7 @@
                   <a:srgbClr val="000000"/>
                 </a:solidFill>
               </a:rPr>
-              <a:t> </a:t>
-            </a:r>
-            <a:r>
-              <a:rPr lang="en-US" sz="1500" dirty="0" smtClean="0">
-                <a:solidFill>
-                  <a:srgbClr val="000000"/>
-                </a:solidFill>
-              </a:rPr>
-              <a:t>–  </a:t>
+              <a:t> –  </a:t>
             </a:r>
             <a:r>
               <a:rPr lang="en-US" sz="1500" b="1" dirty="0" err="1" smtClean="0">
@@ -25294,11 +25166,6 @@
               </a:rPr>
               <a:t>guide</a:t>
             </a:r>
-            <a:endParaRPr lang="hu-HU" sz="1500" b="1" dirty="0" smtClean="0">
-              <a:solidFill>
-                <a:srgbClr val="000000"/>
-              </a:solidFill>
-            </a:endParaRPr>
           </a:p>
           <a:p>
             <a:pPr lvl="1"/>
@@ -25317,15 +25184,7 @@
                   <a:srgbClr val="000000"/>
                 </a:solidFill>
               </a:rPr>
-              <a:t> </a:t>
-            </a:r>
-            <a:r>
-              <a:rPr lang="en-US" sz="1500" dirty="0" smtClean="0">
-                <a:solidFill>
-                  <a:srgbClr val="000000"/>
-                </a:solidFill>
-              </a:rPr>
-              <a:t>-  </a:t>
+              <a:t> -  </a:t>
             </a:r>
             <a:r>
               <a:rPr lang="hu-HU" sz="1500" b="1" dirty="0" smtClean="0">

</xml_diff>

<commit_message>
Added and refactored simple single page version of Todo app
Change-Id: I0e0953264ccceb8f486bf5812c600fe7b750290e
</commit_message>
<xml_diff>
--- a/Introduction to AngularJs.pptx
+++ b/Introduction to AngularJs.pptx
@@ -12217,43 +12217,7 @@
                 </a:solidFill>
                 <a:sym typeface="Wingdings"/>
               </a:rPr>
-              <a:t>No magic, </a:t>
-            </a:r>
-            <a:r>
-              <a:rPr lang="en-US" dirty="0" smtClean="0">
-                <a:solidFill>
-                  <a:schemeClr val="tx1"/>
-                </a:solidFill>
-                <a:sym typeface="Wingdings"/>
-              </a:rPr>
-              <a:t>implemented purely </a:t>
-            </a:r>
-            <a:r>
-              <a:rPr lang="en-US" dirty="0" smtClean="0">
-                <a:solidFill>
-                  <a:schemeClr val="tx1"/>
-                </a:solidFill>
-                <a:sym typeface="Wingdings"/>
-              </a:rPr>
-              <a:t>using </a:t>
-            </a:r>
-            <a:r>
-              <a:rPr lang="en-US" dirty="0" smtClean="0">
-                <a:solidFill>
-                  <a:schemeClr val="tx1"/>
-                </a:solidFill>
-                <a:sym typeface="Wingdings"/>
-              </a:rPr>
-              <a:t>JS and HMTL </a:t>
-            </a:r>
-            <a:r>
-              <a:rPr lang="en-US" dirty="0" smtClean="0">
-                <a:solidFill>
-                  <a:schemeClr val="tx1"/>
-                </a:solidFill>
-                <a:sym typeface="Wingdings"/>
-              </a:rPr>
-              <a:t></a:t>
+              <a:t>No magic, implemented purely using JS and HMTL </a:t>
             </a:r>
             <a:endParaRPr lang="en-US" dirty="0">
               <a:solidFill>
@@ -26178,7 +26142,7 @@
         </p:nvSpPr>
         <p:spPr>
           <a:xfrm>
-            <a:off x="3461026" y="1804404"/>
+            <a:off x="3461026" y="5694024"/>
             <a:ext cx="2240837" cy="461665"/>
           </a:xfrm>
           <a:prstGeom prst="rect">
@@ -26266,7 +26230,7 @@
         </p:nvSpPr>
         <p:spPr>
           <a:xfrm>
-            <a:off x="2648237" y="5866201"/>
+            <a:off x="2648237" y="1885861"/>
             <a:ext cx="1144103" cy="461665"/>
           </a:xfrm>
           <a:prstGeom prst="rect">
@@ -26767,7 +26731,7 @@
         </p:nvSpPr>
         <p:spPr>
           <a:xfrm>
-            <a:off x="3993332" y="5866105"/>
+            <a:off x="3993332" y="1885765"/>
             <a:ext cx="1144103" cy="461665"/>
           </a:xfrm>
           <a:prstGeom prst="rect">
@@ -26855,7 +26819,7 @@
         </p:nvSpPr>
         <p:spPr>
           <a:xfrm>
-            <a:off x="5360516" y="5866009"/>
+            <a:off x="5360516" y="1885669"/>
             <a:ext cx="1144103" cy="461665"/>
           </a:xfrm>
           <a:prstGeom prst="rect">
@@ -26979,7 +26943,7 @@
                                           </p:stCondLst>
                                         </p:cTn>
                                         <p:tgtEl>
-                                          <p:spTgt spid="6"/>
+                                          <p:spTgt spid="8"/>
                                         </p:tgtEl>
                                         <p:attrNameLst>
                                           <p:attrName>style.visibility</p:attrName>
@@ -26993,7 +26957,7 @@
                                       <p:cBhvr additive="base">
                                         <p:cTn id="7" dur="500"/>
                                         <p:tgtEl>
-                                          <p:spTgt spid="6"/>
+                                          <p:spTgt spid="8"/>
                                         </p:tgtEl>
                                         <p:attrNameLst>
                                           <p:attrName>ppt_y</p:attrName>
@@ -27016,7 +26980,123 @@
                                       <p:cBhvr>
                                         <p:cTn id="8" dur="500"/>
                                         <p:tgtEl>
-                                          <p:spTgt spid="6"/>
+                                          <p:spTgt spid="8"/>
+                                        </p:tgtEl>
+                                      </p:cBhvr>
+                                    </p:animEffect>
+                                  </p:childTnLst>
+                                </p:cTn>
+                              </p:par>
+                              <p:par>
+                                <p:cTn id="9" presetID="12" presetClass="entr" presetSubtype="4" fill="hold" grpId="0" nodeType="withEffect">
+                                  <p:stCondLst>
+                                    <p:cond delay="0"/>
+                                  </p:stCondLst>
+                                  <p:childTnLst>
+                                    <p:set>
+                                      <p:cBhvr>
+                                        <p:cTn id="10" dur="1" fill="hold">
+                                          <p:stCondLst>
+                                            <p:cond delay="0"/>
+                                          </p:stCondLst>
+                                        </p:cTn>
+                                        <p:tgtEl>
+                                          <p:spTgt spid="15"/>
+                                        </p:tgtEl>
+                                        <p:attrNameLst>
+                                          <p:attrName>style.visibility</p:attrName>
+                                        </p:attrNameLst>
+                                      </p:cBhvr>
+                                      <p:to>
+                                        <p:strVal val="visible"/>
+                                      </p:to>
+                                    </p:set>
+                                    <p:anim calcmode="lin" valueType="num">
+                                      <p:cBhvr additive="base">
+                                        <p:cTn id="11" dur="500"/>
+                                        <p:tgtEl>
+                                          <p:spTgt spid="15"/>
+                                        </p:tgtEl>
+                                        <p:attrNameLst>
+                                          <p:attrName>ppt_y</p:attrName>
+                                        </p:attrNameLst>
+                                      </p:cBhvr>
+                                      <p:tavLst>
+                                        <p:tav tm="0">
+                                          <p:val>
+                                            <p:strVal val="#ppt_y+#ppt_h*1.125000"/>
+                                          </p:val>
+                                        </p:tav>
+                                        <p:tav tm="100000">
+                                          <p:val>
+                                            <p:strVal val="#ppt_y"/>
+                                          </p:val>
+                                        </p:tav>
+                                      </p:tavLst>
+                                    </p:anim>
+                                    <p:animEffect transition="in" filter="wipe(up)">
+                                      <p:cBhvr>
+                                        <p:cTn id="12" dur="500"/>
+                                        <p:tgtEl>
+                                          <p:spTgt spid="15"/>
+                                        </p:tgtEl>
+                                      </p:cBhvr>
+                                    </p:animEffect>
+                                  </p:childTnLst>
+                                </p:cTn>
+                              </p:par>
+                              <p:par>
+                                <p:cTn id="13" presetID="12" presetClass="entr" presetSubtype="4" fill="hold" grpId="0" nodeType="withEffect">
+                                  <p:stCondLst>
+                                    <p:cond delay="0"/>
+                                  </p:stCondLst>
+                                  <p:childTnLst>
+                                    <p:set>
+                                      <p:cBhvr>
+                                        <p:cTn id="14" dur="1" fill="hold">
+                                          <p:stCondLst>
+                                            <p:cond delay="0"/>
+                                          </p:stCondLst>
+                                        </p:cTn>
+                                        <p:tgtEl>
+                                          <p:spTgt spid="16"/>
+                                        </p:tgtEl>
+                                        <p:attrNameLst>
+                                          <p:attrName>style.visibility</p:attrName>
+                                        </p:attrNameLst>
+                                      </p:cBhvr>
+                                      <p:to>
+                                        <p:strVal val="visible"/>
+                                      </p:to>
+                                    </p:set>
+                                    <p:anim calcmode="lin" valueType="num">
+                                      <p:cBhvr additive="base">
+                                        <p:cTn id="15" dur="500"/>
+                                        <p:tgtEl>
+                                          <p:spTgt spid="16"/>
+                                        </p:tgtEl>
+                                        <p:attrNameLst>
+                                          <p:attrName>ppt_y</p:attrName>
+                                        </p:attrNameLst>
+                                      </p:cBhvr>
+                                      <p:tavLst>
+                                        <p:tav tm="0">
+                                          <p:val>
+                                            <p:strVal val="#ppt_y+#ppt_h*1.125000"/>
+                                          </p:val>
+                                        </p:tav>
+                                        <p:tav tm="100000">
+                                          <p:val>
+                                            <p:strVal val="#ppt_y"/>
+                                          </p:val>
+                                        </p:tav>
+                                      </p:tavLst>
+                                    </p:anim>
+                                    <p:animEffect transition="in" filter="wipe(up)">
+                                      <p:cBhvr>
+                                        <p:cTn id="16" dur="500"/>
+                                        <p:tgtEl>
+                                          <p:spTgt spid="16"/>
                                         </p:tgtEl>
                                       </p:cBhvr>
                                     </p:animEffect>
@@ -27030,148 +27110,32 @@
                     </p:cTn>
                   </p:par>
                   <p:par>
-                    <p:cTn id="9" fill="hold">
+                    <p:cTn id="17" fill="hold">
                       <p:stCondLst>
                         <p:cond delay="indefinite"/>
                       </p:stCondLst>
                       <p:childTnLst>
                         <p:par>
-                          <p:cTn id="10" fill="hold">
+                          <p:cTn id="18" fill="hold">
                             <p:stCondLst>
                               <p:cond delay="0"/>
                             </p:stCondLst>
                             <p:childTnLst>
                               <p:par>
-                                <p:cTn id="11" presetID="12" presetClass="entr" presetSubtype="4" fill="hold" grpId="0" nodeType="clickEffect">
+                                <p:cTn id="19" presetID="12" presetClass="entr" presetSubtype="4" fill="hold" grpId="0" nodeType="clickEffect">
                                   <p:stCondLst>
                                     <p:cond delay="0"/>
                                   </p:stCondLst>
                                   <p:childTnLst>
                                     <p:set>
                                       <p:cBhvr>
-                                        <p:cTn id="12" dur="1" fill="hold">
-                                          <p:stCondLst>
-                                            <p:cond delay="0"/>
-                                          </p:stCondLst>
-                                        </p:cTn>
-                                        <p:tgtEl>
-                                          <p:spTgt spid="8"/>
-                                        </p:tgtEl>
-                                        <p:attrNameLst>
-                                          <p:attrName>style.visibility</p:attrName>
-                                        </p:attrNameLst>
-                                      </p:cBhvr>
-                                      <p:to>
-                                        <p:strVal val="visible"/>
-                                      </p:to>
-                                    </p:set>
-                                    <p:anim calcmode="lin" valueType="num">
-                                      <p:cBhvr additive="base">
-                                        <p:cTn id="13" dur="500"/>
-                                        <p:tgtEl>
-                                          <p:spTgt spid="8"/>
-                                        </p:tgtEl>
-                                        <p:attrNameLst>
-                                          <p:attrName>ppt_y</p:attrName>
-                                        </p:attrNameLst>
-                                      </p:cBhvr>
-                                      <p:tavLst>
-                                        <p:tav tm="0">
-                                          <p:val>
-                                            <p:strVal val="#ppt_y+#ppt_h*1.125000"/>
-                                          </p:val>
-                                        </p:tav>
-                                        <p:tav tm="100000">
-                                          <p:val>
-                                            <p:strVal val="#ppt_y"/>
-                                          </p:val>
-                                        </p:tav>
-                                      </p:tavLst>
-                                    </p:anim>
-                                    <p:animEffect transition="in" filter="wipe(up)">
-                                      <p:cBhvr>
-                                        <p:cTn id="14" dur="500"/>
-                                        <p:tgtEl>
-                                          <p:spTgt spid="8"/>
-                                        </p:tgtEl>
-                                      </p:cBhvr>
-                                    </p:animEffect>
-                                  </p:childTnLst>
-                                </p:cTn>
-                              </p:par>
-                              <p:par>
-                                <p:cTn id="15" presetID="12" presetClass="entr" presetSubtype="4" fill="hold" grpId="0" nodeType="withEffect">
-                                  <p:stCondLst>
-                                    <p:cond delay="0"/>
-                                  </p:stCondLst>
-                                  <p:childTnLst>
-                                    <p:set>
-                                      <p:cBhvr>
-                                        <p:cTn id="16" dur="1" fill="hold">
-                                          <p:stCondLst>
-                                            <p:cond delay="0"/>
-                                          </p:stCondLst>
-                                        </p:cTn>
-                                        <p:tgtEl>
-                                          <p:spTgt spid="15"/>
-                                        </p:tgtEl>
-                                        <p:attrNameLst>
-                                          <p:attrName>style.visibility</p:attrName>
-                                        </p:attrNameLst>
-                                      </p:cBhvr>
-                                      <p:to>
-                                        <p:strVal val="visible"/>
-                                      </p:to>
-                                    </p:set>
-                                    <p:anim calcmode="lin" valueType="num">
-                                      <p:cBhvr additive="base">
-                                        <p:cTn id="17" dur="500"/>
-                                        <p:tgtEl>
-                                          <p:spTgt spid="15"/>
-                                        </p:tgtEl>
-                                        <p:attrNameLst>
-                                          <p:attrName>ppt_y</p:attrName>
-                                        </p:attrNameLst>
-                                      </p:cBhvr>
-                                      <p:tavLst>
-                                        <p:tav tm="0">
-                                          <p:val>
-                                            <p:strVal val="#ppt_y+#ppt_h*1.125000"/>
-                                          </p:val>
-                                        </p:tav>
-                                        <p:tav tm="100000">
-                                          <p:val>
-                                            <p:strVal val="#ppt_y"/>
-                                          </p:val>
-                                        </p:tav>
-                                      </p:tavLst>
-                                    </p:anim>
-                                    <p:animEffect transition="in" filter="wipe(up)">
-                                      <p:cBhvr>
-                                        <p:cTn id="18" dur="500"/>
-                                        <p:tgtEl>
-                                          <p:spTgt spid="15"/>
-                                        </p:tgtEl>
-                                      </p:cBhvr>
-                                    </p:animEffect>
-                                  </p:childTnLst>
-                                </p:cTn>
-                              </p:par>
-                              <p:par>
-                                <p:cTn id="19" presetID="12" presetClass="entr" presetSubtype="4" fill="hold" grpId="0" nodeType="withEffect">
-                                  <p:stCondLst>
-                                    <p:cond delay="0"/>
-                                  </p:stCondLst>
-                                  <p:childTnLst>
-                                    <p:set>
-                                      <p:cBhvr>
                                         <p:cTn id="20" dur="1" fill="hold">
                                           <p:stCondLst>
                                             <p:cond delay="0"/>
                                           </p:stCondLst>
                                         </p:cTn>
                                         <p:tgtEl>
-                                          <p:spTgt spid="16"/>
+                                          <p:spTgt spid="6"/>
                                         </p:tgtEl>
                                         <p:attrNameLst>
                                           <p:attrName>style.visibility</p:attrName>
@@ -27185,7 +27149,7 @@
                                       <p:cBhvr additive="base">
                                         <p:cTn id="21" dur="500"/>
                                         <p:tgtEl>
-                                          <p:spTgt spid="16"/>
+                                          <p:spTgt spid="6"/>
                                         </p:tgtEl>
                                         <p:attrNameLst>
                                           <p:attrName>ppt_y</p:attrName>
@@ -27208,7 +27172,7 @@
                                       <p:cBhvr>
                                         <p:cTn id="22" dur="500"/>
                                         <p:tgtEl>
-                                          <p:spTgt spid="16"/>
+                                          <p:spTgt spid="6"/>
                                         </p:tgtEl>
                                       </p:cBhvr>
                                     </p:animEffect>

</xml_diff>

<commit_message>
1. Added a simple directive example that simply abstracts markup to a partial. Uses parent scope. 2. Updated presentation with another best pactice for directives   - Use Isolate scope
Change-Id: If7e0830353ef8f8eeab8614ed09c6112daf6a79b
</commit_message>
<xml_diff>
--- a/Introduction to AngularJs.pptx
+++ b/Introduction to AngularJs.pptx
@@ -3423,7 +3423,7 @@
         </p:nvSpPr>
         <p:spPr>
           <a:xfrm>
-            <a:off x="457200" y="3617848"/>
+            <a:off x="457200" y="3583522"/>
             <a:ext cx="8229600" cy="812800"/>
           </a:xfrm>
         </p:spPr>
@@ -17959,8 +17959,21 @@
           <a:p>
             <a:r>
               <a:rPr lang="en-US" sz="1050" dirty="0"/>
-              <a:t>	 ...</a:t>
-            </a:r>
+              <a:t>	 </a:t>
+            </a:r>
+            <a:r>
+              <a:rPr lang="en-US" sz="1050" dirty="0" smtClean="0"/>
+              <a:t>&lt;div ng-</a:t>
+            </a:r>
+            <a:r>
+              <a:rPr lang="en-US" sz="1050" dirty="0" err="1" smtClean="0"/>
+              <a:t>transclude</a:t>
+            </a:r>
+            <a:r>
+              <a:rPr lang="en-US" sz="1050" dirty="0" smtClean="0"/>
+              <a:t> /&gt;</a:t>
+            </a:r>
+            <a:endParaRPr lang="en-US" sz="1050" dirty="0"/>
           </a:p>
           <a:p>
             <a:r>
@@ -20164,7 +20177,7 @@
         <p:spPr/>
         <p:txBody>
           <a:bodyPr>
-            <a:normAutofit fontScale="92500"/>
+            <a:normAutofit fontScale="92500" lnSpcReduction="10000"/>
           </a:bodyPr>
           <a:lstStyle/>
           <a:p>
@@ -20449,8 +20462,56 @@
                   <a:srgbClr val="000000"/>
                 </a:solidFill>
               </a:rPr>
-              <a:t>for your directives</a:t>
-            </a:r>
+              <a:t>for your </a:t>
+            </a:r>
+            <a:r>
+              <a:rPr lang="en-US" dirty="0" smtClean="0">
+                <a:solidFill>
+                  <a:srgbClr val="000000"/>
+                </a:solidFill>
+              </a:rPr>
+              <a:t>directives</a:t>
+            </a:r>
+          </a:p>
+          <a:p>
+            <a:pPr lvl="1"/>
+            <a:r>
+              <a:rPr lang="en-US" dirty="0">
+                <a:solidFill>
+                  <a:srgbClr val="70A525"/>
+                </a:solidFill>
+              </a:rPr>
+              <a:t>Create </a:t>
+            </a:r>
+            <a:r>
+              <a:rPr lang="en-US" b="1" dirty="0" smtClean="0">
+                <a:solidFill>
+                  <a:srgbClr val="70A525"/>
+                </a:solidFill>
+              </a:rPr>
+              <a:t>isolate</a:t>
+            </a:r>
+            <a:r>
+              <a:rPr lang="en-US" dirty="0" smtClean="0">
+                <a:solidFill>
+                  <a:srgbClr val="70A525"/>
+                </a:solidFill>
+              </a:rPr>
+              <a:t> scopes </a:t>
+            </a:r>
+            <a:r>
+              <a:rPr lang="en-US" dirty="0" smtClean="0">
+                <a:solidFill>
+                  <a:srgbClr val="000000"/>
+                </a:solidFill>
+              </a:rPr>
+              <a:t>to avoid accidental overrides of properties</a:t>
+            </a:r>
+            <a:endParaRPr lang="en-US" dirty="0" smtClean="0">
+              <a:solidFill>
+                <a:srgbClr val="000000"/>
+              </a:solidFill>
+            </a:endParaRPr>
           </a:p>
           <a:p>
             <a:pPr lvl="1"/>
@@ -21389,33 +21450,15 @@
                                   </p:childTnLst>
                                 </p:cTn>
                               </p:par>
-                            </p:childTnLst>
-                          </p:cTn>
-                        </p:par>
-                      </p:childTnLst>
-                    </p:cTn>
-                  </p:par>
-                  <p:par>
-                    <p:cTn id="53" fill="hold">
-                      <p:stCondLst>
-                        <p:cond delay="indefinite"/>
-                      </p:stCondLst>
-                      <p:childTnLst>
-                        <p:par>
-                          <p:cTn id="54" fill="hold">
-                            <p:stCondLst>
-                              <p:cond delay="0"/>
-                            </p:stCondLst>
-                            <p:childTnLst>
                               <p:par>
-                                <p:cTn id="55" presetID="12" presetClass="entr" presetSubtype="4" fill="hold" nodeType="clickEffect">
+                                <p:cTn id="53" presetID="12" presetClass="entr" presetSubtype="4" fill="hold" nodeType="withEffect">
                                   <p:stCondLst>
                                     <p:cond delay="0"/>
                                   </p:stCondLst>
                                   <p:childTnLst>
                                     <p:set>
                                       <p:cBhvr>
-                                        <p:cTn id="56" dur="1" fill="hold">
+                                        <p:cTn id="54" dur="1" fill="hold">
                                           <p:stCondLst>
                                             <p:cond delay="0"/>
                                           </p:stCondLst>
@@ -21423,7 +21466,7 @@
                                         <p:tgtEl>
                                           <p:spTgt spid="3">
                                             <p:txEl>
-                                              <p:pRg st="12" end="12"/>
+                                              <p:pRg st="11" end="11"/>
                                             </p:txEl>
                                           </p:spTgt>
                                         </p:tgtEl>
@@ -21437,11 +21480,11 @@
                                     </p:set>
                                     <p:anim calcmode="lin" valueType="num">
                                       <p:cBhvr additive="base">
-                                        <p:cTn id="57" dur="500"/>
-                                        <p:tgtEl>
-                                          <p:spTgt spid="3">
-                                            <p:txEl>
-                                              <p:pRg st="12" end="12"/>
+                                        <p:cTn id="55" dur="500"/>
+                                        <p:tgtEl>
+                                          <p:spTgt spid="3">
+                                            <p:txEl>
+                                              <p:pRg st="11" end="11"/>
                                             </p:txEl>
                                           </p:spTgt>
                                         </p:tgtEl>
@@ -21464,11 +21507,11 @@
                                     </p:anim>
                                     <p:animEffect transition="in" filter="wipe(up)">
                                       <p:cBhvr>
-                                        <p:cTn id="58" dur="500"/>
-                                        <p:tgtEl>
-                                          <p:spTgt spid="3">
-                                            <p:txEl>
-                                              <p:pRg st="12" end="12"/>
+                                        <p:cTn id="56" dur="500"/>
+                                        <p:tgtEl>
+                                          <p:spTgt spid="3">
+                                            <p:txEl>
+                                              <p:pRg st="11" end="11"/>
                                             </p:txEl>
                                           </p:spTgt>
                                         </p:tgtEl>
@@ -21484,26 +21527,26 @@
                     </p:cTn>
                   </p:par>
                   <p:par>
-                    <p:cTn id="59" fill="hold">
+                    <p:cTn id="57" fill="hold">
                       <p:stCondLst>
                         <p:cond delay="indefinite"/>
                       </p:stCondLst>
                       <p:childTnLst>
                         <p:par>
-                          <p:cTn id="60" fill="hold">
+                          <p:cTn id="58" fill="hold">
                             <p:stCondLst>
                               <p:cond delay="0"/>
                             </p:stCondLst>
                             <p:childTnLst>
                               <p:par>
-                                <p:cTn id="61" presetID="12" presetClass="entr" presetSubtype="4" fill="hold" nodeType="clickEffect">
+                                <p:cTn id="59" presetID="12" presetClass="entr" presetSubtype="4" fill="hold" nodeType="clickEffect">
                                   <p:stCondLst>
                                     <p:cond delay="0"/>
                                   </p:stCondLst>
                                   <p:childTnLst>
                                     <p:set>
                                       <p:cBhvr>
-                                        <p:cTn id="62" dur="1" fill="hold">
+                                        <p:cTn id="60" dur="1" fill="hold">
                                           <p:stCondLst>
                                             <p:cond delay="0"/>
                                           </p:stCondLst>
@@ -21525,7 +21568,7 @@
                                     </p:set>
                                     <p:anim calcmode="lin" valueType="num">
                                       <p:cBhvr additive="base">
-                                        <p:cTn id="63" dur="500"/>
+                                        <p:cTn id="61" dur="500"/>
                                         <p:tgtEl>
                                           <p:spTgt spid="3">
                                             <p:txEl>
@@ -21552,11 +21595,99 @@
                                     </p:anim>
                                     <p:animEffect transition="in" filter="wipe(up)">
                                       <p:cBhvr>
-                                        <p:cTn id="64" dur="500"/>
+                                        <p:cTn id="62" dur="500"/>
                                         <p:tgtEl>
                                           <p:spTgt spid="3">
                                             <p:txEl>
                                               <p:pRg st="13" end="13"/>
+                                            </p:txEl>
+                                          </p:spTgt>
+                                        </p:tgtEl>
+                                      </p:cBhvr>
+                                    </p:animEffect>
+                                  </p:childTnLst>
+                                </p:cTn>
+                              </p:par>
+                            </p:childTnLst>
+                          </p:cTn>
+                        </p:par>
+                      </p:childTnLst>
+                    </p:cTn>
+                  </p:par>
+                  <p:par>
+                    <p:cTn id="63" fill="hold">
+                      <p:stCondLst>
+                        <p:cond delay="indefinite"/>
+                      </p:stCondLst>
+                      <p:childTnLst>
+                        <p:par>
+                          <p:cTn id="64" fill="hold">
+                            <p:stCondLst>
+                              <p:cond delay="0"/>
+                            </p:stCondLst>
+                            <p:childTnLst>
+                              <p:par>
+                                <p:cTn id="65" presetID="12" presetClass="entr" presetSubtype="4" fill="hold" nodeType="clickEffect">
+                                  <p:stCondLst>
+                                    <p:cond delay="0"/>
+                                  </p:stCondLst>
+                                  <p:childTnLst>
+                                    <p:set>
+                                      <p:cBhvr>
+                                        <p:cTn id="66" dur="1" fill="hold">
+                                          <p:stCondLst>
+                                            <p:cond delay="0"/>
+                                          </p:stCondLst>
+                                        </p:cTn>
+                                        <p:tgtEl>
+                                          <p:spTgt spid="3">
+                                            <p:txEl>
+                                              <p:pRg st="14" end="14"/>
+                                            </p:txEl>
+                                          </p:spTgt>
+                                        </p:tgtEl>
+                                        <p:attrNameLst>
+                                          <p:attrName>style.visibility</p:attrName>
+                                        </p:attrNameLst>
+                                      </p:cBhvr>
+                                      <p:to>
+                                        <p:strVal val="visible"/>
+                                      </p:to>
+                                    </p:set>
+                                    <p:anim calcmode="lin" valueType="num">
+                                      <p:cBhvr additive="base">
+                                        <p:cTn id="67" dur="500"/>
+                                        <p:tgtEl>
+                                          <p:spTgt spid="3">
+                                            <p:txEl>
+                                              <p:pRg st="14" end="14"/>
+                                            </p:txEl>
+                                          </p:spTgt>
+                                        </p:tgtEl>
+                                        <p:attrNameLst>
+                                          <p:attrName>ppt_y</p:attrName>
+                                        </p:attrNameLst>
+                                      </p:cBhvr>
+                                      <p:tavLst>
+                                        <p:tav tm="0">
+                                          <p:val>
+                                            <p:strVal val="#ppt_y+#ppt_h*1.125000"/>
+                                          </p:val>
+                                        </p:tav>
+                                        <p:tav tm="100000">
+                                          <p:val>
+                                            <p:strVal val="#ppt_y"/>
+                                          </p:val>
+                                        </p:tav>
+                                      </p:tavLst>
+                                    </p:anim>
+                                    <p:animEffect transition="in" filter="wipe(up)">
+                                      <p:cBhvr>
+                                        <p:cTn id="68" dur="500"/>
+                                        <p:tgtEl>
+                                          <p:spTgt spid="3">
+                                            <p:txEl>
+                                              <p:pRg st="14" end="14"/>
                                             </p:txEl>
                                           </p:spTgt>
                                         </p:tgtEl>

</xml_diff>

<commit_message>
Added slide for form validation
Change-Id: I388c5dd5fc1d8bab1458ef614edd7aeffa95dbf1
</commit_message>
<xml_diff>
--- a/Introduction to AngularJs.pptx
+++ b/Introduction to AngularJs.pptx
@@ -25,13 +25,14 @@
     <p:sldId id="277" r:id="rId19"/>
     <p:sldId id="278" r:id="rId20"/>
     <p:sldId id="265" r:id="rId21"/>
-    <p:sldId id="280" r:id="rId22"/>
-    <p:sldId id="281" r:id="rId23"/>
-    <p:sldId id="282" r:id="rId24"/>
-    <p:sldId id="260" r:id="rId25"/>
-    <p:sldId id="262" r:id="rId26"/>
-    <p:sldId id="261" r:id="rId27"/>
-    <p:sldId id="285" r:id="rId28"/>
+    <p:sldId id="288" r:id="rId22"/>
+    <p:sldId id="280" r:id="rId23"/>
+    <p:sldId id="281" r:id="rId24"/>
+    <p:sldId id="282" r:id="rId25"/>
+    <p:sldId id="260" r:id="rId26"/>
+    <p:sldId id="262" r:id="rId27"/>
+    <p:sldId id="261" r:id="rId28"/>
+    <p:sldId id="285" r:id="rId29"/>
   </p:sldIdLst>
   <p:sldSz cx="9144000" cy="6858000" type="screen4x3"/>
   <p:notesSz cx="6858000" cy="9144000"/>
@@ -7566,8 +7567,40 @@
                   <a:schemeClr val="tx1"/>
                 </a:solidFill>
               </a:rPr>
-              <a:t>$watch method</a:t>
-            </a:r>
+              <a:t>$watch </a:t>
+            </a:r>
+            <a:r>
+              <a:rPr lang="en-US" dirty="0" smtClean="0">
+                <a:solidFill>
+                  <a:schemeClr val="tx1"/>
+                </a:solidFill>
+              </a:rPr>
+              <a:t>method</a:t>
+            </a:r>
+          </a:p>
+          <a:p>
+            <a:pPr lvl="1"/>
+            <a:r>
+              <a:rPr lang="en-US" dirty="0">
+                <a:solidFill>
+                  <a:schemeClr val="tx1"/>
+                </a:solidFill>
+              </a:rPr>
+              <a:t>e</a:t>
+            </a:r>
+            <a:r>
+              <a:rPr lang="en-US" dirty="0" smtClean="0">
+                <a:solidFill>
+                  <a:schemeClr val="tx1"/>
+                </a:solidFill>
+              </a:rPr>
+              <a:t>tc..</a:t>
+            </a:r>
+            <a:endParaRPr lang="en-US" dirty="0" smtClean="0">
+              <a:solidFill>
+                <a:schemeClr val="tx1"/>
+              </a:solidFill>
+            </a:endParaRPr>
           </a:p>
           <a:p>
             <a:pPr lvl="1"/>
@@ -8018,6 +8051,49 @@
                                   </p:childTnLst>
                                 </p:cTn>
                               </p:par>
+                              <p:par>
+                                <p:cTn id="30" presetID="10" presetClass="entr" presetSubtype="0" fill="hold" nodeType="withEffect">
+                                  <p:stCondLst>
+                                    <p:cond delay="0"/>
+                                  </p:stCondLst>
+                                  <p:childTnLst>
+                                    <p:set>
+                                      <p:cBhvr>
+                                        <p:cTn id="31" dur="1" fill="hold">
+                                          <p:stCondLst>
+                                            <p:cond delay="0"/>
+                                          </p:stCondLst>
+                                        </p:cTn>
+                                        <p:tgtEl>
+                                          <p:spTgt spid="3">
+                                            <p:txEl>
+                                              <p:pRg st="8" end="8"/>
+                                            </p:txEl>
+                                          </p:spTgt>
+                                        </p:tgtEl>
+                                        <p:attrNameLst>
+                                          <p:attrName>style.visibility</p:attrName>
+                                        </p:attrNameLst>
+                                      </p:cBhvr>
+                                      <p:to>
+                                        <p:strVal val="visible"/>
+                                      </p:to>
+                                    </p:set>
+                                    <p:animEffect transition="in" filter="fade">
+                                      <p:cBhvr>
+                                        <p:cTn id="32" dur="500"/>
+                                        <p:tgtEl>
+                                          <p:spTgt spid="3">
+                                            <p:txEl>
+                                              <p:pRg st="8" end="8"/>
+                                            </p:txEl>
+                                          </p:spTgt>
+                                        </p:tgtEl>
+                                      </p:cBhvr>
+                                    </p:animEffect>
+                                  </p:childTnLst>
+                                </p:cTn>
+                              </p:par>
                             </p:childTnLst>
                           </p:cTn>
                         </p:par>
@@ -8025,26 +8101,26 @@
                     </p:cTn>
                   </p:par>
                   <p:par>
-                    <p:cTn id="30" fill="hold">
+                    <p:cTn id="33" fill="hold">
                       <p:stCondLst>
                         <p:cond delay="indefinite"/>
                       </p:stCondLst>
                       <p:childTnLst>
                         <p:par>
-                          <p:cTn id="31" fill="hold">
+                          <p:cTn id="34" fill="hold">
                             <p:stCondLst>
                               <p:cond delay="0"/>
                             </p:stCondLst>
                             <p:childTnLst>
                               <p:par>
-                                <p:cTn id="32" presetID="10" presetClass="entr" presetSubtype="0" fill="hold" nodeType="clickEffect">
+                                <p:cTn id="35" presetID="10" presetClass="entr" presetSubtype="0" fill="hold" nodeType="clickEffect">
                                   <p:stCondLst>
                                     <p:cond delay="0"/>
                                   </p:stCondLst>
                                   <p:childTnLst>
                                     <p:set>
                                       <p:cBhvr>
-                                        <p:cTn id="33" dur="1" fill="hold">
+                                        <p:cTn id="36" dur="1" fill="hold">
                                           <p:stCondLst>
                                             <p:cond delay="0"/>
                                           </p:stCondLst>
@@ -8052,7 +8128,7 @@
                                         <p:tgtEl>
                                           <p:spTgt spid="3">
                                             <p:txEl>
-                                              <p:pRg st="9" end="9"/>
+                                              <p:pRg st="10" end="10"/>
                                             </p:txEl>
                                           </p:spTgt>
                                         </p:tgtEl>
@@ -8066,11 +8142,11 @@
                                     </p:set>
                                     <p:animEffect transition="in" filter="fade">
                                       <p:cBhvr>
-                                        <p:cTn id="34" dur="500"/>
-                                        <p:tgtEl>
-                                          <p:spTgt spid="3">
-                                            <p:txEl>
-                                              <p:pRg st="9" end="9"/>
+                                        <p:cTn id="37" dur="500"/>
+                                        <p:tgtEl>
+                                          <p:spTgt spid="3">
+                                            <p:txEl>
+                                              <p:pRg st="10" end="10"/>
                                             </p:txEl>
                                           </p:spTgt>
                                         </p:tgtEl>
@@ -8271,7 +8347,15 @@
                   <a:schemeClr val="tx1"/>
                 </a:solidFill>
               </a:rPr>
-              <a:t>Cannot use conditionals, loops</a:t>
+              <a:t>*Cannot* </a:t>
+            </a:r>
+            <a:r>
+              <a:rPr lang="en-US" dirty="0" smtClean="0">
+                <a:solidFill>
+                  <a:schemeClr val="tx1"/>
+                </a:solidFill>
+              </a:rPr>
+              <a:t>use conditionals, loops</a:t>
             </a:r>
             <a:r>
               <a:rPr lang="en-US" dirty="0">
@@ -12067,7 +12151,23 @@
                   <a:schemeClr val="tx1"/>
                 </a:solidFill>
               </a:rPr>
-              <a:t> other HTML attributes with more capabilities –  required, checked etc. </a:t>
+              <a:t> other HTML attributes with more capabilities –  required, </a:t>
+            </a:r>
+            <a:r>
+              <a:rPr lang="en-US" dirty="0" smtClean="0">
+                <a:solidFill>
+                  <a:schemeClr val="tx1"/>
+                </a:solidFill>
+              </a:rPr>
+              <a:t>type, input etc</a:t>
+            </a:r>
+            <a:r>
+              <a:rPr lang="en-US" dirty="0" smtClean="0">
+                <a:solidFill>
+                  <a:schemeClr val="tx1"/>
+                </a:solidFill>
+              </a:rPr>
+              <a:t>. </a:t>
             </a:r>
           </a:p>
           <a:p>
@@ -12289,7 +12389,25 @@
                 </a:solidFill>
                 <a:sym typeface="Wingdings"/>
               </a:rPr>
-              <a:t>No magic, implemented purely using JS and HMTL </a:t>
+              <a:t>No magic, implemented purely using JS and </a:t>
+            </a:r>
+            <a:r>
+              <a:rPr lang="en-US" dirty="0" smtClean="0">
+                <a:solidFill>
+                  <a:schemeClr val="tx1"/>
+                </a:solidFill>
+                <a:sym typeface="Wingdings"/>
+              </a:rPr>
+              <a:t>HTML </a:t>
+            </a:r>
+            <a:r>
+              <a:rPr lang="en-US" dirty="0" smtClean="0">
+                <a:solidFill>
+                  <a:schemeClr val="tx1"/>
+                </a:solidFill>
+                <a:sym typeface="Wingdings"/>
+              </a:rPr>
+              <a:t></a:t>
             </a:r>
             <a:endParaRPr lang="en-US" dirty="0">
               <a:solidFill>
@@ -16634,6 +16752,2186 @@
         </p:nvSpPr>
         <p:spPr>
           <a:xfrm>
+            <a:off x="457200" y="-320376"/>
+            <a:ext cx="8229600" cy="1600200"/>
+          </a:xfrm>
+        </p:spPr>
+        <p:txBody>
+          <a:bodyPr/>
+          <a:lstStyle/>
+          <a:p>
+            <a:r>
+              <a:rPr lang="en-US" dirty="0" smtClean="0"/>
+              <a:t>Form Validation</a:t>
+            </a:r>
+            <a:endParaRPr lang="en-US" dirty="0"/>
+          </a:p>
+        </p:txBody>
+      </p:sp>
+      <p:sp>
+        <p:nvSpPr>
+          <p:cNvPr id="3" name="Content Placeholder 2"/>
+          <p:cNvSpPr>
+            <a:spLocks noGrp="1"/>
+          </p:cNvSpPr>
+          <p:nvPr>
+            <p:ph idx="1"/>
+          </p:nvPr>
+        </p:nvSpPr>
+        <p:spPr>
+          <a:xfrm>
+            <a:off x="457200" y="1395914"/>
+            <a:ext cx="8229600" cy="4965793"/>
+          </a:xfrm>
+        </p:spPr>
+        <p:txBody>
+          <a:bodyPr>
+            <a:normAutofit fontScale="92500" lnSpcReduction="10000"/>
+          </a:bodyPr>
+          <a:lstStyle/>
+          <a:p>
+            <a:r>
+              <a:rPr lang="en-US" b="1" dirty="0" smtClean="0">
+                <a:solidFill>
+                  <a:schemeClr val="tx1"/>
+                </a:solidFill>
+              </a:rPr>
+              <a:t>Activated</a:t>
+            </a:r>
+            <a:r>
+              <a:rPr lang="en-US" dirty="0" smtClean="0">
+                <a:solidFill>
+                  <a:schemeClr val="tx1"/>
+                </a:solidFill>
+              </a:rPr>
+              <a:t> by - adding ‘name’ attribute to ‘form’ and ‘form elements’</a:t>
+            </a:r>
+          </a:p>
+          <a:p>
+            <a:endParaRPr lang="en-US" dirty="0" smtClean="0">
+              <a:solidFill>
+                <a:schemeClr val="tx1"/>
+              </a:solidFill>
+            </a:endParaRPr>
+          </a:p>
+          <a:p>
+            <a:endParaRPr lang="en-US" dirty="0">
+              <a:solidFill>
+                <a:schemeClr val="tx1"/>
+              </a:solidFill>
+            </a:endParaRPr>
+          </a:p>
+          <a:p>
+            <a:r>
+              <a:rPr lang="en-US" dirty="0" smtClean="0">
+                <a:solidFill>
+                  <a:schemeClr val="tx1"/>
+                </a:solidFill>
+              </a:rPr>
+              <a:t>Angular </a:t>
+            </a:r>
+            <a:r>
+              <a:rPr lang="en-US" b="1" dirty="0" smtClean="0">
+                <a:solidFill>
+                  <a:schemeClr val="tx1"/>
+                </a:solidFill>
+              </a:rPr>
+              <a:t>attaches</a:t>
+            </a:r>
+            <a:r>
+              <a:rPr lang="en-US" dirty="0" smtClean="0">
+                <a:solidFill>
+                  <a:schemeClr val="tx1"/>
+                </a:solidFill>
+              </a:rPr>
+              <a:t> these properties to form and form elements</a:t>
+            </a:r>
+          </a:p>
+          <a:p>
+            <a:r>
+              <a:rPr lang="en-US" b="1" dirty="0" smtClean="0">
+                <a:solidFill>
+                  <a:schemeClr val="tx1"/>
+                </a:solidFill>
+              </a:rPr>
+              <a:t>Accessed</a:t>
+            </a:r>
+            <a:r>
+              <a:rPr lang="en-US" dirty="0" smtClean="0">
+                <a:solidFill>
+                  <a:schemeClr val="tx1"/>
+                </a:solidFill>
+              </a:rPr>
+              <a:t> as</a:t>
+            </a:r>
+          </a:p>
+          <a:p>
+            <a:pPr lvl="1"/>
+            <a:r>
+              <a:rPr lang="en-US" dirty="0" smtClean="0">
+                <a:solidFill>
+                  <a:schemeClr val="tx1"/>
+                </a:solidFill>
+              </a:rPr>
+              <a:t>Form: &lt;form name&gt;.&lt;property&gt;</a:t>
+            </a:r>
+          </a:p>
+          <a:p>
+            <a:pPr lvl="1"/>
+            <a:r>
+              <a:rPr lang="en-US" dirty="0" smtClean="0">
+                <a:solidFill>
+                  <a:schemeClr val="tx1"/>
+                </a:solidFill>
+              </a:rPr>
+              <a:t>Individual form element: &lt;form name&gt;.&lt;element name&gt;.&lt;property&gt;</a:t>
+            </a:r>
+          </a:p>
+          <a:p>
+            <a:r>
+              <a:rPr lang="en-US" b="1" dirty="0" smtClean="0">
+                <a:solidFill>
+                  <a:schemeClr val="tx1"/>
+                </a:solidFill>
+              </a:rPr>
+              <a:t>Applies</a:t>
+            </a:r>
+            <a:r>
+              <a:rPr lang="en-US" dirty="0" smtClean="0">
+                <a:solidFill>
+                  <a:schemeClr val="tx1"/>
+                </a:solidFill>
+              </a:rPr>
+              <a:t> these styling classes </a:t>
+            </a:r>
+            <a:r>
+              <a:rPr lang="en-US" dirty="0">
+                <a:solidFill>
+                  <a:schemeClr val="tx1"/>
+                </a:solidFill>
+              </a:rPr>
+              <a:t>–</a:t>
+            </a:r>
+          </a:p>
+          <a:p>
+            <a:pPr lvl="1"/>
+            <a:r>
+              <a:rPr lang="en-US" dirty="0">
+                <a:solidFill>
+                  <a:schemeClr val="tx1"/>
+                </a:solidFill>
+              </a:rPr>
+              <a:t>.ng-valid, .ng-invalid, .ng-pristine, .ng-dirty</a:t>
+            </a:r>
+          </a:p>
+          <a:p>
+            <a:pPr lvl="1"/>
+            <a:r>
+              <a:rPr lang="en-US" dirty="0">
+                <a:solidFill>
+                  <a:schemeClr val="tx1"/>
+                </a:solidFill>
+              </a:rPr>
+              <a:t>.ng-invalid-required, .ng-valid-max-length </a:t>
+            </a:r>
+            <a:endParaRPr lang="en-US" dirty="0" smtClean="0">
+              <a:solidFill>
+                <a:schemeClr val="tx1"/>
+              </a:solidFill>
+            </a:endParaRPr>
+          </a:p>
+          <a:p>
+            <a:r>
+              <a:rPr lang="en-US" dirty="0" smtClean="0">
+                <a:solidFill>
+                  <a:schemeClr val="tx1"/>
+                </a:solidFill>
+              </a:rPr>
+              <a:t>Make use of these </a:t>
+            </a:r>
+            <a:r>
+              <a:rPr lang="en-US" b="1" dirty="0" smtClean="0">
+                <a:solidFill>
+                  <a:schemeClr val="tx1"/>
+                </a:solidFill>
+              </a:rPr>
+              <a:t>validation directives </a:t>
+            </a:r>
+            <a:r>
+              <a:rPr lang="en-US" dirty="0" smtClean="0">
+                <a:solidFill>
+                  <a:schemeClr val="tx1"/>
+                </a:solidFill>
+              </a:rPr>
+              <a:t>-</a:t>
+            </a:r>
+          </a:p>
+          <a:p>
+            <a:pPr lvl="1"/>
+            <a:r>
+              <a:rPr lang="en-US" b="1" dirty="0">
+                <a:solidFill>
+                  <a:schemeClr val="tx1"/>
+                </a:solidFill>
+              </a:rPr>
+              <a:t>r</a:t>
+            </a:r>
+            <a:r>
+              <a:rPr lang="en-US" b="1" dirty="0" smtClean="0">
+                <a:solidFill>
+                  <a:schemeClr val="tx1"/>
+                </a:solidFill>
+              </a:rPr>
+              <a:t>equired</a:t>
+            </a:r>
+            <a:r>
+              <a:rPr lang="en-US" dirty="0" smtClean="0">
+                <a:solidFill>
+                  <a:schemeClr val="tx1"/>
+                </a:solidFill>
+              </a:rPr>
+              <a:t>, </a:t>
+            </a:r>
+            <a:r>
+              <a:rPr lang="en-US" b="1" dirty="0" smtClean="0">
+                <a:solidFill>
+                  <a:schemeClr val="tx1"/>
+                </a:solidFill>
+              </a:rPr>
+              <a:t>type</a:t>
+            </a:r>
+            <a:r>
+              <a:rPr lang="en-US" dirty="0" smtClean="0">
+                <a:solidFill>
+                  <a:schemeClr val="tx1"/>
+                </a:solidFill>
+              </a:rPr>
+              <a:t>, </a:t>
+            </a:r>
+            <a:r>
+              <a:rPr lang="en-US" b="1" dirty="0" smtClean="0">
+                <a:solidFill>
+                  <a:schemeClr val="tx1"/>
+                </a:solidFill>
+              </a:rPr>
+              <a:t>ng-</a:t>
+            </a:r>
+            <a:r>
+              <a:rPr lang="en-US" b="1" dirty="0" err="1" smtClean="0">
+                <a:solidFill>
+                  <a:schemeClr val="tx1"/>
+                </a:solidFill>
+              </a:rPr>
+              <a:t>minlength</a:t>
+            </a:r>
+            <a:r>
+              <a:rPr lang="en-US" dirty="0" smtClean="0">
+                <a:solidFill>
+                  <a:schemeClr val="tx1"/>
+                </a:solidFill>
+              </a:rPr>
+              <a:t>, </a:t>
+            </a:r>
+            <a:r>
+              <a:rPr lang="en-US" b="1" dirty="0" smtClean="0">
+                <a:solidFill>
+                  <a:schemeClr val="tx1"/>
+                </a:solidFill>
+              </a:rPr>
+              <a:t>ng-</a:t>
+            </a:r>
+            <a:r>
+              <a:rPr lang="en-US" b="1" dirty="0" err="1" smtClean="0">
+                <a:solidFill>
+                  <a:schemeClr val="tx1"/>
+                </a:solidFill>
+              </a:rPr>
+              <a:t>maxlength</a:t>
+            </a:r>
+            <a:r>
+              <a:rPr lang="en-US" dirty="0" smtClean="0">
+                <a:solidFill>
+                  <a:schemeClr val="tx1"/>
+                </a:solidFill>
+              </a:rPr>
+              <a:t>, </a:t>
+            </a:r>
+            <a:r>
+              <a:rPr lang="en-US" b="1" dirty="0" smtClean="0">
+                <a:solidFill>
+                  <a:schemeClr val="tx1"/>
+                </a:solidFill>
+              </a:rPr>
+              <a:t>ng-pattern</a:t>
+            </a:r>
+          </a:p>
+          <a:p>
+            <a:pPr lvl="1"/>
+            <a:r>
+              <a:rPr lang="en-US" dirty="0" smtClean="0">
+                <a:solidFill>
+                  <a:schemeClr val="tx1"/>
+                </a:solidFill>
+              </a:rPr>
+              <a:t>Your own custom directive</a:t>
+            </a:r>
+          </a:p>
+          <a:p>
+            <a:r>
+              <a:rPr lang="en-US" dirty="0" smtClean="0">
+                <a:solidFill>
+                  <a:schemeClr val="tx1"/>
+                </a:solidFill>
+              </a:rPr>
+              <a:t>Use ‘</a:t>
+            </a:r>
+            <a:r>
+              <a:rPr lang="en-US" i="1" dirty="0" err="1" smtClean="0">
+                <a:solidFill>
+                  <a:schemeClr val="tx1"/>
+                </a:solidFill>
+              </a:rPr>
+              <a:t>novalidate</a:t>
+            </a:r>
+            <a:r>
+              <a:rPr lang="en-US" dirty="0" smtClean="0">
+                <a:solidFill>
+                  <a:schemeClr val="tx1"/>
+                </a:solidFill>
+              </a:rPr>
+              <a:t>’ attribute to avoid HTML5 auto validation</a:t>
+            </a:r>
+          </a:p>
+          <a:p>
+            <a:pPr lvl="1"/>
+            <a:endParaRPr lang="en-US" dirty="0" smtClean="0">
+              <a:solidFill>
+                <a:schemeClr val="tx1"/>
+              </a:solidFill>
+            </a:endParaRPr>
+          </a:p>
+          <a:p>
+            <a:pPr lvl="1"/>
+            <a:endParaRPr lang="en-US" dirty="0">
+              <a:solidFill>
+                <a:schemeClr val="tx1"/>
+              </a:solidFill>
+            </a:endParaRPr>
+          </a:p>
+        </p:txBody>
+      </p:sp>
+      <p:sp>
+        <p:nvSpPr>
+          <p:cNvPr id="4" name="Rectangle 3"/>
+          <p:cNvSpPr/>
+          <p:nvPr/>
+        </p:nvSpPr>
+        <p:spPr>
+          <a:xfrm>
+            <a:off x="6574776" y="2135404"/>
+            <a:ext cx="1321924" cy="523220"/>
+          </a:xfrm>
+          <a:prstGeom prst="rect">
+            <a:avLst/>
+          </a:prstGeom>
+          <a:ln w="19050" cmpd="sng">
+            <a:solidFill>
+              <a:schemeClr val="accent4"/>
+            </a:solidFill>
+          </a:ln>
+        </p:spPr>
+        <p:style>
+          <a:lnRef idx="1">
+            <a:schemeClr val="accent5"/>
+          </a:lnRef>
+          <a:fillRef idx="3">
+            <a:schemeClr val="accent5"/>
+          </a:fillRef>
+          <a:effectRef idx="2">
+            <a:schemeClr val="accent5"/>
+          </a:effectRef>
+          <a:fontRef idx="minor">
+            <a:schemeClr val="lt1"/>
+          </a:fontRef>
+        </p:style>
+        <p:txBody>
+          <a:bodyPr wrap="square" lIns="91440" tIns="45720" rIns="91440" bIns="45720">
+            <a:spAutoFit/>
+          </a:bodyPr>
+          <a:lstStyle/>
+          <a:p>
+            <a:pPr algn="ctr"/>
+            <a:r>
+              <a:rPr lang="en-US" sz="2800" b="1" dirty="0" smtClean="0">
+                <a:ln w="12700">
+                  <a:solidFill>
+                    <a:schemeClr val="tx2">
+                      <a:satMod val="155000"/>
+                    </a:schemeClr>
+                  </a:solidFill>
+                  <a:prstDash val="solid"/>
+                </a:ln>
+                <a:solidFill>
+                  <a:schemeClr val="accent5"/>
+                </a:solidFill>
+                <a:effectLst>
+                  <a:outerShdw blurRad="41275" dist="20320" dir="1800000" algn="tl" rotWithShape="0">
+                    <a:srgbClr val="000000">
+                      <a:alpha val="40000"/>
+                    </a:srgbClr>
+                  </a:outerShdw>
+                </a:effectLst>
+              </a:rPr>
+              <a:t>$valid</a:t>
+            </a:r>
+            <a:endParaRPr lang="en-US" sz="2800" b="1" dirty="0">
+              <a:ln w="12700">
+                <a:solidFill>
+                  <a:schemeClr val="tx2">
+                    <a:satMod val="155000"/>
+                  </a:schemeClr>
+                </a:solidFill>
+                <a:prstDash val="solid"/>
+              </a:ln>
+              <a:solidFill>
+                <a:schemeClr val="accent5"/>
+              </a:solidFill>
+              <a:effectLst>
+                <a:outerShdw blurRad="41275" dist="20320" dir="1800000" algn="tl" rotWithShape="0">
+                  <a:srgbClr val="000000">
+                    <a:alpha val="40000"/>
+                  </a:srgbClr>
+                </a:outerShdw>
+              </a:effectLst>
+            </a:endParaRPr>
+          </a:p>
+        </p:txBody>
+      </p:sp>
+      <p:sp>
+        <p:nvSpPr>
+          <p:cNvPr id="5" name="Rectangle 4"/>
+          <p:cNvSpPr/>
+          <p:nvPr/>
+        </p:nvSpPr>
+        <p:spPr>
+          <a:xfrm>
+            <a:off x="4717244" y="2140399"/>
+            <a:ext cx="1380657" cy="523220"/>
+          </a:xfrm>
+          <a:prstGeom prst="rect">
+            <a:avLst/>
+          </a:prstGeom>
+          <a:ln/>
+          <a:effectLst>
+            <a:outerShdw blurRad="50800" dist="12700" dir="2700000" algn="tl" rotWithShape="0">
+              <a:srgbClr val="000000">
+                <a:alpha val="43000"/>
+              </a:srgbClr>
+            </a:outerShdw>
+          </a:effectLst>
+        </p:spPr>
+        <p:style>
+          <a:lnRef idx="2">
+            <a:schemeClr val="accent3">
+              <a:shade val="50000"/>
+            </a:schemeClr>
+          </a:lnRef>
+          <a:fillRef idx="1">
+            <a:schemeClr val="accent3"/>
+          </a:fillRef>
+          <a:effectRef idx="0">
+            <a:schemeClr val="accent3"/>
+          </a:effectRef>
+          <a:fontRef idx="minor">
+            <a:schemeClr val="lt1"/>
+          </a:fontRef>
+        </p:style>
+        <p:txBody>
+          <a:bodyPr wrap="square" lIns="91440" tIns="45720" rIns="91440" bIns="45720">
+            <a:spAutoFit/>
+          </a:bodyPr>
+          <a:lstStyle/>
+          <a:p>
+            <a:pPr algn="ctr"/>
+            <a:r>
+              <a:rPr lang="en-US" sz="2800" b="1" dirty="0" smtClean="0">
+                <a:ln w="12700">
+                  <a:solidFill>
+                    <a:schemeClr val="tx2">
+                      <a:satMod val="155000"/>
+                    </a:schemeClr>
+                  </a:solidFill>
+                  <a:prstDash val="solid"/>
+                </a:ln>
+                <a:solidFill>
+                  <a:schemeClr val="accent3">
+                    <a:lumMod val="60000"/>
+                    <a:lumOff val="40000"/>
+                  </a:schemeClr>
+                </a:solidFill>
+                <a:effectLst>
+                  <a:outerShdw blurRad="41275" dist="20320" dir="1800000" algn="tl" rotWithShape="0">
+                    <a:srgbClr val="000000">
+                      <a:alpha val="40000"/>
+                    </a:srgbClr>
+                  </a:outerShdw>
+                </a:effectLst>
+              </a:rPr>
+              <a:t>$invalid</a:t>
+            </a:r>
+            <a:endParaRPr lang="en-US" sz="2800" b="1" dirty="0">
+              <a:ln w="12700">
+                <a:solidFill>
+                  <a:schemeClr val="tx2">
+                    <a:satMod val="155000"/>
+                  </a:schemeClr>
+                </a:solidFill>
+                <a:prstDash val="solid"/>
+              </a:ln>
+              <a:solidFill>
+                <a:schemeClr val="accent3">
+                  <a:lumMod val="60000"/>
+                  <a:lumOff val="40000"/>
+                </a:schemeClr>
+              </a:solidFill>
+              <a:effectLst>
+                <a:outerShdw blurRad="41275" dist="20320" dir="1800000" algn="tl" rotWithShape="0">
+                  <a:srgbClr val="000000">
+                    <a:alpha val="40000"/>
+                  </a:srgbClr>
+                </a:outerShdw>
+              </a:effectLst>
+            </a:endParaRPr>
+          </a:p>
+        </p:txBody>
+      </p:sp>
+      <p:sp>
+        <p:nvSpPr>
+          <p:cNvPr id="6" name="Rectangle 5"/>
+          <p:cNvSpPr/>
+          <p:nvPr/>
+        </p:nvSpPr>
+        <p:spPr>
+          <a:xfrm>
+            <a:off x="1120765" y="2148472"/>
+            <a:ext cx="1419079" cy="523220"/>
+          </a:xfrm>
+          <a:prstGeom prst="rect">
+            <a:avLst/>
+          </a:prstGeom>
+          <a:solidFill>
+            <a:schemeClr val="lt1"/>
+          </a:solidFill>
+          <a:ln w="28575" cmpd="sng">
+            <a:solidFill>
+              <a:schemeClr val="tx1"/>
+            </a:solidFill>
+          </a:ln>
+          <a:effectLst>
+            <a:glow rad="12700">
+              <a:schemeClr val="bg1">
+                <a:alpha val="75000"/>
+              </a:schemeClr>
+            </a:glow>
+            <a:outerShdw blurRad="95250" dist="25400" dir="6660000" sx="101000" sy="101000" algn="tl" rotWithShape="0">
+              <a:srgbClr val="000000">
+                <a:alpha val="43000"/>
+              </a:srgbClr>
+            </a:outerShdw>
+            <a:softEdge rad="88900"/>
+          </a:effectLst>
+        </p:spPr>
+        <p:style>
+          <a:lnRef idx="2">
+            <a:schemeClr val="dk1"/>
+          </a:lnRef>
+          <a:fillRef idx="1">
+            <a:schemeClr val="lt1"/>
+          </a:fillRef>
+          <a:effectRef idx="0">
+            <a:schemeClr val="dk1"/>
+          </a:effectRef>
+          <a:fontRef idx="minor">
+            <a:schemeClr val="dk1"/>
+          </a:fontRef>
+        </p:style>
+        <p:txBody>
+          <a:bodyPr wrap="square" lIns="91440" tIns="45720" rIns="91440" bIns="45720">
+            <a:spAutoFit/>
+          </a:bodyPr>
+          <a:lstStyle/>
+          <a:p>
+            <a:pPr algn="ctr"/>
+            <a:r>
+              <a:rPr lang="en-US" sz="2800" b="1" dirty="0" smtClean="0">
+                <a:ln w="12700">
+                  <a:solidFill>
+                    <a:schemeClr val="tx2">
+                      <a:satMod val="155000"/>
+                    </a:schemeClr>
+                  </a:solidFill>
+                  <a:prstDash val="solid"/>
+                </a:ln>
+                <a:solidFill>
+                  <a:schemeClr val="bg2">
+                    <a:tint val="85000"/>
+                    <a:satMod val="155000"/>
+                  </a:schemeClr>
+                </a:solidFill>
+                <a:effectLst>
+                  <a:outerShdw blurRad="41275" dist="20320" dir="1800000" algn="tl" rotWithShape="0">
+                    <a:srgbClr val="000000">
+                      <a:alpha val="40000"/>
+                    </a:srgbClr>
+                  </a:outerShdw>
+                </a:effectLst>
+              </a:rPr>
+              <a:t>$</a:t>
+            </a:r>
+            <a:r>
+              <a:rPr lang="en-US" sz="2400" b="1" dirty="0" smtClean="0">
+                <a:ln w="12700">
+                  <a:solidFill>
+                    <a:schemeClr val="tx2">
+                      <a:satMod val="155000"/>
+                    </a:schemeClr>
+                  </a:solidFill>
+                  <a:prstDash val="solid"/>
+                </a:ln>
+                <a:solidFill>
+                  <a:schemeClr val="bg2">
+                    <a:tint val="85000"/>
+                    <a:satMod val="155000"/>
+                  </a:schemeClr>
+                </a:solidFill>
+                <a:effectLst>
+                  <a:outerShdw blurRad="41275" dist="20320" dir="1800000" algn="tl" rotWithShape="0">
+                    <a:srgbClr val="000000">
+                      <a:alpha val="40000"/>
+                    </a:srgbClr>
+                  </a:outerShdw>
+                </a:effectLst>
+              </a:rPr>
+              <a:t>pristine</a:t>
+            </a:r>
+            <a:endParaRPr lang="en-US" sz="2400" b="1" dirty="0">
+              <a:ln w="12700">
+                <a:solidFill>
+                  <a:schemeClr val="tx2">
+                    <a:satMod val="155000"/>
+                  </a:schemeClr>
+                </a:solidFill>
+                <a:prstDash val="solid"/>
+              </a:ln>
+              <a:solidFill>
+                <a:schemeClr val="bg2">
+                  <a:tint val="85000"/>
+                  <a:satMod val="155000"/>
+                </a:schemeClr>
+              </a:solidFill>
+              <a:effectLst>
+                <a:outerShdw blurRad="41275" dist="20320" dir="1800000" algn="tl" rotWithShape="0">
+                  <a:srgbClr val="000000">
+                    <a:alpha val="40000"/>
+                  </a:srgbClr>
+                </a:outerShdw>
+              </a:effectLst>
+            </a:endParaRPr>
+          </a:p>
+        </p:txBody>
+      </p:sp>
+      <p:sp>
+        <p:nvSpPr>
+          <p:cNvPr id="9" name="Rectangle 8"/>
+          <p:cNvSpPr/>
+          <p:nvPr/>
+        </p:nvSpPr>
+        <p:spPr>
+          <a:xfrm>
+            <a:off x="3020381" y="2146846"/>
+            <a:ext cx="972434" cy="523220"/>
+          </a:xfrm>
+          <a:prstGeom prst="rect">
+            <a:avLst/>
+          </a:prstGeom>
+          <a:solidFill>
+            <a:schemeClr val="tx1">
+              <a:alpha val="16000"/>
+            </a:schemeClr>
+          </a:solidFill>
+          <a:ln w="19050" cmpd="sng"/>
+        </p:spPr>
+        <p:style>
+          <a:lnRef idx="1">
+            <a:schemeClr val="dk1"/>
+          </a:lnRef>
+          <a:fillRef idx="3">
+            <a:schemeClr val="dk1"/>
+          </a:fillRef>
+          <a:effectRef idx="2">
+            <a:schemeClr val="dk1"/>
+          </a:effectRef>
+          <a:fontRef idx="minor">
+            <a:schemeClr val="lt1"/>
+          </a:fontRef>
+        </p:style>
+        <p:txBody>
+          <a:bodyPr wrap="square" lIns="91440" tIns="45720" rIns="91440" bIns="45720">
+            <a:spAutoFit/>
+          </a:bodyPr>
+          <a:lstStyle/>
+          <a:p>
+            <a:pPr algn="ctr"/>
+            <a:r>
+              <a:rPr lang="en-US" sz="2800" b="1" dirty="0" smtClean="0">
+                <a:ln w="12700">
+                  <a:solidFill>
+                    <a:schemeClr val="tx2">
+                      <a:satMod val="155000"/>
+                    </a:schemeClr>
+                  </a:solidFill>
+                  <a:prstDash val="solid"/>
+                </a:ln>
+                <a:solidFill>
+                  <a:schemeClr val="bg2">
+                    <a:tint val="85000"/>
+                    <a:satMod val="155000"/>
+                  </a:schemeClr>
+                </a:solidFill>
+                <a:effectLst>
+                  <a:outerShdw blurRad="41275" dist="20320" dir="1800000" algn="tl" rotWithShape="0">
+                    <a:srgbClr val="000000">
+                      <a:alpha val="40000"/>
+                    </a:srgbClr>
+                  </a:outerShdw>
+                </a:effectLst>
+              </a:rPr>
+              <a:t>$</a:t>
+            </a:r>
+            <a:r>
+              <a:rPr lang="en-US" sz="2400" b="1" dirty="0" smtClean="0">
+                <a:ln w="12700">
+                  <a:solidFill>
+                    <a:schemeClr val="tx2">
+                      <a:satMod val="155000"/>
+                    </a:schemeClr>
+                  </a:solidFill>
+                  <a:prstDash val="solid"/>
+                </a:ln>
+                <a:solidFill>
+                  <a:schemeClr val="bg2">
+                    <a:tint val="85000"/>
+                    <a:satMod val="155000"/>
+                  </a:schemeClr>
+                </a:solidFill>
+                <a:effectLst>
+                  <a:outerShdw blurRad="41275" dist="20320" dir="1800000" algn="tl" rotWithShape="0">
+                    <a:srgbClr val="000000">
+                      <a:alpha val="40000"/>
+                    </a:srgbClr>
+                  </a:outerShdw>
+                </a:effectLst>
+              </a:rPr>
+              <a:t>dirty</a:t>
+            </a:r>
+            <a:endParaRPr lang="en-US" sz="2400" b="1" dirty="0">
+              <a:ln w="12700">
+                <a:solidFill>
+                  <a:schemeClr val="tx2">
+                    <a:satMod val="155000"/>
+                  </a:schemeClr>
+                </a:solidFill>
+                <a:prstDash val="solid"/>
+              </a:ln>
+              <a:solidFill>
+                <a:schemeClr val="bg2">
+                  <a:tint val="85000"/>
+                  <a:satMod val="155000"/>
+                </a:schemeClr>
+              </a:solidFill>
+              <a:effectLst>
+                <a:outerShdw blurRad="41275" dist="20320" dir="1800000" algn="tl" rotWithShape="0">
+                  <a:srgbClr val="000000">
+                    <a:alpha val="40000"/>
+                  </a:srgbClr>
+                </a:outerShdw>
+              </a:effectLst>
+            </a:endParaRPr>
+          </a:p>
+        </p:txBody>
+      </p:sp>
+    </p:spTree>
+    <p:extLst>
+      <p:ext uri="{BB962C8B-B14F-4D97-AF65-F5344CB8AC3E}">
+        <p14:creationId xmlns:p14="http://schemas.microsoft.com/office/powerpoint/2010/main" val="1116242600"/>
+      </p:ext>
+    </p:extLst>
+  </p:cSld>
+  <p:clrMapOvr>
+    <a:masterClrMapping/>
+  </p:clrMapOvr>
+  <p:timing>
+    <p:tnLst>
+      <p:par>
+        <p:cTn xmlns:p14="http://schemas.microsoft.com/office/powerpoint/2010/main" id="1" dur="indefinite" restart="never" nodeType="tmRoot">
+          <p:childTnLst>
+            <p:seq concurrent="1" nextAc="seek">
+              <p:cTn id="2" dur="indefinite" nodeType="mainSeq">
+                <p:childTnLst>
+                  <p:par>
+                    <p:cTn id="3" fill="hold">
+                      <p:stCondLst>
+                        <p:cond delay="indefinite"/>
+                        <p:cond evt="onBegin" delay="0">
+                          <p:tn val="2"/>
+                        </p:cond>
+                      </p:stCondLst>
+                      <p:childTnLst>
+                        <p:par>
+                          <p:cTn id="4" fill="hold">
+                            <p:stCondLst>
+                              <p:cond delay="0"/>
+                            </p:stCondLst>
+                            <p:childTnLst>
+                              <p:par>
+                                <p:cTn id="5" presetID="12" presetClass="entr" presetSubtype="4" fill="hold" grpId="0" nodeType="withEffect">
+                                  <p:stCondLst>
+                                    <p:cond delay="0"/>
+                                  </p:stCondLst>
+                                  <p:childTnLst>
+                                    <p:set>
+                                      <p:cBhvr>
+                                        <p:cTn id="6" dur="1" fill="hold">
+                                          <p:stCondLst>
+                                            <p:cond delay="0"/>
+                                          </p:stCondLst>
+                                        </p:cTn>
+                                        <p:tgtEl>
+                                          <p:spTgt spid="3">
+                                            <p:txEl>
+                                              <p:pRg st="0" end="0"/>
+                                            </p:txEl>
+                                          </p:spTgt>
+                                        </p:tgtEl>
+                                        <p:attrNameLst>
+                                          <p:attrName>style.visibility</p:attrName>
+                                        </p:attrNameLst>
+                                      </p:cBhvr>
+                                      <p:to>
+                                        <p:strVal val="visible"/>
+                                      </p:to>
+                                    </p:set>
+                                    <p:anim calcmode="lin" valueType="num">
+                                      <p:cBhvr additive="base">
+                                        <p:cTn id="7" dur="500"/>
+                                        <p:tgtEl>
+                                          <p:spTgt spid="3">
+                                            <p:txEl>
+                                              <p:pRg st="0" end="0"/>
+                                            </p:txEl>
+                                          </p:spTgt>
+                                        </p:tgtEl>
+                                        <p:attrNameLst>
+                                          <p:attrName>ppt_y</p:attrName>
+                                        </p:attrNameLst>
+                                      </p:cBhvr>
+                                      <p:tavLst>
+                                        <p:tav tm="0">
+                                          <p:val>
+                                            <p:strVal val="#ppt_y+#ppt_h*1.125000"/>
+                                          </p:val>
+                                        </p:tav>
+                                        <p:tav tm="100000">
+                                          <p:val>
+                                            <p:strVal val="#ppt_y"/>
+                                          </p:val>
+                                        </p:tav>
+                                      </p:tavLst>
+                                    </p:anim>
+                                    <p:animEffect transition="in" filter="wipe(up)">
+                                      <p:cBhvr>
+                                        <p:cTn id="8" dur="500"/>
+                                        <p:tgtEl>
+                                          <p:spTgt spid="3">
+                                            <p:txEl>
+                                              <p:pRg st="0" end="0"/>
+                                            </p:txEl>
+                                          </p:spTgt>
+                                        </p:tgtEl>
+                                      </p:cBhvr>
+                                    </p:animEffect>
+                                  </p:childTnLst>
+                                </p:cTn>
+                              </p:par>
+                            </p:childTnLst>
+                          </p:cTn>
+                        </p:par>
+                      </p:childTnLst>
+                    </p:cTn>
+                  </p:par>
+                  <p:par>
+                    <p:cTn id="9" fill="hold">
+                      <p:stCondLst>
+                        <p:cond delay="indefinite"/>
+                      </p:stCondLst>
+                      <p:childTnLst>
+                        <p:par>
+                          <p:cTn id="10" fill="hold">
+                            <p:stCondLst>
+                              <p:cond delay="0"/>
+                            </p:stCondLst>
+                            <p:childTnLst>
+                              <p:par>
+                                <p:cTn id="11" presetID="53" presetClass="entr" presetSubtype="16" fill="hold" grpId="0" nodeType="clickEffect">
+                                  <p:stCondLst>
+                                    <p:cond delay="0"/>
+                                  </p:stCondLst>
+                                  <p:childTnLst>
+                                    <p:set>
+                                      <p:cBhvr>
+                                        <p:cTn id="12" dur="1" fill="hold">
+                                          <p:stCondLst>
+                                            <p:cond delay="0"/>
+                                          </p:stCondLst>
+                                        </p:cTn>
+                                        <p:tgtEl>
+                                          <p:spTgt spid="6"/>
+                                        </p:tgtEl>
+                                        <p:attrNameLst>
+                                          <p:attrName>style.visibility</p:attrName>
+                                        </p:attrNameLst>
+                                      </p:cBhvr>
+                                      <p:to>
+                                        <p:strVal val="visible"/>
+                                      </p:to>
+                                    </p:set>
+                                    <p:anim calcmode="lin" valueType="num">
+                                      <p:cBhvr>
+                                        <p:cTn id="13" dur="500" fill="hold"/>
+                                        <p:tgtEl>
+                                          <p:spTgt spid="6"/>
+                                        </p:tgtEl>
+                                        <p:attrNameLst>
+                                          <p:attrName>ppt_w</p:attrName>
+                                        </p:attrNameLst>
+                                      </p:cBhvr>
+                                      <p:tavLst>
+                                        <p:tav tm="0">
+                                          <p:val>
+                                            <p:fltVal val="0"/>
+                                          </p:val>
+                                        </p:tav>
+                                        <p:tav tm="100000">
+                                          <p:val>
+                                            <p:strVal val="#ppt_w"/>
+                                          </p:val>
+                                        </p:tav>
+                                      </p:tavLst>
+                                    </p:anim>
+                                    <p:anim calcmode="lin" valueType="num">
+                                      <p:cBhvr>
+                                        <p:cTn id="14" dur="500" fill="hold"/>
+                                        <p:tgtEl>
+                                          <p:spTgt spid="6"/>
+                                        </p:tgtEl>
+                                        <p:attrNameLst>
+                                          <p:attrName>ppt_h</p:attrName>
+                                        </p:attrNameLst>
+                                      </p:cBhvr>
+                                      <p:tavLst>
+                                        <p:tav tm="0">
+                                          <p:val>
+                                            <p:fltVal val="0"/>
+                                          </p:val>
+                                        </p:tav>
+                                        <p:tav tm="100000">
+                                          <p:val>
+                                            <p:strVal val="#ppt_h"/>
+                                          </p:val>
+                                        </p:tav>
+                                      </p:tavLst>
+                                    </p:anim>
+                                    <p:animEffect transition="in" filter="fade">
+                                      <p:cBhvr>
+                                        <p:cTn id="15" dur="500"/>
+                                        <p:tgtEl>
+                                          <p:spTgt spid="6"/>
+                                        </p:tgtEl>
+                                      </p:cBhvr>
+                                    </p:animEffect>
+                                  </p:childTnLst>
+                                </p:cTn>
+                              </p:par>
+                              <p:par>
+                                <p:cTn id="16" presetID="53" presetClass="entr" presetSubtype="16" fill="hold" grpId="0" nodeType="withEffect">
+                                  <p:stCondLst>
+                                    <p:cond delay="0"/>
+                                  </p:stCondLst>
+                                  <p:childTnLst>
+                                    <p:set>
+                                      <p:cBhvr>
+                                        <p:cTn id="17" dur="1" fill="hold">
+                                          <p:stCondLst>
+                                            <p:cond delay="0"/>
+                                          </p:stCondLst>
+                                        </p:cTn>
+                                        <p:tgtEl>
+                                          <p:spTgt spid="9"/>
+                                        </p:tgtEl>
+                                        <p:attrNameLst>
+                                          <p:attrName>style.visibility</p:attrName>
+                                        </p:attrNameLst>
+                                      </p:cBhvr>
+                                      <p:to>
+                                        <p:strVal val="visible"/>
+                                      </p:to>
+                                    </p:set>
+                                    <p:anim calcmode="lin" valueType="num">
+                                      <p:cBhvr>
+                                        <p:cTn id="18" dur="500" fill="hold"/>
+                                        <p:tgtEl>
+                                          <p:spTgt spid="9"/>
+                                        </p:tgtEl>
+                                        <p:attrNameLst>
+                                          <p:attrName>ppt_w</p:attrName>
+                                        </p:attrNameLst>
+                                      </p:cBhvr>
+                                      <p:tavLst>
+                                        <p:tav tm="0">
+                                          <p:val>
+                                            <p:fltVal val="0"/>
+                                          </p:val>
+                                        </p:tav>
+                                        <p:tav tm="100000">
+                                          <p:val>
+                                            <p:strVal val="#ppt_w"/>
+                                          </p:val>
+                                        </p:tav>
+                                      </p:tavLst>
+                                    </p:anim>
+                                    <p:anim calcmode="lin" valueType="num">
+                                      <p:cBhvr>
+                                        <p:cTn id="19" dur="500" fill="hold"/>
+                                        <p:tgtEl>
+                                          <p:spTgt spid="9"/>
+                                        </p:tgtEl>
+                                        <p:attrNameLst>
+                                          <p:attrName>ppt_h</p:attrName>
+                                        </p:attrNameLst>
+                                      </p:cBhvr>
+                                      <p:tavLst>
+                                        <p:tav tm="0">
+                                          <p:val>
+                                            <p:fltVal val="0"/>
+                                          </p:val>
+                                        </p:tav>
+                                        <p:tav tm="100000">
+                                          <p:val>
+                                            <p:strVal val="#ppt_h"/>
+                                          </p:val>
+                                        </p:tav>
+                                      </p:tavLst>
+                                    </p:anim>
+                                    <p:animEffect transition="in" filter="fade">
+                                      <p:cBhvr>
+                                        <p:cTn id="20" dur="500"/>
+                                        <p:tgtEl>
+                                          <p:spTgt spid="9"/>
+                                        </p:tgtEl>
+                                      </p:cBhvr>
+                                    </p:animEffect>
+                                  </p:childTnLst>
+                                </p:cTn>
+                              </p:par>
+                              <p:par>
+                                <p:cTn id="21" presetID="53" presetClass="entr" presetSubtype="16" fill="hold" grpId="0" nodeType="withEffect">
+                                  <p:stCondLst>
+                                    <p:cond delay="0"/>
+                                  </p:stCondLst>
+                                  <p:childTnLst>
+                                    <p:set>
+                                      <p:cBhvr>
+                                        <p:cTn id="22" dur="1" fill="hold">
+                                          <p:stCondLst>
+                                            <p:cond delay="0"/>
+                                          </p:stCondLst>
+                                        </p:cTn>
+                                        <p:tgtEl>
+                                          <p:spTgt spid="5"/>
+                                        </p:tgtEl>
+                                        <p:attrNameLst>
+                                          <p:attrName>style.visibility</p:attrName>
+                                        </p:attrNameLst>
+                                      </p:cBhvr>
+                                      <p:to>
+                                        <p:strVal val="visible"/>
+                                      </p:to>
+                                    </p:set>
+                                    <p:anim calcmode="lin" valueType="num">
+                                      <p:cBhvr>
+                                        <p:cTn id="23" dur="500" fill="hold"/>
+                                        <p:tgtEl>
+                                          <p:spTgt spid="5"/>
+                                        </p:tgtEl>
+                                        <p:attrNameLst>
+                                          <p:attrName>ppt_w</p:attrName>
+                                        </p:attrNameLst>
+                                      </p:cBhvr>
+                                      <p:tavLst>
+                                        <p:tav tm="0">
+                                          <p:val>
+                                            <p:fltVal val="0"/>
+                                          </p:val>
+                                        </p:tav>
+                                        <p:tav tm="100000">
+                                          <p:val>
+                                            <p:strVal val="#ppt_w"/>
+                                          </p:val>
+                                        </p:tav>
+                                      </p:tavLst>
+                                    </p:anim>
+                                    <p:anim calcmode="lin" valueType="num">
+                                      <p:cBhvr>
+                                        <p:cTn id="24" dur="500" fill="hold"/>
+                                        <p:tgtEl>
+                                          <p:spTgt spid="5"/>
+                                        </p:tgtEl>
+                                        <p:attrNameLst>
+                                          <p:attrName>ppt_h</p:attrName>
+                                        </p:attrNameLst>
+                                      </p:cBhvr>
+                                      <p:tavLst>
+                                        <p:tav tm="0">
+                                          <p:val>
+                                            <p:fltVal val="0"/>
+                                          </p:val>
+                                        </p:tav>
+                                        <p:tav tm="100000">
+                                          <p:val>
+                                            <p:strVal val="#ppt_h"/>
+                                          </p:val>
+                                        </p:tav>
+                                      </p:tavLst>
+                                    </p:anim>
+                                    <p:animEffect transition="in" filter="fade">
+                                      <p:cBhvr>
+                                        <p:cTn id="25" dur="500"/>
+                                        <p:tgtEl>
+                                          <p:spTgt spid="5"/>
+                                        </p:tgtEl>
+                                      </p:cBhvr>
+                                    </p:animEffect>
+                                  </p:childTnLst>
+                                </p:cTn>
+                              </p:par>
+                              <p:par>
+                                <p:cTn id="26" presetID="53" presetClass="entr" presetSubtype="16" fill="hold" grpId="0" nodeType="withEffect">
+                                  <p:stCondLst>
+                                    <p:cond delay="0"/>
+                                  </p:stCondLst>
+                                  <p:childTnLst>
+                                    <p:set>
+                                      <p:cBhvr>
+                                        <p:cTn id="27" dur="1" fill="hold">
+                                          <p:stCondLst>
+                                            <p:cond delay="0"/>
+                                          </p:stCondLst>
+                                        </p:cTn>
+                                        <p:tgtEl>
+                                          <p:spTgt spid="4"/>
+                                        </p:tgtEl>
+                                        <p:attrNameLst>
+                                          <p:attrName>style.visibility</p:attrName>
+                                        </p:attrNameLst>
+                                      </p:cBhvr>
+                                      <p:to>
+                                        <p:strVal val="visible"/>
+                                      </p:to>
+                                    </p:set>
+                                    <p:anim calcmode="lin" valueType="num">
+                                      <p:cBhvr>
+                                        <p:cTn id="28" dur="500" fill="hold"/>
+                                        <p:tgtEl>
+                                          <p:spTgt spid="4"/>
+                                        </p:tgtEl>
+                                        <p:attrNameLst>
+                                          <p:attrName>ppt_w</p:attrName>
+                                        </p:attrNameLst>
+                                      </p:cBhvr>
+                                      <p:tavLst>
+                                        <p:tav tm="0">
+                                          <p:val>
+                                            <p:fltVal val="0"/>
+                                          </p:val>
+                                        </p:tav>
+                                        <p:tav tm="100000">
+                                          <p:val>
+                                            <p:strVal val="#ppt_w"/>
+                                          </p:val>
+                                        </p:tav>
+                                      </p:tavLst>
+                                    </p:anim>
+                                    <p:anim calcmode="lin" valueType="num">
+                                      <p:cBhvr>
+                                        <p:cTn id="29" dur="500" fill="hold"/>
+                                        <p:tgtEl>
+                                          <p:spTgt spid="4"/>
+                                        </p:tgtEl>
+                                        <p:attrNameLst>
+                                          <p:attrName>ppt_h</p:attrName>
+                                        </p:attrNameLst>
+                                      </p:cBhvr>
+                                      <p:tavLst>
+                                        <p:tav tm="0">
+                                          <p:val>
+                                            <p:fltVal val="0"/>
+                                          </p:val>
+                                        </p:tav>
+                                        <p:tav tm="100000">
+                                          <p:val>
+                                            <p:strVal val="#ppt_h"/>
+                                          </p:val>
+                                        </p:tav>
+                                      </p:tavLst>
+                                    </p:anim>
+                                    <p:animEffect transition="in" filter="fade">
+                                      <p:cBhvr>
+                                        <p:cTn id="30" dur="500"/>
+                                        <p:tgtEl>
+                                          <p:spTgt spid="4"/>
+                                        </p:tgtEl>
+                                      </p:cBhvr>
+                                    </p:animEffect>
+                                  </p:childTnLst>
+                                </p:cTn>
+                              </p:par>
+                            </p:childTnLst>
+                          </p:cTn>
+                        </p:par>
+                      </p:childTnLst>
+                    </p:cTn>
+                  </p:par>
+                  <p:par>
+                    <p:cTn id="31" fill="hold">
+                      <p:stCondLst>
+                        <p:cond delay="indefinite"/>
+                      </p:stCondLst>
+                      <p:childTnLst>
+                        <p:par>
+                          <p:cTn id="32" fill="hold">
+                            <p:stCondLst>
+                              <p:cond delay="0"/>
+                            </p:stCondLst>
+                            <p:childTnLst>
+                              <p:par>
+                                <p:cTn id="33" presetID="12" presetClass="entr" presetSubtype="4" fill="hold" grpId="0" nodeType="clickEffect">
+                                  <p:stCondLst>
+                                    <p:cond delay="0"/>
+                                  </p:stCondLst>
+                                  <p:childTnLst>
+                                    <p:set>
+                                      <p:cBhvr>
+                                        <p:cTn id="34" dur="1" fill="hold">
+                                          <p:stCondLst>
+                                            <p:cond delay="0"/>
+                                          </p:stCondLst>
+                                        </p:cTn>
+                                        <p:tgtEl>
+                                          <p:spTgt spid="3">
+                                            <p:txEl>
+                                              <p:pRg st="3" end="3"/>
+                                            </p:txEl>
+                                          </p:spTgt>
+                                        </p:tgtEl>
+                                        <p:attrNameLst>
+                                          <p:attrName>style.visibility</p:attrName>
+                                        </p:attrNameLst>
+                                      </p:cBhvr>
+                                      <p:to>
+                                        <p:strVal val="visible"/>
+                                      </p:to>
+                                    </p:set>
+                                    <p:anim calcmode="lin" valueType="num">
+                                      <p:cBhvr additive="base">
+                                        <p:cTn id="35" dur="500"/>
+                                        <p:tgtEl>
+                                          <p:spTgt spid="3">
+                                            <p:txEl>
+                                              <p:pRg st="3" end="3"/>
+                                            </p:txEl>
+                                          </p:spTgt>
+                                        </p:tgtEl>
+                                        <p:attrNameLst>
+                                          <p:attrName>ppt_y</p:attrName>
+                                        </p:attrNameLst>
+                                      </p:cBhvr>
+                                      <p:tavLst>
+                                        <p:tav tm="0">
+                                          <p:val>
+                                            <p:strVal val="#ppt_y+#ppt_h*1.125000"/>
+                                          </p:val>
+                                        </p:tav>
+                                        <p:tav tm="100000">
+                                          <p:val>
+                                            <p:strVal val="#ppt_y"/>
+                                          </p:val>
+                                        </p:tav>
+                                      </p:tavLst>
+                                    </p:anim>
+                                    <p:animEffect transition="in" filter="wipe(up)">
+                                      <p:cBhvr>
+                                        <p:cTn id="36" dur="500"/>
+                                        <p:tgtEl>
+                                          <p:spTgt spid="3">
+                                            <p:txEl>
+                                              <p:pRg st="3" end="3"/>
+                                            </p:txEl>
+                                          </p:spTgt>
+                                        </p:tgtEl>
+                                      </p:cBhvr>
+                                    </p:animEffect>
+                                  </p:childTnLst>
+                                </p:cTn>
+                              </p:par>
+                            </p:childTnLst>
+                          </p:cTn>
+                        </p:par>
+                      </p:childTnLst>
+                    </p:cTn>
+                  </p:par>
+                  <p:par>
+                    <p:cTn id="37" fill="hold">
+                      <p:stCondLst>
+                        <p:cond delay="indefinite"/>
+                      </p:stCondLst>
+                      <p:childTnLst>
+                        <p:par>
+                          <p:cTn id="38" fill="hold">
+                            <p:stCondLst>
+                              <p:cond delay="0"/>
+                            </p:stCondLst>
+                            <p:childTnLst>
+                              <p:par>
+                                <p:cTn id="39" presetID="12" presetClass="entr" presetSubtype="4" fill="hold" grpId="0" nodeType="clickEffect">
+                                  <p:stCondLst>
+                                    <p:cond delay="0"/>
+                                  </p:stCondLst>
+                                  <p:childTnLst>
+                                    <p:set>
+                                      <p:cBhvr>
+                                        <p:cTn id="40" dur="1" fill="hold">
+                                          <p:stCondLst>
+                                            <p:cond delay="0"/>
+                                          </p:stCondLst>
+                                        </p:cTn>
+                                        <p:tgtEl>
+                                          <p:spTgt spid="3">
+                                            <p:txEl>
+                                              <p:pRg st="4" end="4"/>
+                                            </p:txEl>
+                                          </p:spTgt>
+                                        </p:tgtEl>
+                                        <p:attrNameLst>
+                                          <p:attrName>style.visibility</p:attrName>
+                                        </p:attrNameLst>
+                                      </p:cBhvr>
+                                      <p:to>
+                                        <p:strVal val="visible"/>
+                                      </p:to>
+                                    </p:set>
+                                    <p:anim calcmode="lin" valueType="num">
+                                      <p:cBhvr additive="base">
+                                        <p:cTn id="41" dur="500"/>
+                                        <p:tgtEl>
+                                          <p:spTgt spid="3">
+                                            <p:txEl>
+                                              <p:pRg st="4" end="4"/>
+                                            </p:txEl>
+                                          </p:spTgt>
+                                        </p:tgtEl>
+                                        <p:attrNameLst>
+                                          <p:attrName>ppt_y</p:attrName>
+                                        </p:attrNameLst>
+                                      </p:cBhvr>
+                                      <p:tavLst>
+                                        <p:tav tm="0">
+                                          <p:val>
+                                            <p:strVal val="#ppt_y+#ppt_h*1.125000"/>
+                                          </p:val>
+                                        </p:tav>
+                                        <p:tav tm="100000">
+                                          <p:val>
+                                            <p:strVal val="#ppt_y"/>
+                                          </p:val>
+                                        </p:tav>
+                                      </p:tavLst>
+                                    </p:anim>
+                                    <p:animEffect transition="in" filter="wipe(up)">
+                                      <p:cBhvr>
+                                        <p:cTn id="42" dur="500"/>
+                                        <p:tgtEl>
+                                          <p:spTgt spid="3">
+                                            <p:txEl>
+                                              <p:pRg st="4" end="4"/>
+                                            </p:txEl>
+                                          </p:spTgt>
+                                        </p:tgtEl>
+                                      </p:cBhvr>
+                                    </p:animEffect>
+                                  </p:childTnLst>
+                                </p:cTn>
+                              </p:par>
+                              <p:par>
+                                <p:cTn id="43" presetID="12" presetClass="entr" presetSubtype="4" fill="hold" grpId="0" nodeType="withEffect">
+                                  <p:stCondLst>
+                                    <p:cond delay="0"/>
+                                  </p:stCondLst>
+                                  <p:childTnLst>
+                                    <p:set>
+                                      <p:cBhvr>
+                                        <p:cTn id="44" dur="1" fill="hold">
+                                          <p:stCondLst>
+                                            <p:cond delay="0"/>
+                                          </p:stCondLst>
+                                        </p:cTn>
+                                        <p:tgtEl>
+                                          <p:spTgt spid="3">
+                                            <p:txEl>
+                                              <p:pRg st="5" end="5"/>
+                                            </p:txEl>
+                                          </p:spTgt>
+                                        </p:tgtEl>
+                                        <p:attrNameLst>
+                                          <p:attrName>style.visibility</p:attrName>
+                                        </p:attrNameLst>
+                                      </p:cBhvr>
+                                      <p:to>
+                                        <p:strVal val="visible"/>
+                                      </p:to>
+                                    </p:set>
+                                    <p:anim calcmode="lin" valueType="num">
+                                      <p:cBhvr additive="base">
+                                        <p:cTn id="45" dur="500"/>
+                                        <p:tgtEl>
+                                          <p:spTgt spid="3">
+                                            <p:txEl>
+                                              <p:pRg st="5" end="5"/>
+                                            </p:txEl>
+                                          </p:spTgt>
+                                        </p:tgtEl>
+                                        <p:attrNameLst>
+                                          <p:attrName>ppt_y</p:attrName>
+                                        </p:attrNameLst>
+                                      </p:cBhvr>
+                                      <p:tavLst>
+                                        <p:tav tm="0">
+                                          <p:val>
+                                            <p:strVal val="#ppt_y+#ppt_h*1.125000"/>
+                                          </p:val>
+                                        </p:tav>
+                                        <p:tav tm="100000">
+                                          <p:val>
+                                            <p:strVal val="#ppt_y"/>
+                                          </p:val>
+                                        </p:tav>
+                                      </p:tavLst>
+                                    </p:anim>
+                                    <p:animEffect transition="in" filter="wipe(up)">
+                                      <p:cBhvr>
+                                        <p:cTn id="46" dur="500"/>
+                                        <p:tgtEl>
+                                          <p:spTgt spid="3">
+                                            <p:txEl>
+                                              <p:pRg st="5" end="5"/>
+                                            </p:txEl>
+                                          </p:spTgt>
+                                        </p:tgtEl>
+                                      </p:cBhvr>
+                                    </p:animEffect>
+                                  </p:childTnLst>
+                                </p:cTn>
+                              </p:par>
+                              <p:par>
+                                <p:cTn id="47" presetID="12" presetClass="entr" presetSubtype="4" fill="hold" grpId="0" nodeType="withEffect">
+                                  <p:stCondLst>
+                                    <p:cond delay="0"/>
+                                  </p:stCondLst>
+                                  <p:childTnLst>
+                                    <p:set>
+                                      <p:cBhvr>
+                                        <p:cTn id="48" dur="1" fill="hold">
+                                          <p:stCondLst>
+                                            <p:cond delay="0"/>
+                                          </p:stCondLst>
+                                        </p:cTn>
+                                        <p:tgtEl>
+                                          <p:spTgt spid="3">
+                                            <p:txEl>
+                                              <p:pRg st="6" end="6"/>
+                                            </p:txEl>
+                                          </p:spTgt>
+                                        </p:tgtEl>
+                                        <p:attrNameLst>
+                                          <p:attrName>style.visibility</p:attrName>
+                                        </p:attrNameLst>
+                                      </p:cBhvr>
+                                      <p:to>
+                                        <p:strVal val="visible"/>
+                                      </p:to>
+                                    </p:set>
+                                    <p:anim calcmode="lin" valueType="num">
+                                      <p:cBhvr additive="base">
+                                        <p:cTn id="49" dur="500"/>
+                                        <p:tgtEl>
+                                          <p:spTgt spid="3">
+                                            <p:txEl>
+                                              <p:pRg st="6" end="6"/>
+                                            </p:txEl>
+                                          </p:spTgt>
+                                        </p:tgtEl>
+                                        <p:attrNameLst>
+                                          <p:attrName>ppt_y</p:attrName>
+                                        </p:attrNameLst>
+                                      </p:cBhvr>
+                                      <p:tavLst>
+                                        <p:tav tm="0">
+                                          <p:val>
+                                            <p:strVal val="#ppt_y+#ppt_h*1.125000"/>
+                                          </p:val>
+                                        </p:tav>
+                                        <p:tav tm="100000">
+                                          <p:val>
+                                            <p:strVal val="#ppt_y"/>
+                                          </p:val>
+                                        </p:tav>
+                                      </p:tavLst>
+                                    </p:anim>
+                                    <p:animEffect transition="in" filter="wipe(up)">
+                                      <p:cBhvr>
+                                        <p:cTn id="50" dur="500"/>
+                                        <p:tgtEl>
+                                          <p:spTgt spid="3">
+                                            <p:txEl>
+                                              <p:pRg st="6" end="6"/>
+                                            </p:txEl>
+                                          </p:spTgt>
+                                        </p:tgtEl>
+                                      </p:cBhvr>
+                                    </p:animEffect>
+                                  </p:childTnLst>
+                                </p:cTn>
+                              </p:par>
+                            </p:childTnLst>
+                          </p:cTn>
+                        </p:par>
+                      </p:childTnLst>
+                    </p:cTn>
+                  </p:par>
+                  <p:par>
+                    <p:cTn id="51" fill="hold">
+                      <p:stCondLst>
+                        <p:cond delay="indefinite"/>
+                      </p:stCondLst>
+                      <p:childTnLst>
+                        <p:par>
+                          <p:cTn id="52" fill="hold">
+                            <p:stCondLst>
+                              <p:cond delay="0"/>
+                            </p:stCondLst>
+                            <p:childTnLst>
+                              <p:par>
+                                <p:cTn id="53" presetID="12" presetClass="entr" presetSubtype="4" fill="hold" grpId="0" nodeType="clickEffect">
+                                  <p:stCondLst>
+                                    <p:cond delay="0"/>
+                                  </p:stCondLst>
+                                  <p:childTnLst>
+                                    <p:set>
+                                      <p:cBhvr>
+                                        <p:cTn id="54" dur="1" fill="hold">
+                                          <p:stCondLst>
+                                            <p:cond delay="0"/>
+                                          </p:stCondLst>
+                                        </p:cTn>
+                                        <p:tgtEl>
+                                          <p:spTgt spid="3">
+                                            <p:txEl>
+                                              <p:pRg st="7" end="7"/>
+                                            </p:txEl>
+                                          </p:spTgt>
+                                        </p:tgtEl>
+                                        <p:attrNameLst>
+                                          <p:attrName>style.visibility</p:attrName>
+                                        </p:attrNameLst>
+                                      </p:cBhvr>
+                                      <p:to>
+                                        <p:strVal val="visible"/>
+                                      </p:to>
+                                    </p:set>
+                                    <p:anim calcmode="lin" valueType="num">
+                                      <p:cBhvr additive="base">
+                                        <p:cTn id="55" dur="500"/>
+                                        <p:tgtEl>
+                                          <p:spTgt spid="3">
+                                            <p:txEl>
+                                              <p:pRg st="7" end="7"/>
+                                            </p:txEl>
+                                          </p:spTgt>
+                                        </p:tgtEl>
+                                        <p:attrNameLst>
+                                          <p:attrName>ppt_y</p:attrName>
+                                        </p:attrNameLst>
+                                      </p:cBhvr>
+                                      <p:tavLst>
+                                        <p:tav tm="0">
+                                          <p:val>
+                                            <p:strVal val="#ppt_y+#ppt_h*1.125000"/>
+                                          </p:val>
+                                        </p:tav>
+                                        <p:tav tm="100000">
+                                          <p:val>
+                                            <p:strVal val="#ppt_y"/>
+                                          </p:val>
+                                        </p:tav>
+                                      </p:tavLst>
+                                    </p:anim>
+                                    <p:animEffect transition="in" filter="wipe(up)">
+                                      <p:cBhvr>
+                                        <p:cTn id="56" dur="500"/>
+                                        <p:tgtEl>
+                                          <p:spTgt spid="3">
+                                            <p:txEl>
+                                              <p:pRg st="7" end="7"/>
+                                            </p:txEl>
+                                          </p:spTgt>
+                                        </p:tgtEl>
+                                      </p:cBhvr>
+                                    </p:animEffect>
+                                  </p:childTnLst>
+                                </p:cTn>
+                              </p:par>
+                              <p:par>
+                                <p:cTn id="57" presetID="12" presetClass="entr" presetSubtype="4" fill="hold" grpId="0" nodeType="withEffect">
+                                  <p:stCondLst>
+                                    <p:cond delay="0"/>
+                                  </p:stCondLst>
+                                  <p:childTnLst>
+                                    <p:set>
+                                      <p:cBhvr>
+                                        <p:cTn id="58" dur="1" fill="hold">
+                                          <p:stCondLst>
+                                            <p:cond delay="0"/>
+                                          </p:stCondLst>
+                                        </p:cTn>
+                                        <p:tgtEl>
+                                          <p:spTgt spid="3">
+                                            <p:txEl>
+                                              <p:pRg st="8" end="8"/>
+                                            </p:txEl>
+                                          </p:spTgt>
+                                        </p:tgtEl>
+                                        <p:attrNameLst>
+                                          <p:attrName>style.visibility</p:attrName>
+                                        </p:attrNameLst>
+                                      </p:cBhvr>
+                                      <p:to>
+                                        <p:strVal val="visible"/>
+                                      </p:to>
+                                    </p:set>
+                                    <p:anim calcmode="lin" valueType="num">
+                                      <p:cBhvr additive="base">
+                                        <p:cTn id="59" dur="500"/>
+                                        <p:tgtEl>
+                                          <p:spTgt spid="3">
+                                            <p:txEl>
+                                              <p:pRg st="8" end="8"/>
+                                            </p:txEl>
+                                          </p:spTgt>
+                                        </p:tgtEl>
+                                        <p:attrNameLst>
+                                          <p:attrName>ppt_y</p:attrName>
+                                        </p:attrNameLst>
+                                      </p:cBhvr>
+                                      <p:tavLst>
+                                        <p:tav tm="0">
+                                          <p:val>
+                                            <p:strVal val="#ppt_y+#ppt_h*1.125000"/>
+                                          </p:val>
+                                        </p:tav>
+                                        <p:tav tm="100000">
+                                          <p:val>
+                                            <p:strVal val="#ppt_y"/>
+                                          </p:val>
+                                        </p:tav>
+                                      </p:tavLst>
+                                    </p:anim>
+                                    <p:animEffect transition="in" filter="wipe(up)">
+                                      <p:cBhvr>
+                                        <p:cTn id="60" dur="500"/>
+                                        <p:tgtEl>
+                                          <p:spTgt spid="3">
+                                            <p:txEl>
+                                              <p:pRg st="8" end="8"/>
+                                            </p:txEl>
+                                          </p:spTgt>
+                                        </p:tgtEl>
+                                      </p:cBhvr>
+                                    </p:animEffect>
+                                  </p:childTnLst>
+                                </p:cTn>
+                              </p:par>
+                              <p:par>
+                                <p:cTn id="61" presetID="12" presetClass="entr" presetSubtype="4" fill="hold" grpId="0" nodeType="withEffect">
+                                  <p:stCondLst>
+                                    <p:cond delay="0"/>
+                                  </p:stCondLst>
+                                  <p:childTnLst>
+                                    <p:set>
+                                      <p:cBhvr>
+                                        <p:cTn id="62" dur="1" fill="hold">
+                                          <p:stCondLst>
+                                            <p:cond delay="0"/>
+                                          </p:stCondLst>
+                                        </p:cTn>
+                                        <p:tgtEl>
+                                          <p:spTgt spid="3">
+                                            <p:txEl>
+                                              <p:pRg st="9" end="9"/>
+                                            </p:txEl>
+                                          </p:spTgt>
+                                        </p:tgtEl>
+                                        <p:attrNameLst>
+                                          <p:attrName>style.visibility</p:attrName>
+                                        </p:attrNameLst>
+                                      </p:cBhvr>
+                                      <p:to>
+                                        <p:strVal val="visible"/>
+                                      </p:to>
+                                    </p:set>
+                                    <p:anim calcmode="lin" valueType="num">
+                                      <p:cBhvr additive="base">
+                                        <p:cTn id="63" dur="500"/>
+                                        <p:tgtEl>
+                                          <p:spTgt spid="3">
+                                            <p:txEl>
+                                              <p:pRg st="9" end="9"/>
+                                            </p:txEl>
+                                          </p:spTgt>
+                                        </p:tgtEl>
+                                        <p:attrNameLst>
+                                          <p:attrName>ppt_y</p:attrName>
+                                        </p:attrNameLst>
+                                      </p:cBhvr>
+                                      <p:tavLst>
+                                        <p:tav tm="0">
+                                          <p:val>
+                                            <p:strVal val="#ppt_y+#ppt_h*1.125000"/>
+                                          </p:val>
+                                        </p:tav>
+                                        <p:tav tm="100000">
+                                          <p:val>
+                                            <p:strVal val="#ppt_y"/>
+                                          </p:val>
+                                        </p:tav>
+                                      </p:tavLst>
+                                    </p:anim>
+                                    <p:animEffect transition="in" filter="wipe(up)">
+                                      <p:cBhvr>
+                                        <p:cTn id="64" dur="500"/>
+                                        <p:tgtEl>
+                                          <p:spTgt spid="3">
+                                            <p:txEl>
+                                              <p:pRg st="9" end="9"/>
+                                            </p:txEl>
+                                          </p:spTgt>
+                                        </p:tgtEl>
+                                      </p:cBhvr>
+                                    </p:animEffect>
+                                  </p:childTnLst>
+                                </p:cTn>
+                              </p:par>
+                            </p:childTnLst>
+                          </p:cTn>
+                        </p:par>
+                      </p:childTnLst>
+                    </p:cTn>
+                  </p:par>
+                  <p:par>
+                    <p:cTn id="65" fill="hold">
+                      <p:stCondLst>
+                        <p:cond delay="indefinite"/>
+                      </p:stCondLst>
+                      <p:childTnLst>
+                        <p:par>
+                          <p:cTn id="66" fill="hold">
+                            <p:stCondLst>
+                              <p:cond delay="0"/>
+                            </p:stCondLst>
+                            <p:childTnLst>
+                              <p:par>
+                                <p:cTn id="67" presetID="12" presetClass="entr" presetSubtype="4" fill="hold" grpId="0" nodeType="clickEffect">
+                                  <p:stCondLst>
+                                    <p:cond delay="0"/>
+                                  </p:stCondLst>
+                                  <p:childTnLst>
+                                    <p:set>
+                                      <p:cBhvr>
+                                        <p:cTn id="68" dur="1" fill="hold">
+                                          <p:stCondLst>
+                                            <p:cond delay="0"/>
+                                          </p:stCondLst>
+                                        </p:cTn>
+                                        <p:tgtEl>
+                                          <p:spTgt spid="3">
+                                            <p:txEl>
+                                              <p:pRg st="10" end="10"/>
+                                            </p:txEl>
+                                          </p:spTgt>
+                                        </p:tgtEl>
+                                        <p:attrNameLst>
+                                          <p:attrName>style.visibility</p:attrName>
+                                        </p:attrNameLst>
+                                      </p:cBhvr>
+                                      <p:to>
+                                        <p:strVal val="visible"/>
+                                      </p:to>
+                                    </p:set>
+                                    <p:anim calcmode="lin" valueType="num">
+                                      <p:cBhvr additive="base">
+                                        <p:cTn id="69" dur="500"/>
+                                        <p:tgtEl>
+                                          <p:spTgt spid="3">
+                                            <p:txEl>
+                                              <p:pRg st="10" end="10"/>
+                                            </p:txEl>
+                                          </p:spTgt>
+                                        </p:tgtEl>
+                                        <p:attrNameLst>
+                                          <p:attrName>ppt_y</p:attrName>
+                                        </p:attrNameLst>
+                                      </p:cBhvr>
+                                      <p:tavLst>
+                                        <p:tav tm="0">
+                                          <p:val>
+                                            <p:strVal val="#ppt_y+#ppt_h*1.125000"/>
+                                          </p:val>
+                                        </p:tav>
+                                        <p:tav tm="100000">
+                                          <p:val>
+                                            <p:strVal val="#ppt_y"/>
+                                          </p:val>
+                                        </p:tav>
+                                      </p:tavLst>
+                                    </p:anim>
+                                    <p:animEffect transition="in" filter="wipe(up)">
+                                      <p:cBhvr>
+                                        <p:cTn id="70" dur="500"/>
+                                        <p:tgtEl>
+                                          <p:spTgt spid="3">
+                                            <p:txEl>
+                                              <p:pRg st="10" end="10"/>
+                                            </p:txEl>
+                                          </p:spTgt>
+                                        </p:tgtEl>
+                                      </p:cBhvr>
+                                    </p:animEffect>
+                                  </p:childTnLst>
+                                </p:cTn>
+                              </p:par>
+                              <p:par>
+                                <p:cTn id="71" presetID="12" presetClass="entr" presetSubtype="4" fill="hold" grpId="0" nodeType="withEffect">
+                                  <p:stCondLst>
+                                    <p:cond delay="0"/>
+                                  </p:stCondLst>
+                                  <p:childTnLst>
+                                    <p:set>
+                                      <p:cBhvr>
+                                        <p:cTn id="72" dur="1" fill="hold">
+                                          <p:stCondLst>
+                                            <p:cond delay="0"/>
+                                          </p:stCondLst>
+                                        </p:cTn>
+                                        <p:tgtEl>
+                                          <p:spTgt spid="3">
+                                            <p:txEl>
+                                              <p:pRg st="11" end="11"/>
+                                            </p:txEl>
+                                          </p:spTgt>
+                                        </p:tgtEl>
+                                        <p:attrNameLst>
+                                          <p:attrName>style.visibility</p:attrName>
+                                        </p:attrNameLst>
+                                      </p:cBhvr>
+                                      <p:to>
+                                        <p:strVal val="visible"/>
+                                      </p:to>
+                                    </p:set>
+                                    <p:anim calcmode="lin" valueType="num">
+                                      <p:cBhvr additive="base">
+                                        <p:cTn id="73" dur="500"/>
+                                        <p:tgtEl>
+                                          <p:spTgt spid="3">
+                                            <p:txEl>
+                                              <p:pRg st="11" end="11"/>
+                                            </p:txEl>
+                                          </p:spTgt>
+                                        </p:tgtEl>
+                                        <p:attrNameLst>
+                                          <p:attrName>ppt_y</p:attrName>
+                                        </p:attrNameLst>
+                                      </p:cBhvr>
+                                      <p:tavLst>
+                                        <p:tav tm="0">
+                                          <p:val>
+                                            <p:strVal val="#ppt_y+#ppt_h*1.125000"/>
+                                          </p:val>
+                                        </p:tav>
+                                        <p:tav tm="100000">
+                                          <p:val>
+                                            <p:strVal val="#ppt_y"/>
+                                          </p:val>
+                                        </p:tav>
+                                      </p:tavLst>
+                                    </p:anim>
+                                    <p:animEffect transition="in" filter="wipe(up)">
+                                      <p:cBhvr>
+                                        <p:cTn id="74" dur="500"/>
+                                        <p:tgtEl>
+                                          <p:spTgt spid="3">
+                                            <p:txEl>
+                                              <p:pRg st="11" end="11"/>
+                                            </p:txEl>
+                                          </p:spTgt>
+                                        </p:tgtEl>
+                                      </p:cBhvr>
+                                    </p:animEffect>
+                                  </p:childTnLst>
+                                </p:cTn>
+                              </p:par>
+                              <p:par>
+                                <p:cTn id="75" presetID="12" presetClass="entr" presetSubtype="4" fill="hold" grpId="0" nodeType="withEffect">
+                                  <p:stCondLst>
+                                    <p:cond delay="0"/>
+                                  </p:stCondLst>
+                                  <p:childTnLst>
+                                    <p:set>
+                                      <p:cBhvr>
+                                        <p:cTn id="76" dur="1" fill="hold">
+                                          <p:stCondLst>
+                                            <p:cond delay="0"/>
+                                          </p:stCondLst>
+                                        </p:cTn>
+                                        <p:tgtEl>
+                                          <p:spTgt spid="3">
+                                            <p:txEl>
+                                              <p:pRg st="12" end="12"/>
+                                            </p:txEl>
+                                          </p:spTgt>
+                                        </p:tgtEl>
+                                        <p:attrNameLst>
+                                          <p:attrName>style.visibility</p:attrName>
+                                        </p:attrNameLst>
+                                      </p:cBhvr>
+                                      <p:to>
+                                        <p:strVal val="visible"/>
+                                      </p:to>
+                                    </p:set>
+                                    <p:anim calcmode="lin" valueType="num">
+                                      <p:cBhvr additive="base">
+                                        <p:cTn id="77" dur="500"/>
+                                        <p:tgtEl>
+                                          <p:spTgt spid="3">
+                                            <p:txEl>
+                                              <p:pRg st="12" end="12"/>
+                                            </p:txEl>
+                                          </p:spTgt>
+                                        </p:tgtEl>
+                                        <p:attrNameLst>
+                                          <p:attrName>ppt_y</p:attrName>
+                                        </p:attrNameLst>
+                                      </p:cBhvr>
+                                      <p:tavLst>
+                                        <p:tav tm="0">
+                                          <p:val>
+                                            <p:strVal val="#ppt_y+#ppt_h*1.125000"/>
+                                          </p:val>
+                                        </p:tav>
+                                        <p:tav tm="100000">
+                                          <p:val>
+                                            <p:strVal val="#ppt_y"/>
+                                          </p:val>
+                                        </p:tav>
+                                      </p:tavLst>
+                                    </p:anim>
+                                    <p:animEffect transition="in" filter="wipe(up)">
+                                      <p:cBhvr>
+                                        <p:cTn id="78" dur="500"/>
+                                        <p:tgtEl>
+                                          <p:spTgt spid="3">
+                                            <p:txEl>
+                                              <p:pRg st="12" end="12"/>
+                                            </p:txEl>
+                                          </p:spTgt>
+                                        </p:tgtEl>
+                                      </p:cBhvr>
+                                    </p:animEffect>
+                                  </p:childTnLst>
+                                </p:cTn>
+                              </p:par>
+                            </p:childTnLst>
+                          </p:cTn>
+                        </p:par>
+                      </p:childTnLst>
+                    </p:cTn>
+                  </p:par>
+                  <p:par>
+                    <p:cTn id="79" fill="hold">
+                      <p:stCondLst>
+                        <p:cond delay="indefinite"/>
+                      </p:stCondLst>
+                      <p:childTnLst>
+                        <p:par>
+                          <p:cTn id="80" fill="hold">
+                            <p:stCondLst>
+                              <p:cond delay="0"/>
+                            </p:stCondLst>
+                            <p:childTnLst>
+                              <p:par>
+                                <p:cTn id="81" presetID="12" presetClass="entr" presetSubtype="4" fill="hold" grpId="0" nodeType="clickEffect">
+                                  <p:stCondLst>
+                                    <p:cond delay="0"/>
+                                  </p:stCondLst>
+                                  <p:childTnLst>
+                                    <p:set>
+                                      <p:cBhvr>
+                                        <p:cTn id="82" dur="1" fill="hold">
+                                          <p:stCondLst>
+                                            <p:cond delay="0"/>
+                                          </p:stCondLst>
+                                        </p:cTn>
+                                        <p:tgtEl>
+                                          <p:spTgt spid="3">
+                                            <p:txEl>
+                                              <p:pRg st="13" end="13"/>
+                                            </p:txEl>
+                                          </p:spTgt>
+                                        </p:tgtEl>
+                                        <p:attrNameLst>
+                                          <p:attrName>style.visibility</p:attrName>
+                                        </p:attrNameLst>
+                                      </p:cBhvr>
+                                      <p:to>
+                                        <p:strVal val="visible"/>
+                                      </p:to>
+                                    </p:set>
+                                    <p:anim calcmode="lin" valueType="num">
+                                      <p:cBhvr additive="base">
+                                        <p:cTn id="83" dur="500"/>
+                                        <p:tgtEl>
+                                          <p:spTgt spid="3">
+                                            <p:txEl>
+                                              <p:pRg st="13" end="13"/>
+                                            </p:txEl>
+                                          </p:spTgt>
+                                        </p:tgtEl>
+                                        <p:attrNameLst>
+                                          <p:attrName>ppt_y</p:attrName>
+                                        </p:attrNameLst>
+                                      </p:cBhvr>
+                                      <p:tavLst>
+                                        <p:tav tm="0">
+                                          <p:val>
+                                            <p:strVal val="#ppt_y+#ppt_h*1.125000"/>
+                                          </p:val>
+                                        </p:tav>
+                                        <p:tav tm="100000">
+                                          <p:val>
+                                            <p:strVal val="#ppt_y"/>
+                                          </p:val>
+                                        </p:tav>
+                                      </p:tavLst>
+                                    </p:anim>
+                                    <p:animEffect transition="in" filter="wipe(up)">
+                                      <p:cBhvr>
+                                        <p:cTn id="84" dur="500"/>
+                                        <p:tgtEl>
+                                          <p:spTgt spid="3">
+                                            <p:txEl>
+                                              <p:pRg st="13" end="13"/>
+                                            </p:txEl>
+                                          </p:spTgt>
+                                        </p:tgtEl>
+                                      </p:cBhvr>
+                                    </p:animEffect>
+                                  </p:childTnLst>
+                                </p:cTn>
+                              </p:par>
+                            </p:childTnLst>
+                          </p:cTn>
+                        </p:par>
+                      </p:childTnLst>
+                    </p:cTn>
+                  </p:par>
+                </p:childTnLst>
+              </p:cTn>
+              <p:prevCondLst>
+                <p:cond evt="onPrev" delay="0">
+                  <p:tgtEl>
+                    <p:sldTgt/>
+                  </p:tgtEl>
+                </p:cond>
+              </p:prevCondLst>
+              <p:nextCondLst>
+                <p:cond evt="onNext" delay="0">
+                  <p:tgtEl>
+                    <p:sldTgt/>
+                  </p:tgtEl>
+                </p:cond>
+              </p:nextCondLst>
+            </p:seq>
+          </p:childTnLst>
+        </p:cTn>
+      </p:par>
+    </p:tnLst>
+    <p:bldLst>
+      <p:bldP spid="3" grpId="0" build="p"/>
+      <p:bldP spid="4" grpId="0" animBg="1"/>
+      <p:bldP spid="5" grpId="0" animBg="1"/>
+      <p:bldP spid="6" grpId="0" animBg="1"/>
+      <p:bldP spid="9" grpId="0" animBg="1"/>
+    </p:bldLst>
+  </p:timing>
+</p:sld>
+</file>
+
+<file path=ppt/slides/slide22.xml><?xml version="1.0" encoding="utf-8"?>
+<p:sld xmlns:a="http://schemas.openxmlformats.org/drawingml/2006/main" xmlns:r="http://schemas.openxmlformats.org/officeDocument/2006/relationships" xmlns:p="http://schemas.openxmlformats.org/presentationml/2006/main">
+  <p:cSld>
+    <p:spTree>
+      <p:nvGrpSpPr>
+        <p:cNvPr id="1" name=""/>
+        <p:cNvGrpSpPr/>
+        <p:nvPr/>
+      </p:nvGrpSpPr>
+      <p:grpSpPr>
+        <a:xfrm>
+          <a:off x="0" y="0"/>
+          <a:ext cx="0" cy="0"/>
+          <a:chOff x="0" y="0"/>
+          <a:chExt cx="0" cy="0"/>
+        </a:xfrm>
+      </p:grpSpPr>
+      <p:sp>
+        <p:nvSpPr>
+          <p:cNvPr id="2" name="Title 1"/>
+          <p:cNvSpPr>
+            <a:spLocks noGrp="1"/>
+          </p:cNvSpPr>
+          <p:nvPr>
+            <p:ph type="title"/>
+          </p:nvPr>
+        </p:nvSpPr>
+        <p:spPr>
+          <a:xfrm>
             <a:off x="457200" y="-530064"/>
             <a:ext cx="8229600" cy="1600200"/>
           </a:xfrm>
@@ -20119,7 +22417,7 @@
 </p:sld>
 </file>
 
-<file path=ppt/slides/slide22.xml><?xml version="1.0" encoding="utf-8"?>
+<file path=ppt/slides/slide23.xml><?xml version="1.0" encoding="utf-8"?>
 <p:sld xmlns:a="http://schemas.openxmlformats.org/drawingml/2006/main" xmlns:r="http://schemas.openxmlformats.org/officeDocument/2006/relationships" xmlns:p="http://schemas.openxmlformats.org/presentationml/2006/main">
   <p:cSld>
     <p:spTree>
@@ -21688,605 +23986,6 @@
                                           <p:spTgt spid="3">
                                             <p:txEl>
                                               <p:pRg st="14" end="14"/>
-                                            </p:txEl>
-                                          </p:spTgt>
-                                        </p:tgtEl>
-                                      </p:cBhvr>
-                                    </p:animEffect>
-                                  </p:childTnLst>
-                                </p:cTn>
-                              </p:par>
-                            </p:childTnLst>
-                          </p:cTn>
-                        </p:par>
-                      </p:childTnLst>
-                    </p:cTn>
-                  </p:par>
-                </p:childTnLst>
-              </p:cTn>
-              <p:prevCondLst>
-                <p:cond evt="onPrev" delay="0">
-                  <p:tgtEl>
-                    <p:sldTgt/>
-                  </p:tgtEl>
-                </p:cond>
-              </p:prevCondLst>
-              <p:nextCondLst>
-                <p:cond evt="onNext" delay="0">
-                  <p:tgtEl>
-                    <p:sldTgt/>
-                  </p:tgtEl>
-                </p:cond>
-              </p:nextCondLst>
-            </p:seq>
-          </p:childTnLst>
-        </p:cTn>
-      </p:par>
-    </p:tnLst>
-  </p:timing>
-</p:sld>
-</file>
-
-<file path=ppt/slides/slide23.xml><?xml version="1.0" encoding="utf-8"?>
-<p:sld xmlns:a="http://schemas.openxmlformats.org/drawingml/2006/main" xmlns:r="http://schemas.openxmlformats.org/officeDocument/2006/relationships" xmlns:p="http://schemas.openxmlformats.org/presentationml/2006/main">
-  <p:cSld>
-    <p:spTree>
-      <p:nvGrpSpPr>
-        <p:cNvPr id="1" name=""/>
-        <p:cNvGrpSpPr/>
-        <p:nvPr/>
-      </p:nvGrpSpPr>
-      <p:grpSpPr>
-        <a:xfrm>
-          <a:off x="0" y="0"/>
-          <a:ext cx="0" cy="0"/>
-          <a:chOff x="0" y="0"/>
-          <a:chExt cx="0" cy="0"/>
-        </a:xfrm>
-      </p:grpSpPr>
-      <p:sp>
-        <p:nvSpPr>
-          <p:cNvPr id="2" name="Title 1"/>
-          <p:cNvSpPr>
-            <a:spLocks noGrp="1"/>
-          </p:cNvSpPr>
-          <p:nvPr>
-            <p:ph type="title"/>
-          </p:nvPr>
-        </p:nvSpPr>
-        <p:spPr>
-          <a:xfrm>
-            <a:off x="457200" y="-143559"/>
-            <a:ext cx="8229600" cy="1600200"/>
-          </a:xfrm>
-        </p:spPr>
-        <p:txBody>
-          <a:bodyPr/>
-          <a:lstStyle/>
-          <a:p>
-            <a:r>
-              <a:rPr lang="en-US" dirty="0" smtClean="0"/>
-              <a:t>Best Practices..</a:t>
-            </a:r>
-            <a:endParaRPr lang="en-US" dirty="0"/>
-          </a:p>
-        </p:txBody>
-      </p:sp>
-      <p:sp>
-        <p:nvSpPr>
-          <p:cNvPr id="3" name="Content Placeholder 2"/>
-          <p:cNvSpPr>
-            <a:spLocks noGrp="1"/>
-          </p:cNvSpPr>
-          <p:nvPr>
-            <p:ph idx="1"/>
-          </p:nvPr>
-        </p:nvSpPr>
-        <p:spPr/>
-        <p:txBody>
-          <a:bodyPr>
-            <a:normAutofit/>
-          </a:bodyPr>
-          <a:lstStyle/>
-          <a:p>
-            <a:r>
-              <a:rPr lang="en-US" dirty="0" smtClean="0">
-                <a:solidFill>
-                  <a:srgbClr val="70A525"/>
-                </a:solidFill>
-              </a:rPr>
-              <a:t>Use $inject pattern </a:t>
-            </a:r>
-            <a:r>
-              <a:rPr lang="en-US" dirty="0" smtClean="0">
-                <a:solidFill>
-                  <a:srgbClr val="000000"/>
-                </a:solidFill>
-              </a:rPr>
-              <a:t>for defining components.</a:t>
-            </a:r>
-          </a:p>
-          <a:p>
-            <a:pPr lvl="1"/>
-            <a:r>
-              <a:rPr lang="en-US" dirty="0" smtClean="0">
-                <a:solidFill>
-                  <a:srgbClr val="000000"/>
-                </a:solidFill>
-              </a:rPr>
-              <a:t> Avoids breakages when minifying</a:t>
-            </a:r>
-          </a:p>
-          <a:p>
-            <a:r>
-              <a:rPr lang="en-US" dirty="0" smtClean="0">
-                <a:solidFill>
-                  <a:srgbClr val="FF0000"/>
-                </a:solidFill>
-              </a:rPr>
-              <a:t>Do not create $ and $$ prefixed APIs</a:t>
-            </a:r>
-            <a:endParaRPr lang="en-US" dirty="0">
-              <a:solidFill>
-                <a:srgbClr val="000000"/>
-              </a:solidFill>
-            </a:endParaRPr>
-          </a:p>
-          <a:p>
-            <a:pPr lvl="1"/>
-            <a:r>
-              <a:rPr lang="en-US" dirty="0" smtClean="0">
-                <a:solidFill>
-                  <a:srgbClr val="000000"/>
-                </a:solidFill>
-              </a:rPr>
-              <a:t> </a:t>
-            </a:r>
-            <a:r>
-              <a:rPr lang="en-US" dirty="0">
-                <a:solidFill>
-                  <a:srgbClr val="000000"/>
-                </a:solidFill>
-              </a:rPr>
-              <a:t>C</a:t>
-            </a:r>
-            <a:r>
-              <a:rPr lang="en-US" dirty="0" smtClean="0">
-                <a:solidFill>
-                  <a:srgbClr val="000000"/>
-                </a:solidFill>
-              </a:rPr>
-              <a:t>ould lead to collisions </a:t>
-            </a:r>
-          </a:p>
-          <a:p>
-            <a:r>
-              <a:rPr lang="en-US" dirty="0" smtClean="0">
-                <a:solidFill>
-                  <a:schemeClr val="accent4"/>
-                </a:solidFill>
-              </a:rPr>
-              <a:t>Prefer ‘data-’ prefix </a:t>
-            </a:r>
-            <a:r>
-              <a:rPr lang="en-US" sz="2000" dirty="0" smtClean="0">
-                <a:solidFill>
-                  <a:srgbClr val="000000"/>
-                </a:solidFill>
-              </a:rPr>
-              <a:t>when using directives</a:t>
-            </a:r>
-          </a:p>
-        </p:txBody>
-      </p:sp>
-    </p:spTree>
-    <p:extLst>
-      <p:ext uri="{BB962C8B-B14F-4D97-AF65-F5344CB8AC3E}">
-        <p14:creationId xmlns:p14="http://schemas.microsoft.com/office/powerpoint/2010/main" val="839905389"/>
-      </p:ext>
-    </p:extLst>
-  </p:cSld>
-  <p:clrMapOvr>
-    <a:masterClrMapping/>
-  </p:clrMapOvr>
-  <p:timing>
-    <p:tnLst>
-      <p:par>
-        <p:cTn xmlns:p14="http://schemas.microsoft.com/office/powerpoint/2010/main" id="1" dur="indefinite" restart="never" nodeType="tmRoot">
-          <p:childTnLst>
-            <p:seq concurrent="1" nextAc="seek">
-              <p:cTn id="2" dur="indefinite" nodeType="mainSeq">
-                <p:childTnLst>
-                  <p:par>
-                    <p:cTn id="3" fill="hold">
-                      <p:stCondLst>
-                        <p:cond delay="indefinite"/>
-                      </p:stCondLst>
-                      <p:childTnLst>
-                        <p:par>
-                          <p:cTn id="4" fill="hold">
-                            <p:stCondLst>
-                              <p:cond delay="0"/>
-                            </p:stCondLst>
-                            <p:childTnLst>
-                              <p:par>
-                                <p:cTn id="5" presetID="12" presetClass="entr" presetSubtype="4" fill="hold" nodeType="clickEffect">
-                                  <p:stCondLst>
-                                    <p:cond delay="0"/>
-                                  </p:stCondLst>
-                                  <p:childTnLst>
-                                    <p:set>
-                                      <p:cBhvr>
-                                        <p:cTn id="6" dur="1" fill="hold">
-                                          <p:stCondLst>
-                                            <p:cond delay="0"/>
-                                          </p:stCondLst>
-                                        </p:cTn>
-                                        <p:tgtEl>
-                                          <p:spTgt spid="3">
-                                            <p:txEl>
-                                              <p:pRg st="0" end="0"/>
-                                            </p:txEl>
-                                          </p:spTgt>
-                                        </p:tgtEl>
-                                        <p:attrNameLst>
-                                          <p:attrName>style.visibility</p:attrName>
-                                        </p:attrNameLst>
-                                      </p:cBhvr>
-                                      <p:to>
-                                        <p:strVal val="visible"/>
-                                      </p:to>
-                                    </p:set>
-                                    <p:anim calcmode="lin" valueType="num">
-                                      <p:cBhvr additive="base">
-                                        <p:cTn id="7" dur="500"/>
-                                        <p:tgtEl>
-                                          <p:spTgt spid="3">
-                                            <p:txEl>
-                                              <p:pRg st="0" end="0"/>
-                                            </p:txEl>
-                                          </p:spTgt>
-                                        </p:tgtEl>
-                                        <p:attrNameLst>
-                                          <p:attrName>ppt_y</p:attrName>
-                                        </p:attrNameLst>
-                                      </p:cBhvr>
-                                      <p:tavLst>
-                                        <p:tav tm="0">
-                                          <p:val>
-                                            <p:strVal val="#ppt_y+#ppt_h*1.125000"/>
-                                          </p:val>
-                                        </p:tav>
-                                        <p:tav tm="100000">
-                                          <p:val>
-                                            <p:strVal val="#ppt_y"/>
-                                          </p:val>
-                                        </p:tav>
-                                      </p:tavLst>
-                                    </p:anim>
-                                    <p:animEffect transition="in" filter="wipe(up)">
-                                      <p:cBhvr>
-                                        <p:cTn id="8" dur="500"/>
-                                        <p:tgtEl>
-                                          <p:spTgt spid="3">
-                                            <p:txEl>
-                                              <p:pRg st="0" end="0"/>
-                                            </p:txEl>
-                                          </p:spTgt>
-                                        </p:tgtEl>
-                                      </p:cBhvr>
-                                    </p:animEffect>
-                                  </p:childTnLst>
-                                </p:cTn>
-                              </p:par>
-                              <p:par>
-                                <p:cTn id="9" presetID="12" presetClass="entr" presetSubtype="4" fill="hold" nodeType="withEffect">
-                                  <p:stCondLst>
-                                    <p:cond delay="0"/>
-                                  </p:stCondLst>
-                                  <p:childTnLst>
-                                    <p:set>
-                                      <p:cBhvr>
-                                        <p:cTn id="10" dur="1" fill="hold">
-                                          <p:stCondLst>
-                                            <p:cond delay="0"/>
-                                          </p:stCondLst>
-                                        </p:cTn>
-                                        <p:tgtEl>
-                                          <p:spTgt spid="3">
-                                            <p:txEl>
-                                              <p:pRg st="1" end="1"/>
-                                            </p:txEl>
-                                          </p:spTgt>
-                                        </p:tgtEl>
-                                        <p:attrNameLst>
-                                          <p:attrName>style.visibility</p:attrName>
-                                        </p:attrNameLst>
-                                      </p:cBhvr>
-                                      <p:to>
-                                        <p:strVal val="visible"/>
-                                      </p:to>
-                                    </p:set>
-                                    <p:anim calcmode="lin" valueType="num">
-                                      <p:cBhvr additive="base">
-                                        <p:cTn id="11" dur="500"/>
-                                        <p:tgtEl>
-                                          <p:spTgt spid="3">
-                                            <p:txEl>
-                                              <p:pRg st="1" end="1"/>
-                                            </p:txEl>
-                                          </p:spTgt>
-                                        </p:tgtEl>
-                                        <p:attrNameLst>
-                                          <p:attrName>ppt_y</p:attrName>
-                                        </p:attrNameLst>
-                                      </p:cBhvr>
-                                      <p:tavLst>
-                                        <p:tav tm="0">
-                                          <p:val>
-                                            <p:strVal val="#ppt_y+#ppt_h*1.125000"/>
-                                          </p:val>
-                                        </p:tav>
-                                        <p:tav tm="100000">
-                                          <p:val>
-                                            <p:strVal val="#ppt_y"/>
-                                          </p:val>
-                                        </p:tav>
-                                      </p:tavLst>
-                                    </p:anim>
-                                    <p:animEffect transition="in" filter="wipe(up)">
-                                      <p:cBhvr>
-                                        <p:cTn id="12" dur="500"/>
-                                        <p:tgtEl>
-                                          <p:spTgt spid="3">
-                                            <p:txEl>
-                                              <p:pRg st="1" end="1"/>
-                                            </p:txEl>
-                                          </p:spTgt>
-                                        </p:tgtEl>
-                                      </p:cBhvr>
-                                    </p:animEffect>
-                                  </p:childTnLst>
-                                </p:cTn>
-                              </p:par>
-                            </p:childTnLst>
-                          </p:cTn>
-                        </p:par>
-                      </p:childTnLst>
-                    </p:cTn>
-                  </p:par>
-                  <p:par>
-                    <p:cTn id="13" fill="hold">
-                      <p:stCondLst>
-                        <p:cond delay="indefinite"/>
-                      </p:stCondLst>
-                      <p:childTnLst>
-                        <p:par>
-                          <p:cTn id="14" fill="hold">
-                            <p:stCondLst>
-                              <p:cond delay="0"/>
-                            </p:stCondLst>
-                            <p:childTnLst>
-                              <p:par>
-                                <p:cTn id="15" presetID="12" presetClass="entr" presetSubtype="4" fill="hold" nodeType="clickEffect">
-                                  <p:stCondLst>
-                                    <p:cond delay="0"/>
-                                  </p:stCondLst>
-                                  <p:childTnLst>
-                                    <p:set>
-                                      <p:cBhvr>
-                                        <p:cTn id="16" dur="1" fill="hold">
-                                          <p:stCondLst>
-                                            <p:cond delay="0"/>
-                                          </p:stCondLst>
-                                        </p:cTn>
-                                        <p:tgtEl>
-                                          <p:spTgt spid="3">
-                                            <p:txEl>
-                                              <p:pRg st="2" end="2"/>
-                                            </p:txEl>
-                                          </p:spTgt>
-                                        </p:tgtEl>
-                                        <p:attrNameLst>
-                                          <p:attrName>style.visibility</p:attrName>
-                                        </p:attrNameLst>
-                                      </p:cBhvr>
-                                      <p:to>
-                                        <p:strVal val="visible"/>
-                                      </p:to>
-                                    </p:set>
-                                    <p:anim calcmode="lin" valueType="num">
-                                      <p:cBhvr additive="base">
-                                        <p:cTn id="17" dur="500"/>
-                                        <p:tgtEl>
-                                          <p:spTgt spid="3">
-                                            <p:txEl>
-                                              <p:pRg st="2" end="2"/>
-                                            </p:txEl>
-                                          </p:spTgt>
-                                        </p:tgtEl>
-                                        <p:attrNameLst>
-                                          <p:attrName>ppt_y</p:attrName>
-                                        </p:attrNameLst>
-                                      </p:cBhvr>
-                                      <p:tavLst>
-                                        <p:tav tm="0">
-                                          <p:val>
-                                            <p:strVal val="#ppt_y+#ppt_h*1.125000"/>
-                                          </p:val>
-                                        </p:tav>
-                                        <p:tav tm="100000">
-                                          <p:val>
-                                            <p:strVal val="#ppt_y"/>
-                                          </p:val>
-                                        </p:tav>
-                                      </p:tavLst>
-                                    </p:anim>
-                                    <p:animEffect transition="in" filter="wipe(up)">
-                                      <p:cBhvr>
-                                        <p:cTn id="18" dur="500"/>
-                                        <p:tgtEl>
-                                          <p:spTgt spid="3">
-                                            <p:txEl>
-                                              <p:pRg st="2" end="2"/>
-                                            </p:txEl>
-                                          </p:spTgt>
-                                        </p:tgtEl>
-                                      </p:cBhvr>
-                                    </p:animEffect>
-                                  </p:childTnLst>
-                                </p:cTn>
-                              </p:par>
-                              <p:par>
-                                <p:cTn id="19" presetID="12" presetClass="entr" presetSubtype="4" fill="hold" nodeType="withEffect">
-                                  <p:stCondLst>
-                                    <p:cond delay="0"/>
-                                  </p:stCondLst>
-                                  <p:childTnLst>
-                                    <p:set>
-                                      <p:cBhvr>
-                                        <p:cTn id="20" dur="1" fill="hold">
-                                          <p:stCondLst>
-                                            <p:cond delay="0"/>
-                                          </p:stCondLst>
-                                        </p:cTn>
-                                        <p:tgtEl>
-                                          <p:spTgt spid="3">
-                                            <p:txEl>
-                                              <p:pRg st="3" end="3"/>
-                                            </p:txEl>
-                                          </p:spTgt>
-                                        </p:tgtEl>
-                                        <p:attrNameLst>
-                                          <p:attrName>style.visibility</p:attrName>
-                                        </p:attrNameLst>
-                                      </p:cBhvr>
-                                      <p:to>
-                                        <p:strVal val="visible"/>
-                                      </p:to>
-                                    </p:set>
-                                    <p:anim calcmode="lin" valueType="num">
-                                      <p:cBhvr additive="base">
-                                        <p:cTn id="21" dur="500"/>
-                                        <p:tgtEl>
-                                          <p:spTgt spid="3">
-                                            <p:txEl>
-                                              <p:pRg st="3" end="3"/>
-                                            </p:txEl>
-                                          </p:spTgt>
-                                        </p:tgtEl>
-                                        <p:attrNameLst>
-                                          <p:attrName>ppt_y</p:attrName>
-                                        </p:attrNameLst>
-                                      </p:cBhvr>
-                                      <p:tavLst>
-                                        <p:tav tm="0">
-                                          <p:val>
-                                            <p:strVal val="#ppt_y+#ppt_h*1.125000"/>
-                                          </p:val>
-                                        </p:tav>
-                                        <p:tav tm="100000">
-                                          <p:val>
-                                            <p:strVal val="#ppt_y"/>
-                                          </p:val>
-                                        </p:tav>
-                                      </p:tavLst>
-                                    </p:anim>
-                                    <p:animEffect transition="in" filter="wipe(up)">
-                                      <p:cBhvr>
-                                        <p:cTn id="22" dur="500"/>
-                                        <p:tgtEl>
-                                          <p:spTgt spid="3">
-                                            <p:txEl>
-                                              <p:pRg st="3" end="3"/>
-                                            </p:txEl>
-                                          </p:spTgt>
-                                        </p:tgtEl>
-                                      </p:cBhvr>
-                                    </p:animEffect>
-                                  </p:childTnLst>
-                                </p:cTn>
-                              </p:par>
-                            </p:childTnLst>
-                          </p:cTn>
-                        </p:par>
-                      </p:childTnLst>
-                    </p:cTn>
-                  </p:par>
-                  <p:par>
-                    <p:cTn id="23" fill="hold">
-                      <p:stCondLst>
-                        <p:cond delay="indefinite"/>
-                      </p:stCondLst>
-                      <p:childTnLst>
-                        <p:par>
-                          <p:cTn id="24" fill="hold">
-                            <p:stCondLst>
-                              <p:cond delay="0"/>
-                            </p:stCondLst>
-                            <p:childTnLst>
-                              <p:par>
-                                <p:cTn id="25" presetID="12" presetClass="entr" presetSubtype="4" fill="hold" nodeType="clickEffect">
-                                  <p:stCondLst>
-                                    <p:cond delay="0"/>
-                                  </p:stCondLst>
-                                  <p:childTnLst>
-                                    <p:set>
-                                      <p:cBhvr>
-                                        <p:cTn id="26" dur="1" fill="hold">
-                                          <p:stCondLst>
-                                            <p:cond delay="0"/>
-                                          </p:stCondLst>
-                                        </p:cTn>
-                                        <p:tgtEl>
-                                          <p:spTgt spid="3">
-                                            <p:txEl>
-                                              <p:pRg st="4" end="4"/>
-                                            </p:txEl>
-                                          </p:spTgt>
-                                        </p:tgtEl>
-                                        <p:attrNameLst>
-                                          <p:attrName>style.visibility</p:attrName>
-                                        </p:attrNameLst>
-                                      </p:cBhvr>
-                                      <p:to>
-                                        <p:strVal val="visible"/>
-                                      </p:to>
-                                    </p:set>
-                                    <p:anim calcmode="lin" valueType="num">
-                                      <p:cBhvr additive="base">
-                                        <p:cTn id="27" dur="500"/>
-                                        <p:tgtEl>
-                                          <p:spTgt spid="3">
-                                            <p:txEl>
-                                              <p:pRg st="4" end="4"/>
-                                            </p:txEl>
-                                          </p:spTgt>
-                                        </p:tgtEl>
-                                        <p:attrNameLst>
-                                          <p:attrName>ppt_y</p:attrName>
-                                        </p:attrNameLst>
-                                      </p:cBhvr>
-                                      <p:tavLst>
-                                        <p:tav tm="0">
-                                          <p:val>
-                                            <p:strVal val="#ppt_y+#ppt_h*1.125000"/>
-                                          </p:val>
-                                        </p:tav>
-                                        <p:tav tm="100000">
-                                          <p:val>
-                                            <p:strVal val="#ppt_y"/>
-                                          </p:val>
-                                        </p:tav>
-                                      </p:tavLst>
-                                    </p:anim>
-                                    <p:animEffect transition="in" filter="wipe(up)">
-                                      <p:cBhvr>
-                                        <p:cTn id="28" dur="500"/>
-                                        <p:tgtEl>
-                                          <p:spTgt spid="3">
-                                            <p:txEl>
-                                              <p:pRg st="4" end="4"/>
                                             </p:txEl>
                                           </p:spTgt>
                                         </p:tgtEl>
@@ -22345,6 +24044,605 @@
       </p:grpSpPr>
       <p:sp>
         <p:nvSpPr>
+          <p:cNvPr id="2" name="Title 1"/>
+          <p:cNvSpPr>
+            <a:spLocks noGrp="1"/>
+          </p:cNvSpPr>
+          <p:nvPr>
+            <p:ph type="title"/>
+          </p:nvPr>
+        </p:nvSpPr>
+        <p:spPr>
+          <a:xfrm>
+            <a:off x="457200" y="-143559"/>
+            <a:ext cx="8229600" cy="1600200"/>
+          </a:xfrm>
+        </p:spPr>
+        <p:txBody>
+          <a:bodyPr/>
+          <a:lstStyle/>
+          <a:p>
+            <a:r>
+              <a:rPr lang="en-US" dirty="0" smtClean="0"/>
+              <a:t>Best Practices..</a:t>
+            </a:r>
+            <a:endParaRPr lang="en-US" dirty="0"/>
+          </a:p>
+        </p:txBody>
+      </p:sp>
+      <p:sp>
+        <p:nvSpPr>
+          <p:cNvPr id="3" name="Content Placeholder 2"/>
+          <p:cNvSpPr>
+            <a:spLocks noGrp="1"/>
+          </p:cNvSpPr>
+          <p:nvPr>
+            <p:ph idx="1"/>
+          </p:nvPr>
+        </p:nvSpPr>
+        <p:spPr/>
+        <p:txBody>
+          <a:bodyPr>
+            <a:normAutofit/>
+          </a:bodyPr>
+          <a:lstStyle/>
+          <a:p>
+            <a:r>
+              <a:rPr lang="en-US" dirty="0" smtClean="0">
+                <a:solidFill>
+                  <a:srgbClr val="70A525"/>
+                </a:solidFill>
+              </a:rPr>
+              <a:t>Use $inject pattern </a:t>
+            </a:r>
+            <a:r>
+              <a:rPr lang="en-US" dirty="0" smtClean="0">
+                <a:solidFill>
+                  <a:srgbClr val="000000"/>
+                </a:solidFill>
+              </a:rPr>
+              <a:t>for defining components.</a:t>
+            </a:r>
+          </a:p>
+          <a:p>
+            <a:pPr lvl="1"/>
+            <a:r>
+              <a:rPr lang="en-US" dirty="0" smtClean="0">
+                <a:solidFill>
+                  <a:srgbClr val="000000"/>
+                </a:solidFill>
+              </a:rPr>
+              <a:t> Avoids breakages when minifying</a:t>
+            </a:r>
+          </a:p>
+          <a:p>
+            <a:r>
+              <a:rPr lang="en-US" dirty="0" smtClean="0">
+                <a:solidFill>
+                  <a:srgbClr val="FF0000"/>
+                </a:solidFill>
+              </a:rPr>
+              <a:t>Do not create $ and $$ prefixed APIs</a:t>
+            </a:r>
+            <a:endParaRPr lang="en-US" dirty="0">
+              <a:solidFill>
+                <a:srgbClr val="000000"/>
+              </a:solidFill>
+            </a:endParaRPr>
+          </a:p>
+          <a:p>
+            <a:pPr lvl="1"/>
+            <a:r>
+              <a:rPr lang="en-US" dirty="0" smtClean="0">
+                <a:solidFill>
+                  <a:srgbClr val="000000"/>
+                </a:solidFill>
+              </a:rPr>
+              <a:t> </a:t>
+            </a:r>
+            <a:r>
+              <a:rPr lang="en-US" dirty="0">
+                <a:solidFill>
+                  <a:srgbClr val="000000"/>
+                </a:solidFill>
+              </a:rPr>
+              <a:t>C</a:t>
+            </a:r>
+            <a:r>
+              <a:rPr lang="en-US" dirty="0" smtClean="0">
+                <a:solidFill>
+                  <a:srgbClr val="000000"/>
+                </a:solidFill>
+              </a:rPr>
+              <a:t>ould lead to collisions </a:t>
+            </a:r>
+          </a:p>
+          <a:p>
+            <a:r>
+              <a:rPr lang="en-US" dirty="0" smtClean="0">
+                <a:solidFill>
+                  <a:schemeClr val="accent4"/>
+                </a:solidFill>
+              </a:rPr>
+              <a:t>Prefer ‘data-’ prefix </a:t>
+            </a:r>
+            <a:r>
+              <a:rPr lang="en-US" sz="2000" dirty="0" smtClean="0">
+                <a:solidFill>
+                  <a:srgbClr val="000000"/>
+                </a:solidFill>
+              </a:rPr>
+              <a:t>when using directives</a:t>
+            </a:r>
+          </a:p>
+        </p:txBody>
+      </p:sp>
+    </p:spTree>
+    <p:extLst>
+      <p:ext uri="{BB962C8B-B14F-4D97-AF65-F5344CB8AC3E}">
+        <p14:creationId xmlns:p14="http://schemas.microsoft.com/office/powerpoint/2010/main" val="839905389"/>
+      </p:ext>
+    </p:extLst>
+  </p:cSld>
+  <p:clrMapOvr>
+    <a:masterClrMapping/>
+  </p:clrMapOvr>
+  <p:timing>
+    <p:tnLst>
+      <p:par>
+        <p:cTn xmlns:p14="http://schemas.microsoft.com/office/powerpoint/2010/main" id="1" dur="indefinite" restart="never" nodeType="tmRoot">
+          <p:childTnLst>
+            <p:seq concurrent="1" nextAc="seek">
+              <p:cTn id="2" dur="indefinite" nodeType="mainSeq">
+                <p:childTnLst>
+                  <p:par>
+                    <p:cTn id="3" fill="hold">
+                      <p:stCondLst>
+                        <p:cond delay="indefinite"/>
+                      </p:stCondLst>
+                      <p:childTnLst>
+                        <p:par>
+                          <p:cTn id="4" fill="hold">
+                            <p:stCondLst>
+                              <p:cond delay="0"/>
+                            </p:stCondLst>
+                            <p:childTnLst>
+                              <p:par>
+                                <p:cTn id="5" presetID="12" presetClass="entr" presetSubtype="4" fill="hold" nodeType="clickEffect">
+                                  <p:stCondLst>
+                                    <p:cond delay="0"/>
+                                  </p:stCondLst>
+                                  <p:childTnLst>
+                                    <p:set>
+                                      <p:cBhvr>
+                                        <p:cTn id="6" dur="1" fill="hold">
+                                          <p:stCondLst>
+                                            <p:cond delay="0"/>
+                                          </p:stCondLst>
+                                        </p:cTn>
+                                        <p:tgtEl>
+                                          <p:spTgt spid="3">
+                                            <p:txEl>
+                                              <p:pRg st="0" end="0"/>
+                                            </p:txEl>
+                                          </p:spTgt>
+                                        </p:tgtEl>
+                                        <p:attrNameLst>
+                                          <p:attrName>style.visibility</p:attrName>
+                                        </p:attrNameLst>
+                                      </p:cBhvr>
+                                      <p:to>
+                                        <p:strVal val="visible"/>
+                                      </p:to>
+                                    </p:set>
+                                    <p:anim calcmode="lin" valueType="num">
+                                      <p:cBhvr additive="base">
+                                        <p:cTn id="7" dur="500"/>
+                                        <p:tgtEl>
+                                          <p:spTgt spid="3">
+                                            <p:txEl>
+                                              <p:pRg st="0" end="0"/>
+                                            </p:txEl>
+                                          </p:spTgt>
+                                        </p:tgtEl>
+                                        <p:attrNameLst>
+                                          <p:attrName>ppt_y</p:attrName>
+                                        </p:attrNameLst>
+                                      </p:cBhvr>
+                                      <p:tavLst>
+                                        <p:tav tm="0">
+                                          <p:val>
+                                            <p:strVal val="#ppt_y+#ppt_h*1.125000"/>
+                                          </p:val>
+                                        </p:tav>
+                                        <p:tav tm="100000">
+                                          <p:val>
+                                            <p:strVal val="#ppt_y"/>
+                                          </p:val>
+                                        </p:tav>
+                                      </p:tavLst>
+                                    </p:anim>
+                                    <p:animEffect transition="in" filter="wipe(up)">
+                                      <p:cBhvr>
+                                        <p:cTn id="8" dur="500"/>
+                                        <p:tgtEl>
+                                          <p:spTgt spid="3">
+                                            <p:txEl>
+                                              <p:pRg st="0" end="0"/>
+                                            </p:txEl>
+                                          </p:spTgt>
+                                        </p:tgtEl>
+                                      </p:cBhvr>
+                                    </p:animEffect>
+                                  </p:childTnLst>
+                                </p:cTn>
+                              </p:par>
+                              <p:par>
+                                <p:cTn id="9" presetID="12" presetClass="entr" presetSubtype="4" fill="hold" nodeType="withEffect">
+                                  <p:stCondLst>
+                                    <p:cond delay="0"/>
+                                  </p:stCondLst>
+                                  <p:childTnLst>
+                                    <p:set>
+                                      <p:cBhvr>
+                                        <p:cTn id="10" dur="1" fill="hold">
+                                          <p:stCondLst>
+                                            <p:cond delay="0"/>
+                                          </p:stCondLst>
+                                        </p:cTn>
+                                        <p:tgtEl>
+                                          <p:spTgt spid="3">
+                                            <p:txEl>
+                                              <p:pRg st="1" end="1"/>
+                                            </p:txEl>
+                                          </p:spTgt>
+                                        </p:tgtEl>
+                                        <p:attrNameLst>
+                                          <p:attrName>style.visibility</p:attrName>
+                                        </p:attrNameLst>
+                                      </p:cBhvr>
+                                      <p:to>
+                                        <p:strVal val="visible"/>
+                                      </p:to>
+                                    </p:set>
+                                    <p:anim calcmode="lin" valueType="num">
+                                      <p:cBhvr additive="base">
+                                        <p:cTn id="11" dur="500"/>
+                                        <p:tgtEl>
+                                          <p:spTgt spid="3">
+                                            <p:txEl>
+                                              <p:pRg st="1" end="1"/>
+                                            </p:txEl>
+                                          </p:spTgt>
+                                        </p:tgtEl>
+                                        <p:attrNameLst>
+                                          <p:attrName>ppt_y</p:attrName>
+                                        </p:attrNameLst>
+                                      </p:cBhvr>
+                                      <p:tavLst>
+                                        <p:tav tm="0">
+                                          <p:val>
+                                            <p:strVal val="#ppt_y+#ppt_h*1.125000"/>
+                                          </p:val>
+                                        </p:tav>
+                                        <p:tav tm="100000">
+                                          <p:val>
+                                            <p:strVal val="#ppt_y"/>
+                                          </p:val>
+                                        </p:tav>
+                                      </p:tavLst>
+                                    </p:anim>
+                                    <p:animEffect transition="in" filter="wipe(up)">
+                                      <p:cBhvr>
+                                        <p:cTn id="12" dur="500"/>
+                                        <p:tgtEl>
+                                          <p:spTgt spid="3">
+                                            <p:txEl>
+                                              <p:pRg st="1" end="1"/>
+                                            </p:txEl>
+                                          </p:spTgt>
+                                        </p:tgtEl>
+                                      </p:cBhvr>
+                                    </p:animEffect>
+                                  </p:childTnLst>
+                                </p:cTn>
+                              </p:par>
+                            </p:childTnLst>
+                          </p:cTn>
+                        </p:par>
+                      </p:childTnLst>
+                    </p:cTn>
+                  </p:par>
+                  <p:par>
+                    <p:cTn id="13" fill="hold">
+                      <p:stCondLst>
+                        <p:cond delay="indefinite"/>
+                      </p:stCondLst>
+                      <p:childTnLst>
+                        <p:par>
+                          <p:cTn id="14" fill="hold">
+                            <p:stCondLst>
+                              <p:cond delay="0"/>
+                            </p:stCondLst>
+                            <p:childTnLst>
+                              <p:par>
+                                <p:cTn id="15" presetID="12" presetClass="entr" presetSubtype="4" fill="hold" nodeType="clickEffect">
+                                  <p:stCondLst>
+                                    <p:cond delay="0"/>
+                                  </p:stCondLst>
+                                  <p:childTnLst>
+                                    <p:set>
+                                      <p:cBhvr>
+                                        <p:cTn id="16" dur="1" fill="hold">
+                                          <p:stCondLst>
+                                            <p:cond delay="0"/>
+                                          </p:stCondLst>
+                                        </p:cTn>
+                                        <p:tgtEl>
+                                          <p:spTgt spid="3">
+                                            <p:txEl>
+                                              <p:pRg st="2" end="2"/>
+                                            </p:txEl>
+                                          </p:spTgt>
+                                        </p:tgtEl>
+                                        <p:attrNameLst>
+                                          <p:attrName>style.visibility</p:attrName>
+                                        </p:attrNameLst>
+                                      </p:cBhvr>
+                                      <p:to>
+                                        <p:strVal val="visible"/>
+                                      </p:to>
+                                    </p:set>
+                                    <p:anim calcmode="lin" valueType="num">
+                                      <p:cBhvr additive="base">
+                                        <p:cTn id="17" dur="500"/>
+                                        <p:tgtEl>
+                                          <p:spTgt spid="3">
+                                            <p:txEl>
+                                              <p:pRg st="2" end="2"/>
+                                            </p:txEl>
+                                          </p:spTgt>
+                                        </p:tgtEl>
+                                        <p:attrNameLst>
+                                          <p:attrName>ppt_y</p:attrName>
+                                        </p:attrNameLst>
+                                      </p:cBhvr>
+                                      <p:tavLst>
+                                        <p:tav tm="0">
+                                          <p:val>
+                                            <p:strVal val="#ppt_y+#ppt_h*1.125000"/>
+                                          </p:val>
+                                        </p:tav>
+                                        <p:tav tm="100000">
+                                          <p:val>
+                                            <p:strVal val="#ppt_y"/>
+                                          </p:val>
+                                        </p:tav>
+                                      </p:tavLst>
+                                    </p:anim>
+                                    <p:animEffect transition="in" filter="wipe(up)">
+                                      <p:cBhvr>
+                                        <p:cTn id="18" dur="500"/>
+                                        <p:tgtEl>
+                                          <p:spTgt spid="3">
+                                            <p:txEl>
+                                              <p:pRg st="2" end="2"/>
+                                            </p:txEl>
+                                          </p:spTgt>
+                                        </p:tgtEl>
+                                      </p:cBhvr>
+                                    </p:animEffect>
+                                  </p:childTnLst>
+                                </p:cTn>
+                              </p:par>
+                              <p:par>
+                                <p:cTn id="19" presetID="12" presetClass="entr" presetSubtype="4" fill="hold" nodeType="withEffect">
+                                  <p:stCondLst>
+                                    <p:cond delay="0"/>
+                                  </p:stCondLst>
+                                  <p:childTnLst>
+                                    <p:set>
+                                      <p:cBhvr>
+                                        <p:cTn id="20" dur="1" fill="hold">
+                                          <p:stCondLst>
+                                            <p:cond delay="0"/>
+                                          </p:stCondLst>
+                                        </p:cTn>
+                                        <p:tgtEl>
+                                          <p:spTgt spid="3">
+                                            <p:txEl>
+                                              <p:pRg st="3" end="3"/>
+                                            </p:txEl>
+                                          </p:spTgt>
+                                        </p:tgtEl>
+                                        <p:attrNameLst>
+                                          <p:attrName>style.visibility</p:attrName>
+                                        </p:attrNameLst>
+                                      </p:cBhvr>
+                                      <p:to>
+                                        <p:strVal val="visible"/>
+                                      </p:to>
+                                    </p:set>
+                                    <p:anim calcmode="lin" valueType="num">
+                                      <p:cBhvr additive="base">
+                                        <p:cTn id="21" dur="500"/>
+                                        <p:tgtEl>
+                                          <p:spTgt spid="3">
+                                            <p:txEl>
+                                              <p:pRg st="3" end="3"/>
+                                            </p:txEl>
+                                          </p:spTgt>
+                                        </p:tgtEl>
+                                        <p:attrNameLst>
+                                          <p:attrName>ppt_y</p:attrName>
+                                        </p:attrNameLst>
+                                      </p:cBhvr>
+                                      <p:tavLst>
+                                        <p:tav tm="0">
+                                          <p:val>
+                                            <p:strVal val="#ppt_y+#ppt_h*1.125000"/>
+                                          </p:val>
+                                        </p:tav>
+                                        <p:tav tm="100000">
+                                          <p:val>
+                                            <p:strVal val="#ppt_y"/>
+                                          </p:val>
+                                        </p:tav>
+                                      </p:tavLst>
+                                    </p:anim>
+                                    <p:animEffect transition="in" filter="wipe(up)">
+                                      <p:cBhvr>
+                                        <p:cTn id="22" dur="500"/>
+                                        <p:tgtEl>
+                                          <p:spTgt spid="3">
+                                            <p:txEl>
+                                              <p:pRg st="3" end="3"/>
+                                            </p:txEl>
+                                          </p:spTgt>
+                                        </p:tgtEl>
+                                      </p:cBhvr>
+                                    </p:animEffect>
+                                  </p:childTnLst>
+                                </p:cTn>
+                              </p:par>
+                            </p:childTnLst>
+                          </p:cTn>
+                        </p:par>
+                      </p:childTnLst>
+                    </p:cTn>
+                  </p:par>
+                  <p:par>
+                    <p:cTn id="23" fill="hold">
+                      <p:stCondLst>
+                        <p:cond delay="indefinite"/>
+                      </p:stCondLst>
+                      <p:childTnLst>
+                        <p:par>
+                          <p:cTn id="24" fill="hold">
+                            <p:stCondLst>
+                              <p:cond delay="0"/>
+                            </p:stCondLst>
+                            <p:childTnLst>
+                              <p:par>
+                                <p:cTn id="25" presetID="12" presetClass="entr" presetSubtype="4" fill="hold" nodeType="clickEffect">
+                                  <p:stCondLst>
+                                    <p:cond delay="0"/>
+                                  </p:stCondLst>
+                                  <p:childTnLst>
+                                    <p:set>
+                                      <p:cBhvr>
+                                        <p:cTn id="26" dur="1" fill="hold">
+                                          <p:stCondLst>
+                                            <p:cond delay="0"/>
+                                          </p:stCondLst>
+                                        </p:cTn>
+                                        <p:tgtEl>
+                                          <p:spTgt spid="3">
+                                            <p:txEl>
+                                              <p:pRg st="4" end="4"/>
+                                            </p:txEl>
+                                          </p:spTgt>
+                                        </p:tgtEl>
+                                        <p:attrNameLst>
+                                          <p:attrName>style.visibility</p:attrName>
+                                        </p:attrNameLst>
+                                      </p:cBhvr>
+                                      <p:to>
+                                        <p:strVal val="visible"/>
+                                      </p:to>
+                                    </p:set>
+                                    <p:anim calcmode="lin" valueType="num">
+                                      <p:cBhvr additive="base">
+                                        <p:cTn id="27" dur="500"/>
+                                        <p:tgtEl>
+                                          <p:spTgt spid="3">
+                                            <p:txEl>
+                                              <p:pRg st="4" end="4"/>
+                                            </p:txEl>
+                                          </p:spTgt>
+                                        </p:tgtEl>
+                                        <p:attrNameLst>
+                                          <p:attrName>ppt_y</p:attrName>
+                                        </p:attrNameLst>
+                                      </p:cBhvr>
+                                      <p:tavLst>
+                                        <p:tav tm="0">
+                                          <p:val>
+                                            <p:strVal val="#ppt_y+#ppt_h*1.125000"/>
+                                          </p:val>
+                                        </p:tav>
+                                        <p:tav tm="100000">
+                                          <p:val>
+                                            <p:strVal val="#ppt_y"/>
+                                          </p:val>
+                                        </p:tav>
+                                      </p:tavLst>
+                                    </p:anim>
+                                    <p:animEffect transition="in" filter="wipe(up)">
+                                      <p:cBhvr>
+                                        <p:cTn id="28" dur="500"/>
+                                        <p:tgtEl>
+                                          <p:spTgt spid="3">
+                                            <p:txEl>
+                                              <p:pRg st="4" end="4"/>
+                                            </p:txEl>
+                                          </p:spTgt>
+                                        </p:tgtEl>
+                                      </p:cBhvr>
+                                    </p:animEffect>
+                                  </p:childTnLst>
+                                </p:cTn>
+                              </p:par>
+                            </p:childTnLst>
+                          </p:cTn>
+                        </p:par>
+                      </p:childTnLst>
+                    </p:cTn>
+                  </p:par>
+                </p:childTnLst>
+              </p:cTn>
+              <p:prevCondLst>
+                <p:cond evt="onPrev" delay="0">
+                  <p:tgtEl>
+                    <p:sldTgt/>
+                  </p:tgtEl>
+                </p:cond>
+              </p:prevCondLst>
+              <p:nextCondLst>
+                <p:cond evt="onNext" delay="0">
+                  <p:tgtEl>
+                    <p:sldTgt/>
+                  </p:tgtEl>
+                </p:cond>
+              </p:nextCondLst>
+            </p:seq>
+          </p:childTnLst>
+        </p:cTn>
+      </p:par>
+    </p:tnLst>
+  </p:timing>
+</p:sld>
+</file>
+
+<file path=ppt/slides/slide25.xml><?xml version="1.0" encoding="utf-8"?>
+<p:sld xmlns:a="http://schemas.openxmlformats.org/drawingml/2006/main" xmlns:r="http://schemas.openxmlformats.org/officeDocument/2006/relationships" xmlns:p="http://schemas.openxmlformats.org/presentationml/2006/main">
+  <p:cSld>
+    <p:spTree>
+      <p:nvGrpSpPr>
+        <p:cNvPr id="1" name=""/>
+        <p:cNvGrpSpPr/>
+        <p:nvPr/>
+      </p:nvGrpSpPr>
+      <p:grpSpPr>
+        <a:xfrm>
+          <a:off x="0" y="0"/>
+          <a:ext cx="0" cy="0"/>
+          <a:chOff x="0" y="0"/>
+          <a:chExt cx="0" cy="0"/>
+        </a:xfrm>
+      </p:grpSpPr>
+      <p:sp>
+        <p:nvSpPr>
           <p:cNvPr id="4" name="Title 3"/>
           <p:cNvSpPr>
             <a:spLocks noGrp="1"/>
@@ -22440,7 +24738,7 @@
 </p:sld>
 </file>
 
-<file path=ppt/slides/slide25.xml><?xml version="1.0" encoding="utf-8"?>
+<file path=ppt/slides/slide26.xml><?xml version="1.0" encoding="utf-8"?>
 <p:sld xmlns:a="http://schemas.openxmlformats.org/drawingml/2006/main" xmlns:r="http://schemas.openxmlformats.org/officeDocument/2006/relationships" xmlns:p="http://schemas.openxmlformats.org/presentationml/2006/main">
   <p:cSld>
     <p:spTree>
@@ -22495,12 +24793,19 @@
             <p:ph idx="1"/>
           </p:nvPr>
         </p:nvSpPr>
-        <p:spPr/>
+        <p:spPr>
+          <a:xfrm>
+            <a:off x="457200" y="1462896"/>
+            <a:ext cx="8229600" cy="4525963"/>
+          </a:xfrm>
+        </p:spPr>
         <p:txBody>
-          <a:bodyPr/>
+          <a:bodyPr>
+            <a:normAutofit/>
+          </a:bodyPr>
           <a:lstStyle/>
           <a:p>
-            <a:endParaRPr lang="en-US" dirty="0" smtClean="0"/>
+            <a:endParaRPr lang="en-US" sz="1800" dirty="0" smtClean="0"/>
           </a:p>
           <a:p>
             <a:r>
@@ -22556,9 +24861,25 @@
               <a:rPr lang="en-US" dirty="0" smtClean="0">
                 <a:hlinkClick r:id="rId5"/>
               </a:rPr>
-              <a:t>Rapid prototyping with AngularJs</a:t>
+              <a:t>Rapid prototyping with </a:t>
+            </a:r>
+            <a:r>
+              <a:rPr lang="en-US" dirty="0" smtClean="0">
+                <a:hlinkClick r:id="rId5"/>
+              </a:rPr>
+              <a:t>AngularJs</a:t>
             </a:r>
             <a:endParaRPr lang="en-US" dirty="0" smtClean="0"/>
+          </a:p>
+          <a:p>
+            <a:pPr lvl="1"/>
+            <a:r>
+              <a:rPr lang="en-US" dirty="0">
+                <a:hlinkClick r:id="rId6"/>
+              </a:rPr>
+              <a:t>AngularJs Form Validation</a:t>
+            </a:r>
+            <a:endParaRPr lang="en-US" dirty="0"/>
           </a:p>
           <a:p>
             <a:pPr marL="457200" lvl="1" indent="0">
@@ -22580,21 +24901,11 @@
             <a:pPr lvl="1"/>
             <a:r>
               <a:rPr lang="en-US" dirty="0" smtClean="0">
-                <a:hlinkClick r:id="rId6"/>
+                <a:hlinkClick r:id="rId7"/>
               </a:rPr>
               <a:t>Official YouTube channel</a:t>
             </a:r>
             <a:endParaRPr lang="en-US" dirty="0" smtClean="0"/>
-          </a:p>
-          <a:p>
-            <a:pPr lvl="1"/>
-            <a:r>
-              <a:rPr lang="en-US" dirty="0" smtClean="0">
-                <a:hlinkClick r:id="rId7"/>
-              </a:rPr>
-              <a:t>AngularJs Fundamentals in 60-ish minutes</a:t>
-            </a:r>
-            <a:endParaRPr lang="en-US" dirty="0"/>
           </a:p>
           <a:p>
             <a:pPr lvl="1"/>
@@ -22602,15 +24913,41 @@
               <a:rPr lang="en-US" dirty="0" smtClean="0">
                 <a:hlinkClick r:id="rId8"/>
               </a:rPr>
-              <a:t>Introduction to AngularJs Unit Testing </a:t>
-            </a:r>
-            <a:endParaRPr lang="en-US" dirty="0"/>
+              <a:t>AngularJs Fundamentals in 60-ish </a:t>
+            </a:r>
+            <a:r>
+              <a:rPr lang="en-US" dirty="0" smtClean="0">
+                <a:hlinkClick r:id="rId8"/>
+              </a:rPr>
+              <a:t>minutes</a:t>
+            </a:r>
+            <a:endParaRPr lang="en-US" dirty="0" smtClean="0"/>
           </a:p>
           <a:p>
             <a:pPr lvl="1"/>
             <a:r>
               <a:rPr lang="en-US" dirty="0" smtClean="0">
                 <a:hlinkClick r:id="rId9"/>
+              </a:rPr>
+              <a:t>Writing Directives</a:t>
+            </a:r>
+            <a:endParaRPr lang="en-US" dirty="0"/>
+          </a:p>
+          <a:p>
+            <a:pPr lvl="1"/>
+            <a:r>
+              <a:rPr lang="en-US" dirty="0" smtClean="0">
+                <a:hlinkClick r:id="rId10"/>
+              </a:rPr>
+              <a:t>Introduction to AngularJs Unit Testing </a:t>
+            </a:r>
+            <a:endParaRPr lang="en-US" dirty="0"/>
+          </a:p>
+          <a:p>
+            <a:pPr lvl="1"/>
+            <a:r>
+              <a:rPr lang="en-US" dirty="0" smtClean="0">
+                <a:hlinkClick r:id="rId11"/>
               </a:rPr>
               <a:t>End to End testing of AngularJs apps with Protractor</a:t>
             </a:r>
@@ -22638,7 +24975,7 @@
 </p:sld>
 </file>
 
-<file path=ppt/slides/slide26.xml><?xml version="1.0" encoding="utf-8"?>
+<file path=ppt/slides/slide27.xml><?xml version="1.0" encoding="utf-8"?>
 <p:sld xmlns:a="http://schemas.openxmlformats.org/drawingml/2006/main" xmlns:r="http://schemas.openxmlformats.org/officeDocument/2006/relationships" xmlns:p="http://schemas.openxmlformats.org/presentationml/2006/main">
   <p:cSld>
     <p:spTree>
@@ -22752,7 +25089,7 @@
 </p:sld>
 </file>
 
-<file path=ppt/slides/slide27.xml><?xml version="1.0" encoding="utf-8"?>
+<file path=ppt/slides/slide28.xml><?xml version="1.0" encoding="utf-8"?>
 <p:sld xmlns:a="http://schemas.openxmlformats.org/drawingml/2006/main" xmlns:r="http://schemas.openxmlformats.org/officeDocument/2006/relationships" xmlns:p="http://schemas.openxmlformats.org/presentationml/2006/main" show="0">
   <p:cSld>
     <p:spTree>
@@ -22928,7 +25265,7 @@
         </p:spPr>
         <p:txBody>
           <a:bodyPr>
-            <a:normAutofit fontScale="92500" lnSpcReduction="10000"/>
+            <a:normAutofit fontScale="92500" lnSpcReduction="20000"/>
           </a:bodyPr>
           <a:lstStyle/>
           <a:p>
@@ -23081,8 +25418,31 @@
                   <a:srgbClr val="000000"/>
                 </a:solidFill>
               </a:rPr>
-              <a:t>Custom Directives</a:t>
-            </a:r>
+              <a:t>Form Validation</a:t>
+            </a:r>
+          </a:p>
+          <a:p>
+            <a:r>
+              <a:rPr lang="en-US" dirty="0">
+                <a:solidFill>
+                  <a:srgbClr val="000000"/>
+                </a:solidFill>
+              </a:rPr>
+              <a:t>Custom </a:t>
+            </a:r>
+            <a:r>
+              <a:rPr lang="en-US" dirty="0" smtClean="0">
+                <a:solidFill>
+                  <a:srgbClr val="000000"/>
+                </a:solidFill>
+              </a:rPr>
+              <a:t>Directives</a:t>
+            </a:r>
+            <a:endParaRPr lang="en-US" dirty="0" smtClean="0">
+              <a:solidFill>
+                <a:srgbClr val="000000"/>
+              </a:solidFill>
+            </a:endParaRPr>
           </a:p>
           <a:p>
             <a:r>
@@ -24236,6 +26596,94 @@
                                           <p:spTgt spid="3">
                                             <p:txEl>
                                               <p:pRg st="13" end="13"/>
+                                            </p:txEl>
+                                          </p:spTgt>
+                                        </p:tgtEl>
+                                      </p:cBhvr>
+                                    </p:animEffect>
+                                  </p:childTnLst>
+                                </p:cTn>
+                              </p:par>
+                            </p:childTnLst>
+                          </p:cTn>
+                        </p:par>
+                      </p:childTnLst>
+                    </p:cTn>
+                  </p:par>
+                  <p:par>
+                    <p:cTn id="71" fill="hold">
+                      <p:stCondLst>
+                        <p:cond delay="indefinite"/>
+                      </p:stCondLst>
+                      <p:childTnLst>
+                        <p:par>
+                          <p:cTn id="72" fill="hold">
+                            <p:stCondLst>
+                              <p:cond delay="0"/>
+                            </p:stCondLst>
+                            <p:childTnLst>
+                              <p:par>
+                                <p:cTn id="73" presetID="12" presetClass="entr" presetSubtype="4" fill="hold" nodeType="clickEffect">
+                                  <p:stCondLst>
+                                    <p:cond delay="0"/>
+                                  </p:stCondLst>
+                                  <p:childTnLst>
+                                    <p:set>
+                                      <p:cBhvr>
+                                        <p:cTn id="74" dur="1" fill="hold">
+                                          <p:stCondLst>
+                                            <p:cond delay="0"/>
+                                          </p:stCondLst>
+                                        </p:cTn>
+                                        <p:tgtEl>
+                                          <p:spTgt spid="3">
+                                            <p:txEl>
+                                              <p:pRg st="14" end="14"/>
+                                            </p:txEl>
+                                          </p:spTgt>
+                                        </p:tgtEl>
+                                        <p:attrNameLst>
+                                          <p:attrName>style.visibility</p:attrName>
+                                        </p:attrNameLst>
+                                      </p:cBhvr>
+                                      <p:to>
+                                        <p:strVal val="visible"/>
+                                      </p:to>
+                                    </p:set>
+                                    <p:anim calcmode="lin" valueType="num">
+                                      <p:cBhvr additive="base">
+                                        <p:cTn id="75" dur="500"/>
+                                        <p:tgtEl>
+                                          <p:spTgt spid="3">
+                                            <p:txEl>
+                                              <p:pRg st="14" end="14"/>
+                                            </p:txEl>
+                                          </p:spTgt>
+                                        </p:tgtEl>
+                                        <p:attrNameLst>
+                                          <p:attrName>ppt_y</p:attrName>
+                                        </p:attrNameLst>
+                                      </p:cBhvr>
+                                      <p:tavLst>
+                                        <p:tav tm="0">
+                                          <p:val>
+                                            <p:strVal val="#ppt_y+#ppt_h*1.125000"/>
+                                          </p:val>
+                                        </p:tav>
+                                        <p:tav tm="100000">
+                                          <p:val>
+                                            <p:strVal val="#ppt_y"/>
+                                          </p:val>
+                                        </p:tav>
+                                      </p:tavLst>
+                                    </p:anim>
+                                    <p:animEffect transition="in" filter="wipe(up)">
+                                      <p:cBhvr>
+                                        <p:cTn id="76" dur="500"/>
+                                        <p:tgtEl>
+                                          <p:spTgt spid="3">
+                                            <p:txEl>
+                                              <p:pRg st="14" end="14"/>
                                             </p:txEl>
                                           </p:spTgt>
                                         </p:tgtEl>

</xml_diff>

<commit_message>
Removed some animations from 'what is angular?' features slide
Change-Id: I13594306f2ebe41b25f0e8a81fdbafc8ee3fad97
</commit_message>
<xml_diff>
--- a/Introduction to AngularJs.pptx
+++ b/Introduction to AngularJs.pptx
@@ -30220,222 +30220,6 @@
                       </p:childTnLst>
                     </p:cTn>
                   </p:par>
-                  <p:par>
-                    <p:cTn id="49" fill="hold">
-                      <p:stCondLst>
-                        <p:cond delay="indefinite"/>
-                      </p:stCondLst>
-                      <p:childTnLst>
-                        <p:par>
-                          <p:cTn id="50" fill="hold">
-                            <p:stCondLst>
-                              <p:cond delay="0"/>
-                            </p:stCondLst>
-                            <p:childTnLst>
-                              <p:par>
-                                <p:cTn id="51" presetID="6" presetClass="emph" presetSubtype="0" accel="50000" fill="hold" grpId="1" nodeType="clickEffect">
-                                  <p:stCondLst>
-                                    <p:cond delay="0"/>
-                                  </p:stCondLst>
-                                  <p:childTnLst>
-                                    <p:animScale>
-                                      <p:cBhvr>
-                                        <p:cTn id="52" dur="500" fill="hold"/>
-                                        <p:tgtEl>
-                                          <p:spTgt spid="9"/>
-                                        </p:tgtEl>
-                                      </p:cBhvr>
-                                      <p:by x="150000" y="150000"/>
-                                    </p:animScale>
-                                  </p:childTnLst>
-                                </p:cTn>
-                              </p:par>
-                            </p:childTnLst>
-                          </p:cTn>
-                        </p:par>
-                      </p:childTnLst>
-                    </p:cTn>
-                  </p:par>
-                  <p:par>
-                    <p:cTn id="53" fill="hold">
-                      <p:stCondLst>
-                        <p:cond delay="indefinite"/>
-                      </p:stCondLst>
-                      <p:childTnLst>
-                        <p:par>
-                          <p:cTn id="54" fill="hold">
-                            <p:stCondLst>
-                              <p:cond delay="0"/>
-                            </p:stCondLst>
-                            <p:childTnLst>
-                              <p:par>
-                                <p:cTn id="55" presetID="6" presetClass="emph" presetSubtype="0" accel="50000" fill="hold" grpId="1" nodeType="clickEffect">
-                                  <p:stCondLst>
-                                    <p:cond delay="0"/>
-                                  </p:stCondLst>
-                                  <p:childTnLst>
-                                    <p:animScale>
-                                      <p:cBhvr>
-                                        <p:cTn id="56" dur="500" fill="hold"/>
-                                        <p:tgtEl>
-                                          <p:spTgt spid="10"/>
-                                        </p:tgtEl>
-                                      </p:cBhvr>
-                                      <p:by x="150000" y="150000"/>
-                                    </p:animScale>
-                                  </p:childTnLst>
-                                </p:cTn>
-                              </p:par>
-                            </p:childTnLst>
-                          </p:cTn>
-                        </p:par>
-                      </p:childTnLst>
-                    </p:cTn>
-                  </p:par>
-                  <p:par>
-                    <p:cTn id="57" fill="hold">
-                      <p:stCondLst>
-                        <p:cond delay="indefinite"/>
-                      </p:stCondLst>
-                      <p:childTnLst>
-                        <p:par>
-                          <p:cTn id="58" fill="hold">
-                            <p:stCondLst>
-                              <p:cond delay="0"/>
-                            </p:stCondLst>
-                            <p:childTnLst>
-                              <p:par>
-                                <p:cTn id="59" presetID="6" presetClass="emph" presetSubtype="0" accel="50000" fill="hold" grpId="1" nodeType="clickEffect">
-                                  <p:stCondLst>
-                                    <p:cond delay="0"/>
-                                  </p:stCondLst>
-                                  <p:childTnLst>
-                                    <p:animScale>
-                                      <p:cBhvr>
-                                        <p:cTn id="60" dur="500" fill="hold"/>
-                                        <p:tgtEl>
-                                          <p:spTgt spid="11"/>
-                                        </p:tgtEl>
-                                      </p:cBhvr>
-                                      <p:by x="150000" y="150000"/>
-                                    </p:animScale>
-                                  </p:childTnLst>
-                                </p:cTn>
-                              </p:par>
-                            </p:childTnLst>
-                          </p:cTn>
-                        </p:par>
-                      </p:childTnLst>
-                    </p:cTn>
-                  </p:par>
-                  <p:par>
-                    <p:cTn id="61" fill="hold">
-                      <p:stCondLst>
-                        <p:cond delay="indefinite"/>
-                      </p:stCondLst>
-                      <p:childTnLst>
-                        <p:par>
-                          <p:cTn id="62" fill="hold">
-                            <p:stCondLst>
-                              <p:cond delay="0"/>
-                            </p:stCondLst>
-                            <p:childTnLst>
-                              <p:par>
-                                <p:cTn id="63" presetID="6" presetClass="emph" presetSubtype="0" accel="50000" fill="hold" grpId="1" nodeType="clickEffect">
-                                  <p:stCondLst>
-                                    <p:cond delay="0"/>
-                                  </p:stCondLst>
-                                  <p:childTnLst>
-                                    <p:animScale>
-                                      <p:cBhvr>
-                                        <p:cTn id="64" dur="500" fill="hold"/>
-                                        <p:tgtEl>
-                                          <p:spTgt spid="13"/>
-                                        </p:tgtEl>
-                                      </p:cBhvr>
-                                      <p:by x="150000" y="150000"/>
-                                    </p:animScale>
-                                  </p:childTnLst>
-                                </p:cTn>
-                              </p:par>
-                            </p:childTnLst>
-                          </p:cTn>
-                        </p:par>
-                      </p:childTnLst>
-                    </p:cTn>
-                  </p:par>
-                  <p:par>
-                    <p:cTn id="65" fill="hold">
-                      <p:stCondLst>
-                        <p:cond delay="indefinite"/>
-                      </p:stCondLst>
-                      <p:childTnLst>
-                        <p:par>
-                          <p:cTn id="66" fill="hold">
-                            <p:stCondLst>
-                              <p:cond delay="0"/>
-                            </p:stCondLst>
-                            <p:childTnLst>
-                              <p:par>
-                                <p:cTn id="67" presetID="6" presetClass="emph" presetSubtype="0" accel="50000" fill="hold" grpId="1" nodeType="clickEffect">
-                                  <p:stCondLst>
-                                    <p:cond delay="0"/>
-                                  </p:stCondLst>
-                                  <p:childTnLst>
-                                    <p:animScale>
-                                      <p:cBhvr>
-                                        <p:cTn id="68" dur="500" fill="hold"/>
-                                        <p:tgtEl>
-                                          <p:spTgt spid="14"/>
-                                        </p:tgtEl>
-                                      </p:cBhvr>
-                                      <p:by x="150000" y="150000"/>
-                                    </p:animScale>
-                                  </p:childTnLst>
-                                </p:cTn>
-                              </p:par>
-                            </p:childTnLst>
-                          </p:cTn>
-                        </p:par>
-                      </p:childTnLst>
-                    </p:cTn>
-                  </p:par>
-                  <p:par>
-                    <p:cTn id="69" fill="hold">
-                      <p:stCondLst>
-                        <p:cond delay="indefinite"/>
-                      </p:stCondLst>
-                      <p:childTnLst>
-                        <p:par>
-                          <p:cTn id="70" fill="hold">
-                            <p:stCondLst>
-                              <p:cond delay="0"/>
-                            </p:stCondLst>
-                            <p:childTnLst>
-                              <p:par>
-                                <p:cTn id="71" presetID="6" presetClass="emph" presetSubtype="0" accel="50000" fill="hold" grpId="1" nodeType="clickEffect">
-                                  <p:stCondLst>
-                                    <p:cond delay="0"/>
-                                  </p:stCondLst>
-                                  <p:childTnLst>
-                                    <p:animScale>
-                                      <p:cBhvr>
-                                        <p:cTn id="72" dur="500" fill="hold"/>
-                                        <p:tgtEl>
-                                          <p:spTgt spid="12"/>
-                                        </p:tgtEl>
-                                      </p:cBhvr>
-                                      <p:by x="150000" y="150000"/>
-                                    </p:animScale>
-                                  </p:childTnLst>
-                                </p:cTn>
-                              </p:par>
-                            </p:childTnLst>
-                          </p:cTn>
-                        </p:par>
-                      </p:childTnLst>
-                    </p:cTn>
-                  </p:par>
                 </p:childTnLst>
               </p:cTn>
               <p:prevCondLst>
@@ -30461,17 +30245,11 @@
       <p:bldP spid="6" grpId="0" animBg="1"/>
       <p:bldP spid="8" grpId="0" animBg="1"/>
       <p:bldP spid="9" grpId="0" animBg="1"/>
-      <p:bldP spid="9" grpId="1" animBg="1"/>
       <p:bldP spid="10" grpId="0" animBg="1"/>
-      <p:bldP spid="10" grpId="1" animBg="1"/>
       <p:bldP spid="11" grpId="0" animBg="1"/>
-      <p:bldP spid="11" grpId="1" animBg="1"/>
       <p:bldP spid="12" grpId="0" animBg="1"/>
-      <p:bldP spid="12" grpId="1" animBg="1"/>
       <p:bldP spid="13" grpId="0" animBg="1"/>
-      <p:bldP spid="13" grpId="1" animBg="1"/>
       <p:bldP spid="14" grpId="0" animBg="1"/>
-      <p:bldP spid="14" grpId="1" animBg="1"/>
       <p:bldP spid="15" grpId="0" animBg="1"/>
       <p:bldP spid="16" grpId="0" animBg="1"/>
     </p:bldLst>

</xml_diff>

<commit_message>
Added example for form validation
Change-Id: Id544e5b34eb297af78e4670135d03776b91d358c
</commit_message>
<xml_diff>
--- a/Introduction to AngularJs.pptx
+++ b/Introduction to AngularJs.pptx
@@ -10433,9 +10433,6 @@
                     <p:cTn id="3" fill="hold">
                       <p:stCondLst>
                         <p:cond delay="indefinite"/>
-                        <p:cond evt="onBegin" delay="0">
-                          <p:tn val="2"/>
-                        </p:cond>
                       </p:stCondLst>
                       <p:childTnLst>
                         <p:par>
@@ -10445,7 +10442,7 @@
                             </p:stCondLst>
                             <p:childTnLst>
                               <p:par>
-                                <p:cTn id="5" presetID="1" presetClass="entr" presetSubtype="0" fill="hold" grpId="0" nodeType="withEffect">
+                                <p:cTn id="5" presetID="1" presetClass="entr" presetSubtype="0" fill="hold" grpId="0" nodeType="clickEffect">
                                   <p:stCondLst>
                                     <p:cond delay="0"/>
                                   </p:stCondLst>
@@ -12447,6 +12444,9 @@
                     <p:cTn id="3" fill="hold">
                       <p:stCondLst>
                         <p:cond delay="indefinite"/>
+                        <p:cond evt="onBegin" delay="0">
+                          <p:tn val="2"/>
+                        </p:cond>
                       </p:stCondLst>
                       <p:childTnLst>
                         <p:par>
@@ -12456,7 +12456,7 @@
                             </p:stCondLst>
                             <p:childTnLst>
                               <p:par>
-                                <p:cTn id="5" presetID="12" presetClass="entr" presetSubtype="4" fill="hold" nodeType="clickEffect">
+                                <p:cTn id="5" presetID="12" presetClass="entr" presetSubtype="4" fill="hold" nodeType="withEffect">
                                   <p:stCondLst>
                                     <p:cond delay="0"/>
                                   </p:stCondLst>
@@ -20311,6 +20311,9 @@
                     <p:cTn id="3" fill="hold">
                       <p:stCondLst>
                         <p:cond delay="indefinite"/>
+                        <p:cond evt="onBegin" delay="0">
+                          <p:tn val="2"/>
+                        </p:cond>
                       </p:stCondLst>
                       <p:childTnLst>
                         <p:par>
@@ -20320,7 +20323,7 @@
                             </p:stCondLst>
                             <p:childTnLst>
                               <p:par>
-                                <p:cTn id="5" presetID="53" presetClass="entr" presetSubtype="16" fill="hold" grpId="0" nodeType="clickEffect">
+                                <p:cTn id="5" presetID="53" presetClass="entr" presetSubtype="16" fill="hold" grpId="0" nodeType="withEffect">
                                   <p:stCondLst>
                                     <p:cond delay="0"/>
                                   </p:stCondLst>
@@ -20419,7 +20422,7 @@
                             </p:stCondLst>
                             <p:childTnLst>
                               <p:par>
-                                <p:cTn id="12" presetID="53" presetClass="entr" presetSubtype="16" fill="hold" grpId="0" nodeType="clickEffect">
+                                <p:cTn id="12" presetID="1" presetClass="entr" presetSubtype="0" fill="hold" grpId="0" nodeType="clickEffect">
                                   <p:stCondLst>
                                     <p:cond delay="0"/>
                                   </p:stCondLst>
@@ -20444,62 +20447,72 @@
                                         <p:strVal val="visible"/>
                                       </p:to>
                                     </p:set>
+                                  </p:childTnLst>
+                                </p:cTn>
+                              </p:par>
+                              <p:par>
+                                <p:cTn id="14" presetID="12" presetClass="entr" presetSubtype="4" fill="hold" nodeType="withEffect">
+                                  <p:stCondLst>
+                                    <p:cond delay="0"/>
+                                  </p:stCondLst>
+                                  <p:childTnLst>
+                                    <p:set>
+                                      <p:cBhvr>
+                                        <p:cTn id="15" dur="1" fill="hold">
+                                          <p:stCondLst>
+                                            <p:cond delay="0"/>
+                                          </p:stCondLst>
+                                        </p:cTn>
+                                        <p:tgtEl>
+                                          <p:spTgt spid="3">
+                                            <p:txEl>
+                                              <p:pRg st="0" end="0"/>
+                                            </p:txEl>
+                                          </p:spTgt>
+                                        </p:tgtEl>
+                                        <p:attrNameLst>
+                                          <p:attrName>style.visibility</p:attrName>
+                                        </p:attrNameLst>
+                                      </p:cBhvr>
+                                      <p:to>
+                                        <p:strVal val="visible"/>
+                                      </p:to>
+                                    </p:set>
                                     <p:anim calcmode="lin" valueType="num">
-                                      <p:cBhvr>
-                                        <p:cTn id="14" dur="500" fill="hold"/>
-                                        <p:tgtEl>
-                                          <p:spTgt spid="3">
-                                            <p:bg/>
-                                          </p:spTgt>
-                                        </p:tgtEl>
-                                        <p:attrNameLst>
-                                          <p:attrName>ppt_w</p:attrName>
+                                      <p:cBhvr additive="base">
+                                        <p:cTn id="16" dur="500"/>
+                                        <p:tgtEl>
+                                          <p:spTgt spid="3">
+                                            <p:txEl>
+                                              <p:pRg st="0" end="0"/>
+                                            </p:txEl>
+                                          </p:spTgt>
+                                        </p:tgtEl>
+                                        <p:attrNameLst>
+                                          <p:attrName>ppt_y</p:attrName>
                                         </p:attrNameLst>
                                       </p:cBhvr>
                                       <p:tavLst>
                                         <p:tav tm="0">
                                           <p:val>
-                                            <p:fltVal val="0"/>
+                                            <p:strVal val="#ppt_y+#ppt_h*1.125000"/>
                                           </p:val>
                                         </p:tav>
                                         <p:tav tm="100000">
                                           <p:val>
-                                            <p:strVal val="#ppt_w"/>
+                                            <p:strVal val="#ppt_y"/>
                                           </p:val>
                                         </p:tav>
                                       </p:tavLst>
                                     </p:anim>
-                                    <p:anim calcmode="lin" valueType="num">
-                                      <p:cBhvr>
-                                        <p:cTn id="15" dur="500" fill="hold"/>
-                                        <p:tgtEl>
-                                          <p:spTgt spid="3">
-                                            <p:bg/>
-                                          </p:spTgt>
-                                        </p:tgtEl>
-                                        <p:attrNameLst>
-                                          <p:attrName>ppt_h</p:attrName>
-                                        </p:attrNameLst>
-                                      </p:cBhvr>
-                                      <p:tavLst>
-                                        <p:tav tm="0">
-                                          <p:val>
-                                            <p:fltVal val="0"/>
-                                          </p:val>
-                                        </p:tav>
-                                        <p:tav tm="100000">
-                                          <p:val>
-                                            <p:strVal val="#ppt_h"/>
-                                          </p:val>
-                                        </p:tav>
-                                      </p:tavLst>
-                                    </p:anim>
-                                    <p:animEffect transition="in" filter="fade">
-                                      <p:cBhvr>
-                                        <p:cTn id="16" dur="500"/>
-                                        <p:tgtEl>
-                                          <p:spTgt spid="3">
-                                            <p:bg/>
+                                    <p:animEffect transition="in" filter="wipe(up)">
+                                      <p:cBhvr>
+                                        <p:cTn id="17" dur="500"/>
+                                        <p:tgtEl>
+                                          <p:spTgt spid="3">
+                                            <p:txEl>
+                                              <p:pRg st="0" end="0"/>
+                                            </p:txEl>
                                           </p:spTgt>
                                         </p:tgtEl>
                                       </p:cBhvr>
@@ -20514,26 +20527,26 @@
                     </p:cTn>
                   </p:par>
                   <p:par>
-                    <p:cTn id="17" fill="hold">
+                    <p:cTn id="18" fill="hold">
                       <p:stCondLst>
                         <p:cond delay="indefinite"/>
                       </p:stCondLst>
                       <p:childTnLst>
                         <p:par>
-                          <p:cTn id="18" fill="hold">
+                          <p:cTn id="19" fill="hold">
                             <p:stCondLst>
                               <p:cond delay="0"/>
                             </p:stCondLst>
                             <p:childTnLst>
                               <p:par>
-                                <p:cTn id="19" presetID="53" presetClass="entr" presetSubtype="16" fill="hold" nodeType="clickEffect">
+                                <p:cTn id="20" presetID="12" presetClass="entr" presetSubtype="4" fill="hold" nodeType="clickEffect">
                                   <p:stCondLst>
                                     <p:cond delay="0"/>
                                   </p:stCondLst>
                                   <p:childTnLst>
                                     <p:set>
                                       <p:cBhvr>
-                                        <p:cTn id="20" dur="1" fill="hold">
+                                        <p:cTn id="21" dur="1" fill="hold">
                                           <p:stCondLst>
                                             <p:cond delay="0"/>
                                           </p:stCondLst>
@@ -20541,7 +20554,7 @@
                                         <p:tgtEl>
                                           <p:spTgt spid="3">
                                             <p:txEl>
-                                              <p:pRg st="0" end="0"/>
+                                              <p:pRg st="1" end="1"/>
                                             </p:txEl>
                                           </p:spTgt>
                                         </p:tgtEl>
@@ -20554,66 +20567,39 @@
                                       </p:to>
                                     </p:set>
                                     <p:anim calcmode="lin" valueType="num">
-                                      <p:cBhvr>
-                                        <p:cTn id="21" dur="500" fill="hold"/>
-                                        <p:tgtEl>
-                                          <p:spTgt spid="3">
-                                            <p:txEl>
-                                              <p:pRg st="0" end="0"/>
-                                            </p:txEl>
-                                          </p:spTgt>
-                                        </p:tgtEl>
-                                        <p:attrNameLst>
-                                          <p:attrName>ppt_w</p:attrName>
+                                      <p:cBhvr additive="base">
+                                        <p:cTn id="22" dur="500"/>
+                                        <p:tgtEl>
+                                          <p:spTgt spid="3">
+                                            <p:txEl>
+                                              <p:pRg st="1" end="1"/>
+                                            </p:txEl>
+                                          </p:spTgt>
+                                        </p:tgtEl>
+                                        <p:attrNameLst>
+                                          <p:attrName>ppt_y</p:attrName>
                                         </p:attrNameLst>
                                       </p:cBhvr>
                                       <p:tavLst>
                                         <p:tav tm="0">
                                           <p:val>
-                                            <p:fltVal val="0"/>
+                                            <p:strVal val="#ppt_y+#ppt_h*1.125000"/>
                                           </p:val>
                                         </p:tav>
                                         <p:tav tm="100000">
                                           <p:val>
-                                            <p:strVal val="#ppt_w"/>
+                                            <p:strVal val="#ppt_y"/>
                                           </p:val>
                                         </p:tav>
                                       </p:tavLst>
                                     </p:anim>
-                                    <p:anim calcmode="lin" valueType="num">
-                                      <p:cBhvr>
-                                        <p:cTn id="22" dur="500" fill="hold"/>
-                                        <p:tgtEl>
-                                          <p:spTgt spid="3">
-                                            <p:txEl>
-                                              <p:pRg st="0" end="0"/>
-                                            </p:txEl>
-                                          </p:spTgt>
-                                        </p:tgtEl>
-                                        <p:attrNameLst>
-                                          <p:attrName>ppt_h</p:attrName>
-                                        </p:attrNameLst>
-                                      </p:cBhvr>
-                                      <p:tavLst>
-                                        <p:tav tm="0">
-                                          <p:val>
-                                            <p:fltVal val="0"/>
-                                          </p:val>
-                                        </p:tav>
-                                        <p:tav tm="100000">
-                                          <p:val>
-                                            <p:strVal val="#ppt_h"/>
-                                          </p:val>
-                                        </p:tav>
-                                      </p:tavLst>
-                                    </p:anim>
-                                    <p:animEffect transition="in" filter="fade">
+                                    <p:animEffect transition="in" filter="wipe(up)">
                                       <p:cBhvr>
                                         <p:cTn id="23" dur="500"/>
                                         <p:tgtEl>
                                           <p:spTgt spid="3">
                                             <p:txEl>
-                                              <p:pRg st="0" end="0"/>
+                                              <p:pRg st="1" end="1"/>
                                             </p:txEl>
                                           </p:spTgt>
                                         </p:tgtEl>
@@ -20656,7 +20642,7 @@
                                         <p:tgtEl>
                                           <p:spTgt spid="3">
                                             <p:txEl>
-                                              <p:pRg st="1" end="1"/>
+                                              <p:pRg st="20" end="20"/>
                                             </p:txEl>
                                           </p:spTgt>
                                         </p:tgtEl>
@@ -20674,7 +20660,7 @@
                                         <p:tgtEl>
                                           <p:spTgt spid="3">
                                             <p:txEl>
-                                              <p:pRg st="1" end="1"/>
+                                              <p:pRg st="20" end="20"/>
                                             </p:txEl>
                                           </p:spTgt>
                                         </p:tgtEl>
@@ -20701,7 +20687,7 @@
                                         <p:tgtEl>
                                           <p:spTgt spid="3">
                                             <p:txEl>
-                                              <p:pRg st="1" end="1"/>
+                                              <p:pRg st="20" end="20"/>
                                             </p:txEl>
                                           </p:spTgt>
                                         </p:tgtEl>
@@ -20729,7 +20715,7 @@
                             </p:stCondLst>
                             <p:childTnLst>
                               <p:par>
-                                <p:cTn id="32" presetID="12" presetClass="entr" presetSubtype="4" fill="hold" nodeType="clickEffect">
+                                <p:cTn id="32" presetID="12" presetClass="entr" presetSubtype="4" fill="hold" grpId="0" nodeType="clickEffect">
                                   <p:stCondLst>
                                     <p:cond delay="0"/>
                                   </p:stCondLst>
@@ -20744,7 +20730,7 @@
                                         <p:tgtEl>
                                           <p:spTgt spid="3">
                                             <p:txEl>
-                                              <p:pRg st="20" end="20"/>
+                                              <p:pRg st="2" end="2"/>
                                             </p:txEl>
                                           </p:spTgt>
                                         </p:tgtEl>
@@ -20762,7 +20748,7 @@
                                         <p:tgtEl>
                                           <p:spTgt spid="3">
                                             <p:txEl>
-                                              <p:pRg st="20" end="20"/>
+                                              <p:pRg st="2" end="2"/>
                                             </p:txEl>
                                           </p:spTgt>
                                         </p:tgtEl>
@@ -20789,7 +20775,7 @@
                                         <p:tgtEl>
                                           <p:spTgt spid="3">
                                             <p:txEl>
-                                              <p:pRg st="20" end="20"/>
+                                              <p:pRg st="2" end="2"/>
                                             </p:txEl>
                                           </p:spTgt>
                                         </p:tgtEl>
@@ -20817,7 +20803,7 @@
                             </p:stCondLst>
                             <p:childTnLst>
                               <p:par>
-                                <p:cTn id="38" presetID="12" presetClass="entr" presetSubtype="4" fill="hold" grpId="0" nodeType="clickEffect">
+                                <p:cTn id="38" presetID="12" presetClass="entr" presetSubtype="4" fill="hold" nodeType="clickEffect">
                                   <p:stCondLst>
                                     <p:cond delay="0"/>
                                   </p:stCondLst>
@@ -20832,7 +20818,7 @@
                                         <p:tgtEl>
                                           <p:spTgt spid="3">
                                             <p:txEl>
-                                              <p:pRg st="2" end="2"/>
+                                              <p:pRg st="19" end="19"/>
                                             </p:txEl>
                                           </p:spTgt>
                                         </p:tgtEl>
@@ -20850,7 +20836,7 @@
                                         <p:tgtEl>
                                           <p:spTgt spid="3">
                                             <p:txEl>
-                                              <p:pRg st="2" end="2"/>
+                                              <p:pRg st="19" end="19"/>
                                             </p:txEl>
                                           </p:spTgt>
                                         </p:tgtEl>
@@ -20877,7 +20863,7 @@
                                         <p:tgtEl>
                                           <p:spTgt spid="3">
                                             <p:txEl>
-                                              <p:pRg st="2" end="2"/>
+                                              <p:pRg st="19" end="19"/>
                                             </p:txEl>
                                           </p:spTgt>
                                         </p:tgtEl>
@@ -20905,7 +20891,7 @@
                             </p:stCondLst>
                             <p:childTnLst>
                               <p:par>
-                                <p:cTn id="44" presetID="12" presetClass="entr" presetSubtype="4" fill="hold" nodeType="clickEffect">
+                                <p:cTn id="44" presetID="12" presetClass="entr" presetSubtype="4" fill="hold" grpId="0" nodeType="clickEffect">
                                   <p:stCondLst>
                                     <p:cond delay="0"/>
                                   </p:stCondLst>
@@ -20920,7 +20906,7 @@
                                         <p:tgtEl>
                                           <p:spTgt spid="3">
                                             <p:txEl>
-                                              <p:pRg st="19" end="19"/>
+                                              <p:pRg st="3" end="3"/>
                                             </p:txEl>
                                           </p:spTgt>
                                         </p:tgtEl>
@@ -20938,7 +20924,7 @@
                                         <p:tgtEl>
                                           <p:spTgt spid="3">
                                             <p:txEl>
-                                              <p:pRg st="19" end="19"/>
+                                              <p:pRg st="3" end="3"/>
                                             </p:txEl>
                                           </p:spTgt>
                                         </p:tgtEl>
@@ -20965,7 +20951,7 @@
                                         <p:tgtEl>
                                           <p:spTgt spid="3">
                                             <p:txEl>
-                                              <p:pRg st="19" end="19"/>
+                                              <p:pRg st="3" end="3"/>
                                             </p:txEl>
                                           </p:spTgt>
                                         </p:tgtEl>
@@ -21008,7 +20994,7 @@
                                         <p:tgtEl>
                                           <p:spTgt spid="3">
                                             <p:txEl>
-                                              <p:pRg st="3" end="3"/>
+                                              <p:pRg st="4" end="4"/>
                                             </p:txEl>
                                           </p:spTgt>
                                         </p:tgtEl>
@@ -21026,7 +21012,7 @@
                                         <p:tgtEl>
                                           <p:spTgt spid="3">
                                             <p:txEl>
-                                              <p:pRg st="3" end="3"/>
+                                              <p:pRg st="4" end="4"/>
                                             </p:txEl>
                                           </p:spTgt>
                                         </p:tgtEl>
@@ -21053,7 +21039,77 @@
                                         <p:tgtEl>
                                           <p:spTgt spid="3">
                                             <p:txEl>
-                                              <p:pRg st="3" end="3"/>
+                                              <p:pRg st="4" end="4"/>
+                                            </p:txEl>
+                                          </p:spTgt>
+                                        </p:tgtEl>
+                                      </p:cBhvr>
+                                    </p:animEffect>
+                                  </p:childTnLst>
+                                </p:cTn>
+                              </p:par>
+                              <p:par>
+                                <p:cTn id="54" presetID="12" presetClass="entr" presetSubtype="4" fill="hold" grpId="0" nodeType="withEffect">
+                                  <p:stCondLst>
+                                    <p:cond delay="0"/>
+                                  </p:stCondLst>
+                                  <p:childTnLst>
+                                    <p:set>
+                                      <p:cBhvr>
+                                        <p:cTn id="55" dur="1" fill="hold">
+                                          <p:stCondLst>
+                                            <p:cond delay="0"/>
+                                          </p:stCondLst>
+                                        </p:cTn>
+                                        <p:tgtEl>
+                                          <p:spTgt spid="3">
+                                            <p:txEl>
+                                              <p:pRg st="5" end="5"/>
+                                            </p:txEl>
+                                          </p:spTgt>
+                                        </p:tgtEl>
+                                        <p:attrNameLst>
+                                          <p:attrName>style.visibility</p:attrName>
+                                        </p:attrNameLst>
+                                      </p:cBhvr>
+                                      <p:to>
+                                        <p:strVal val="visible"/>
+                                      </p:to>
+                                    </p:set>
+                                    <p:anim calcmode="lin" valueType="num">
+                                      <p:cBhvr additive="base">
+                                        <p:cTn id="56" dur="500"/>
+                                        <p:tgtEl>
+                                          <p:spTgt spid="3">
+                                            <p:txEl>
+                                              <p:pRg st="5" end="5"/>
+                                            </p:txEl>
+                                          </p:spTgt>
+                                        </p:tgtEl>
+                                        <p:attrNameLst>
+                                          <p:attrName>ppt_y</p:attrName>
+                                        </p:attrNameLst>
+                                      </p:cBhvr>
+                                      <p:tavLst>
+                                        <p:tav tm="0">
+                                          <p:val>
+                                            <p:strVal val="#ppt_y+#ppt_h*1.125000"/>
+                                          </p:val>
+                                        </p:tav>
+                                        <p:tav tm="100000">
+                                          <p:val>
+                                            <p:strVal val="#ppt_y"/>
+                                          </p:val>
+                                        </p:tav>
+                                      </p:tavLst>
+                                    </p:anim>
+                                    <p:animEffect transition="in" filter="wipe(up)">
+                                      <p:cBhvr>
+                                        <p:cTn id="57" dur="500"/>
+                                        <p:tgtEl>
+                                          <p:spTgt spid="3">
+                                            <p:txEl>
+                                              <p:pRg st="5" end="5"/>
                                             </p:txEl>
                                           </p:spTgt>
                                         </p:tgtEl>
@@ -21069,26 +21125,26 @@
                     </p:cTn>
                   </p:par>
                   <p:par>
-                    <p:cTn id="54" fill="hold">
+                    <p:cTn id="58" fill="hold">
                       <p:stCondLst>
                         <p:cond delay="indefinite"/>
                       </p:stCondLst>
                       <p:childTnLst>
                         <p:par>
-                          <p:cTn id="55" fill="hold">
+                          <p:cTn id="59" fill="hold">
                             <p:stCondLst>
                               <p:cond delay="0"/>
                             </p:stCondLst>
                             <p:childTnLst>
                               <p:par>
-                                <p:cTn id="56" presetID="12" presetClass="entr" presetSubtype="4" fill="hold" grpId="0" nodeType="clickEffect">
+                                <p:cTn id="60" presetID="12" presetClass="entr" presetSubtype="4" fill="hold" grpId="0" nodeType="clickEffect">
                                   <p:stCondLst>
                                     <p:cond delay="0"/>
                                   </p:stCondLst>
                                   <p:childTnLst>
                                     <p:set>
                                       <p:cBhvr>
-                                        <p:cTn id="57" dur="1" fill="hold">
+                                        <p:cTn id="61" dur="1" fill="hold">
                                           <p:stCondLst>
                                             <p:cond delay="0"/>
                                           </p:stCondLst>
@@ -21096,7 +21152,7 @@
                                         <p:tgtEl>
                                           <p:spTgt spid="3">
                                             <p:txEl>
-                                              <p:pRg st="4" end="4"/>
+                                              <p:pRg st="6" end="6"/>
                                             </p:txEl>
                                           </p:spTgt>
                                         </p:tgtEl>
@@ -21110,11 +21166,11 @@
                                     </p:set>
                                     <p:anim calcmode="lin" valueType="num">
                                       <p:cBhvr additive="base">
-                                        <p:cTn id="58" dur="500"/>
-                                        <p:tgtEl>
-                                          <p:spTgt spid="3">
-                                            <p:txEl>
-                                              <p:pRg st="4" end="4"/>
+                                        <p:cTn id="62" dur="500"/>
+                                        <p:tgtEl>
+                                          <p:spTgt spid="3">
+                                            <p:txEl>
+                                              <p:pRg st="6" end="6"/>
                                             </p:txEl>
                                           </p:spTgt>
                                         </p:tgtEl>
@@ -21137,11 +21193,11 @@
                                     </p:anim>
                                     <p:animEffect transition="in" filter="wipe(up)">
                                       <p:cBhvr>
-                                        <p:cTn id="59" dur="500"/>
-                                        <p:tgtEl>
-                                          <p:spTgt spid="3">
-                                            <p:txEl>
-                                              <p:pRg st="4" end="4"/>
+                                        <p:cTn id="63" dur="500"/>
+                                        <p:tgtEl>
+                                          <p:spTgt spid="3">
+                                            <p:txEl>
+                                              <p:pRg st="6" end="6"/>
                                             </p:txEl>
                                           </p:spTgt>
                                         </p:tgtEl>
@@ -21157,26 +21213,26 @@
                     </p:cTn>
                   </p:par>
                   <p:par>
-                    <p:cTn id="60" fill="hold">
+                    <p:cTn id="64" fill="hold">
                       <p:stCondLst>
                         <p:cond delay="indefinite"/>
                       </p:stCondLst>
                       <p:childTnLst>
                         <p:par>
-                          <p:cTn id="61" fill="hold">
+                          <p:cTn id="65" fill="hold">
                             <p:stCondLst>
                               <p:cond delay="0"/>
                             </p:stCondLst>
                             <p:childTnLst>
                               <p:par>
-                                <p:cTn id="62" presetID="12" presetClass="entr" presetSubtype="4" fill="hold" grpId="0" nodeType="clickEffect">
+                                <p:cTn id="66" presetID="12" presetClass="entr" presetSubtype="4" fill="hold" grpId="0" nodeType="clickEffect">
                                   <p:stCondLst>
                                     <p:cond delay="0"/>
                                   </p:stCondLst>
                                   <p:childTnLst>
                                     <p:set>
                                       <p:cBhvr>
-                                        <p:cTn id="63" dur="1" fill="hold">
+                                        <p:cTn id="67" dur="1" fill="hold">
                                           <p:stCondLst>
                                             <p:cond delay="0"/>
                                           </p:stCondLst>
@@ -21184,7 +21240,7 @@
                                         <p:tgtEl>
                                           <p:spTgt spid="3">
                                             <p:txEl>
-                                              <p:pRg st="5" end="5"/>
+                                              <p:pRg st="7" end="7"/>
                                             </p:txEl>
                                           </p:spTgt>
                                         </p:tgtEl>
@@ -21198,11 +21254,11 @@
                                     </p:set>
                                     <p:anim calcmode="lin" valueType="num">
                                       <p:cBhvr additive="base">
-                                        <p:cTn id="64" dur="500"/>
-                                        <p:tgtEl>
-                                          <p:spTgt spid="3">
-                                            <p:txEl>
-                                              <p:pRg st="5" end="5"/>
+                                        <p:cTn id="68" dur="500"/>
+                                        <p:tgtEl>
+                                          <p:spTgt spid="3">
+                                            <p:txEl>
+                                              <p:pRg st="7" end="7"/>
                                             </p:txEl>
                                           </p:spTgt>
                                         </p:tgtEl>
@@ -21225,11 +21281,11 @@
                                     </p:anim>
                                     <p:animEffect transition="in" filter="wipe(up)">
                                       <p:cBhvr>
-                                        <p:cTn id="65" dur="500"/>
-                                        <p:tgtEl>
-                                          <p:spTgt spid="3">
-                                            <p:txEl>
-                                              <p:pRg st="5" end="5"/>
+                                        <p:cTn id="69" dur="500"/>
+                                        <p:tgtEl>
+                                          <p:spTgt spid="3">
+                                            <p:txEl>
+                                              <p:pRg st="7" end="7"/>
                                             </p:txEl>
                                           </p:spTgt>
                                         </p:tgtEl>
@@ -21245,26 +21301,26 @@
                     </p:cTn>
                   </p:par>
                   <p:par>
-                    <p:cTn id="66" fill="hold">
+                    <p:cTn id="70" fill="hold">
                       <p:stCondLst>
                         <p:cond delay="indefinite"/>
                       </p:stCondLst>
                       <p:childTnLst>
                         <p:par>
-                          <p:cTn id="67" fill="hold">
+                          <p:cTn id="71" fill="hold">
                             <p:stCondLst>
                               <p:cond delay="0"/>
                             </p:stCondLst>
                             <p:childTnLst>
                               <p:par>
-                                <p:cTn id="68" presetID="12" presetClass="entr" presetSubtype="4" fill="hold" grpId="0" nodeType="clickEffect">
+                                <p:cTn id="72" presetID="12" presetClass="entr" presetSubtype="4" fill="hold" grpId="0" nodeType="clickEffect">
                                   <p:stCondLst>
                                     <p:cond delay="0"/>
                                   </p:stCondLst>
                                   <p:childTnLst>
                                     <p:set>
                                       <p:cBhvr>
-                                        <p:cTn id="69" dur="1" fill="hold">
+                                        <p:cTn id="73" dur="1" fill="hold">
                                           <p:stCondLst>
                                             <p:cond delay="0"/>
                                           </p:stCondLst>
@@ -21272,7 +21328,7 @@
                                         <p:tgtEl>
                                           <p:spTgt spid="3">
                                             <p:txEl>
-                                              <p:pRg st="6" end="6"/>
+                                              <p:pRg st="9" end="9"/>
                                             </p:txEl>
                                           </p:spTgt>
                                         </p:tgtEl>
@@ -21286,11 +21342,11 @@
                                     </p:set>
                                     <p:anim calcmode="lin" valueType="num">
                                       <p:cBhvr additive="base">
-                                        <p:cTn id="70" dur="500"/>
-                                        <p:tgtEl>
-                                          <p:spTgt spid="3">
-                                            <p:txEl>
-                                              <p:pRg st="6" end="6"/>
+                                        <p:cTn id="74" dur="500"/>
+                                        <p:tgtEl>
+                                          <p:spTgt spid="3">
+                                            <p:txEl>
+                                              <p:pRg st="9" end="9"/>
                                             </p:txEl>
                                           </p:spTgt>
                                         </p:tgtEl>
@@ -21313,11 +21369,11 @@
                                     </p:anim>
                                     <p:animEffect transition="in" filter="wipe(up)">
                                       <p:cBhvr>
-                                        <p:cTn id="71" dur="500"/>
-                                        <p:tgtEl>
-                                          <p:spTgt spid="3">
-                                            <p:txEl>
-                                              <p:pRg st="6" end="6"/>
+                                        <p:cTn id="75" dur="500"/>
+                                        <p:tgtEl>
+                                          <p:spTgt spid="3">
+                                            <p:txEl>
+                                              <p:pRg st="9" end="9"/>
                                             </p:txEl>
                                           </p:spTgt>
                                         </p:tgtEl>
@@ -21333,26 +21389,26 @@
                     </p:cTn>
                   </p:par>
                   <p:par>
-                    <p:cTn id="72" fill="hold">
+                    <p:cTn id="76" fill="hold">
                       <p:stCondLst>
                         <p:cond delay="indefinite"/>
                       </p:stCondLst>
                       <p:childTnLst>
                         <p:par>
-                          <p:cTn id="73" fill="hold">
+                          <p:cTn id="77" fill="hold">
                             <p:stCondLst>
                               <p:cond delay="0"/>
                             </p:stCondLst>
                             <p:childTnLst>
                               <p:par>
-                                <p:cTn id="74" presetID="12" presetClass="entr" presetSubtype="4" fill="hold" grpId="0" nodeType="clickEffect">
+                                <p:cTn id="78" presetID="12" presetClass="entr" presetSubtype="4" fill="hold" grpId="0" nodeType="clickEffect">
                                   <p:stCondLst>
                                     <p:cond delay="0"/>
                                   </p:stCondLst>
                                   <p:childTnLst>
                                     <p:set>
                                       <p:cBhvr>
-                                        <p:cTn id="75" dur="1" fill="hold">
+                                        <p:cTn id="79" dur="1" fill="hold">
                                           <p:stCondLst>
                                             <p:cond delay="0"/>
                                           </p:stCondLst>
@@ -21360,7 +21416,7 @@
                                         <p:tgtEl>
                                           <p:spTgt spid="3">
                                             <p:txEl>
-                                              <p:pRg st="7" end="7"/>
+                                              <p:pRg st="10" end="10"/>
                                             </p:txEl>
                                           </p:spTgt>
                                         </p:tgtEl>
@@ -21374,11 +21430,11 @@
                                     </p:set>
                                     <p:anim calcmode="lin" valueType="num">
                                       <p:cBhvr additive="base">
-                                        <p:cTn id="76" dur="500"/>
-                                        <p:tgtEl>
-                                          <p:spTgt spid="3">
-                                            <p:txEl>
-                                              <p:pRg st="7" end="7"/>
+                                        <p:cTn id="80" dur="500"/>
+                                        <p:tgtEl>
+                                          <p:spTgt spid="3">
+                                            <p:txEl>
+                                              <p:pRg st="10" end="10"/>
                                             </p:txEl>
                                           </p:spTgt>
                                         </p:tgtEl>
@@ -21401,11 +21457,11 @@
                                     </p:anim>
                                     <p:animEffect transition="in" filter="wipe(up)">
                                       <p:cBhvr>
-                                        <p:cTn id="77" dur="500"/>
-                                        <p:tgtEl>
-                                          <p:spTgt spid="3">
-                                            <p:txEl>
-                                              <p:pRg st="7" end="7"/>
+                                        <p:cTn id="81" dur="500"/>
+                                        <p:tgtEl>
+                                          <p:spTgt spid="3">
+                                            <p:txEl>
+                                              <p:pRg st="10" end="10"/>
                                             </p:txEl>
                                           </p:spTgt>
                                         </p:tgtEl>
@@ -21421,26 +21477,26 @@
                     </p:cTn>
                   </p:par>
                   <p:par>
-                    <p:cTn id="78" fill="hold">
+                    <p:cTn id="82" fill="hold">
                       <p:stCondLst>
                         <p:cond delay="indefinite"/>
                       </p:stCondLst>
                       <p:childTnLst>
                         <p:par>
-                          <p:cTn id="79" fill="hold">
+                          <p:cTn id="83" fill="hold">
                             <p:stCondLst>
                               <p:cond delay="0"/>
                             </p:stCondLst>
                             <p:childTnLst>
                               <p:par>
-                                <p:cTn id="80" presetID="12" presetClass="entr" presetSubtype="4" fill="hold" grpId="0" nodeType="clickEffect">
+                                <p:cTn id="84" presetID="12" presetClass="entr" presetSubtype="4" fill="hold" grpId="0" nodeType="clickEffect">
                                   <p:stCondLst>
                                     <p:cond delay="0"/>
                                   </p:stCondLst>
                                   <p:childTnLst>
                                     <p:set>
                                       <p:cBhvr>
-                                        <p:cTn id="81" dur="1" fill="hold">
+                                        <p:cTn id="85" dur="1" fill="hold">
                                           <p:stCondLst>
                                             <p:cond delay="0"/>
                                           </p:stCondLst>
@@ -21448,7 +21504,7 @@
                                         <p:tgtEl>
                                           <p:spTgt spid="3">
                                             <p:txEl>
-                                              <p:pRg st="8" end="8"/>
+                                              <p:pRg st="11" end="11"/>
                                             </p:txEl>
                                           </p:spTgt>
                                         </p:tgtEl>
@@ -21462,11 +21518,11 @@
                                     </p:set>
                                     <p:anim calcmode="lin" valueType="num">
                                       <p:cBhvr additive="base">
-                                        <p:cTn id="82" dur="500"/>
-                                        <p:tgtEl>
-                                          <p:spTgt spid="3">
-                                            <p:txEl>
-                                              <p:pRg st="8" end="8"/>
+                                        <p:cTn id="86" dur="500"/>
+                                        <p:tgtEl>
+                                          <p:spTgt spid="3">
+                                            <p:txEl>
+                                              <p:pRg st="11" end="11"/>
                                             </p:txEl>
                                           </p:spTgt>
                                         </p:tgtEl>
@@ -21489,11 +21545,11 @@
                                     </p:anim>
                                     <p:animEffect transition="in" filter="wipe(up)">
                                       <p:cBhvr>
-                                        <p:cTn id="83" dur="500"/>
-                                        <p:tgtEl>
-                                          <p:spTgt spid="3">
-                                            <p:txEl>
-                                              <p:pRg st="8" end="8"/>
+                                        <p:cTn id="87" dur="500"/>
+                                        <p:tgtEl>
+                                          <p:spTgt spid="3">
+                                            <p:txEl>
+                                              <p:pRg st="11" end="11"/>
                                             </p:txEl>
                                           </p:spTgt>
                                         </p:tgtEl>
@@ -21509,26 +21565,26 @@
                     </p:cTn>
                   </p:par>
                   <p:par>
-                    <p:cTn id="84" fill="hold">
+                    <p:cTn id="88" fill="hold">
                       <p:stCondLst>
                         <p:cond delay="indefinite"/>
                       </p:stCondLst>
                       <p:childTnLst>
                         <p:par>
-                          <p:cTn id="85" fill="hold">
+                          <p:cTn id="89" fill="hold">
                             <p:stCondLst>
                               <p:cond delay="0"/>
                             </p:stCondLst>
                             <p:childTnLst>
                               <p:par>
-                                <p:cTn id="86" presetID="12" presetClass="entr" presetSubtype="4" fill="hold" grpId="0" nodeType="clickEffect">
+                                <p:cTn id="90" presetID="12" presetClass="entr" presetSubtype="4" fill="hold" grpId="0" nodeType="clickEffect">
                                   <p:stCondLst>
                                     <p:cond delay="0"/>
                                   </p:stCondLst>
                                   <p:childTnLst>
                                     <p:set>
                                       <p:cBhvr>
-                                        <p:cTn id="87" dur="1" fill="hold">
+                                        <p:cTn id="91" dur="1" fill="hold">
                                           <p:stCondLst>
                                             <p:cond delay="0"/>
                                           </p:stCondLst>
@@ -21536,7 +21592,7 @@
                                         <p:tgtEl>
                                           <p:spTgt spid="3">
                                             <p:txEl>
-                                              <p:pRg st="9" end="9"/>
+                                              <p:pRg st="12" end="12"/>
                                             </p:txEl>
                                           </p:spTgt>
                                         </p:tgtEl>
@@ -21550,11 +21606,11 @@
                                     </p:set>
                                     <p:anim calcmode="lin" valueType="num">
                                       <p:cBhvr additive="base">
-                                        <p:cTn id="88" dur="500"/>
-                                        <p:tgtEl>
-                                          <p:spTgt spid="3">
-                                            <p:txEl>
-                                              <p:pRg st="9" end="9"/>
+                                        <p:cTn id="92" dur="500"/>
+                                        <p:tgtEl>
+                                          <p:spTgt spid="3">
+                                            <p:txEl>
+                                              <p:pRg st="12" end="12"/>
                                             </p:txEl>
                                           </p:spTgt>
                                         </p:tgtEl>
@@ -21577,11 +21633,11 @@
                                     </p:anim>
                                     <p:animEffect transition="in" filter="wipe(up)">
                                       <p:cBhvr>
-                                        <p:cTn id="89" dur="500"/>
-                                        <p:tgtEl>
-                                          <p:spTgt spid="3">
-                                            <p:txEl>
-                                              <p:pRg st="9" end="9"/>
+                                        <p:cTn id="93" dur="500"/>
+                                        <p:tgtEl>
+                                          <p:spTgt spid="3">
+                                            <p:txEl>
+                                              <p:pRg st="12" end="12"/>
                                             </p:txEl>
                                           </p:spTgt>
                                         </p:tgtEl>
@@ -21597,26 +21653,26 @@
                     </p:cTn>
                   </p:par>
                   <p:par>
-                    <p:cTn id="90" fill="hold">
+                    <p:cTn id="94" fill="hold">
                       <p:stCondLst>
                         <p:cond delay="indefinite"/>
                       </p:stCondLst>
                       <p:childTnLst>
                         <p:par>
-                          <p:cTn id="91" fill="hold">
+                          <p:cTn id="95" fill="hold">
                             <p:stCondLst>
                               <p:cond delay="0"/>
                             </p:stCondLst>
                             <p:childTnLst>
                               <p:par>
-                                <p:cTn id="92" presetID="12" presetClass="entr" presetSubtype="4" fill="hold" grpId="0" nodeType="clickEffect">
+                                <p:cTn id="96" presetID="12" presetClass="entr" presetSubtype="4" fill="hold" grpId="0" nodeType="clickEffect">
                                   <p:stCondLst>
                                     <p:cond delay="0"/>
                                   </p:stCondLst>
                                   <p:childTnLst>
                                     <p:set>
                                       <p:cBhvr>
-                                        <p:cTn id="93" dur="1" fill="hold">
+                                        <p:cTn id="97" dur="1" fill="hold">
                                           <p:stCondLst>
                                             <p:cond delay="0"/>
                                           </p:stCondLst>
@@ -21624,7 +21680,7 @@
                                         <p:tgtEl>
                                           <p:spTgt spid="3">
                                             <p:txEl>
-                                              <p:pRg st="10" end="10"/>
+                                              <p:pRg st="13" end="13"/>
                                             </p:txEl>
                                           </p:spTgt>
                                         </p:tgtEl>
@@ -21638,11 +21694,11 @@
                                     </p:set>
                                     <p:anim calcmode="lin" valueType="num">
                                       <p:cBhvr additive="base">
-                                        <p:cTn id="94" dur="500"/>
-                                        <p:tgtEl>
-                                          <p:spTgt spid="3">
-                                            <p:txEl>
-                                              <p:pRg st="10" end="10"/>
+                                        <p:cTn id="98" dur="500"/>
+                                        <p:tgtEl>
+                                          <p:spTgt spid="3">
+                                            <p:txEl>
+                                              <p:pRg st="13" end="13"/>
                                             </p:txEl>
                                           </p:spTgt>
                                         </p:tgtEl>
@@ -21665,11 +21721,11 @@
                                     </p:anim>
                                     <p:animEffect transition="in" filter="wipe(up)">
                                       <p:cBhvr>
-                                        <p:cTn id="95" dur="500"/>
-                                        <p:tgtEl>
-                                          <p:spTgt spid="3">
-                                            <p:txEl>
-                                              <p:pRg st="10" end="10"/>
+                                        <p:cTn id="99" dur="500"/>
+                                        <p:tgtEl>
+                                          <p:spTgt spid="3">
+                                            <p:txEl>
+                                              <p:pRg st="13" end="13"/>
                                             </p:txEl>
                                           </p:spTgt>
                                         </p:tgtEl>
@@ -21685,26 +21741,26 @@
                     </p:cTn>
                   </p:par>
                   <p:par>
-                    <p:cTn id="96" fill="hold">
+                    <p:cTn id="100" fill="hold">
                       <p:stCondLst>
                         <p:cond delay="indefinite"/>
                       </p:stCondLst>
                       <p:childTnLst>
                         <p:par>
-                          <p:cTn id="97" fill="hold">
+                          <p:cTn id="101" fill="hold">
                             <p:stCondLst>
                               <p:cond delay="0"/>
                             </p:stCondLst>
                             <p:childTnLst>
                               <p:par>
-                                <p:cTn id="98" presetID="12" presetClass="entr" presetSubtype="4" fill="hold" grpId="0" nodeType="clickEffect">
+                                <p:cTn id="102" presetID="12" presetClass="entr" presetSubtype="4" fill="hold" grpId="0" nodeType="clickEffect">
                                   <p:stCondLst>
                                     <p:cond delay="0"/>
                                   </p:stCondLst>
                                   <p:childTnLst>
                                     <p:set>
                                       <p:cBhvr>
-                                        <p:cTn id="99" dur="1" fill="hold">
+                                        <p:cTn id="103" dur="1" fill="hold">
                                           <p:stCondLst>
                                             <p:cond delay="0"/>
                                           </p:stCondLst>
@@ -21712,7 +21768,7 @@
                                         <p:tgtEl>
                                           <p:spTgt spid="3">
                                             <p:txEl>
-                                              <p:pRg st="11" end="11"/>
+                                              <p:pRg st="15" end="15"/>
                                             </p:txEl>
                                           </p:spTgt>
                                         </p:tgtEl>
@@ -21726,11 +21782,11 @@
                                     </p:set>
                                     <p:anim calcmode="lin" valueType="num">
                                       <p:cBhvr additive="base">
-                                        <p:cTn id="100" dur="500"/>
-                                        <p:tgtEl>
-                                          <p:spTgt spid="3">
-                                            <p:txEl>
-                                              <p:pRg st="11" end="11"/>
+                                        <p:cTn id="104" dur="500"/>
+                                        <p:tgtEl>
+                                          <p:spTgt spid="3">
+                                            <p:txEl>
+                                              <p:pRg st="15" end="15"/>
                                             </p:txEl>
                                           </p:spTgt>
                                         </p:tgtEl>
@@ -21753,11 +21809,11 @@
                                     </p:anim>
                                     <p:animEffect transition="in" filter="wipe(up)">
                                       <p:cBhvr>
-                                        <p:cTn id="101" dur="500"/>
-                                        <p:tgtEl>
-                                          <p:spTgt spid="3">
-                                            <p:txEl>
-                                              <p:pRg st="11" end="11"/>
+                                        <p:cTn id="105" dur="500"/>
+                                        <p:tgtEl>
+                                          <p:spTgt spid="3">
+                                            <p:txEl>
+                                              <p:pRg st="15" end="15"/>
                                             </p:txEl>
                                           </p:spTgt>
                                         </p:tgtEl>
@@ -21773,26 +21829,26 @@
                     </p:cTn>
                   </p:par>
                   <p:par>
-                    <p:cTn id="102" fill="hold">
+                    <p:cTn id="106" fill="hold">
                       <p:stCondLst>
                         <p:cond delay="indefinite"/>
                       </p:stCondLst>
                       <p:childTnLst>
                         <p:par>
-                          <p:cTn id="103" fill="hold">
+                          <p:cTn id="107" fill="hold">
                             <p:stCondLst>
                               <p:cond delay="0"/>
                             </p:stCondLst>
                             <p:childTnLst>
                               <p:par>
-                                <p:cTn id="104" presetID="12" presetClass="entr" presetSubtype="4" fill="hold" grpId="0" nodeType="clickEffect">
+                                <p:cTn id="108" presetID="12" presetClass="entr" presetSubtype="4" fill="hold" grpId="0" nodeType="clickEffect">
                                   <p:stCondLst>
                                     <p:cond delay="0"/>
                                   </p:stCondLst>
                                   <p:childTnLst>
                                     <p:set>
                                       <p:cBhvr>
-                                        <p:cTn id="105" dur="1" fill="hold">
+                                        <p:cTn id="109" dur="1" fill="hold">
                                           <p:stCondLst>
                                             <p:cond delay="0"/>
                                           </p:stCondLst>
@@ -21800,7 +21856,7 @@
                                         <p:tgtEl>
                                           <p:spTgt spid="3">
                                             <p:txEl>
-                                              <p:pRg st="12" end="12"/>
+                                              <p:pRg st="16" end="16"/>
                                             </p:txEl>
                                           </p:spTgt>
                                         </p:tgtEl>
@@ -21814,11 +21870,11 @@
                                     </p:set>
                                     <p:anim calcmode="lin" valueType="num">
                                       <p:cBhvr additive="base">
-                                        <p:cTn id="106" dur="500"/>
-                                        <p:tgtEl>
-                                          <p:spTgt spid="3">
-                                            <p:txEl>
-                                              <p:pRg st="12" end="12"/>
+                                        <p:cTn id="110" dur="500"/>
+                                        <p:tgtEl>
+                                          <p:spTgt spid="3">
+                                            <p:txEl>
+                                              <p:pRg st="16" end="16"/>
                                             </p:txEl>
                                           </p:spTgt>
                                         </p:tgtEl>
@@ -21841,11 +21897,11 @@
                                     </p:anim>
                                     <p:animEffect transition="in" filter="wipe(up)">
                                       <p:cBhvr>
-                                        <p:cTn id="107" dur="500"/>
-                                        <p:tgtEl>
-                                          <p:spTgt spid="3">
-                                            <p:txEl>
-                                              <p:pRg st="12" end="12"/>
+                                        <p:cTn id="111" dur="500"/>
+                                        <p:tgtEl>
+                                          <p:spTgt spid="3">
+                                            <p:txEl>
+                                              <p:pRg st="16" end="16"/>
                                             </p:txEl>
                                           </p:spTgt>
                                         </p:tgtEl>
@@ -21861,26 +21917,26 @@
                     </p:cTn>
                   </p:par>
                   <p:par>
-                    <p:cTn id="108" fill="hold">
+                    <p:cTn id="112" fill="hold">
                       <p:stCondLst>
                         <p:cond delay="indefinite"/>
                       </p:stCondLst>
                       <p:childTnLst>
                         <p:par>
-                          <p:cTn id="109" fill="hold">
+                          <p:cTn id="113" fill="hold">
                             <p:stCondLst>
                               <p:cond delay="0"/>
                             </p:stCondLst>
                             <p:childTnLst>
                               <p:par>
-                                <p:cTn id="110" presetID="12" presetClass="entr" presetSubtype="4" fill="hold" grpId="0" nodeType="clickEffect">
+                                <p:cTn id="114" presetID="12" presetClass="entr" presetSubtype="4" fill="hold" grpId="0" nodeType="clickEffect">
                                   <p:stCondLst>
                                     <p:cond delay="0"/>
                                   </p:stCondLst>
                                   <p:childTnLst>
                                     <p:set>
                                       <p:cBhvr>
-                                        <p:cTn id="111" dur="1" fill="hold">
+                                        <p:cTn id="115" dur="1" fill="hold">
                                           <p:stCondLst>
                                             <p:cond delay="0"/>
                                           </p:stCondLst>
@@ -21888,7 +21944,7 @@
                                         <p:tgtEl>
                                           <p:spTgt spid="3">
                                             <p:txEl>
-                                              <p:pRg st="13" end="13"/>
+                                              <p:pRg st="18" end="18"/>
                                             </p:txEl>
                                           </p:spTgt>
                                         </p:tgtEl>
@@ -21902,11 +21958,11 @@
                                     </p:set>
                                     <p:anim calcmode="lin" valueType="num">
                                       <p:cBhvr additive="base">
-                                        <p:cTn id="112" dur="500"/>
-                                        <p:tgtEl>
-                                          <p:spTgt spid="3">
-                                            <p:txEl>
-                                              <p:pRg st="13" end="13"/>
+                                        <p:cTn id="116" dur="500"/>
+                                        <p:tgtEl>
+                                          <p:spTgt spid="3">
+                                            <p:txEl>
+                                              <p:pRg st="18" end="18"/>
                                             </p:txEl>
                                           </p:spTgt>
                                         </p:tgtEl>
@@ -21929,447 +21985,7 @@
                                     </p:anim>
                                     <p:animEffect transition="in" filter="wipe(up)">
                                       <p:cBhvr>
-                                        <p:cTn id="113" dur="500"/>
-                                        <p:tgtEl>
-                                          <p:spTgt spid="3">
-                                            <p:txEl>
-                                              <p:pRg st="13" end="13"/>
-                                            </p:txEl>
-                                          </p:spTgt>
-                                        </p:tgtEl>
-                                      </p:cBhvr>
-                                    </p:animEffect>
-                                  </p:childTnLst>
-                                </p:cTn>
-                              </p:par>
-                            </p:childTnLst>
-                          </p:cTn>
-                        </p:par>
-                      </p:childTnLst>
-                    </p:cTn>
-                  </p:par>
-                  <p:par>
-                    <p:cTn id="114" fill="hold">
-                      <p:stCondLst>
-                        <p:cond delay="indefinite"/>
-                      </p:stCondLst>
-                      <p:childTnLst>
-                        <p:par>
-                          <p:cTn id="115" fill="hold">
-                            <p:stCondLst>
-                              <p:cond delay="0"/>
-                            </p:stCondLst>
-                            <p:childTnLst>
-                              <p:par>
-                                <p:cTn id="116" presetID="12" presetClass="entr" presetSubtype="4" fill="hold" grpId="0" nodeType="clickEffect">
-                                  <p:stCondLst>
-                                    <p:cond delay="0"/>
-                                  </p:stCondLst>
-                                  <p:childTnLst>
-                                    <p:set>
-                                      <p:cBhvr>
-                                        <p:cTn id="117" dur="1" fill="hold">
-                                          <p:stCondLst>
-                                            <p:cond delay="0"/>
-                                          </p:stCondLst>
-                                        </p:cTn>
-                                        <p:tgtEl>
-                                          <p:spTgt spid="3">
-                                            <p:txEl>
-                                              <p:pRg st="14" end="14"/>
-                                            </p:txEl>
-                                          </p:spTgt>
-                                        </p:tgtEl>
-                                        <p:attrNameLst>
-                                          <p:attrName>style.visibility</p:attrName>
-                                        </p:attrNameLst>
-                                      </p:cBhvr>
-                                      <p:to>
-                                        <p:strVal val="visible"/>
-                                      </p:to>
-                                    </p:set>
-                                    <p:anim calcmode="lin" valueType="num">
-                                      <p:cBhvr additive="base">
-                                        <p:cTn id="118" dur="500"/>
-                                        <p:tgtEl>
-                                          <p:spTgt spid="3">
-                                            <p:txEl>
-                                              <p:pRg st="14" end="14"/>
-                                            </p:txEl>
-                                          </p:spTgt>
-                                        </p:tgtEl>
-                                        <p:attrNameLst>
-                                          <p:attrName>ppt_y</p:attrName>
-                                        </p:attrNameLst>
-                                      </p:cBhvr>
-                                      <p:tavLst>
-                                        <p:tav tm="0">
-                                          <p:val>
-                                            <p:strVal val="#ppt_y+#ppt_h*1.125000"/>
-                                          </p:val>
-                                        </p:tav>
-                                        <p:tav tm="100000">
-                                          <p:val>
-                                            <p:strVal val="#ppt_y"/>
-                                          </p:val>
-                                        </p:tav>
-                                      </p:tavLst>
-                                    </p:anim>
-                                    <p:animEffect transition="in" filter="wipe(up)">
-                                      <p:cBhvr>
-                                        <p:cTn id="119" dur="500"/>
-                                        <p:tgtEl>
-                                          <p:spTgt spid="3">
-                                            <p:txEl>
-                                              <p:pRg st="14" end="14"/>
-                                            </p:txEl>
-                                          </p:spTgt>
-                                        </p:tgtEl>
-                                      </p:cBhvr>
-                                    </p:animEffect>
-                                  </p:childTnLst>
-                                </p:cTn>
-                              </p:par>
-                            </p:childTnLst>
-                          </p:cTn>
-                        </p:par>
-                      </p:childTnLst>
-                    </p:cTn>
-                  </p:par>
-                  <p:par>
-                    <p:cTn id="120" fill="hold">
-                      <p:stCondLst>
-                        <p:cond delay="indefinite"/>
-                      </p:stCondLst>
-                      <p:childTnLst>
-                        <p:par>
-                          <p:cTn id="121" fill="hold">
-                            <p:stCondLst>
-                              <p:cond delay="0"/>
-                            </p:stCondLst>
-                            <p:childTnLst>
-                              <p:par>
-                                <p:cTn id="122" presetID="12" presetClass="entr" presetSubtype="4" fill="hold" grpId="0" nodeType="clickEffect">
-                                  <p:stCondLst>
-                                    <p:cond delay="0"/>
-                                  </p:stCondLst>
-                                  <p:childTnLst>
-                                    <p:set>
-                                      <p:cBhvr>
-                                        <p:cTn id="123" dur="1" fill="hold">
-                                          <p:stCondLst>
-                                            <p:cond delay="0"/>
-                                          </p:stCondLst>
-                                        </p:cTn>
-                                        <p:tgtEl>
-                                          <p:spTgt spid="3">
-                                            <p:txEl>
-                                              <p:pRg st="15" end="15"/>
-                                            </p:txEl>
-                                          </p:spTgt>
-                                        </p:tgtEl>
-                                        <p:attrNameLst>
-                                          <p:attrName>style.visibility</p:attrName>
-                                        </p:attrNameLst>
-                                      </p:cBhvr>
-                                      <p:to>
-                                        <p:strVal val="visible"/>
-                                      </p:to>
-                                    </p:set>
-                                    <p:anim calcmode="lin" valueType="num">
-                                      <p:cBhvr additive="base">
-                                        <p:cTn id="124" dur="500"/>
-                                        <p:tgtEl>
-                                          <p:spTgt spid="3">
-                                            <p:txEl>
-                                              <p:pRg st="15" end="15"/>
-                                            </p:txEl>
-                                          </p:spTgt>
-                                        </p:tgtEl>
-                                        <p:attrNameLst>
-                                          <p:attrName>ppt_y</p:attrName>
-                                        </p:attrNameLst>
-                                      </p:cBhvr>
-                                      <p:tavLst>
-                                        <p:tav tm="0">
-                                          <p:val>
-                                            <p:strVal val="#ppt_y+#ppt_h*1.125000"/>
-                                          </p:val>
-                                        </p:tav>
-                                        <p:tav tm="100000">
-                                          <p:val>
-                                            <p:strVal val="#ppt_y"/>
-                                          </p:val>
-                                        </p:tav>
-                                      </p:tavLst>
-                                    </p:anim>
-                                    <p:animEffect transition="in" filter="wipe(up)">
-                                      <p:cBhvr>
-                                        <p:cTn id="125" dur="500"/>
-                                        <p:tgtEl>
-                                          <p:spTgt spid="3">
-                                            <p:txEl>
-                                              <p:pRg st="15" end="15"/>
-                                            </p:txEl>
-                                          </p:spTgt>
-                                        </p:tgtEl>
-                                      </p:cBhvr>
-                                    </p:animEffect>
-                                  </p:childTnLst>
-                                </p:cTn>
-                              </p:par>
-                            </p:childTnLst>
-                          </p:cTn>
-                        </p:par>
-                      </p:childTnLst>
-                    </p:cTn>
-                  </p:par>
-                  <p:par>
-                    <p:cTn id="126" fill="hold">
-                      <p:stCondLst>
-                        <p:cond delay="indefinite"/>
-                      </p:stCondLst>
-                      <p:childTnLst>
-                        <p:par>
-                          <p:cTn id="127" fill="hold">
-                            <p:stCondLst>
-                              <p:cond delay="0"/>
-                            </p:stCondLst>
-                            <p:childTnLst>
-                              <p:par>
-                                <p:cTn id="128" presetID="12" presetClass="entr" presetSubtype="4" fill="hold" grpId="0" nodeType="clickEffect">
-                                  <p:stCondLst>
-                                    <p:cond delay="0"/>
-                                  </p:stCondLst>
-                                  <p:childTnLst>
-                                    <p:set>
-                                      <p:cBhvr>
-                                        <p:cTn id="129" dur="1" fill="hold">
-                                          <p:stCondLst>
-                                            <p:cond delay="0"/>
-                                          </p:stCondLst>
-                                        </p:cTn>
-                                        <p:tgtEl>
-                                          <p:spTgt spid="3">
-                                            <p:txEl>
-                                              <p:pRg st="16" end="16"/>
-                                            </p:txEl>
-                                          </p:spTgt>
-                                        </p:tgtEl>
-                                        <p:attrNameLst>
-                                          <p:attrName>style.visibility</p:attrName>
-                                        </p:attrNameLst>
-                                      </p:cBhvr>
-                                      <p:to>
-                                        <p:strVal val="visible"/>
-                                      </p:to>
-                                    </p:set>
-                                    <p:anim calcmode="lin" valueType="num">
-                                      <p:cBhvr additive="base">
-                                        <p:cTn id="130" dur="500"/>
-                                        <p:tgtEl>
-                                          <p:spTgt spid="3">
-                                            <p:txEl>
-                                              <p:pRg st="16" end="16"/>
-                                            </p:txEl>
-                                          </p:spTgt>
-                                        </p:tgtEl>
-                                        <p:attrNameLst>
-                                          <p:attrName>ppt_y</p:attrName>
-                                        </p:attrNameLst>
-                                      </p:cBhvr>
-                                      <p:tavLst>
-                                        <p:tav tm="0">
-                                          <p:val>
-                                            <p:strVal val="#ppt_y+#ppt_h*1.125000"/>
-                                          </p:val>
-                                        </p:tav>
-                                        <p:tav tm="100000">
-                                          <p:val>
-                                            <p:strVal val="#ppt_y"/>
-                                          </p:val>
-                                        </p:tav>
-                                      </p:tavLst>
-                                    </p:anim>
-                                    <p:animEffect transition="in" filter="wipe(up)">
-                                      <p:cBhvr>
-                                        <p:cTn id="131" dur="500"/>
-                                        <p:tgtEl>
-                                          <p:spTgt spid="3">
-                                            <p:txEl>
-                                              <p:pRg st="16" end="16"/>
-                                            </p:txEl>
-                                          </p:spTgt>
-                                        </p:tgtEl>
-                                      </p:cBhvr>
-                                    </p:animEffect>
-                                  </p:childTnLst>
-                                </p:cTn>
-                              </p:par>
-                            </p:childTnLst>
-                          </p:cTn>
-                        </p:par>
-                      </p:childTnLst>
-                    </p:cTn>
-                  </p:par>
-                  <p:par>
-                    <p:cTn id="132" fill="hold">
-                      <p:stCondLst>
-                        <p:cond delay="indefinite"/>
-                      </p:stCondLst>
-                      <p:childTnLst>
-                        <p:par>
-                          <p:cTn id="133" fill="hold">
-                            <p:stCondLst>
-                              <p:cond delay="0"/>
-                            </p:stCondLst>
-                            <p:childTnLst>
-                              <p:par>
-                                <p:cTn id="134" presetID="12" presetClass="entr" presetSubtype="4" fill="hold" grpId="0" nodeType="clickEffect">
-                                  <p:stCondLst>
-                                    <p:cond delay="0"/>
-                                  </p:stCondLst>
-                                  <p:childTnLst>
-                                    <p:set>
-                                      <p:cBhvr>
-                                        <p:cTn id="135" dur="1" fill="hold">
-                                          <p:stCondLst>
-                                            <p:cond delay="0"/>
-                                          </p:stCondLst>
-                                        </p:cTn>
-                                        <p:tgtEl>
-                                          <p:spTgt spid="3">
-                                            <p:txEl>
-                                              <p:pRg st="17" end="17"/>
-                                            </p:txEl>
-                                          </p:spTgt>
-                                        </p:tgtEl>
-                                        <p:attrNameLst>
-                                          <p:attrName>style.visibility</p:attrName>
-                                        </p:attrNameLst>
-                                      </p:cBhvr>
-                                      <p:to>
-                                        <p:strVal val="visible"/>
-                                      </p:to>
-                                    </p:set>
-                                    <p:anim calcmode="lin" valueType="num">
-                                      <p:cBhvr additive="base">
-                                        <p:cTn id="136" dur="500"/>
-                                        <p:tgtEl>
-                                          <p:spTgt spid="3">
-                                            <p:txEl>
-                                              <p:pRg st="17" end="17"/>
-                                            </p:txEl>
-                                          </p:spTgt>
-                                        </p:tgtEl>
-                                        <p:attrNameLst>
-                                          <p:attrName>ppt_y</p:attrName>
-                                        </p:attrNameLst>
-                                      </p:cBhvr>
-                                      <p:tavLst>
-                                        <p:tav tm="0">
-                                          <p:val>
-                                            <p:strVal val="#ppt_y+#ppt_h*1.125000"/>
-                                          </p:val>
-                                        </p:tav>
-                                        <p:tav tm="100000">
-                                          <p:val>
-                                            <p:strVal val="#ppt_y"/>
-                                          </p:val>
-                                        </p:tav>
-                                      </p:tavLst>
-                                    </p:anim>
-                                    <p:animEffect transition="in" filter="wipe(up)">
-                                      <p:cBhvr>
-                                        <p:cTn id="137" dur="500"/>
-                                        <p:tgtEl>
-                                          <p:spTgt spid="3">
-                                            <p:txEl>
-                                              <p:pRg st="17" end="17"/>
-                                            </p:txEl>
-                                          </p:spTgt>
-                                        </p:tgtEl>
-                                      </p:cBhvr>
-                                    </p:animEffect>
-                                  </p:childTnLst>
-                                </p:cTn>
-                              </p:par>
-                            </p:childTnLst>
-                          </p:cTn>
-                        </p:par>
-                      </p:childTnLst>
-                    </p:cTn>
-                  </p:par>
-                  <p:par>
-                    <p:cTn id="138" fill="hold">
-                      <p:stCondLst>
-                        <p:cond delay="indefinite"/>
-                      </p:stCondLst>
-                      <p:childTnLst>
-                        <p:par>
-                          <p:cTn id="139" fill="hold">
-                            <p:stCondLst>
-                              <p:cond delay="0"/>
-                            </p:stCondLst>
-                            <p:childTnLst>
-                              <p:par>
-                                <p:cTn id="140" presetID="12" presetClass="entr" presetSubtype="4" fill="hold" grpId="0" nodeType="clickEffect">
-                                  <p:stCondLst>
-                                    <p:cond delay="0"/>
-                                  </p:stCondLst>
-                                  <p:childTnLst>
-                                    <p:set>
-                                      <p:cBhvr>
-                                        <p:cTn id="141" dur="1" fill="hold">
-                                          <p:stCondLst>
-                                            <p:cond delay="0"/>
-                                          </p:stCondLst>
-                                        </p:cTn>
-                                        <p:tgtEl>
-                                          <p:spTgt spid="3">
-                                            <p:txEl>
-                                              <p:pRg st="18" end="18"/>
-                                            </p:txEl>
-                                          </p:spTgt>
-                                        </p:tgtEl>
-                                        <p:attrNameLst>
-                                          <p:attrName>style.visibility</p:attrName>
-                                        </p:attrNameLst>
-                                      </p:cBhvr>
-                                      <p:to>
-                                        <p:strVal val="visible"/>
-                                      </p:to>
-                                    </p:set>
-                                    <p:anim calcmode="lin" valueType="num">
-                                      <p:cBhvr additive="base">
-                                        <p:cTn id="142" dur="500"/>
-                                        <p:tgtEl>
-                                          <p:spTgt spid="3">
-                                            <p:txEl>
-                                              <p:pRg st="18" end="18"/>
-                                            </p:txEl>
-                                          </p:spTgt>
-                                        </p:tgtEl>
-                                        <p:attrNameLst>
-                                          <p:attrName>ppt_y</p:attrName>
-                                        </p:attrNameLst>
-                                      </p:cBhvr>
-                                      <p:tavLst>
-                                        <p:tav tm="0">
-                                          <p:val>
-                                            <p:strVal val="#ppt_y+#ppt_h*1.125000"/>
-                                          </p:val>
-                                        </p:tav>
-                                        <p:tav tm="100000">
-                                          <p:val>
-                                            <p:strVal val="#ppt_y"/>
-                                          </p:val>
-                                        </p:tav>
-                                      </p:tavLst>
-                                    </p:anim>
-                                    <p:animEffect transition="in" filter="wipe(up)">
-                                      <p:cBhvr>
-                                        <p:cTn id="143" dur="500"/>
+                                        <p:cTn id="117" dur="500"/>
                                         <p:tgtEl>
                                           <p:spTgt spid="3">
                                             <p:txEl>

</xml_diff>

<commit_message>
1. Added an demo example for tabs directive 2. Updated presentation with a demo link. TODO: Update them with working links for all demos
Change-Id: Iad9cc3001c9d7d909452b78c5c60a08b2f698452
</commit_message>
<xml_diff>
--- a/Introduction to AngularJs.pptx
+++ b/Introduction to AngularJs.pptx
@@ -327,7 +327,7 @@
             <a:fld id="{7D0065BE-0657-4A47-90AD-C21C55E16B19}" type="datetime4">
               <a:rPr lang="en-US" smtClean="0"/>
               <a:pPr/>
-              <a:t>April 7, 2014</a:t>
+              <a:t>April 9, 2014</a:t>
             </a:fld>
             <a:endParaRPr lang="en-US"/>
           </a:p>
@@ -494,7 +494,7 @@
             <a:fld id="{A16C3AA4-67BE-44F7-809A-3582401494AF}" type="datetime4">
               <a:rPr lang="en-US" smtClean="0"/>
               <a:pPr/>
-              <a:t>April 7, 2014</a:t>
+              <a:t>April 9, 2014</a:t>
             </a:fld>
             <a:endParaRPr lang="en-US"/>
           </a:p>
@@ -671,7 +671,7 @@
             <a:fld id="{25172EEB-1769-4776-AD69-E7C1260563EB}" type="datetime4">
               <a:rPr lang="en-US" smtClean="0"/>
               <a:pPr/>
-              <a:t>April 7, 2014</a:t>
+              <a:t>April 9, 2014</a:t>
             </a:fld>
             <a:endParaRPr lang="en-US"/>
           </a:p>
@@ -856,7 +856,7 @@
             <a:fld id="{D47BB8AF-C16A-4836-A92D-61834B5F0BA5}" type="datetime4">
               <a:rPr lang="en-US" smtClean="0"/>
               <a:pPr/>
-              <a:t>April 7, 2014</a:t>
+              <a:t>April 9, 2014</a:t>
             </a:fld>
             <a:endParaRPr lang="en-US"/>
           </a:p>
@@ -1120,7 +1120,7 @@
             <a:fld id="{647D2193-4505-4A75-99BB-880C6989A757}" type="datetime4">
               <a:rPr lang="en-US" smtClean="0"/>
               <a:pPr/>
-              <a:t>April 7, 2014</a:t>
+              <a:t>April 9, 2014</a:t>
             </a:fld>
             <a:endParaRPr lang="en-US"/>
           </a:p>
@@ -1470,7 +1470,7 @@
             <a:fld id="{113A18F4-33C3-445B-924C-31108C51719C}" type="datetime4">
               <a:rPr lang="en-US" smtClean="0"/>
               <a:pPr/>
-              <a:t>April 7, 2014</a:t>
+              <a:t>April 9, 2014</a:t>
             </a:fld>
             <a:endParaRPr lang="en-US"/>
           </a:p>
@@ -1780,7 +1780,7 @@
             <a:fld id="{3AF7543A-E259-478F-9E0D-57BA40E442B7}" type="datetime4">
               <a:rPr lang="en-US" smtClean="0"/>
               <a:pPr/>
-              <a:t>April 7, 2014</a:t>
+              <a:t>April 9, 2014</a:t>
             </a:fld>
             <a:endParaRPr lang="en-US"/>
           </a:p>
@@ -2009,7 +2009,7 @@
             <a:fld id="{1EFB012D-77A1-44B0-BB26-329BA1EE55C9}" type="datetime4">
               <a:rPr lang="en-US" smtClean="0"/>
               <a:pPr/>
-              <a:t>April 7, 2014</a:t>
+              <a:t>April 9, 2014</a:t>
             </a:fld>
             <a:endParaRPr lang="en-US"/>
           </a:p>
@@ -2101,7 +2101,7 @@
             <a:fld id="{94B7499E-3031-413E-B01E-B94970708CAA}" type="datetime4">
               <a:rPr lang="en-US" smtClean="0"/>
               <a:pPr/>
-              <a:t>April 7, 2014</a:t>
+              <a:t>April 9, 2014</a:t>
             </a:fld>
             <a:endParaRPr lang="en-US"/>
           </a:p>
@@ -2391,7 +2391,7 @@
             <a:fld id="{DC7EAB0C-2220-4D0E-A0DD-DB7FA0F742F4}" type="datetime4">
               <a:rPr lang="en-US" smtClean="0"/>
               <a:pPr/>
-              <a:t>April 7, 2014</a:t>
+              <a:t>April 9, 2014</a:t>
             </a:fld>
             <a:endParaRPr lang="en-US"/>
           </a:p>
@@ -2661,7 +2661,7 @@
             <a:fld id="{E3416D63-31BF-4B94-B6C5-E20B2C63F515}" type="datetime4">
               <a:rPr lang="en-US" smtClean="0"/>
               <a:pPr/>
-              <a:t>April 7, 2014</a:t>
+              <a:t>April 9, 2014</a:t>
             </a:fld>
             <a:endParaRPr lang="en-US"/>
           </a:p>
@@ -2892,7 +2892,7 @@
             <a:fld id="{62B1B13E-D5AF-485E-81A1-82A140076526}" type="datetime4">
               <a:rPr lang="en-US" smtClean="0"/>
               <a:pPr/>
-              <a:t>April 7, 2014</a:t>
+              <a:t>April 9, 2014</a:t>
             </a:fld>
             <a:endParaRPr lang="en-US" dirty="0"/>
           </a:p>
@@ -7567,7 +7567,18 @@
                   <a:schemeClr val="tx1"/>
                 </a:solidFill>
               </a:rPr>
-              <a:t>$watch </a:t>
+              <a:t>$watch method</a:t>
+            </a:r>
+          </a:p>
+          <a:p>
+            <a:pPr lvl="1"/>
+            <a:r>
+              <a:rPr lang="en-US" dirty="0">
+                <a:solidFill>
+                  <a:schemeClr val="tx1"/>
+                </a:solidFill>
+              </a:rPr>
+              <a:t>e</a:t>
             </a:r>
             <a:r>
               <a:rPr lang="en-US" dirty="0" smtClean="0">
@@ -7575,32 +7586,8 @@
                   <a:schemeClr val="tx1"/>
                 </a:solidFill>
               </a:rPr>
-              <a:t>method</a:t>
-            </a:r>
-          </a:p>
-          <a:p>
-            <a:pPr lvl="1"/>
-            <a:r>
-              <a:rPr lang="en-US" dirty="0">
-                <a:solidFill>
-                  <a:schemeClr val="tx1"/>
-                </a:solidFill>
-              </a:rPr>
-              <a:t>e</a:t>
-            </a:r>
-            <a:r>
-              <a:rPr lang="en-US" dirty="0" smtClean="0">
-                <a:solidFill>
-                  <a:schemeClr val="tx1"/>
-                </a:solidFill>
-              </a:rPr>
               <a:t>tc..</a:t>
             </a:r>
-            <a:endParaRPr lang="en-US" dirty="0" smtClean="0">
-              <a:solidFill>
-                <a:schemeClr val="tx1"/>
-              </a:solidFill>
-            </a:endParaRPr>
           </a:p>
           <a:p>
             <a:pPr lvl="1"/>
@@ -8347,15 +8334,7 @@
                   <a:schemeClr val="tx1"/>
                 </a:solidFill>
               </a:rPr>
-              <a:t>*Cannot* </a:t>
-            </a:r>
-            <a:r>
-              <a:rPr lang="en-US" dirty="0" smtClean="0">
-                <a:solidFill>
-                  <a:schemeClr val="tx1"/>
-                </a:solidFill>
-              </a:rPr>
-              <a:t>use conditionals, loops</a:t>
+              <a:t>*Cannot* use conditionals, loops</a:t>
             </a:r>
             <a:r>
               <a:rPr lang="en-US" dirty="0">
@@ -12148,23 +12127,7 @@
                   <a:schemeClr val="tx1"/>
                 </a:solidFill>
               </a:rPr>
-              <a:t> other HTML attributes with more capabilities –  required, </a:t>
-            </a:r>
-            <a:r>
-              <a:rPr lang="en-US" dirty="0" smtClean="0">
-                <a:solidFill>
-                  <a:schemeClr val="tx1"/>
-                </a:solidFill>
-              </a:rPr>
-              <a:t>type, input etc</a:t>
-            </a:r>
-            <a:r>
-              <a:rPr lang="en-US" dirty="0" smtClean="0">
-                <a:solidFill>
-                  <a:schemeClr val="tx1"/>
-                </a:solidFill>
-              </a:rPr>
-              <a:t>. </a:t>
+              <a:t> other HTML attributes with more capabilities –  required, type, input etc. </a:t>
             </a:r>
           </a:p>
           <a:p>
@@ -12386,25 +12349,7 @@
                 </a:solidFill>
                 <a:sym typeface="Wingdings"/>
               </a:rPr>
-              <a:t>No magic, implemented purely using JS and </a:t>
-            </a:r>
-            <a:r>
-              <a:rPr lang="en-US" dirty="0" smtClean="0">
-                <a:solidFill>
-                  <a:schemeClr val="tx1"/>
-                </a:solidFill>
-                <a:sym typeface="Wingdings"/>
-              </a:rPr>
-              <a:t>HTML </a:t>
-            </a:r>
-            <a:r>
-              <a:rPr lang="en-US" dirty="0" smtClean="0">
-                <a:solidFill>
-                  <a:schemeClr val="tx1"/>
-                </a:solidFill>
-                <a:sym typeface="Wingdings"/>
-              </a:rPr>
-              <a:t></a:t>
+              <a:t>No magic, implemented purely using JS and HTML </a:t>
             </a:r>
             <a:endParaRPr lang="en-US" dirty="0">
               <a:solidFill>
@@ -13306,7 +13251,37 @@
           <a:bodyPr/>
           <a:lstStyle/>
           <a:p>
-            <a:endParaRPr lang="en-US"/>
+            <a:r>
+              <a:rPr lang="de-DE" dirty="0">
+                <a:hlinkClick r:id="rId2"/>
+              </a:rPr>
+              <a:t>http://</a:t>
+            </a:r>
+            <a:r>
+              <a:rPr lang="de-DE" dirty="0" err="1">
+                <a:hlinkClick r:id="rId2"/>
+              </a:rPr>
+              <a:t>jsbin.com</a:t>
+            </a:r>
+            <a:r>
+              <a:rPr lang="de-DE" dirty="0">
+                <a:hlinkClick r:id="rId2"/>
+              </a:rPr>
+              <a:t>/</a:t>
+            </a:r>
+            <a:r>
+              <a:rPr lang="de-DE" dirty="0" err="1">
+                <a:hlinkClick r:id="rId2"/>
+              </a:rPr>
+              <a:t>welcome</a:t>
+            </a:r>
+            <a:r>
+              <a:rPr lang="de-DE" dirty="0">
+                <a:hlinkClick r:id="rId2"/>
+              </a:rPr>
+              <a:t>/1/</a:t>
+            </a:r>
+            <a:endParaRPr lang="en-US" dirty="0"/>
           </a:p>
         </p:txBody>
       </p:sp>
@@ -13319,7 +13294,7 @@
           <p:nvPr/>
         </p:nvPicPr>
         <p:blipFill rotWithShape="1">
-          <a:blip r:embed="rId2">
+          <a:blip r:embed="rId3">
             <a:alphaModFix amt="24000"/>
             <a:extLst>
               <a:ext uri="{28A0092B-C50C-407E-A947-70E740481C1C}">
@@ -16786,7 +16761,7 @@
         </p:spPr>
         <p:txBody>
           <a:bodyPr>
-            <a:normAutofit fontScale="92500" lnSpcReduction="10000"/>
+            <a:normAutofit fontScale="92500"/>
           </a:bodyPr>
           <a:lstStyle/>
           <a:p>
@@ -16796,7 +16771,7 @@
                   <a:schemeClr val="tx1"/>
                 </a:solidFill>
               </a:rPr>
-              <a:t>Activated</a:t>
+              <a:t>Start </a:t>
             </a:r>
             <a:r>
               <a:rPr lang="en-US" dirty="0" smtClean="0">
@@ -16804,7 +16779,15 @@
                   <a:schemeClr val="tx1"/>
                 </a:solidFill>
               </a:rPr>
-              <a:t> by - adding ‘name’ attribute to ‘form’ and ‘form elements’</a:t>
+              <a:t>by </a:t>
+            </a:r>
+            <a:r>
+              <a:rPr lang="en-US" dirty="0" smtClean="0">
+                <a:solidFill>
+                  <a:schemeClr val="tx1"/>
+                </a:solidFill>
+              </a:rPr>
+              <a:t>- adding ‘name’ attribute to ‘form’ and ‘form elements’</a:t>
             </a:r>
           </a:p>
           <a:p>
@@ -16921,7 +16904,55 @@
                   <a:schemeClr val="tx1"/>
                 </a:solidFill>
               </a:rPr>
-              <a:t>.ng-valid, .ng-invalid, .ng-pristine, .ng-dirty</a:t>
+              <a:t>.ng-valid, </a:t>
+            </a:r>
+            <a:r>
+              <a:rPr lang="en-US" dirty="0" smtClean="0">
+                <a:solidFill>
+                  <a:schemeClr val="tx1"/>
+                </a:solidFill>
+              </a:rPr>
+              <a:t>       .</a:t>
+            </a:r>
+            <a:r>
+              <a:rPr lang="en-US" dirty="0">
+                <a:solidFill>
+                  <a:schemeClr val="tx1"/>
+                </a:solidFill>
+              </a:rPr>
+              <a:t>ng-invalid, </a:t>
+            </a:r>
+            <a:r>
+              <a:rPr lang="en-US" dirty="0" smtClean="0">
+                <a:solidFill>
+                  <a:schemeClr val="tx1"/>
+                </a:solidFill>
+              </a:rPr>
+              <a:t>       .</a:t>
+            </a:r>
+            <a:r>
+              <a:rPr lang="en-US" dirty="0">
+                <a:solidFill>
+                  <a:schemeClr val="tx1"/>
+                </a:solidFill>
+              </a:rPr>
+              <a:t>ng-pristine, </a:t>
+            </a:r>
+            <a:r>
+              <a:rPr lang="en-US" dirty="0" smtClean="0">
+                <a:solidFill>
+                  <a:schemeClr val="tx1"/>
+                </a:solidFill>
+              </a:rPr>
+              <a:t>         .</a:t>
+            </a:r>
+            <a:r>
+              <a:rPr lang="en-US" dirty="0">
+                <a:solidFill>
+                  <a:schemeClr val="tx1"/>
+                </a:solidFill>
+              </a:rPr>
+              <a:t>ng-dirty</a:t>
             </a:r>
           </a:p>
           <a:p>
@@ -16932,21 +16963,40 @@
                   <a:schemeClr val="tx1"/>
                 </a:solidFill>
               </a:rPr>
-              <a:t>.ng-invalid-required, .ng-valid-max-length </a:t>
-            </a:r>
-            <a:endParaRPr lang="en-US" dirty="0" smtClean="0">
-              <a:solidFill>
-                <a:schemeClr val="tx1"/>
-              </a:solidFill>
-            </a:endParaRPr>
-          </a:p>
-          <a:p>
+              <a:t>.ng-invalid-required, </a:t>
+            </a:r>
             <a:r>
               <a:rPr lang="en-US" dirty="0" smtClean="0">
                 <a:solidFill>
                   <a:schemeClr val="tx1"/>
                 </a:solidFill>
               </a:rPr>
+              <a:t>       .</a:t>
+            </a:r>
+            <a:r>
+              <a:rPr lang="en-US" dirty="0">
+                <a:solidFill>
+                  <a:schemeClr val="tx1"/>
+                </a:solidFill>
+              </a:rPr>
+              <a:t>ng-valid-max-</a:t>
+            </a:r>
+            <a:r>
+              <a:rPr lang="en-US" dirty="0" smtClean="0">
+                <a:solidFill>
+                  <a:schemeClr val="tx1"/>
+                </a:solidFill>
+              </a:rPr>
+              <a:t>length,     etc. </a:t>
+            </a:r>
+          </a:p>
+          <a:p>
+            <a:r>
+              <a:rPr lang="en-US" dirty="0" smtClean="0">
+                <a:solidFill>
+                  <a:schemeClr val="tx1"/>
+                </a:solidFill>
+              </a:rPr>
               <a:t>Make use of these </a:t>
             </a:r>
             <a:r>
@@ -16990,7 +17040,7 @@
                   <a:schemeClr val="tx1"/>
                 </a:solidFill>
               </a:rPr>
-              <a:t>, </a:t>
+              <a:t>,     </a:t>
             </a:r>
             <a:r>
               <a:rPr lang="en-US" b="1" dirty="0" smtClean="0">
@@ -17006,7 +17056,7 @@
                   <a:schemeClr val="tx1"/>
                 </a:solidFill>
               </a:rPr>
-              <a:t>, </a:t>
+              <a:t>,      </a:t>
             </a:r>
             <a:r>
               <a:rPr lang="en-US" b="1" dirty="0" smtClean="0">
@@ -17030,7 +17080,7 @@
                   <a:schemeClr val="tx1"/>
                 </a:solidFill>
               </a:rPr>
-              <a:t>, </a:t>
+              <a:t>,       </a:t>
             </a:r>
             <a:r>
               <a:rPr lang="en-US" b="1" dirty="0" smtClean="0">
@@ -17054,7 +17104,7 @@
                   <a:schemeClr val="tx1"/>
                 </a:solidFill>
               </a:rPr>
-              <a:t>, </a:t>
+              <a:t>,        </a:t>
             </a:r>
             <a:r>
               <a:rPr lang="en-US" b="1" dirty="0" smtClean="0">
@@ -17078,7 +17128,7 @@
           </a:p>
           <a:p>
             <a:r>
-              <a:rPr lang="en-US" dirty="0" smtClean="0">
+              <a:rPr lang="en-US" sz="2200" dirty="0" smtClean="0">
                 <a:solidFill>
                   <a:schemeClr val="tx1"/>
                 </a:solidFill>
@@ -17086,7 +17136,7 @@
               <a:t>Use ‘</a:t>
             </a:r>
             <a:r>
-              <a:rPr lang="en-US" i="1" dirty="0" err="1" smtClean="0">
+              <a:rPr lang="en-US" sz="2200" i="1" dirty="0" err="1" smtClean="0">
                 <a:solidFill>
                   <a:schemeClr val="tx1"/>
                 </a:solidFill>
@@ -17094,12 +17144,12 @@
               <a:t>novalidate</a:t>
             </a:r>
             <a:r>
-              <a:rPr lang="en-US" dirty="0" smtClean="0">
+              <a:rPr lang="en-US" sz="2200" dirty="0" smtClean="0">
                 <a:solidFill>
                   <a:schemeClr val="tx1"/>
                 </a:solidFill>
               </a:rPr>
-              <a:t>’ attribute to avoid HTML5 auto validation</a:t>
+              <a:t>’ attribute to stop HTML5 auto validation</a:t>
             </a:r>
           </a:p>
           <a:p>
@@ -17128,7 +17178,7 @@
         </p:nvSpPr>
         <p:spPr>
           <a:xfrm>
-            <a:off x="6574776" y="2135404"/>
+            <a:off x="6574776" y="1952088"/>
             <a:ext cx="1321924" cy="523220"/>
           </a:xfrm>
           <a:prstGeom prst="rect">
@@ -17215,7 +17265,7 @@
         </p:nvSpPr>
         <p:spPr>
           <a:xfrm>
-            <a:off x="4717244" y="2140399"/>
+            <a:off x="4717244" y="1979967"/>
             <a:ext cx="1380657" cy="523220"/>
           </a:xfrm>
           <a:prstGeom prst="rect">
@@ -17313,7 +17363,7 @@
         </p:nvSpPr>
         <p:spPr>
           <a:xfrm>
-            <a:off x="1120765" y="2148472"/>
+            <a:off x="1120765" y="1965156"/>
             <a:ext cx="1419079" cy="523220"/>
           </a:xfrm>
           <a:prstGeom prst="rect">
@@ -17448,7 +17498,7 @@
         </p:nvSpPr>
         <p:spPr>
           <a:xfrm>
-            <a:off x="3020381" y="2146846"/>
+            <a:off x="3020381" y="1974972"/>
             <a:ext cx="972434" cy="523220"/>
           </a:xfrm>
           <a:prstGeom prst="rect">
@@ -22376,56 +22426,43 @@
                   <a:srgbClr val="000000"/>
                 </a:solidFill>
               </a:rPr>
-              <a:t>for your </a:t>
+              <a:t>for your directives</a:t>
+            </a:r>
+          </a:p>
+          <a:p>
+            <a:pPr lvl="1"/>
+            <a:r>
+              <a:rPr lang="en-US" dirty="0">
+                <a:solidFill>
+                  <a:srgbClr val="70A525"/>
+                </a:solidFill>
+              </a:rPr>
+              <a:t>Create </a:t>
+            </a:r>
+            <a:r>
+              <a:rPr lang="en-US" b="1" dirty="0" smtClean="0">
+                <a:solidFill>
+                  <a:srgbClr val="70A525"/>
+                </a:solidFill>
+              </a:rPr>
+              <a:t>isolate</a:t>
             </a:r>
             <a:r>
               <a:rPr lang="en-US" dirty="0" smtClean="0">
                 <a:solidFill>
+                  <a:srgbClr val="70A525"/>
+                </a:solidFill>
+              </a:rPr>
+              <a:t> scopes </a:t>
+            </a:r>
+            <a:r>
+              <a:rPr lang="en-US" dirty="0" smtClean="0">
+                <a:solidFill>
                   <a:srgbClr val="000000"/>
                 </a:solidFill>
               </a:rPr>
-              <a:t>directives</a:t>
-            </a:r>
-          </a:p>
-          <a:p>
-            <a:pPr lvl="1"/>
-            <a:r>
-              <a:rPr lang="en-US" dirty="0">
-                <a:solidFill>
-                  <a:srgbClr val="70A525"/>
-                </a:solidFill>
-              </a:rPr>
-              <a:t>Create </a:t>
-            </a:r>
-            <a:r>
-              <a:rPr lang="en-US" b="1" dirty="0" smtClean="0">
-                <a:solidFill>
-                  <a:srgbClr val="70A525"/>
-                </a:solidFill>
-              </a:rPr>
-              <a:t>isolate</a:t>
-            </a:r>
-            <a:r>
-              <a:rPr lang="en-US" dirty="0" smtClean="0">
-                <a:solidFill>
-                  <a:srgbClr val="70A525"/>
-                </a:solidFill>
-              </a:rPr>
-              <a:t> scopes </a:t>
-            </a:r>
-            <a:r>
-              <a:rPr lang="en-US" dirty="0" smtClean="0">
-                <a:solidFill>
-                  <a:srgbClr val="000000"/>
-                </a:solidFill>
-              </a:rPr>
               <a:t>to avoid accidental overrides of properties</a:t>
             </a:r>
-            <a:endParaRPr lang="en-US" dirty="0" smtClean="0">
-              <a:solidFill>
-                <a:srgbClr val="000000"/>
-              </a:solidFill>
-            </a:endParaRPr>
           </a:p>
           <a:p>
             <a:pPr lvl="1"/>
@@ -24477,13 +24514,7 @@
               <a:rPr lang="en-US" dirty="0" smtClean="0">
                 <a:hlinkClick r:id="rId5"/>
               </a:rPr>
-              <a:t>Rapid prototyping with </a:t>
-            </a:r>
-            <a:r>
-              <a:rPr lang="en-US" dirty="0" smtClean="0">
-                <a:hlinkClick r:id="rId5"/>
-              </a:rPr>
-              <a:t>AngularJs</a:t>
+              <a:t>Rapid prototyping with AngularJs</a:t>
             </a:r>
             <a:endParaRPr lang="en-US" dirty="0" smtClean="0"/>
           </a:p>
@@ -24529,13 +24560,7 @@
               <a:rPr lang="en-US" dirty="0" smtClean="0">
                 <a:hlinkClick r:id="rId8"/>
               </a:rPr>
-              <a:t>AngularJs Fundamentals in 60-ish </a:t>
-            </a:r>
-            <a:r>
-              <a:rPr lang="en-US" dirty="0" smtClean="0">
-                <a:hlinkClick r:id="rId8"/>
-              </a:rPr>
-              <a:t>minutes</a:t>
+              <a:t>AngularJs Fundamentals in 60-ish minutes</a:t>
             </a:r>
             <a:endParaRPr lang="en-US" dirty="0" smtClean="0"/>
           </a:p>
@@ -25054,11 +25079,6 @@
               </a:rPr>
               <a:t>Directives</a:t>
             </a:r>
-            <a:endParaRPr lang="en-US" dirty="0" smtClean="0">
-              <a:solidFill>
-                <a:srgbClr val="000000"/>
-              </a:solidFill>
-            </a:endParaRPr>
           </a:p>
           <a:p>
             <a:r>

</xml_diff>

<commit_message>
Changes to presetation - 1. Updated data-binding slide with objects and animations 2. Rejigged forms validation slide, reordering the content
Change-Id: I92f161a3649b2ade5a2a4b4db2f39f917bd697cc
</commit_message>
<xml_diff>
--- a/Introduction to AngularJs.pptx
+++ b/Introduction to AngularJs.pptx
@@ -327,7 +327,7 @@
             <a:fld id="{7D0065BE-0657-4A47-90AD-C21C55E16B19}" type="datetime4">
               <a:rPr lang="en-US" smtClean="0"/>
               <a:pPr/>
-              <a:t>April 9, 2014</a:t>
+              <a:t>April 10, 2014</a:t>
             </a:fld>
             <a:endParaRPr lang="en-US"/>
           </a:p>
@@ -494,7 +494,7 @@
             <a:fld id="{A16C3AA4-67BE-44F7-809A-3582401494AF}" type="datetime4">
               <a:rPr lang="en-US" smtClean="0"/>
               <a:pPr/>
-              <a:t>April 9, 2014</a:t>
+              <a:t>April 10, 2014</a:t>
             </a:fld>
             <a:endParaRPr lang="en-US"/>
           </a:p>
@@ -671,7 +671,7 @@
             <a:fld id="{25172EEB-1769-4776-AD69-E7C1260563EB}" type="datetime4">
               <a:rPr lang="en-US" smtClean="0"/>
               <a:pPr/>
-              <a:t>April 9, 2014</a:t>
+              <a:t>April 10, 2014</a:t>
             </a:fld>
             <a:endParaRPr lang="en-US"/>
           </a:p>
@@ -856,7 +856,7 @@
             <a:fld id="{D47BB8AF-C16A-4836-A92D-61834B5F0BA5}" type="datetime4">
               <a:rPr lang="en-US" smtClean="0"/>
               <a:pPr/>
-              <a:t>April 9, 2014</a:t>
+              <a:t>April 10, 2014</a:t>
             </a:fld>
             <a:endParaRPr lang="en-US"/>
           </a:p>
@@ -1120,7 +1120,7 @@
             <a:fld id="{647D2193-4505-4A75-99BB-880C6989A757}" type="datetime4">
               <a:rPr lang="en-US" smtClean="0"/>
               <a:pPr/>
-              <a:t>April 9, 2014</a:t>
+              <a:t>April 10, 2014</a:t>
             </a:fld>
             <a:endParaRPr lang="en-US"/>
           </a:p>
@@ -1470,7 +1470,7 @@
             <a:fld id="{113A18F4-33C3-445B-924C-31108C51719C}" type="datetime4">
               <a:rPr lang="en-US" smtClean="0"/>
               <a:pPr/>
-              <a:t>April 9, 2014</a:t>
+              <a:t>April 10, 2014</a:t>
             </a:fld>
             <a:endParaRPr lang="en-US"/>
           </a:p>
@@ -1780,7 +1780,7 @@
             <a:fld id="{3AF7543A-E259-478F-9E0D-57BA40E442B7}" type="datetime4">
               <a:rPr lang="en-US" smtClean="0"/>
               <a:pPr/>
-              <a:t>April 9, 2014</a:t>
+              <a:t>April 10, 2014</a:t>
             </a:fld>
             <a:endParaRPr lang="en-US"/>
           </a:p>
@@ -2009,7 +2009,7 @@
             <a:fld id="{1EFB012D-77A1-44B0-BB26-329BA1EE55C9}" type="datetime4">
               <a:rPr lang="en-US" smtClean="0"/>
               <a:pPr/>
-              <a:t>April 9, 2014</a:t>
+              <a:t>April 10, 2014</a:t>
             </a:fld>
             <a:endParaRPr lang="en-US"/>
           </a:p>
@@ -2101,7 +2101,7 @@
             <a:fld id="{94B7499E-3031-413E-B01E-B94970708CAA}" type="datetime4">
               <a:rPr lang="en-US" smtClean="0"/>
               <a:pPr/>
-              <a:t>April 9, 2014</a:t>
+              <a:t>April 10, 2014</a:t>
             </a:fld>
             <a:endParaRPr lang="en-US"/>
           </a:p>
@@ -2391,7 +2391,7 @@
             <a:fld id="{DC7EAB0C-2220-4D0E-A0DD-DB7FA0F742F4}" type="datetime4">
               <a:rPr lang="en-US" smtClean="0"/>
               <a:pPr/>
-              <a:t>April 9, 2014</a:t>
+              <a:t>April 10, 2014</a:t>
             </a:fld>
             <a:endParaRPr lang="en-US"/>
           </a:p>
@@ -2661,7 +2661,7 @@
             <a:fld id="{E3416D63-31BF-4B94-B6C5-E20B2C63F515}" type="datetime4">
               <a:rPr lang="en-US" smtClean="0"/>
               <a:pPr/>
-              <a:t>April 9, 2014</a:t>
+              <a:t>April 10, 2014</a:t>
             </a:fld>
             <a:endParaRPr lang="en-US"/>
           </a:p>
@@ -2892,7 +2892,7 @@
             <a:fld id="{62B1B13E-D5AF-485E-81A1-82A140076526}" type="datetime4">
               <a:rPr lang="en-US" smtClean="0"/>
               <a:pPr/>
-              <a:t>April 9, 2014</a:t>
+              <a:t>April 10, 2014</a:t>
             </a:fld>
             <a:endParaRPr lang="en-US" dirty="0"/>
           </a:p>
@@ -7489,19 +7489,45 @@
         </p:nvSpPr>
         <p:spPr/>
         <p:txBody>
-          <a:bodyPr/>
+          <a:bodyPr>
+            <a:normAutofit fontScale="92500" lnSpcReduction="10000"/>
+          </a:bodyPr>
           <a:lstStyle/>
           <a:p>
             <a:endParaRPr lang="en-US" dirty="0" smtClean="0"/>
           </a:p>
           <a:p>
+            <a:endParaRPr lang="en-US" dirty="0" smtClean="0">
+              <a:solidFill>
+                <a:schemeClr val="tx1"/>
+              </a:solidFill>
+            </a:endParaRPr>
+          </a:p>
+          <a:p>
+            <a:pPr marL="0" indent="0">
+              <a:buNone/>
+            </a:pPr>
+            <a:endParaRPr lang="en-US" dirty="0" smtClean="0">
+              <a:solidFill>
+                <a:schemeClr val="tx1"/>
+              </a:solidFill>
+            </a:endParaRPr>
+          </a:p>
+          <a:p>
+            <a:endParaRPr lang="en-US" dirty="0" smtClean="0">
+              <a:solidFill>
+                <a:schemeClr val="tx1"/>
+              </a:solidFill>
+            </a:endParaRPr>
+          </a:p>
+          <a:p>
             <a:r>
               <a:rPr lang="en-US" dirty="0" smtClean="0">
                 <a:solidFill>
                   <a:schemeClr val="tx1"/>
                 </a:solidFill>
               </a:rPr>
-              <a:t>Automatic update of  Model              View</a:t>
+              <a:t>View is an instant projection of the model</a:t>
             </a:r>
             <a:endParaRPr lang="en-US" dirty="0">
               <a:solidFill>
@@ -7510,6 +7536,22 @@
             </a:endParaRPr>
           </a:p>
           <a:p>
+            <a:r>
+              <a:rPr lang="en-US" dirty="0">
+                <a:solidFill>
+                  <a:schemeClr val="tx1"/>
+                </a:solidFill>
+              </a:rPr>
+              <a:t>Eliminates need of event binding and </a:t>
+            </a:r>
+            <a:r>
+              <a:rPr lang="en-US" dirty="0" smtClean="0">
+                <a:solidFill>
+                  <a:schemeClr val="tx1"/>
+                </a:solidFill>
+              </a:rPr>
+              <a:t>handling</a:t>
+            </a:r>
             <a:endParaRPr lang="en-US" dirty="0" smtClean="0">
               <a:solidFill>
                 <a:schemeClr val="tx1"/>
@@ -7517,81 +7559,7 @@
             </a:endParaRPr>
           </a:p>
           <a:p>
-            <a:r>
-              <a:rPr lang="en-US" dirty="0" smtClean="0">
-                <a:solidFill>
-                  <a:schemeClr val="tx1"/>
-                </a:solidFill>
-              </a:rPr>
-              <a:t>Achieved through </a:t>
-            </a:r>
-          </a:p>
-          <a:p>
-            <a:pPr lvl="1"/>
-            <a:r>
-              <a:rPr lang="en-US" dirty="0" smtClean="0">
-                <a:solidFill>
-                  <a:schemeClr val="tx1"/>
-                </a:solidFill>
-              </a:rPr>
-              <a:t>ng-model directive,</a:t>
-            </a:r>
-          </a:p>
-          <a:p>
-            <a:pPr lvl="1"/>
-            <a:r>
-              <a:rPr lang="en-US" dirty="0" smtClean="0">
-                <a:solidFill>
-                  <a:schemeClr val="tx1"/>
-                </a:solidFill>
-              </a:rPr>
-              <a:t>$scope object</a:t>
-            </a:r>
-          </a:p>
-          <a:p>
-            <a:pPr lvl="1"/>
-            <a:r>
-              <a:rPr lang="en-US" dirty="0" smtClean="0">
-                <a:solidFill>
-                  <a:schemeClr val="tx1"/>
-                </a:solidFill>
-              </a:rPr>
-              <a:t> {{ }} bindings, </a:t>
-            </a:r>
-          </a:p>
-          <a:p>
-            <a:pPr lvl="1"/>
-            <a:r>
-              <a:rPr lang="en-US" dirty="0" smtClean="0">
-                <a:solidFill>
-                  <a:schemeClr val="tx1"/>
-                </a:solidFill>
-              </a:rPr>
-              <a:t>$watch method</a:t>
-            </a:r>
-          </a:p>
-          <a:p>
-            <a:pPr lvl="1"/>
-            <a:r>
-              <a:rPr lang="en-US" dirty="0">
-                <a:solidFill>
-                  <a:schemeClr val="tx1"/>
-                </a:solidFill>
-              </a:rPr>
-              <a:t>e</a:t>
-            </a:r>
-            <a:r>
-              <a:rPr lang="en-US" dirty="0" smtClean="0">
-                <a:solidFill>
-                  <a:schemeClr val="tx1"/>
-                </a:solidFill>
-              </a:rPr>
-              <a:t>tc..</a:t>
-            </a:r>
-          </a:p>
-          <a:p>
-            <a:pPr lvl="1"/>
-            <a:endParaRPr lang="en-US" dirty="0">
+            <a:endParaRPr lang="en-US" dirty="0" smtClean="0">
               <a:solidFill>
                 <a:schemeClr val="tx1"/>
               </a:solidFill>
@@ -7604,9 +7572,88 @@
                   <a:schemeClr val="tx1"/>
                 </a:solidFill>
               </a:rPr>
-              <a:t>Eliminates need of Event binding/handling</a:t>
-            </a:r>
-            <a:endParaRPr lang="en-US" dirty="0">
+              <a:t>Achieved </a:t>
+            </a:r>
+            <a:r>
+              <a:rPr lang="en-US" dirty="0" smtClean="0">
+                <a:solidFill>
+                  <a:schemeClr val="tx1"/>
+                </a:solidFill>
+              </a:rPr>
+              <a:t>through </a:t>
+            </a:r>
+          </a:p>
+          <a:p>
+            <a:pPr lvl="1"/>
+            <a:r>
+              <a:rPr lang="en-US" dirty="0" smtClean="0">
+                <a:solidFill>
+                  <a:schemeClr val="tx1"/>
+                </a:solidFill>
+              </a:rPr>
+              <a:t>ng-model directive,</a:t>
+            </a:r>
+          </a:p>
+          <a:p>
+            <a:pPr lvl="1"/>
+            <a:r>
+              <a:rPr lang="en-US" dirty="0" smtClean="0">
+                <a:solidFill>
+                  <a:schemeClr val="tx1"/>
+                </a:solidFill>
+              </a:rPr>
+              <a:t>$scope object</a:t>
+            </a:r>
+          </a:p>
+          <a:p>
+            <a:pPr lvl="1"/>
+            <a:r>
+              <a:rPr lang="en-US" dirty="0" smtClean="0">
+                <a:solidFill>
+                  <a:schemeClr val="tx1"/>
+                </a:solidFill>
+              </a:rPr>
+              <a:t> {{ }} bindings, </a:t>
+            </a:r>
+          </a:p>
+          <a:p>
+            <a:pPr lvl="1"/>
+            <a:r>
+              <a:rPr lang="en-US" dirty="0" smtClean="0">
+                <a:solidFill>
+                  <a:schemeClr val="tx1"/>
+                </a:solidFill>
+              </a:rPr>
+              <a:t>$watch method</a:t>
+            </a:r>
+          </a:p>
+          <a:p>
+            <a:pPr lvl="1"/>
+            <a:r>
+              <a:rPr lang="en-US" dirty="0">
+                <a:solidFill>
+                  <a:schemeClr val="tx1"/>
+                </a:solidFill>
+              </a:rPr>
+              <a:t>e</a:t>
+            </a:r>
+            <a:r>
+              <a:rPr lang="en-US" dirty="0" smtClean="0">
+                <a:solidFill>
+                  <a:schemeClr val="tx1"/>
+                </a:solidFill>
+              </a:rPr>
+              <a:t>tc.</a:t>
+            </a:r>
+            <a:r>
+              <a:rPr lang="en-US" dirty="0" smtClean="0">
+                <a:solidFill>
+                  <a:schemeClr val="tx1"/>
+                </a:solidFill>
+              </a:rPr>
+              <a:t>.</a:t>
+            </a:r>
+            <a:endParaRPr lang="en-US" dirty="0" smtClean="0">
               <a:solidFill>
                 <a:schemeClr val="tx1"/>
               </a:solidFill>
@@ -7622,17 +7669,17 @@
         </p:nvCxnSpPr>
         <p:spPr>
           <a:xfrm>
-            <a:off x="4671395" y="2285979"/>
-            <a:ext cx="673652" cy="0"/>
+            <a:off x="3090006" y="1994574"/>
+            <a:ext cx="3038147" cy="0"/>
           </a:xfrm>
           <a:prstGeom prst="straightConnector1">
             <a:avLst/>
           </a:prstGeom>
-          <a:ln w="38100" cmpd="sng">
+          <a:ln w="76200" cmpd="sng">
             <a:solidFill>
-              <a:srgbClr val="000000"/>
+              <a:srgbClr val="FF0000"/>
             </a:solidFill>
-            <a:headEnd type="arrow"/>
+            <a:headEnd type="none"/>
             <a:tailEnd type="arrow"/>
           </a:ln>
         </p:spPr>
@@ -7651,6 +7698,253 @@
           </a:fontRef>
         </p:style>
       </p:cxnSp>
+      <p:sp>
+        <p:nvSpPr>
+          <p:cNvPr id="6" name="Rectangle 5"/>
+          <p:cNvSpPr/>
+          <p:nvPr/>
+        </p:nvSpPr>
+        <p:spPr>
+          <a:xfrm>
+            <a:off x="1289842" y="1824313"/>
+            <a:ext cx="1800164" cy="769441"/>
+          </a:xfrm>
+          <a:prstGeom prst="rect">
+            <a:avLst/>
+          </a:prstGeom>
+        </p:spPr>
+        <p:style>
+          <a:lnRef idx="1">
+            <a:schemeClr val="accent1"/>
+          </a:lnRef>
+          <a:fillRef idx="3">
+            <a:schemeClr val="accent1"/>
+          </a:fillRef>
+          <a:effectRef idx="2">
+            <a:schemeClr val="accent1"/>
+          </a:effectRef>
+          <a:fontRef idx="minor">
+            <a:schemeClr val="lt1"/>
+          </a:fontRef>
+        </p:style>
+        <p:txBody>
+          <a:bodyPr wrap="square" lIns="91440" tIns="45720" rIns="91440" bIns="45720">
+            <a:spAutoFit/>
+          </a:bodyPr>
+          <a:lstStyle/>
+          <a:p>
+            <a:pPr algn="ctr"/>
+            <a:r>
+              <a:rPr lang="en-US" sz="4400" b="1" cap="none" spc="0" dirty="0" smtClean="0">
+                <a:ln w="12700">
+                  <a:solidFill>
+                    <a:schemeClr val="tx2">
+                      <a:satMod val="155000"/>
+                    </a:schemeClr>
+                  </a:solidFill>
+                  <a:prstDash val="solid"/>
+                </a:ln>
+                <a:solidFill>
+                  <a:schemeClr val="bg2">
+                    <a:tint val="85000"/>
+                    <a:satMod val="155000"/>
+                  </a:schemeClr>
+                </a:solidFill>
+                <a:effectLst>
+                  <a:outerShdw blurRad="41275" dist="20320" dir="1800000" algn="tl" rotWithShape="0">
+                    <a:srgbClr val="000000">
+                      <a:alpha val="40000"/>
+                    </a:srgbClr>
+                  </a:outerShdw>
+                </a:effectLst>
+              </a:rPr>
+              <a:t>Model</a:t>
+            </a:r>
+            <a:endParaRPr lang="en-US" sz="4400" b="1" cap="none" spc="0" dirty="0">
+              <a:ln w="12700">
+                <a:solidFill>
+                  <a:schemeClr val="tx2">
+                    <a:satMod val="155000"/>
+                  </a:schemeClr>
+                </a:solidFill>
+                <a:prstDash val="solid"/>
+              </a:ln>
+              <a:solidFill>
+                <a:schemeClr val="bg2">
+                  <a:tint val="85000"/>
+                  <a:satMod val="155000"/>
+                </a:schemeClr>
+              </a:solidFill>
+              <a:effectLst>
+                <a:outerShdw blurRad="41275" dist="20320" dir="1800000" algn="tl" rotWithShape="0">
+                  <a:srgbClr val="000000">
+                    <a:alpha val="40000"/>
+                  </a:srgbClr>
+                </a:outerShdw>
+              </a:effectLst>
+            </a:endParaRPr>
+          </a:p>
+        </p:txBody>
+      </p:sp>
+      <p:sp>
+        <p:nvSpPr>
+          <p:cNvPr id="7" name="Rectangle 6"/>
+          <p:cNvSpPr/>
+          <p:nvPr/>
+        </p:nvSpPr>
+        <p:spPr>
+          <a:xfrm>
+            <a:off x="6128153" y="1824314"/>
+            <a:ext cx="1382335" cy="769441"/>
+          </a:xfrm>
+          <a:prstGeom prst="rect">
+            <a:avLst/>
+          </a:prstGeom>
+        </p:spPr>
+        <p:style>
+          <a:lnRef idx="1">
+            <a:schemeClr val="accent2"/>
+          </a:lnRef>
+          <a:fillRef idx="3">
+            <a:schemeClr val="accent2"/>
+          </a:fillRef>
+          <a:effectRef idx="2">
+            <a:schemeClr val="accent2"/>
+          </a:effectRef>
+          <a:fontRef idx="minor">
+            <a:schemeClr val="lt1"/>
+          </a:fontRef>
+        </p:style>
+        <p:txBody>
+          <a:bodyPr wrap="none" lIns="91440" tIns="45720" rIns="91440" bIns="45720">
+            <a:spAutoFit/>
+          </a:bodyPr>
+          <a:lstStyle/>
+          <a:p>
+            <a:pPr algn="ctr"/>
+            <a:r>
+              <a:rPr lang="en-US" sz="4400" b="1" cap="none" spc="0" dirty="0" smtClean="0">
+                <a:ln w="12700">
+                  <a:solidFill>
+                    <a:schemeClr val="tx2">
+                      <a:satMod val="155000"/>
+                    </a:schemeClr>
+                  </a:solidFill>
+                  <a:prstDash val="solid"/>
+                </a:ln>
+                <a:solidFill>
+                  <a:schemeClr val="bg2">
+                    <a:tint val="85000"/>
+                    <a:satMod val="155000"/>
+                  </a:schemeClr>
+                </a:solidFill>
+                <a:effectLst>
+                  <a:outerShdw blurRad="41275" dist="20320" dir="1800000" algn="tl" rotWithShape="0">
+                    <a:srgbClr val="000000">
+                      <a:alpha val="40000"/>
+                    </a:srgbClr>
+                  </a:outerShdw>
+                </a:effectLst>
+              </a:rPr>
+              <a:t>View</a:t>
+            </a:r>
+            <a:endParaRPr lang="en-US" sz="4400" b="1" cap="none" spc="0" dirty="0">
+              <a:ln w="12700">
+                <a:solidFill>
+                  <a:schemeClr val="tx2">
+                    <a:satMod val="155000"/>
+                  </a:schemeClr>
+                </a:solidFill>
+                <a:prstDash val="solid"/>
+              </a:ln>
+              <a:solidFill>
+                <a:schemeClr val="bg2">
+                  <a:tint val="85000"/>
+                  <a:satMod val="155000"/>
+                </a:schemeClr>
+              </a:solidFill>
+              <a:effectLst>
+                <a:outerShdw blurRad="41275" dist="20320" dir="1800000" algn="tl" rotWithShape="0">
+                  <a:srgbClr val="000000">
+                    <a:alpha val="40000"/>
+                  </a:srgbClr>
+                </a:outerShdw>
+              </a:effectLst>
+            </a:endParaRPr>
+          </a:p>
+        </p:txBody>
+      </p:sp>
+      <p:cxnSp>
+        <p:nvCxnSpPr>
+          <p:cNvPr id="11" name="Straight Arrow Connector 10"/>
+          <p:cNvCxnSpPr/>
+          <p:nvPr/>
+        </p:nvCxnSpPr>
+        <p:spPr>
+          <a:xfrm flipV="1">
+            <a:off x="3090006" y="2406714"/>
+            <a:ext cx="3038147" cy="1"/>
+          </a:xfrm>
+          <a:prstGeom prst="straightConnector1">
+            <a:avLst/>
+          </a:prstGeom>
+          <a:ln w="76200" cmpd="sng">
+            <a:solidFill>
+              <a:srgbClr val="FF0000"/>
+            </a:solidFill>
+            <a:headEnd type="arrow"/>
+            <a:tailEnd type="none"/>
+          </a:ln>
+        </p:spPr>
+        <p:style>
+          <a:lnRef idx="2">
+            <a:schemeClr val="dk1"/>
+          </a:lnRef>
+          <a:fillRef idx="0">
+            <a:schemeClr val="dk1"/>
+          </a:fillRef>
+          <a:effectRef idx="1">
+            <a:schemeClr val="dk1"/>
+          </a:effectRef>
+          <a:fontRef idx="minor">
+            <a:schemeClr val="tx1"/>
+          </a:fontRef>
+        </p:style>
+      </p:cxnSp>
+      <p:sp>
+        <p:nvSpPr>
+          <p:cNvPr id="14" name="TextBox 13"/>
+          <p:cNvSpPr txBox="1"/>
+          <p:nvPr/>
+        </p:nvSpPr>
+        <p:spPr>
+          <a:xfrm>
+            <a:off x="3967255" y="1985760"/>
+            <a:ext cx="1300356" cy="400110"/>
+          </a:xfrm>
+          <a:prstGeom prst="rect">
+            <a:avLst/>
+          </a:prstGeom>
+          <a:noFill/>
+        </p:spPr>
+        <p:txBody>
+          <a:bodyPr wrap="none" rtlCol="0">
+            <a:spAutoFit/>
+          </a:bodyPr>
+          <a:lstStyle/>
+          <a:p>
+            <a:r>
+              <a:rPr lang="en-US" sz="2000" b="1" dirty="0"/>
+              <a:t>a</a:t>
+            </a:r>
+            <a:r>
+              <a:rPr lang="en-US" sz="2000" b="1" dirty="0" smtClean="0"/>
+              <a:t>utomatic</a:t>
+            </a:r>
+            <a:endParaRPr lang="en-US" b="1" dirty="0"/>
+          </a:p>
+        </p:txBody>
+      </p:sp>
     </p:spTree>
     <p:extLst>
       <p:ext uri="{BB962C8B-B14F-4D97-AF65-F5344CB8AC3E}">
@@ -7682,7 +7976,7 @@
                             </p:stCondLst>
                             <p:childTnLst>
                               <p:par>
-                                <p:cTn id="5" presetID="10" presetClass="entr" presetSubtype="0" fill="hold" nodeType="clickEffect">
+                                <p:cTn id="5" presetID="23" presetClass="entr" presetSubtype="16" fill="hold" nodeType="clickEffect">
                                   <p:stCondLst>
                                     <p:cond delay="0"/>
                                   </p:stCondLst>
@@ -7695,11 +7989,7 @@
                                           </p:stCondLst>
                                         </p:cTn>
                                         <p:tgtEl>
-                                          <p:spTgt spid="3">
-                                            <p:txEl>
-                                              <p:pRg st="1" end="1"/>
-                                            </p:txEl>
-                                          </p:spTgt>
+                                          <p:spTgt spid="5"/>
                                         </p:tgtEl>
                                         <p:attrNameLst>
                                           <p:attrName>style.visibility</p:attrName>
@@ -7709,36 +7999,70 @@
                                         <p:strVal val="visible"/>
                                       </p:to>
                                     </p:set>
-                                    <p:animEffect transition="in" filter="fade">
-                                      <p:cBhvr>
-                                        <p:cTn id="7" dur="500"/>
-                                        <p:tgtEl>
-                                          <p:spTgt spid="3">
-                                            <p:txEl>
-                                              <p:pRg st="1" end="1"/>
-                                            </p:txEl>
-                                          </p:spTgt>
-                                        </p:tgtEl>
-                                      </p:cBhvr>
-                                    </p:animEffect>
+                                    <p:anim calcmode="lin" valueType="num">
+                                      <p:cBhvr>
+                                        <p:cTn id="7" dur="500" fill="hold"/>
+                                        <p:tgtEl>
+                                          <p:spTgt spid="5"/>
+                                        </p:tgtEl>
+                                        <p:attrNameLst>
+                                          <p:attrName>ppt_w</p:attrName>
+                                        </p:attrNameLst>
+                                      </p:cBhvr>
+                                      <p:tavLst>
+                                        <p:tav tm="0">
+                                          <p:val>
+                                            <p:fltVal val="0"/>
+                                          </p:val>
+                                        </p:tav>
+                                        <p:tav tm="100000">
+                                          <p:val>
+                                            <p:strVal val="#ppt_w"/>
+                                          </p:val>
+                                        </p:tav>
+                                      </p:tavLst>
+                                    </p:anim>
+                                    <p:anim calcmode="lin" valueType="num">
+                                      <p:cBhvr>
+                                        <p:cTn id="8" dur="500" fill="hold"/>
+                                        <p:tgtEl>
+                                          <p:spTgt spid="5"/>
+                                        </p:tgtEl>
+                                        <p:attrNameLst>
+                                          <p:attrName>ppt_h</p:attrName>
+                                        </p:attrNameLst>
+                                      </p:cBhvr>
+                                      <p:tavLst>
+                                        <p:tav tm="0">
+                                          <p:val>
+                                            <p:fltVal val="0"/>
+                                          </p:val>
+                                        </p:tav>
+                                        <p:tav tm="100000">
+                                          <p:val>
+                                            <p:strVal val="#ppt_h"/>
+                                          </p:val>
+                                        </p:tav>
+                                      </p:tavLst>
+                                    </p:anim>
                                   </p:childTnLst>
                                 </p:cTn>
                               </p:par>
                               <p:par>
-                                <p:cTn id="8" presetID="55" presetClass="entr" presetSubtype="0" fill="hold" nodeType="withEffect">
+                                <p:cTn id="9" presetID="23" presetClass="entr" presetSubtype="16" fill="hold" grpId="0" nodeType="withEffect">
                                   <p:stCondLst>
                                     <p:cond delay="0"/>
                                   </p:stCondLst>
                                   <p:childTnLst>
                                     <p:set>
                                       <p:cBhvr>
-                                        <p:cTn id="9" dur="1" fill="hold">
+                                        <p:cTn id="10" dur="1" fill="hold">
                                           <p:stCondLst>
                                             <p:cond delay="0"/>
                                           </p:stCondLst>
                                         </p:cTn>
                                         <p:tgtEl>
-                                          <p:spTgt spid="5"/>
+                                          <p:spTgt spid="6"/>
                                         </p:tgtEl>
                                         <p:attrNameLst>
                                           <p:attrName>style.visibility</p:attrName>
@@ -7750,9 +8074,9 @@
                                     </p:set>
                                     <p:anim calcmode="lin" valueType="num">
                                       <p:cBhvr>
-                                        <p:cTn id="10" dur="1000" fill="hold"/>
-                                        <p:tgtEl>
-                                          <p:spTgt spid="5"/>
+                                        <p:cTn id="11" dur="500" fill="hold"/>
+                                        <p:tgtEl>
+                                          <p:spTgt spid="6"/>
                                         </p:tgtEl>
                                         <p:attrNameLst>
                                           <p:attrName>ppt_w</p:attrName>
@@ -7761,7 +8085,7 @@
                                       <p:tavLst>
                                         <p:tav tm="0">
                                           <p:val>
-                                            <p:strVal val="#ppt_w*0.70"/>
+                                            <p:fltVal val="0"/>
                                           </p:val>
                                         </p:tav>
                                         <p:tav tm="100000">
@@ -7773,9 +8097,9 @@
                                     </p:anim>
                                     <p:anim calcmode="lin" valueType="num">
                                       <p:cBhvr>
-                                        <p:cTn id="11" dur="1000" fill="hold"/>
-                                        <p:tgtEl>
-                                          <p:spTgt spid="5"/>
+                                        <p:cTn id="12" dur="500" fill="hold"/>
+                                        <p:tgtEl>
+                                          <p:spTgt spid="6"/>
                                         </p:tgtEl>
                                         <p:attrNameLst>
                                           <p:attrName>ppt_h</p:attrName>
@@ -7784,7 +8108,7 @@
                                       <p:tavLst>
                                         <p:tav tm="0">
                                           <p:val>
-                                            <p:strVal val="#ppt_h"/>
+                                            <p:fltVal val="0"/>
                                           </p:val>
                                         </p:tav>
                                         <p:tav tm="100000">
@@ -7794,14 +8118,263 @@
                                         </p:tav>
                                       </p:tavLst>
                                     </p:anim>
-                                    <p:animEffect transition="in" filter="fade">
-                                      <p:cBhvr>
-                                        <p:cTn id="12" dur="1000"/>
-                                        <p:tgtEl>
-                                          <p:spTgt spid="5"/>
-                                        </p:tgtEl>
-                                      </p:cBhvr>
-                                    </p:animEffect>
+                                  </p:childTnLst>
+                                </p:cTn>
+                              </p:par>
+                              <p:par>
+                                <p:cTn id="13" presetID="23" presetClass="entr" presetSubtype="16" fill="hold" grpId="0" nodeType="withEffect">
+                                  <p:stCondLst>
+                                    <p:cond delay="0"/>
+                                  </p:stCondLst>
+                                  <p:childTnLst>
+                                    <p:set>
+                                      <p:cBhvr>
+                                        <p:cTn id="14" dur="1" fill="hold">
+                                          <p:stCondLst>
+                                            <p:cond delay="0"/>
+                                          </p:stCondLst>
+                                        </p:cTn>
+                                        <p:tgtEl>
+                                          <p:spTgt spid="7"/>
+                                        </p:tgtEl>
+                                        <p:attrNameLst>
+                                          <p:attrName>style.visibility</p:attrName>
+                                        </p:attrNameLst>
+                                      </p:cBhvr>
+                                      <p:to>
+                                        <p:strVal val="visible"/>
+                                      </p:to>
+                                    </p:set>
+                                    <p:anim calcmode="lin" valueType="num">
+                                      <p:cBhvr>
+                                        <p:cTn id="15" dur="500" fill="hold"/>
+                                        <p:tgtEl>
+                                          <p:spTgt spid="7"/>
+                                        </p:tgtEl>
+                                        <p:attrNameLst>
+                                          <p:attrName>ppt_w</p:attrName>
+                                        </p:attrNameLst>
+                                      </p:cBhvr>
+                                      <p:tavLst>
+                                        <p:tav tm="0">
+                                          <p:val>
+                                            <p:fltVal val="0"/>
+                                          </p:val>
+                                        </p:tav>
+                                        <p:tav tm="100000">
+                                          <p:val>
+                                            <p:strVal val="#ppt_w"/>
+                                          </p:val>
+                                        </p:tav>
+                                      </p:tavLst>
+                                    </p:anim>
+                                    <p:anim calcmode="lin" valueType="num">
+                                      <p:cBhvr>
+                                        <p:cTn id="16" dur="500" fill="hold"/>
+                                        <p:tgtEl>
+                                          <p:spTgt spid="7"/>
+                                        </p:tgtEl>
+                                        <p:attrNameLst>
+                                          <p:attrName>ppt_h</p:attrName>
+                                        </p:attrNameLst>
+                                      </p:cBhvr>
+                                      <p:tavLst>
+                                        <p:tav tm="0">
+                                          <p:val>
+                                            <p:fltVal val="0"/>
+                                          </p:val>
+                                        </p:tav>
+                                        <p:tav tm="100000">
+                                          <p:val>
+                                            <p:strVal val="#ppt_h"/>
+                                          </p:val>
+                                        </p:tav>
+                                      </p:tavLst>
+                                    </p:anim>
+                                  </p:childTnLst>
+                                </p:cTn>
+                              </p:par>
+                              <p:par>
+                                <p:cTn id="17" presetID="23" presetClass="entr" presetSubtype="16" fill="hold" nodeType="withEffect">
+                                  <p:stCondLst>
+                                    <p:cond delay="0"/>
+                                  </p:stCondLst>
+                                  <p:childTnLst>
+                                    <p:set>
+                                      <p:cBhvr>
+                                        <p:cTn id="18" dur="1" fill="hold">
+                                          <p:stCondLst>
+                                            <p:cond delay="0"/>
+                                          </p:stCondLst>
+                                        </p:cTn>
+                                        <p:tgtEl>
+                                          <p:spTgt spid="11"/>
+                                        </p:tgtEl>
+                                        <p:attrNameLst>
+                                          <p:attrName>style.visibility</p:attrName>
+                                        </p:attrNameLst>
+                                      </p:cBhvr>
+                                      <p:to>
+                                        <p:strVal val="visible"/>
+                                      </p:to>
+                                    </p:set>
+                                    <p:anim calcmode="lin" valueType="num">
+                                      <p:cBhvr>
+                                        <p:cTn id="19" dur="500" fill="hold"/>
+                                        <p:tgtEl>
+                                          <p:spTgt spid="11"/>
+                                        </p:tgtEl>
+                                        <p:attrNameLst>
+                                          <p:attrName>ppt_w</p:attrName>
+                                        </p:attrNameLst>
+                                      </p:cBhvr>
+                                      <p:tavLst>
+                                        <p:tav tm="0">
+                                          <p:val>
+                                            <p:fltVal val="0"/>
+                                          </p:val>
+                                        </p:tav>
+                                        <p:tav tm="100000">
+                                          <p:val>
+                                            <p:strVal val="#ppt_w"/>
+                                          </p:val>
+                                        </p:tav>
+                                      </p:tavLst>
+                                    </p:anim>
+                                    <p:anim calcmode="lin" valueType="num">
+                                      <p:cBhvr>
+                                        <p:cTn id="20" dur="500" fill="hold"/>
+                                        <p:tgtEl>
+                                          <p:spTgt spid="11"/>
+                                        </p:tgtEl>
+                                        <p:attrNameLst>
+                                          <p:attrName>ppt_h</p:attrName>
+                                        </p:attrNameLst>
+                                      </p:cBhvr>
+                                      <p:tavLst>
+                                        <p:tav tm="0">
+                                          <p:val>
+                                            <p:fltVal val="0"/>
+                                          </p:val>
+                                        </p:tav>
+                                        <p:tav tm="100000">
+                                          <p:val>
+                                            <p:strVal val="#ppt_h"/>
+                                          </p:val>
+                                        </p:tav>
+                                      </p:tavLst>
+                                    </p:anim>
+                                  </p:childTnLst>
+                                </p:cTn>
+                              </p:par>
+                              <p:par>
+                                <p:cTn id="21" presetID="23" presetClass="entr" presetSubtype="16" fill="hold" grpId="0" nodeType="withEffect">
+                                  <p:stCondLst>
+                                    <p:cond delay="0"/>
+                                  </p:stCondLst>
+                                  <p:iterate type="lt">
+                                    <p:tmPct val="0"/>
+                                  </p:iterate>
+                                  <p:childTnLst>
+                                    <p:set>
+                                      <p:cBhvr>
+                                        <p:cTn id="22" dur="1" fill="hold">
+                                          <p:stCondLst>
+                                            <p:cond delay="0"/>
+                                          </p:stCondLst>
+                                        </p:cTn>
+                                        <p:tgtEl>
+                                          <p:spTgt spid="14"/>
+                                        </p:tgtEl>
+                                        <p:attrNameLst>
+                                          <p:attrName>style.visibility</p:attrName>
+                                        </p:attrNameLst>
+                                      </p:cBhvr>
+                                      <p:to>
+                                        <p:strVal val="visible"/>
+                                      </p:to>
+                                    </p:set>
+                                    <p:anim calcmode="lin" valueType="num">
+                                      <p:cBhvr>
+                                        <p:cTn id="23" dur="500" fill="hold"/>
+                                        <p:tgtEl>
+                                          <p:spTgt spid="14"/>
+                                        </p:tgtEl>
+                                        <p:attrNameLst>
+                                          <p:attrName>ppt_w</p:attrName>
+                                        </p:attrNameLst>
+                                      </p:cBhvr>
+                                      <p:tavLst>
+                                        <p:tav tm="0">
+                                          <p:val>
+                                            <p:fltVal val="0"/>
+                                          </p:val>
+                                        </p:tav>
+                                        <p:tav tm="100000">
+                                          <p:val>
+                                            <p:strVal val="#ppt_w"/>
+                                          </p:val>
+                                        </p:tav>
+                                      </p:tavLst>
+                                    </p:anim>
+                                    <p:anim calcmode="lin" valueType="num">
+                                      <p:cBhvr>
+                                        <p:cTn id="24" dur="500" fill="hold"/>
+                                        <p:tgtEl>
+                                          <p:spTgt spid="14"/>
+                                        </p:tgtEl>
+                                        <p:attrNameLst>
+                                          <p:attrName>ppt_h</p:attrName>
+                                        </p:attrNameLst>
+                                      </p:cBhvr>
+                                      <p:tavLst>
+                                        <p:tav tm="0">
+                                          <p:val>
+                                            <p:fltVal val="0"/>
+                                          </p:val>
+                                        </p:tav>
+                                        <p:tav tm="100000">
+                                          <p:val>
+                                            <p:strVal val="#ppt_h"/>
+                                          </p:val>
+                                        </p:tav>
+                                      </p:tavLst>
+                                    </p:anim>
+                                  </p:childTnLst>
+                                </p:cTn>
+                              </p:par>
+                              <p:par>
+                                <p:cTn id="25" presetID="35" presetClass="emph" presetSubtype="0" repeatCount="5000" fill="hold" grpId="1" nodeType="withEffect">
+                                  <p:stCondLst>
+                                    <p:cond delay="1000"/>
+                                  </p:stCondLst>
+                                  <p:iterate type="lt">
+                                    <p:tmPct val="0"/>
+                                  </p:iterate>
+                                  <p:childTnLst>
+                                    <p:anim calcmode="discrete" valueType="str">
+                                      <p:cBhvr>
+                                        <p:cTn id="26" dur="2000" fill="hold"/>
+                                        <p:tgtEl>
+                                          <p:spTgt spid="14"/>
+                                        </p:tgtEl>
+                                        <p:attrNameLst>
+                                          <p:attrName>style.visibility</p:attrName>
+                                        </p:attrNameLst>
+                                      </p:cBhvr>
+                                      <p:tavLst>
+                                        <p:tav tm="0">
+                                          <p:val>
+                                            <p:strVal val="hidden"/>
+                                          </p:val>
+                                        </p:tav>
+                                        <p:tav tm="50000">
+                                          <p:val>
+                                            <p:strVal val="visible"/>
+                                          </p:val>
+                                        </p:tav>
+                                      </p:tavLst>
+                                    </p:anim>
                                   </p:childTnLst>
                                 </p:cTn>
                               </p:par>
@@ -7812,26 +8385,26 @@
                     </p:cTn>
                   </p:par>
                   <p:par>
-                    <p:cTn id="13" fill="hold">
+                    <p:cTn id="27" fill="hold">
                       <p:stCondLst>
                         <p:cond delay="indefinite"/>
                       </p:stCondLst>
                       <p:childTnLst>
                         <p:par>
-                          <p:cTn id="14" fill="hold">
+                          <p:cTn id="28" fill="hold">
                             <p:stCondLst>
                               <p:cond delay="0"/>
                             </p:stCondLst>
                             <p:childTnLst>
                               <p:par>
-                                <p:cTn id="15" presetID="10" presetClass="entr" presetSubtype="0" fill="hold" nodeType="clickEffect">
+                                <p:cTn id="29" presetID="12" presetClass="entr" presetSubtype="4" fill="hold" nodeType="clickEffect">
                                   <p:stCondLst>
                                     <p:cond delay="0"/>
                                   </p:stCondLst>
                                   <p:childTnLst>
                                     <p:set>
                                       <p:cBhvr>
-                                        <p:cTn id="16" dur="1" fill="hold">
+                                        <p:cTn id="30" dur="1" fill="hold">
                                           <p:stCondLst>
                                             <p:cond delay="0"/>
                                           </p:stCondLst>
@@ -7839,7 +8412,7 @@
                                         <p:tgtEl>
                                           <p:spTgt spid="3">
                                             <p:txEl>
-                                              <p:pRg st="3" end="3"/>
+                                              <p:pRg st="4" end="4"/>
                                             </p:txEl>
                                           </p:spTgt>
                                         </p:tgtEl>
@@ -7851,34 +8424,9 @@
                                         <p:strVal val="visible"/>
                                       </p:to>
                                     </p:set>
-                                    <p:animEffect transition="in" filter="fade">
-                                      <p:cBhvr>
-                                        <p:cTn id="17" dur="500"/>
-                                        <p:tgtEl>
-                                          <p:spTgt spid="3">
-                                            <p:txEl>
-                                              <p:pRg st="3" end="3"/>
-                                            </p:txEl>
-                                          </p:spTgt>
-                                        </p:tgtEl>
-                                      </p:cBhvr>
-                                    </p:animEffect>
-                                  </p:childTnLst>
-                                </p:cTn>
-                              </p:par>
-                              <p:par>
-                                <p:cTn id="18" presetID="10" presetClass="entr" presetSubtype="0" fill="hold" nodeType="withEffect">
-                                  <p:stCondLst>
-                                    <p:cond delay="0"/>
-                                  </p:stCondLst>
-                                  <p:childTnLst>
-                                    <p:set>
-                                      <p:cBhvr>
-                                        <p:cTn id="19" dur="1" fill="hold">
-                                          <p:stCondLst>
-                                            <p:cond delay="0"/>
-                                          </p:stCondLst>
-                                        </p:cTn>
+                                    <p:anim calcmode="lin" valueType="num">
+                                      <p:cBhvr additive="base">
+                                        <p:cTn id="31" dur="500"/>
                                         <p:tgtEl>
                                           <p:spTgt spid="3">
                                             <p:txEl>
@@ -7887,192 +8435,29 @@
                                           </p:spTgt>
                                         </p:tgtEl>
                                         <p:attrNameLst>
-                                          <p:attrName>style.visibility</p:attrName>
-                                        </p:attrNameLst>
-                                      </p:cBhvr>
-                                      <p:to>
-                                        <p:strVal val="visible"/>
-                                      </p:to>
-                                    </p:set>
-                                    <p:animEffect transition="in" filter="fade">
-                                      <p:cBhvr>
-                                        <p:cTn id="20" dur="500"/>
+                                          <p:attrName>ppt_y</p:attrName>
+                                        </p:attrNameLst>
+                                      </p:cBhvr>
+                                      <p:tavLst>
+                                        <p:tav tm="0">
+                                          <p:val>
+                                            <p:strVal val="#ppt_y+#ppt_h*1.125000"/>
+                                          </p:val>
+                                        </p:tav>
+                                        <p:tav tm="100000">
+                                          <p:val>
+                                            <p:strVal val="#ppt_y"/>
+                                          </p:val>
+                                        </p:tav>
+                                      </p:tavLst>
+                                    </p:anim>
+                                    <p:animEffect transition="in" filter="wipe(up)">
+                                      <p:cBhvr>
+                                        <p:cTn id="32" dur="500"/>
                                         <p:tgtEl>
                                           <p:spTgt spid="3">
                                             <p:txEl>
                                               <p:pRg st="4" end="4"/>
-                                            </p:txEl>
-                                          </p:spTgt>
-                                        </p:tgtEl>
-                                      </p:cBhvr>
-                                    </p:animEffect>
-                                  </p:childTnLst>
-                                </p:cTn>
-                              </p:par>
-                              <p:par>
-                                <p:cTn id="21" presetID="10" presetClass="entr" presetSubtype="0" fill="hold" nodeType="withEffect">
-                                  <p:stCondLst>
-                                    <p:cond delay="0"/>
-                                  </p:stCondLst>
-                                  <p:childTnLst>
-                                    <p:set>
-                                      <p:cBhvr>
-                                        <p:cTn id="22" dur="1" fill="hold">
-                                          <p:stCondLst>
-                                            <p:cond delay="0"/>
-                                          </p:stCondLst>
-                                        </p:cTn>
-                                        <p:tgtEl>
-                                          <p:spTgt spid="3">
-                                            <p:txEl>
-                                              <p:pRg st="5" end="5"/>
-                                            </p:txEl>
-                                          </p:spTgt>
-                                        </p:tgtEl>
-                                        <p:attrNameLst>
-                                          <p:attrName>style.visibility</p:attrName>
-                                        </p:attrNameLst>
-                                      </p:cBhvr>
-                                      <p:to>
-                                        <p:strVal val="visible"/>
-                                      </p:to>
-                                    </p:set>
-                                    <p:animEffect transition="in" filter="fade">
-                                      <p:cBhvr>
-                                        <p:cTn id="23" dur="500"/>
-                                        <p:tgtEl>
-                                          <p:spTgt spid="3">
-                                            <p:txEl>
-                                              <p:pRg st="5" end="5"/>
-                                            </p:txEl>
-                                          </p:spTgt>
-                                        </p:tgtEl>
-                                      </p:cBhvr>
-                                    </p:animEffect>
-                                  </p:childTnLst>
-                                </p:cTn>
-                              </p:par>
-                              <p:par>
-                                <p:cTn id="24" presetID="10" presetClass="entr" presetSubtype="0" fill="hold" nodeType="withEffect">
-                                  <p:stCondLst>
-                                    <p:cond delay="0"/>
-                                  </p:stCondLst>
-                                  <p:childTnLst>
-                                    <p:set>
-                                      <p:cBhvr>
-                                        <p:cTn id="25" dur="1" fill="hold">
-                                          <p:stCondLst>
-                                            <p:cond delay="0"/>
-                                          </p:stCondLst>
-                                        </p:cTn>
-                                        <p:tgtEl>
-                                          <p:spTgt spid="3">
-                                            <p:txEl>
-                                              <p:pRg st="6" end="6"/>
-                                            </p:txEl>
-                                          </p:spTgt>
-                                        </p:tgtEl>
-                                        <p:attrNameLst>
-                                          <p:attrName>style.visibility</p:attrName>
-                                        </p:attrNameLst>
-                                      </p:cBhvr>
-                                      <p:to>
-                                        <p:strVal val="visible"/>
-                                      </p:to>
-                                    </p:set>
-                                    <p:animEffect transition="in" filter="fade">
-                                      <p:cBhvr>
-                                        <p:cTn id="26" dur="500"/>
-                                        <p:tgtEl>
-                                          <p:spTgt spid="3">
-                                            <p:txEl>
-                                              <p:pRg st="6" end="6"/>
-                                            </p:txEl>
-                                          </p:spTgt>
-                                        </p:tgtEl>
-                                      </p:cBhvr>
-                                    </p:animEffect>
-                                  </p:childTnLst>
-                                </p:cTn>
-                              </p:par>
-                              <p:par>
-                                <p:cTn id="27" presetID="10" presetClass="entr" presetSubtype="0" fill="hold" nodeType="withEffect">
-                                  <p:stCondLst>
-                                    <p:cond delay="0"/>
-                                  </p:stCondLst>
-                                  <p:childTnLst>
-                                    <p:set>
-                                      <p:cBhvr>
-                                        <p:cTn id="28" dur="1" fill="hold">
-                                          <p:stCondLst>
-                                            <p:cond delay="0"/>
-                                          </p:stCondLst>
-                                        </p:cTn>
-                                        <p:tgtEl>
-                                          <p:spTgt spid="3">
-                                            <p:txEl>
-                                              <p:pRg st="7" end="7"/>
-                                            </p:txEl>
-                                          </p:spTgt>
-                                        </p:tgtEl>
-                                        <p:attrNameLst>
-                                          <p:attrName>style.visibility</p:attrName>
-                                        </p:attrNameLst>
-                                      </p:cBhvr>
-                                      <p:to>
-                                        <p:strVal val="visible"/>
-                                      </p:to>
-                                    </p:set>
-                                    <p:animEffect transition="in" filter="fade">
-                                      <p:cBhvr>
-                                        <p:cTn id="29" dur="500"/>
-                                        <p:tgtEl>
-                                          <p:spTgt spid="3">
-                                            <p:txEl>
-                                              <p:pRg st="7" end="7"/>
-                                            </p:txEl>
-                                          </p:spTgt>
-                                        </p:tgtEl>
-                                      </p:cBhvr>
-                                    </p:animEffect>
-                                  </p:childTnLst>
-                                </p:cTn>
-                              </p:par>
-                              <p:par>
-                                <p:cTn id="30" presetID="10" presetClass="entr" presetSubtype="0" fill="hold" nodeType="withEffect">
-                                  <p:stCondLst>
-                                    <p:cond delay="0"/>
-                                  </p:stCondLst>
-                                  <p:childTnLst>
-                                    <p:set>
-                                      <p:cBhvr>
-                                        <p:cTn id="31" dur="1" fill="hold">
-                                          <p:stCondLst>
-                                            <p:cond delay="0"/>
-                                          </p:stCondLst>
-                                        </p:cTn>
-                                        <p:tgtEl>
-                                          <p:spTgt spid="3">
-                                            <p:txEl>
-                                              <p:pRg st="8" end="8"/>
-                                            </p:txEl>
-                                          </p:spTgt>
-                                        </p:tgtEl>
-                                        <p:attrNameLst>
-                                          <p:attrName>style.visibility</p:attrName>
-                                        </p:attrNameLst>
-                                      </p:cBhvr>
-                                      <p:to>
-                                        <p:strVal val="visible"/>
-                                      </p:to>
-                                    </p:set>
-                                    <p:animEffect transition="in" filter="fade">
-                                      <p:cBhvr>
-                                        <p:cTn id="32" dur="500"/>
-                                        <p:tgtEl>
-                                          <p:spTgt spid="3">
-                                            <p:txEl>
-                                              <p:pRg st="8" end="8"/>
                                             </p:txEl>
                                           </p:spTgt>
                                         </p:tgtEl>
@@ -8100,7 +8485,7 @@
                             </p:stCondLst>
                             <p:childTnLst>
                               <p:par>
-                                <p:cTn id="35" presetID="10" presetClass="entr" presetSubtype="0" fill="hold" nodeType="clickEffect">
+                                <p:cTn id="35" presetID="12" presetClass="entr" presetSubtype="4" fill="hold" nodeType="clickEffect">
                                   <p:stCondLst>
                                     <p:cond delay="0"/>
                                   </p:stCondLst>
@@ -8115,7 +8500,95 @@
                                         <p:tgtEl>
                                           <p:spTgt spid="3">
                                             <p:txEl>
-                                              <p:pRg st="10" end="10"/>
+                                              <p:pRg st="5" end="5"/>
+                                            </p:txEl>
+                                          </p:spTgt>
+                                        </p:tgtEl>
+                                        <p:attrNameLst>
+                                          <p:attrName>style.visibility</p:attrName>
+                                        </p:attrNameLst>
+                                      </p:cBhvr>
+                                      <p:to>
+                                        <p:strVal val="visible"/>
+                                      </p:to>
+                                    </p:set>
+                                    <p:anim calcmode="lin" valueType="num">
+                                      <p:cBhvr additive="base">
+                                        <p:cTn id="37" dur="500"/>
+                                        <p:tgtEl>
+                                          <p:spTgt spid="3">
+                                            <p:txEl>
+                                              <p:pRg st="5" end="5"/>
+                                            </p:txEl>
+                                          </p:spTgt>
+                                        </p:tgtEl>
+                                        <p:attrNameLst>
+                                          <p:attrName>ppt_y</p:attrName>
+                                        </p:attrNameLst>
+                                      </p:cBhvr>
+                                      <p:tavLst>
+                                        <p:tav tm="0">
+                                          <p:val>
+                                            <p:strVal val="#ppt_y+#ppt_h*1.125000"/>
+                                          </p:val>
+                                        </p:tav>
+                                        <p:tav tm="100000">
+                                          <p:val>
+                                            <p:strVal val="#ppt_y"/>
+                                          </p:val>
+                                        </p:tav>
+                                      </p:tavLst>
+                                    </p:anim>
+                                    <p:animEffect transition="in" filter="wipe(up)">
+                                      <p:cBhvr>
+                                        <p:cTn id="38" dur="500"/>
+                                        <p:tgtEl>
+                                          <p:spTgt spid="3">
+                                            <p:txEl>
+                                              <p:pRg st="5" end="5"/>
+                                            </p:txEl>
+                                          </p:spTgt>
+                                        </p:tgtEl>
+                                      </p:cBhvr>
+                                    </p:animEffect>
+                                  </p:childTnLst>
+                                </p:cTn>
+                              </p:par>
+                            </p:childTnLst>
+                          </p:cTn>
+                        </p:par>
+                      </p:childTnLst>
+                    </p:cTn>
+                  </p:par>
+                  <p:par>
+                    <p:cTn id="39" fill="hold">
+                      <p:stCondLst>
+                        <p:cond delay="indefinite"/>
+                      </p:stCondLst>
+                      <p:childTnLst>
+                        <p:par>
+                          <p:cTn id="40" fill="hold">
+                            <p:stCondLst>
+                              <p:cond delay="0"/>
+                            </p:stCondLst>
+                            <p:childTnLst>
+                              <p:par>
+                                <p:cTn id="41" presetID="10" presetClass="entr" presetSubtype="0" fill="hold" nodeType="clickEffect">
+                                  <p:stCondLst>
+                                    <p:cond delay="0"/>
+                                  </p:stCondLst>
+                                  <p:childTnLst>
+                                    <p:set>
+                                      <p:cBhvr>
+                                        <p:cTn id="42" dur="1" fill="hold">
+                                          <p:stCondLst>
+                                            <p:cond delay="0"/>
+                                          </p:stCondLst>
+                                        </p:cTn>
+                                        <p:tgtEl>
+                                          <p:spTgt spid="3">
+                                            <p:txEl>
+                                              <p:pRg st="7" end="7"/>
                                             </p:txEl>
                                           </p:spTgt>
                                         </p:tgtEl>
@@ -8129,11 +8602,226 @@
                                     </p:set>
                                     <p:animEffect transition="in" filter="fade">
                                       <p:cBhvr>
-                                        <p:cTn id="37" dur="500"/>
+                                        <p:cTn id="43" dur="500"/>
+                                        <p:tgtEl>
+                                          <p:spTgt spid="3">
+                                            <p:txEl>
+                                              <p:pRg st="7" end="7"/>
+                                            </p:txEl>
+                                          </p:spTgt>
+                                        </p:tgtEl>
+                                      </p:cBhvr>
+                                    </p:animEffect>
+                                  </p:childTnLst>
+                                </p:cTn>
+                              </p:par>
+                              <p:par>
+                                <p:cTn id="44" presetID="10" presetClass="entr" presetSubtype="0" fill="hold" nodeType="withEffect">
+                                  <p:stCondLst>
+                                    <p:cond delay="0"/>
+                                  </p:stCondLst>
+                                  <p:childTnLst>
+                                    <p:set>
+                                      <p:cBhvr>
+                                        <p:cTn id="45" dur="1" fill="hold">
+                                          <p:stCondLst>
+                                            <p:cond delay="0"/>
+                                          </p:stCondLst>
+                                        </p:cTn>
+                                        <p:tgtEl>
+                                          <p:spTgt spid="3">
+                                            <p:txEl>
+                                              <p:pRg st="8" end="8"/>
+                                            </p:txEl>
+                                          </p:spTgt>
+                                        </p:tgtEl>
+                                        <p:attrNameLst>
+                                          <p:attrName>style.visibility</p:attrName>
+                                        </p:attrNameLst>
+                                      </p:cBhvr>
+                                      <p:to>
+                                        <p:strVal val="visible"/>
+                                      </p:to>
+                                    </p:set>
+                                    <p:animEffect transition="in" filter="fade">
+                                      <p:cBhvr>
+                                        <p:cTn id="46" dur="500"/>
+                                        <p:tgtEl>
+                                          <p:spTgt spid="3">
+                                            <p:txEl>
+                                              <p:pRg st="8" end="8"/>
+                                            </p:txEl>
+                                          </p:spTgt>
+                                        </p:tgtEl>
+                                      </p:cBhvr>
+                                    </p:animEffect>
+                                  </p:childTnLst>
+                                </p:cTn>
+                              </p:par>
+                              <p:par>
+                                <p:cTn id="47" presetID="10" presetClass="entr" presetSubtype="0" fill="hold" nodeType="withEffect">
+                                  <p:stCondLst>
+                                    <p:cond delay="0"/>
+                                  </p:stCondLst>
+                                  <p:childTnLst>
+                                    <p:set>
+                                      <p:cBhvr>
+                                        <p:cTn id="48" dur="1" fill="hold">
+                                          <p:stCondLst>
+                                            <p:cond delay="0"/>
+                                          </p:stCondLst>
+                                        </p:cTn>
+                                        <p:tgtEl>
+                                          <p:spTgt spid="3">
+                                            <p:txEl>
+                                              <p:pRg st="9" end="9"/>
+                                            </p:txEl>
+                                          </p:spTgt>
+                                        </p:tgtEl>
+                                        <p:attrNameLst>
+                                          <p:attrName>style.visibility</p:attrName>
+                                        </p:attrNameLst>
+                                      </p:cBhvr>
+                                      <p:to>
+                                        <p:strVal val="visible"/>
+                                      </p:to>
+                                    </p:set>
+                                    <p:animEffect transition="in" filter="fade">
+                                      <p:cBhvr>
+                                        <p:cTn id="49" dur="500"/>
+                                        <p:tgtEl>
+                                          <p:spTgt spid="3">
+                                            <p:txEl>
+                                              <p:pRg st="9" end="9"/>
+                                            </p:txEl>
+                                          </p:spTgt>
+                                        </p:tgtEl>
+                                      </p:cBhvr>
+                                    </p:animEffect>
+                                  </p:childTnLst>
+                                </p:cTn>
+                              </p:par>
+                              <p:par>
+                                <p:cTn id="50" presetID="10" presetClass="entr" presetSubtype="0" fill="hold" nodeType="withEffect">
+                                  <p:stCondLst>
+                                    <p:cond delay="0"/>
+                                  </p:stCondLst>
+                                  <p:childTnLst>
+                                    <p:set>
+                                      <p:cBhvr>
+                                        <p:cTn id="51" dur="1" fill="hold">
+                                          <p:stCondLst>
+                                            <p:cond delay="0"/>
+                                          </p:stCondLst>
+                                        </p:cTn>
                                         <p:tgtEl>
                                           <p:spTgt spid="3">
                                             <p:txEl>
                                               <p:pRg st="10" end="10"/>
+                                            </p:txEl>
+                                          </p:spTgt>
+                                        </p:tgtEl>
+                                        <p:attrNameLst>
+                                          <p:attrName>style.visibility</p:attrName>
+                                        </p:attrNameLst>
+                                      </p:cBhvr>
+                                      <p:to>
+                                        <p:strVal val="visible"/>
+                                      </p:to>
+                                    </p:set>
+                                    <p:animEffect transition="in" filter="fade">
+                                      <p:cBhvr>
+                                        <p:cTn id="52" dur="500"/>
+                                        <p:tgtEl>
+                                          <p:spTgt spid="3">
+                                            <p:txEl>
+                                              <p:pRg st="10" end="10"/>
+                                            </p:txEl>
+                                          </p:spTgt>
+                                        </p:tgtEl>
+                                      </p:cBhvr>
+                                    </p:animEffect>
+                                  </p:childTnLst>
+                                </p:cTn>
+                              </p:par>
+                              <p:par>
+                                <p:cTn id="53" presetID="10" presetClass="entr" presetSubtype="0" fill="hold" nodeType="withEffect">
+                                  <p:stCondLst>
+                                    <p:cond delay="0"/>
+                                  </p:stCondLst>
+                                  <p:childTnLst>
+                                    <p:set>
+                                      <p:cBhvr>
+                                        <p:cTn id="54" dur="1" fill="hold">
+                                          <p:stCondLst>
+                                            <p:cond delay="0"/>
+                                          </p:stCondLst>
+                                        </p:cTn>
+                                        <p:tgtEl>
+                                          <p:spTgt spid="3">
+                                            <p:txEl>
+                                              <p:pRg st="11" end="11"/>
+                                            </p:txEl>
+                                          </p:spTgt>
+                                        </p:tgtEl>
+                                        <p:attrNameLst>
+                                          <p:attrName>style.visibility</p:attrName>
+                                        </p:attrNameLst>
+                                      </p:cBhvr>
+                                      <p:to>
+                                        <p:strVal val="visible"/>
+                                      </p:to>
+                                    </p:set>
+                                    <p:animEffect transition="in" filter="fade">
+                                      <p:cBhvr>
+                                        <p:cTn id="55" dur="500"/>
+                                        <p:tgtEl>
+                                          <p:spTgt spid="3">
+                                            <p:txEl>
+                                              <p:pRg st="11" end="11"/>
+                                            </p:txEl>
+                                          </p:spTgt>
+                                        </p:tgtEl>
+                                      </p:cBhvr>
+                                    </p:animEffect>
+                                  </p:childTnLst>
+                                </p:cTn>
+                              </p:par>
+                              <p:par>
+                                <p:cTn id="56" presetID="10" presetClass="entr" presetSubtype="0" fill="hold" nodeType="withEffect">
+                                  <p:stCondLst>
+                                    <p:cond delay="0"/>
+                                  </p:stCondLst>
+                                  <p:childTnLst>
+                                    <p:set>
+                                      <p:cBhvr>
+                                        <p:cTn id="57" dur="1" fill="hold">
+                                          <p:stCondLst>
+                                            <p:cond delay="0"/>
+                                          </p:stCondLst>
+                                        </p:cTn>
+                                        <p:tgtEl>
+                                          <p:spTgt spid="3">
+                                            <p:txEl>
+                                              <p:pRg st="12" end="12"/>
+                                            </p:txEl>
+                                          </p:spTgt>
+                                        </p:tgtEl>
+                                        <p:attrNameLst>
+                                          <p:attrName>style.visibility</p:attrName>
+                                        </p:attrNameLst>
+                                      </p:cBhvr>
+                                      <p:to>
+                                        <p:strVal val="visible"/>
+                                      </p:to>
+                                    </p:set>
+                                    <p:animEffect transition="in" filter="fade">
+                                      <p:cBhvr>
+                                        <p:cTn id="58" dur="500"/>
+                                        <p:tgtEl>
+                                          <p:spTgt spid="3">
+                                            <p:txEl>
+                                              <p:pRg st="12" end="12"/>
                                             </p:txEl>
                                           </p:spTgt>
                                         </p:tgtEl>
@@ -8169,6 +8857,12 @@
         </p:cTn>
       </p:par>
     </p:tnLst>
+    <p:bldLst>
+      <p:bldP spid="6" grpId="0" animBg="1"/>
+      <p:bldP spid="7" grpId="0" animBg="1"/>
+      <p:bldP spid="14" grpId="0"/>
+      <p:bldP spid="14" grpId="1"/>
+    </p:bldLst>
   </p:timing>
 </p:sld>
 </file>
@@ -15606,7 +16300,15 @@
                   <a:srgbClr val="000000"/>
                 </a:solidFill>
               </a:rPr>
-              <a:t>Software/UI Developer @ </a:t>
+              <a:t>Software</a:t>
+            </a:r>
+            <a:r>
+              <a:rPr lang="en-US" dirty="0" smtClean="0">
+                <a:solidFill>
+                  <a:srgbClr val="000000"/>
+                </a:solidFill>
+              </a:rPr>
+              <a:t>/UI Developer @ </a:t>
             </a:r>
             <a:r>
               <a:rPr lang="en-US" dirty="0" err="1" smtClean="0">
@@ -16766,12 +17468,130 @@
           <a:lstStyle/>
           <a:p>
             <a:r>
-              <a:rPr lang="en-US" b="1" dirty="0" smtClean="0">
+              <a:rPr lang="en-US" dirty="0">
                 <a:solidFill>
                   <a:schemeClr val="tx1"/>
                 </a:solidFill>
               </a:rPr>
-              <a:t>Start </a:t>
+              <a:t>Make use of these </a:t>
+            </a:r>
+            <a:r>
+              <a:rPr lang="en-US" b="1" dirty="0">
+                <a:solidFill>
+                  <a:schemeClr val="tx1"/>
+                </a:solidFill>
+              </a:rPr>
+              <a:t>validation directives </a:t>
+            </a:r>
+            <a:r>
+              <a:rPr lang="en-US" dirty="0">
+                <a:solidFill>
+                  <a:schemeClr val="tx1"/>
+                </a:solidFill>
+              </a:rPr>
+              <a:t>-</a:t>
+            </a:r>
+          </a:p>
+          <a:p>
+            <a:pPr lvl="1"/>
+            <a:r>
+              <a:rPr lang="en-US" b="1" dirty="0">
+                <a:solidFill>
+                  <a:schemeClr val="tx1"/>
+                </a:solidFill>
+              </a:rPr>
+              <a:t>required</a:t>
+            </a:r>
+            <a:r>
+              <a:rPr lang="en-US" dirty="0">
+                <a:solidFill>
+                  <a:schemeClr val="tx1"/>
+                </a:solidFill>
+              </a:rPr>
+              <a:t>,     </a:t>
+            </a:r>
+            <a:r>
+              <a:rPr lang="en-US" b="1" dirty="0">
+                <a:solidFill>
+                  <a:schemeClr val="tx1"/>
+                </a:solidFill>
+              </a:rPr>
+              <a:t>type</a:t>
+            </a:r>
+            <a:r>
+              <a:rPr lang="en-US" dirty="0">
+                <a:solidFill>
+                  <a:schemeClr val="tx1"/>
+                </a:solidFill>
+              </a:rPr>
+              <a:t>,      </a:t>
+            </a:r>
+            <a:r>
+              <a:rPr lang="en-US" b="1" dirty="0">
+                <a:solidFill>
+                  <a:schemeClr val="tx1"/>
+                </a:solidFill>
+              </a:rPr>
+              <a:t>ng-</a:t>
+            </a:r>
+            <a:r>
+              <a:rPr lang="en-US" b="1" dirty="0" err="1">
+                <a:solidFill>
+                  <a:schemeClr val="tx1"/>
+                </a:solidFill>
+              </a:rPr>
+              <a:t>minlength</a:t>
+            </a:r>
+            <a:r>
+              <a:rPr lang="en-US" dirty="0">
+                <a:solidFill>
+                  <a:schemeClr val="tx1"/>
+                </a:solidFill>
+              </a:rPr>
+              <a:t>,       </a:t>
+            </a:r>
+            <a:r>
+              <a:rPr lang="en-US" b="1" dirty="0">
+                <a:solidFill>
+                  <a:schemeClr val="tx1"/>
+                </a:solidFill>
+              </a:rPr>
+              <a:t>ng-</a:t>
+            </a:r>
+            <a:r>
+              <a:rPr lang="en-US" b="1" dirty="0" err="1">
+                <a:solidFill>
+                  <a:schemeClr val="tx1"/>
+                </a:solidFill>
+              </a:rPr>
+              <a:t>maxlength</a:t>
+            </a:r>
+            <a:r>
+              <a:rPr lang="en-US" dirty="0">
+                <a:solidFill>
+                  <a:schemeClr val="tx1"/>
+                </a:solidFill>
+              </a:rPr>
+              <a:t>,        </a:t>
+            </a:r>
+            <a:r>
+              <a:rPr lang="en-US" b="1" dirty="0">
+                <a:solidFill>
+                  <a:schemeClr val="tx1"/>
+                </a:solidFill>
+              </a:rPr>
+              <a:t>ng-pattern</a:t>
+            </a:r>
+          </a:p>
+          <a:p>
+            <a:pPr lvl="1"/>
+            <a:r>
+              <a:rPr lang="en-US" dirty="0">
+                <a:solidFill>
+                  <a:schemeClr val="tx1"/>
+                </a:solidFill>
+              </a:rPr>
+              <a:t>Your own custom </a:t>
             </a:r>
             <a:r>
               <a:rPr lang="en-US" dirty="0" smtClean="0">
@@ -16779,47 +17599,136 @@
                   <a:schemeClr val="tx1"/>
                 </a:solidFill>
               </a:rPr>
-              <a:t>by </a:t>
-            </a:r>
-            <a:r>
-              <a:rPr lang="en-US" dirty="0" smtClean="0">
-                <a:solidFill>
-                  <a:schemeClr val="tx1"/>
-                </a:solidFill>
-              </a:rPr>
-              <a:t>- adding ‘name’ attribute to ‘form’ and ‘form elements’</a:t>
-            </a:r>
-          </a:p>
-          <a:p>
-            <a:endParaRPr lang="en-US" dirty="0" smtClean="0">
+              <a:t>directive</a:t>
+            </a:r>
+            <a:endParaRPr lang="en-US" b="1" dirty="0" smtClean="0">
               <a:solidFill>
                 <a:schemeClr val="tx1"/>
               </a:solidFill>
             </a:endParaRPr>
           </a:p>
           <a:p>
-            <a:endParaRPr lang="en-US" dirty="0">
+            <a:r>
+              <a:rPr lang="en-US" b="1" dirty="0" smtClean="0">
+                <a:solidFill>
+                  <a:schemeClr val="tx1"/>
+                </a:solidFill>
+              </a:rPr>
+              <a:t>Start </a:t>
+            </a:r>
+            <a:r>
+              <a:rPr lang="en-US" dirty="0" smtClean="0">
+                <a:solidFill>
+                  <a:schemeClr val="tx1"/>
+                </a:solidFill>
+              </a:rPr>
+              <a:t>by - adding ‘name’ attribute to ‘form’ and ‘form </a:t>
+            </a:r>
+            <a:r>
+              <a:rPr lang="en-US" dirty="0" smtClean="0">
+                <a:solidFill>
+                  <a:schemeClr val="tx1"/>
+                </a:solidFill>
+              </a:rPr>
+              <a:t>elements’</a:t>
+            </a:r>
+          </a:p>
+          <a:p>
+            <a:r>
+              <a:rPr lang="en-US" dirty="0" smtClean="0">
+                <a:solidFill>
+                  <a:schemeClr val="tx1"/>
+                </a:solidFill>
+              </a:rPr>
+              <a:t>Angular </a:t>
+            </a:r>
+            <a:r>
+              <a:rPr lang="en-US" b="1" dirty="0" smtClean="0">
+                <a:solidFill>
+                  <a:schemeClr val="tx1"/>
+                </a:solidFill>
+              </a:rPr>
+              <a:t>attaches</a:t>
+            </a:r>
+            <a:r>
+              <a:rPr lang="en-US" dirty="0" smtClean="0">
+                <a:solidFill>
+                  <a:schemeClr val="tx1"/>
+                </a:solidFill>
+              </a:rPr>
+              <a:t> these properties to form and form elements</a:t>
+            </a:r>
+          </a:p>
+          <a:p>
+            <a:endParaRPr lang="en-US" b="1" dirty="0" smtClean="0">
               <a:solidFill>
                 <a:schemeClr val="tx1"/>
               </a:solidFill>
             </a:endParaRPr>
           </a:p>
           <a:p>
+            <a:endParaRPr lang="en-US" b="1" dirty="0">
+              <a:solidFill>
+                <a:schemeClr val="tx1"/>
+              </a:solidFill>
+            </a:endParaRPr>
+          </a:p>
+          <a:p>
+            <a:r>
+              <a:rPr lang="en-US" b="1" dirty="0" smtClean="0">
+                <a:solidFill>
+                  <a:schemeClr val="tx1"/>
+                </a:solidFill>
+              </a:rPr>
+              <a:t>Accessed</a:t>
+            </a:r>
             <a:r>
               <a:rPr lang="en-US" dirty="0" smtClean="0">
                 <a:solidFill>
                   <a:schemeClr val="tx1"/>
                 </a:solidFill>
               </a:rPr>
-              <a:t>Angular </a:t>
-            </a:r>
+              <a:t> </a:t>
+            </a:r>
+            <a:r>
+              <a:rPr lang="en-US" dirty="0" smtClean="0">
+                <a:solidFill>
+                  <a:schemeClr val="tx1"/>
+                </a:solidFill>
+              </a:rPr>
+              <a:t>as</a:t>
+            </a:r>
+          </a:p>
+          <a:p>
+            <a:pPr lvl="1"/>
+            <a:r>
+              <a:rPr lang="en-US" dirty="0" smtClean="0">
+                <a:solidFill>
+                  <a:schemeClr val="tx1"/>
+                </a:solidFill>
+              </a:rPr>
+              <a:t>Form: &lt;form name&gt;.&lt;property&gt;</a:t>
+            </a:r>
+          </a:p>
+          <a:p>
+            <a:pPr lvl="1"/>
+            <a:r>
+              <a:rPr lang="en-US" dirty="0" smtClean="0">
+                <a:solidFill>
+                  <a:schemeClr val="tx1"/>
+                </a:solidFill>
+              </a:rPr>
+              <a:t>Individual form element: &lt;form name&gt;.&lt;element name&gt;.&lt;property&gt;</a:t>
+            </a:r>
+          </a:p>
+          <a:p>
             <a:r>
               <a:rPr lang="en-US" b="1" dirty="0" smtClean="0">
                 <a:solidFill>
                   <a:schemeClr val="tx1"/>
                 </a:solidFill>
               </a:rPr>
-              <a:t>attaches</a:t>
+              <a:t>Applies</a:t>
             </a:r>
             <a:r>
               <a:rPr lang="en-US" dirty="0" smtClean="0">
@@ -16827,17 +17736,26 @@
                   <a:schemeClr val="tx1"/>
                 </a:solidFill>
               </a:rPr>
-              <a:t> these properties to form and form elements</a:t>
-            </a:r>
-          </a:p>
-          <a:p>
-            <a:r>
-              <a:rPr lang="en-US" b="1" dirty="0" smtClean="0">
+              <a:t> these styling classes </a:t>
+            </a:r>
+            <a:r>
+              <a:rPr lang="en-US" dirty="0">
                 <a:solidFill>
                   <a:schemeClr val="tx1"/>
                 </a:solidFill>
               </a:rPr>
-              <a:t>Accessed</a:t>
+              <a:t>–</a:t>
+            </a:r>
+          </a:p>
+          <a:p>
+            <a:pPr lvl="1"/>
+            <a:r>
+              <a:rPr lang="en-US" dirty="0">
+                <a:solidFill>
+                  <a:schemeClr val="tx1"/>
+                </a:solidFill>
+              </a:rPr>
+              <a:t>.ng-valid, </a:t>
             </a:r>
             <a:r>
               <a:rPr lang="en-US" dirty="0" smtClean="0">
@@ -16845,295 +17763,100 @@
                   <a:schemeClr val="tx1"/>
                 </a:solidFill>
               </a:rPr>
-              <a:t> as</a:t>
+              <a:t>       .</a:t>
+            </a:r>
+            <a:r>
+              <a:rPr lang="en-US" dirty="0">
+                <a:solidFill>
+                  <a:schemeClr val="tx1"/>
+                </a:solidFill>
+              </a:rPr>
+              <a:t>ng-invalid, </a:t>
+            </a:r>
+            <a:r>
+              <a:rPr lang="en-US" dirty="0" smtClean="0">
+                <a:solidFill>
+                  <a:schemeClr val="tx1"/>
+                </a:solidFill>
+              </a:rPr>
+              <a:t>       .</a:t>
+            </a:r>
+            <a:r>
+              <a:rPr lang="en-US" dirty="0">
+                <a:solidFill>
+                  <a:schemeClr val="tx1"/>
+                </a:solidFill>
+              </a:rPr>
+              <a:t>ng-pristine, </a:t>
+            </a:r>
+            <a:r>
+              <a:rPr lang="en-US" dirty="0" smtClean="0">
+                <a:solidFill>
+                  <a:schemeClr val="tx1"/>
+                </a:solidFill>
+              </a:rPr>
+              <a:t>         .</a:t>
+            </a:r>
+            <a:r>
+              <a:rPr lang="en-US" dirty="0">
+                <a:solidFill>
+                  <a:schemeClr val="tx1"/>
+                </a:solidFill>
+              </a:rPr>
+              <a:t>ng-dirty</a:t>
             </a:r>
           </a:p>
           <a:p>
             <a:pPr lvl="1"/>
             <a:r>
+              <a:rPr lang="en-US" dirty="0">
+                <a:solidFill>
+                  <a:schemeClr val="tx1"/>
+                </a:solidFill>
+              </a:rPr>
+              <a:t>.ng-invalid-required, </a:t>
+            </a:r>
+            <a:r>
               <a:rPr lang="en-US" dirty="0" smtClean="0">
                 <a:solidFill>
                   <a:schemeClr val="tx1"/>
                 </a:solidFill>
               </a:rPr>
-              <a:t>Form: &lt;form name&gt;.&lt;property&gt;</a:t>
-            </a:r>
-          </a:p>
-          <a:p>
-            <a:pPr lvl="1"/>
+              <a:t>       .</a:t>
+            </a:r>
+            <a:r>
+              <a:rPr lang="en-US" dirty="0">
+                <a:solidFill>
+                  <a:schemeClr val="tx1"/>
+                </a:solidFill>
+              </a:rPr>
+              <a:t>ng-valid-max-</a:t>
+            </a:r>
             <a:r>
               <a:rPr lang="en-US" dirty="0" smtClean="0">
                 <a:solidFill>
                   <a:schemeClr val="tx1"/>
                 </a:solidFill>
               </a:rPr>
-              <a:t>Individual form element: &lt;form name&gt;.&lt;element name&gt;.&lt;property&gt;</a:t>
-            </a:r>
-          </a:p>
-          <a:p>
-            <a:r>
-              <a:rPr lang="en-US" b="1" dirty="0" smtClean="0">
+              <a:t>length,     etc. </a:t>
+            </a:r>
+          </a:p>
+          <a:p>
+            <a:r>
+              <a:rPr lang="en-US" sz="2200" dirty="0" smtClean="0">
                 <a:solidFill>
                   <a:schemeClr val="tx1"/>
                 </a:solidFill>
               </a:rPr>
-              <a:t>Applies</a:t>
-            </a:r>
-            <a:r>
-              <a:rPr lang="en-US" dirty="0" smtClean="0">
+              <a:t>Use </a:t>
+            </a:r>
+            <a:r>
+              <a:rPr lang="en-US" sz="2200" dirty="0" smtClean="0">
                 <a:solidFill>
                   <a:schemeClr val="tx1"/>
                 </a:solidFill>
               </a:rPr>
-              <a:t> these styling classes </a:t>
-            </a:r>
-            <a:r>
-              <a:rPr lang="en-US" dirty="0">
-                <a:solidFill>
-                  <a:schemeClr val="tx1"/>
-                </a:solidFill>
-              </a:rPr>
-              <a:t>–</a:t>
-            </a:r>
-          </a:p>
-          <a:p>
-            <a:pPr lvl="1"/>
-            <a:r>
-              <a:rPr lang="en-US" dirty="0">
-                <a:solidFill>
-                  <a:schemeClr val="tx1"/>
-                </a:solidFill>
-              </a:rPr>
-              <a:t>.ng-valid, </a:t>
-            </a:r>
-            <a:r>
-              <a:rPr lang="en-US" dirty="0" smtClean="0">
-                <a:solidFill>
-                  <a:schemeClr val="tx1"/>
-                </a:solidFill>
-              </a:rPr>
-              <a:t>       .</a:t>
-            </a:r>
-            <a:r>
-              <a:rPr lang="en-US" dirty="0">
-                <a:solidFill>
-                  <a:schemeClr val="tx1"/>
-                </a:solidFill>
-              </a:rPr>
-              <a:t>ng-invalid, </a:t>
-            </a:r>
-            <a:r>
-              <a:rPr lang="en-US" dirty="0" smtClean="0">
-                <a:solidFill>
-                  <a:schemeClr val="tx1"/>
-                </a:solidFill>
-              </a:rPr>
-              <a:t>       .</a:t>
-            </a:r>
-            <a:r>
-              <a:rPr lang="en-US" dirty="0">
-                <a:solidFill>
-                  <a:schemeClr val="tx1"/>
-                </a:solidFill>
-              </a:rPr>
-              <a:t>ng-pristine, </a:t>
-            </a:r>
-            <a:r>
-              <a:rPr lang="en-US" dirty="0" smtClean="0">
-                <a:solidFill>
-                  <a:schemeClr val="tx1"/>
-                </a:solidFill>
-              </a:rPr>
-              <a:t>         .</a:t>
-            </a:r>
-            <a:r>
-              <a:rPr lang="en-US" dirty="0">
-                <a:solidFill>
-                  <a:schemeClr val="tx1"/>
-                </a:solidFill>
-              </a:rPr>
-              <a:t>ng-dirty</a:t>
-            </a:r>
-          </a:p>
-          <a:p>
-            <a:pPr lvl="1"/>
-            <a:r>
-              <a:rPr lang="en-US" dirty="0">
-                <a:solidFill>
-                  <a:schemeClr val="tx1"/>
-                </a:solidFill>
-              </a:rPr>
-              <a:t>.ng-invalid-required, </a:t>
-            </a:r>
-            <a:r>
-              <a:rPr lang="en-US" dirty="0" smtClean="0">
-                <a:solidFill>
-                  <a:schemeClr val="tx1"/>
-                </a:solidFill>
-              </a:rPr>
-              <a:t>       .</a:t>
-            </a:r>
-            <a:r>
-              <a:rPr lang="en-US" dirty="0">
-                <a:solidFill>
-                  <a:schemeClr val="tx1"/>
-                </a:solidFill>
-              </a:rPr>
-              <a:t>ng-valid-max-</a:t>
-            </a:r>
-            <a:r>
-              <a:rPr lang="en-US" dirty="0" smtClean="0">
-                <a:solidFill>
-                  <a:schemeClr val="tx1"/>
-                </a:solidFill>
-              </a:rPr>
-              <a:t>length,     etc. </a:t>
-            </a:r>
-          </a:p>
-          <a:p>
-            <a:r>
-              <a:rPr lang="en-US" dirty="0" smtClean="0">
-                <a:solidFill>
-                  <a:schemeClr val="tx1"/>
-                </a:solidFill>
-              </a:rPr>
-              <a:t>Make use of these </a:t>
-            </a:r>
-            <a:r>
-              <a:rPr lang="en-US" b="1" dirty="0" smtClean="0">
-                <a:solidFill>
-                  <a:schemeClr val="tx1"/>
-                </a:solidFill>
-              </a:rPr>
-              <a:t>validation directives </a:t>
-            </a:r>
-            <a:r>
-              <a:rPr lang="en-US" dirty="0" smtClean="0">
-                <a:solidFill>
-                  <a:schemeClr val="tx1"/>
-                </a:solidFill>
-              </a:rPr>
-              <a:t>-</a:t>
-            </a:r>
-          </a:p>
-          <a:p>
-            <a:pPr lvl="1"/>
-            <a:r>
-              <a:rPr lang="en-US" b="1" dirty="0">
-                <a:solidFill>
-                  <a:schemeClr val="tx1"/>
-                </a:solidFill>
-              </a:rPr>
-              <a:t>r</a:t>
-            </a:r>
-            <a:r>
-              <a:rPr lang="en-US" b="1" dirty="0" smtClean="0">
-                <a:solidFill>
-                  <a:schemeClr val="tx1"/>
-                </a:solidFill>
-              </a:rPr>
-              <a:t>equired</a:t>
-            </a:r>
-            <a:r>
-              <a:rPr lang="en-US" dirty="0" smtClean="0">
-                <a:solidFill>
-                  <a:schemeClr val="tx1"/>
-                </a:solidFill>
-              </a:rPr>
-              <a:t>,     </a:t>
-            </a:r>
-            <a:r>
-              <a:rPr lang="en-US" b="1" dirty="0" smtClean="0">
-                <a:solidFill>
-                  <a:schemeClr val="tx1"/>
-                </a:solidFill>
-              </a:rPr>
-              <a:t>type</a:t>
-            </a:r>
-            <a:r>
-              <a:rPr lang="en-US" dirty="0" smtClean="0">
-                <a:solidFill>
-                  <a:schemeClr val="tx1"/>
-                </a:solidFill>
-              </a:rPr>
-              <a:t>,      </a:t>
-            </a:r>
-            <a:r>
-              <a:rPr lang="en-US" b="1" dirty="0" smtClean="0">
-                <a:solidFill>
-                  <a:schemeClr val="tx1"/>
-                </a:solidFill>
-              </a:rPr>
-              <a:t>ng-</a:t>
-            </a:r>
-            <a:r>
-              <a:rPr lang="en-US" b="1" dirty="0" err="1" smtClean="0">
-                <a:solidFill>
-                  <a:schemeClr val="tx1"/>
-                </a:solidFill>
-              </a:rPr>
-              <a:t>minlength</a:t>
-            </a:r>
-            <a:r>
-              <a:rPr lang="en-US" dirty="0" smtClean="0">
-                <a:solidFill>
-                  <a:schemeClr val="tx1"/>
-                </a:solidFill>
-              </a:rPr>
-              <a:t>,       </a:t>
-            </a:r>
-            <a:r>
-              <a:rPr lang="en-US" b="1" dirty="0" smtClean="0">
-                <a:solidFill>
-                  <a:schemeClr val="tx1"/>
-                </a:solidFill>
-              </a:rPr>
-              <a:t>ng-</a:t>
-            </a:r>
-            <a:r>
-              <a:rPr lang="en-US" b="1" dirty="0" err="1" smtClean="0">
-                <a:solidFill>
-                  <a:schemeClr val="tx1"/>
-                </a:solidFill>
-              </a:rPr>
-              <a:t>maxlength</a:t>
-            </a:r>
-            <a:r>
-              <a:rPr lang="en-US" dirty="0" smtClean="0">
-                <a:solidFill>
-                  <a:schemeClr val="tx1"/>
-                </a:solidFill>
-              </a:rPr>
-              <a:t>,        </a:t>
-            </a:r>
-            <a:r>
-              <a:rPr lang="en-US" b="1" dirty="0" smtClean="0">
-                <a:solidFill>
-                  <a:schemeClr val="tx1"/>
-                </a:solidFill>
-              </a:rPr>
-              <a:t>ng-pattern</a:t>
-            </a:r>
-          </a:p>
-          <a:p>
-            <a:pPr lvl="1"/>
-            <a:r>
-              <a:rPr lang="en-US" dirty="0" smtClean="0">
-                <a:solidFill>
-                  <a:schemeClr val="tx1"/>
-                </a:solidFill>
-              </a:rPr>
-              <a:t>Your own custom directive</a:t>
-            </a:r>
-          </a:p>
-          <a:p>
-            <a:r>
-              <a:rPr lang="en-US" sz="2200" dirty="0" smtClean="0">
-                <a:solidFill>
-                  <a:schemeClr val="tx1"/>
-                </a:solidFill>
-              </a:rPr>
-              <a:t>Use ‘</a:t>
+              <a:t>‘</a:t>
             </a:r>
             <a:r>
               <a:rPr lang="en-US" sz="2200" i="1" dirty="0" err="1" smtClean="0">
@@ -17178,7 +17901,7 @@
         </p:nvSpPr>
         <p:spPr>
           <a:xfrm>
-            <a:off x="6574776" y="1952088"/>
+            <a:off x="6561683" y="3261488"/>
             <a:ext cx="1321924" cy="523220"/>
           </a:xfrm>
           <a:prstGeom prst="rect">
@@ -17265,7 +17988,7 @@
         </p:nvSpPr>
         <p:spPr>
           <a:xfrm>
-            <a:off x="4717244" y="1979967"/>
+            <a:off x="4848174" y="3289367"/>
             <a:ext cx="1380657" cy="523220"/>
           </a:xfrm>
           <a:prstGeom prst="rect">
@@ -17363,7 +18086,7 @@
         </p:nvSpPr>
         <p:spPr>
           <a:xfrm>
-            <a:off x="1120765" y="1965156"/>
+            <a:off x="1107672" y="3274556"/>
             <a:ext cx="1419079" cy="523220"/>
           </a:xfrm>
           <a:prstGeom prst="rect">
@@ -17498,7 +18221,7 @@
         </p:nvSpPr>
         <p:spPr>
           <a:xfrm>
-            <a:off x="3020381" y="1974972"/>
+            <a:off x="2863265" y="3284372"/>
             <a:ext cx="972434" cy="523220"/>
           </a:xfrm>
           <a:prstGeom prst="rect">
@@ -17713,39 +18436,25 @@
                                   </p:childTnLst>
                                 </p:cTn>
                               </p:par>
-                            </p:childTnLst>
-                          </p:cTn>
-                        </p:par>
-                      </p:childTnLst>
-                    </p:cTn>
-                  </p:par>
-                  <p:par>
-                    <p:cTn id="9" fill="hold">
-                      <p:stCondLst>
-                        <p:cond delay="indefinite"/>
-                      </p:stCondLst>
-                      <p:childTnLst>
-                        <p:par>
-                          <p:cTn id="10" fill="hold">
-                            <p:stCondLst>
-                              <p:cond delay="0"/>
-                            </p:stCondLst>
-                            <p:childTnLst>
                               <p:par>
-                                <p:cTn id="11" presetID="53" presetClass="entr" presetSubtype="16" fill="hold" grpId="0" nodeType="clickEffect">
+                                <p:cTn id="9" presetID="12" presetClass="entr" presetSubtype="4" fill="hold" grpId="0" nodeType="withEffect">
                                   <p:stCondLst>
                                     <p:cond delay="0"/>
                                   </p:stCondLst>
                                   <p:childTnLst>
                                     <p:set>
                                       <p:cBhvr>
-                                        <p:cTn id="12" dur="1" fill="hold">
+                                        <p:cTn id="10" dur="1" fill="hold">
                                           <p:stCondLst>
                                             <p:cond delay="0"/>
                                           </p:stCondLst>
                                         </p:cTn>
                                         <p:tgtEl>
-                                          <p:spTgt spid="6"/>
+                                          <p:spTgt spid="3">
+                                            <p:txEl>
+                                              <p:pRg st="1" end="1"/>
+                                            </p:txEl>
+                                          </p:spTgt>
                                         </p:tgtEl>
                                         <p:attrNameLst>
                                           <p:attrName>style.visibility</p:attrName>
@@ -17756,56 +18465,41 @@
                                       </p:to>
                                     </p:set>
                                     <p:anim calcmode="lin" valueType="num">
-                                      <p:cBhvr>
-                                        <p:cTn id="13" dur="500" fill="hold"/>
-                                        <p:tgtEl>
-                                          <p:spTgt spid="6"/>
-                                        </p:tgtEl>
-                                        <p:attrNameLst>
-                                          <p:attrName>ppt_w</p:attrName>
+                                      <p:cBhvr additive="base">
+                                        <p:cTn id="11" dur="500"/>
+                                        <p:tgtEl>
+                                          <p:spTgt spid="3">
+                                            <p:txEl>
+                                              <p:pRg st="1" end="1"/>
+                                            </p:txEl>
+                                          </p:spTgt>
+                                        </p:tgtEl>
+                                        <p:attrNameLst>
+                                          <p:attrName>ppt_y</p:attrName>
                                         </p:attrNameLst>
                                       </p:cBhvr>
                                       <p:tavLst>
                                         <p:tav tm="0">
                                           <p:val>
-                                            <p:fltVal val="0"/>
+                                            <p:strVal val="#ppt_y+#ppt_h*1.125000"/>
                                           </p:val>
                                         </p:tav>
                                         <p:tav tm="100000">
                                           <p:val>
-                                            <p:strVal val="#ppt_w"/>
+                                            <p:strVal val="#ppt_y"/>
                                           </p:val>
                                         </p:tav>
                                       </p:tavLst>
                                     </p:anim>
-                                    <p:anim calcmode="lin" valueType="num">
-                                      <p:cBhvr>
-                                        <p:cTn id="14" dur="500" fill="hold"/>
-                                        <p:tgtEl>
-                                          <p:spTgt spid="6"/>
-                                        </p:tgtEl>
-                                        <p:attrNameLst>
-                                          <p:attrName>ppt_h</p:attrName>
-                                        </p:attrNameLst>
-                                      </p:cBhvr>
-                                      <p:tavLst>
-                                        <p:tav tm="0">
-                                          <p:val>
-                                            <p:fltVal val="0"/>
-                                          </p:val>
-                                        </p:tav>
-                                        <p:tav tm="100000">
-                                          <p:val>
-                                            <p:strVal val="#ppt_h"/>
-                                          </p:val>
-                                        </p:tav>
-                                      </p:tavLst>
-                                    </p:anim>
-                                    <p:animEffect transition="in" filter="fade">
-                                      <p:cBhvr>
-                                        <p:cTn id="15" dur="500"/>
-                                        <p:tgtEl>
-                                          <p:spTgt spid="6"/>
+                                    <p:animEffect transition="in" filter="wipe(up)">
+                                      <p:cBhvr>
+                                        <p:cTn id="12" dur="500"/>
+                                        <p:tgtEl>
+                                          <p:spTgt spid="3">
+                                            <p:txEl>
+                                              <p:pRg st="1" end="1"/>
+                                            </p:txEl>
+                                          </p:spTgt>
                                         </p:tgtEl>
                                       </p:cBhvr>
                                     </p:animEffect>
@@ -17813,20 +18507,24 @@
                                 </p:cTn>
                               </p:par>
                               <p:par>
-                                <p:cTn id="16" presetID="53" presetClass="entr" presetSubtype="16" fill="hold" grpId="0" nodeType="withEffect">
+                                <p:cTn id="13" presetID="12" presetClass="entr" presetSubtype="4" fill="hold" grpId="0" nodeType="withEffect">
                                   <p:stCondLst>
                                     <p:cond delay="0"/>
                                   </p:stCondLst>
                                   <p:childTnLst>
                                     <p:set>
                                       <p:cBhvr>
-                                        <p:cTn id="17" dur="1" fill="hold">
+                                        <p:cTn id="14" dur="1" fill="hold">
                                           <p:stCondLst>
                                             <p:cond delay="0"/>
                                           </p:stCondLst>
                                         </p:cTn>
                                         <p:tgtEl>
-                                          <p:spTgt spid="9"/>
+                                          <p:spTgt spid="3">
+                                            <p:txEl>
+                                              <p:pRg st="2" end="2"/>
+                                            </p:txEl>
+                                          </p:spTgt>
                                         </p:tgtEl>
                                         <p:attrNameLst>
                                           <p:attrName>style.visibility</p:attrName>
@@ -17837,218 +18535,41 @@
                                       </p:to>
                                     </p:set>
                                     <p:anim calcmode="lin" valueType="num">
-                                      <p:cBhvr>
-                                        <p:cTn id="18" dur="500" fill="hold"/>
-                                        <p:tgtEl>
-                                          <p:spTgt spid="9"/>
-                                        </p:tgtEl>
-                                        <p:attrNameLst>
-                                          <p:attrName>ppt_w</p:attrName>
+                                      <p:cBhvr additive="base">
+                                        <p:cTn id="15" dur="500"/>
+                                        <p:tgtEl>
+                                          <p:spTgt spid="3">
+                                            <p:txEl>
+                                              <p:pRg st="2" end="2"/>
+                                            </p:txEl>
+                                          </p:spTgt>
+                                        </p:tgtEl>
+                                        <p:attrNameLst>
+                                          <p:attrName>ppt_y</p:attrName>
                                         </p:attrNameLst>
                                       </p:cBhvr>
                                       <p:tavLst>
                                         <p:tav tm="0">
                                           <p:val>
-                                            <p:fltVal val="0"/>
+                                            <p:strVal val="#ppt_y+#ppt_h*1.125000"/>
                                           </p:val>
                                         </p:tav>
                                         <p:tav tm="100000">
                                           <p:val>
-                                            <p:strVal val="#ppt_w"/>
+                                            <p:strVal val="#ppt_y"/>
                                           </p:val>
                                         </p:tav>
                                       </p:tavLst>
                                     </p:anim>
-                                    <p:anim calcmode="lin" valueType="num">
-                                      <p:cBhvr>
-                                        <p:cTn id="19" dur="500" fill="hold"/>
-                                        <p:tgtEl>
-                                          <p:spTgt spid="9"/>
-                                        </p:tgtEl>
-                                        <p:attrNameLst>
-                                          <p:attrName>ppt_h</p:attrName>
-                                        </p:attrNameLst>
-                                      </p:cBhvr>
-                                      <p:tavLst>
-                                        <p:tav tm="0">
-                                          <p:val>
-                                            <p:fltVal val="0"/>
-                                          </p:val>
-                                        </p:tav>
-                                        <p:tav tm="100000">
-                                          <p:val>
-                                            <p:strVal val="#ppt_h"/>
-                                          </p:val>
-                                        </p:tav>
-                                      </p:tavLst>
-                                    </p:anim>
-                                    <p:animEffect transition="in" filter="fade">
-                                      <p:cBhvr>
-                                        <p:cTn id="20" dur="500"/>
-                                        <p:tgtEl>
-                                          <p:spTgt spid="9"/>
-                                        </p:tgtEl>
-                                      </p:cBhvr>
-                                    </p:animEffect>
-                                  </p:childTnLst>
-                                </p:cTn>
-                              </p:par>
-                              <p:par>
-                                <p:cTn id="21" presetID="53" presetClass="entr" presetSubtype="16" fill="hold" grpId="0" nodeType="withEffect">
-                                  <p:stCondLst>
-                                    <p:cond delay="0"/>
-                                  </p:stCondLst>
-                                  <p:childTnLst>
-                                    <p:set>
-                                      <p:cBhvr>
-                                        <p:cTn id="22" dur="1" fill="hold">
-                                          <p:stCondLst>
-                                            <p:cond delay="0"/>
-                                          </p:stCondLst>
-                                        </p:cTn>
-                                        <p:tgtEl>
-                                          <p:spTgt spid="5"/>
-                                        </p:tgtEl>
-                                        <p:attrNameLst>
-                                          <p:attrName>style.visibility</p:attrName>
-                                        </p:attrNameLst>
-                                      </p:cBhvr>
-                                      <p:to>
-                                        <p:strVal val="visible"/>
-                                      </p:to>
-                                    </p:set>
-                                    <p:anim calcmode="lin" valueType="num">
-                                      <p:cBhvr>
-                                        <p:cTn id="23" dur="500" fill="hold"/>
-                                        <p:tgtEl>
-                                          <p:spTgt spid="5"/>
-                                        </p:tgtEl>
-                                        <p:attrNameLst>
-                                          <p:attrName>ppt_w</p:attrName>
-                                        </p:attrNameLst>
-                                      </p:cBhvr>
-                                      <p:tavLst>
-                                        <p:tav tm="0">
-                                          <p:val>
-                                            <p:fltVal val="0"/>
-                                          </p:val>
-                                        </p:tav>
-                                        <p:tav tm="100000">
-                                          <p:val>
-                                            <p:strVal val="#ppt_w"/>
-                                          </p:val>
-                                        </p:tav>
-                                      </p:tavLst>
-                                    </p:anim>
-                                    <p:anim calcmode="lin" valueType="num">
-                                      <p:cBhvr>
-                                        <p:cTn id="24" dur="500" fill="hold"/>
-                                        <p:tgtEl>
-                                          <p:spTgt spid="5"/>
-                                        </p:tgtEl>
-                                        <p:attrNameLst>
-                                          <p:attrName>ppt_h</p:attrName>
-                                        </p:attrNameLst>
-                                      </p:cBhvr>
-                                      <p:tavLst>
-                                        <p:tav tm="0">
-                                          <p:val>
-                                            <p:fltVal val="0"/>
-                                          </p:val>
-                                        </p:tav>
-                                        <p:tav tm="100000">
-                                          <p:val>
-                                            <p:strVal val="#ppt_h"/>
-                                          </p:val>
-                                        </p:tav>
-                                      </p:tavLst>
-                                    </p:anim>
-                                    <p:animEffect transition="in" filter="fade">
-                                      <p:cBhvr>
-                                        <p:cTn id="25" dur="500"/>
-                                        <p:tgtEl>
-                                          <p:spTgt spid="5"/>
-                                        </p:tgtEl>
-                                      </p:cBhvr>
-                                    </p:animEffect>
-                                  </p:childTnLst>
-                                </p:cTn>
-                              </p:par>
-                              <p:par>
-                                <p:cTn id="26" presetID="53" presetClass="entr" presetSubtype="16" fill="hold" grpId="0" nodeType="withEffect">
-                                  <p:stCondLst>
-                                    <p:cond delay="0"/>
-                                  </p:stCondLst>
-                                  <p:childTnLst>
-                                    <p:set>
-                                      <p:cBhvr>
-                                        <p:cTn id="27" dur="1" fill="hold">
-                                          <p:stCondLst>
-                                            <p:cond delay="0"/>
-                                          </p:stCondLst>
-                                        </p:cTn>
-                                        <p:tgtEl>
-                                          <p:spTgt spid="4"/>
-                                        </p:tgtEl>
-                                        <p:attrNameLst>
-                                          <p:attrName>style.visibility</p:attrName>
-                                        </p:attrNameLst>
-                                      </p:cBhvr>
-                                      <p:to>
-                                        <p:strVal val="visible"/>
-                                      </p:to>
-                                    </p:set>
-                                    <p:anim calcmode="lin" valueType="num">
-                                      <p:cBhvr>
-                                        <p:cTn id="28" dur="500" fill="hold"/>
-                                        <p:tgtEl>
-                                          <p:spTgt spid="4"/>
-                                        </p:tgtEl>
-                                        <p:attrNameLst>
-                                          <p:attrName>ppt_w</p:attrName>
-                                        </p:attrNameLst>
-                                      </p:cBhvr>
-                                      <p:tavLst>
-                                        <p:tav tm="0">
-                                          <p:val>
-                                            <p:fltVal val="0"/>
-                                          </p:val>
-                                        </p:tav>
-                                        <p:tav tm="100000">
-                                          <p:val>
-                                            <p:strVal val="#ppt_w"/>
-                                          </p:val>
-                                        </p:tav>
-                                      </p:tavLst>
-                                    </p:anim>
-                                    <p:anim calcmode="lin" valueType="num">
-                                      <p:cBhvr>
-                                        <p:cTn id="29" dur="500" fill="hold"/>
-                                        <p:tgtEl>
-                                          <p:spTgt spid="4"/>
-                                        </p:tgtEl>
-                                        <p:attrNameLst>
-                                          <p:attrName>ppt_h</p:attrName>
-                                        </p:attrNameLst>
-                                      </p:cBhvr>
-                                      <p:tavLst>
-                                        <p:tav tm="0">
-                                          <p:val>
-                                            <p:fltVal val="0"/>
-                                          </p:val>
-                                        </p:tav>
-                                        <p:tav tm="100000">
-                                          <p:val>
-                                            <p:strVal val="#ppt_h"/>
-                                          </p:val>
-                                        </p:tav>
-                                      </p:tavLst>
-                                    </p:anim>
-                                    <p:animEffect transition="in" filter="fade">
-                                      <p:cBhvr>
-                                        <p:cTn id="30" dur="500"/>
-                                        <p:tgtEl>
-                                          <p:spTgt spid="4"/>
+                                    <p:animEffect transition="in" filter="wipe(up)">
+                                      <p:cBhvr>
+                                        <p:cTn id="16" dur="500"/>
+                                        <p:tgtEl>
+                                          <p:spTgt spid="3">
+                                            <p:txEl>
+                                              <p:pRg st="2" end="2"/>
+                                            </p:txEl>
+                                          </p:spTgt>
                                         </p:tgtEl>
                                       </p:cBhvr>
                                     </p:animEffect>
@@ -18062,26 +18583,26 @@
                     </p:cTn>
                   </p:par>
                   <p:par>
-                    <p:cTn id="31" fill="hold">
+                    <p:cTn id="17" fill="hold">
                       <p:stCondLst>
                         <p:cond delay="indefinite"/>
                       </p:stCondLst>
                       <p:childTnLst>
                         <p:par>
-                          <p:cTn id="32" fill="hold">
+                          <p:cTn id="18" fill="hold">
                             <p:stCondLst>
                               <p:cond delay="0"/>
                             </p:stCondLst>
                             <p:childTnLst>
                               <p:par>
-                                <p:cTn id="33" presetID="12" presetClass="entr" presetSubtype="4" fill="hold" grpId="0" nodeType="clickEffect">
+                                <p:cTn id="19" presetID="12" presetClass="entr" presetSubtype="4" fill="hold" grpId="0" nodeType="clickEffect">
                                   <p:stCondLst>
                                     <p:cond delay="0"/>
                                   </p:stCondLst>
                                   <p:childTnLst>
                                     <p:set>
                                       <p:cBhvr>
-                                        <p:cTn id="34" dur="1" fill="hold">
+                                        <p:cTn id="20" dur="1" fill="hold">
                                           <p:stCondLst>
                                             <p:cond delay="0"/>
                                           </p:stCondLst>
@@ -18103,7 +18624,7 @@
                                     </p:set>
                                     <p:anim calcmode="lin" valueType="num">
                                       <p:cBhvr additive="base">
-                                        <p:cTn id="35" dur="500"/>
+                                        <p:cTn id="21" dur="500"/>
                                         <p:tgtEl>
                                           <p:spTgt spid="3">
                                             <p:txEl>
@@ -18130,7 +18651,7 @@
                                     </p:anim>
                                     <p:animEffect transition="in" filter="wipe(up)">
                                       <p:cBhvr>
-                                        <p:cTn id="36" dur="500"/>
+                                        <p:cTn id="22" dur="500"/>
                                         <p:tgtEl>
                                           <p:spTgt spid="3">
                                             <p:txEl>
@@ -18150,26 +18671,26 @@
                     </p:cTn>
                   </p:par>
                   <p:par>
-                    <p:cTn id="37" fill="hold">
+                    <p:cTn id="23" fill="hold">
                       <p:stCondLst>
                         <p:cond delay="indefinite"/>
                       </p:stCondLst>
                       <p:childTnLst>
                         <p:par>
-                          <p:cTn id="38" fill="hold">
+                          <p:cTn id="24" fill="hold">
                             <p:stCondLst>
                               <p:cond delay="0"/>
                             </p:stCondLst>
                             <p:childTnLst>
                               <p:par>
-                                <p:cTn id="39" presetID="12" presetClass="entr" presetSubtype="4" fill="hold" grpId="0" nodeType="clickEffect">
+                                <p:cTn id="25" presetID="12" presetClass="entr" presetSubtype="4" fill="hold" grpId="0" nodeType="clickEffect">
                                   <p:stCondLst>
                                     <p:cond delay="0"/>
                                   </p:stCondLst>
                                   <p:childTnLst>
                                     <p:set>
                                       <p:cBhvr>
-                                        <p:cTn id="40" dur="1" fill="hold">
+                                        <p:cTn id="26" dur="1" fill="hold">
                                           <p:stCondLst>
                                             <p:cond delay="0"/>
                                           </p:stCondLst>
@@ -18191,7 +18712,7 @@
                                     </p:set>
                                     <p:anim calcmode="lin" valueType="num">
                                       <p:cBhvr additive="base">
-                                        <p:cTn id="41" dur="500"/>
+                                        <p:cTn id="27" dur="500"/>
                                         <p:tgtEl>
                                           <p:spTgt spid="3">
                                             <p:txEl>
@@ -18218,7 +18739,7 @@
                                     </p:anim>
                                     <p:animEffect transition="in" filter="wipe(up)">
                                       <p:cBhvr>
-                                        <p:cTn id="42" dur="500"/>
+                                        <p:cTn id="28" dur="500"/>
                                         <p:tgtEl>
                                           <p:spTgt spid="3">
                                             <p:txEl>
@@ -18232,24 +18753,20 @@
                                 </p:cTn>
                               </p:par>
                               <p:par>
-                                <p:cTn id="43" presetID="12" presetClass="entr" presetSubtype="4" fill="hold" grpId="0" nodeType="withEffect">
+                                <p:cTn id="29" presetID="53" presetClass="entr" presetSubtype="16" fill="hold" grpId="0" nodeType="withEffect">
                                   <p:stCondLst>
                                     <p:cond delay="0"/>
                                   </p:stCondLst>
                                   <p:childTnLst>
                                     <p:set>
                                       <p:cBhvr>
-                                        <p:cTn id="44" dur="1" fill="hold">
+                                        <p:cTn id="30" dur="1" fill="hold">
                                           <p:stCondLst>
                                             <p:cond delay="0"/>
                                           </p:stCondLst>
                                         </p:cTn>
                                         <p:tgtEl>
-                                          <p:spTgt spid="3">
-                                            <p:txEl>
-                                              <p:pRg st="5" end="5"/>
-                                            </p:txEl>
-                                          </p:spTgt>
+                                          <p:spTgt spid="6"/>
                                         </p:tgtEl>
                                         <p:attrNameLst>
                                           <p:attrName>style.visibility</p:attrName>
@@ -18260,41 +18777,56 @@
                                       </p:to>
                                     </p:set>
                                     <p:anim calcmode="lin" valueType="num">
-                                      <p:cBhvr additive="base">
-                                        <p:cTn id="45" dur="500"/>
-                                        <p:tgtEl>
-                                          <p:spTgt spid="3">
-                                            <p:txEl>
-                                              <p:pRg st="5" end="5"/>
-                                            </p:txEl>
-                                          </p:spTgt>
-                                        </p:tgtEl>
-                                        <p:attrNameLst>
-                                          <p:attrName>ppt_y</p:attrName>
+                                      <p:cBhvr>
+                                        <p:cTn id="31" dur="500" fill="hold"/>
+                                        <p:tgtEl>
+                                          <p:spTgt spid="6"/>
+                                        </p:tgtEl>
+                                        <p:attrNameLst>
+                                          <p:attrName>ppt_w</p:attrName>
                                         </p:attrNameLst>
                                       </p:cBhvr>
                                       <p:tavLst>
                                         <p:tav tm="0">
                                           <p:val>
-                                            <p:strVal val="#ppt_y+#ppt_h*1.125000"/>
+                                            <p:fltVal val="0"/>
                                           </p:val>
                                         </p:tav>
                                         <p:tav tm="100000">
                                           <p:val>
-                                            <p:strVal val="#ppt_y"/>
+                                            <p:strVal val="#ppt_w"/>
                                           </p:val>
                                         </p:tav>
                                       </p:tavLst>
                                     </p:anim>
-                                    <p:animEffect transition="in" filter="wipe(up)">
-                                      <p:cBhvr>
-                                        <p:cTn id="46" dur="500"/>
-                                        <p:tgtEl>
-                                          <p:spTgt spid="3">
-                                            <p:txEl>
-                                              <p:pRg st="5" end="5"/>
-                                            </p:txEl>
-                                          </p:spTgt>
+                                    <p:anim calcmode="lin" valueType="num">
+                                      <p:cBhvr>
+                                        <p:cTn id="32" dur="500" fill="hold"/>
+                                        <p:tgtEl>
+                                          <p:spTgt spid="6"/>
+                                        </p:tgtEl>
+                                        <p:attrNameLst>
+                                          <p:attrName>ppt_h</p:attrName>
+                                        </p:attrNameLst>
+                                      </p:cBhvr>
+                                      <p:tavLst>
+                                        <p:tav tm="0">
+                                          <p:val>
+                                            <p:fltVal val="0"/>
+                                          </p:val>
+                                        </p:tav>
+                                        <p:tav tm="100000">
+                                          <p:val>
+                                            <p:strVal val="#ppt_h"/>
+                                          </p:val>
+                                        </p:tav>
+                                      </p:tavLst>
+                                    </p:anim>
+                                    <p:animEffect transition="in" filter="fade">
+                                      <p:cBhvr>
+                                        <p:cTn id="33" dur="500"/>
+                                        <p:tgtEl>
+                                          <p:spTgt spid="6"/>
                                         </p:tgtEl>
                                       </p:cBhvr>
                                     </p:animEffect>
@@ -18302,24 +18834,20 @@
                                 </p:cTn>
                               </p:par>
                               <p:par>
-                                <p:cTn id="47" presetID="12" presetClass="entr" presetSubtype="4" fill="hold" grpId="0" nodeType="withEffect">
+                                <p:cTn id="34" presetID="53" presetClass="entr" presetSubtype="16" fill="hold" grpId="0" nodeType="withEffect">
                                   <p:stCondLst>
                                     <p:cond delay="0"/>
                                   </p:stCondLst>
                                   <p:childTnLst>
                                     <p:set>
                                       <p:cBhvr>
-                                        <p:cTn id="48" dur="1" fill="hold">
+                                        <p:cTn id="35" dur="1" fill="hold">
                                           <p:stCondLst>
                                             <p:cond delay="0"/>
                                           </p:stCondLst>
                                         </p:cTn>
                                         <p:tgtEl>
-                                          <p:spTgt spid="3">
-                                            <p:txEl>
-                                              <p:pRg st="6" end="6"/>
-                                            </p:txEl>
-                                          </p:spTgt>
+                                          <p:spTgt spid="9"/>
                                         </p:tgtEl>
                                         <p:attrNameLst>
                                           <p:attrName>style.visibility</p:attrName>
@@ -18330,41 +18858,218 @@
                                       </p:to>
                                     </p:set>
                                     <p:anim calcmode="lin" valueType="num">
-                                      <p:cBhvr additive="base">
-                                        <p:cTn id="49" dur="500"/>
-                                        <p:tgtEl>
-                                          <p:spTgt spid="3">
-                                            <p:txEl>
-                                              <p:pRg st="6" end="6"/>
-                                            </p:txEl>
-                                          </p:spTgt>
-                                        </p:tgtEl>
-                                        <p:attrNameLst>
-                                          <p:attrName>ppt_y</p:attrName>
+                                      <p:cBhvr>
+                                        <p:cTn id="36" dur="500" fill="hold"/>
+                                        <p:tgtEl>
+                                          <p:spTgt spid="9"/>
+                                        </p:tgtEl>
+                                        <p:attrNameLst>
+                                          <p:attrName>ppt_w</p:attrName>
                                         </p:attrNameLst>
                                       </p:cBhvr>
                                       <p:tavLst>
                                         <p:tav tm="0">
                                           <p:val>
-                                            <p:strVal val="#ppt_y+#ppt_h*1.125000"/>
+                                            <p:fltVal val="0"/>
                                           </p:val>
                                         </p:tav>
                                         <p:tav tm="100000">
                                           <p:val>
-                                            <p:strVal val="#ppt_y"/>
+                                            <p:strVal val="#ppt_w"/>
                                           </p:val>
                                         </p:tav>
                                       </p:tavLst>
                                     </p:anim>
-                                    <p:animEffect transition="in" filter="wipe(up)">
-                                      <p:cBhvr>
-                                        <p:cTn id="50" dur="500"/>
-                                        <p:tgtEl>
-                                          <p:spTgt spid="3">
-                                            <p:txEl>
-                                              <p:pRg st="6" end="6"/>
-                                            </p:txEl>
-                                          </p:spTgt>
+                                    <p:anim calcmode="lin" valueType="num">
+                                      <p:cBhvr>
+                                        <p:cTn id="37" dur="500" fill="hold"/>
+                                        <p:tgtEl>
+                                          <p:spTgt spid="9"/>
+                                        </p:tgtEl>
+                                        <p:attrNameLst>
+                                          <p:attrName>ppt_h</p:attrName>
+                                        </p:attrNameLst>
+                                      </p:cBhvr>
+                                      <p:tavLst>
+                                        <p:tav tm="0">
+                                          <p:val>
+                                            <p:fltVal val="0"/>
+                                          </p:val>
+                                        </p:tav>
+                                        <p:tav tm="100000">
+                                          <p:val>
+                                            <p:strVal val="#ppt_h"/>
+                                          </p:val>
+                                        </p:tav>
+                                      </p:tavLst>
+                                    </p:anim>
+                                    <p:animEffect transition="in" filter="fade">
+                                      <p:cBhvr>
+                                        <p:cTn id="38" dur="500"/>
+                                        <p:tgtEl>
+                                          <p:spTgt spid="9"/>
+                                        </p:tgtEl>
+                                      </p:cBhvr>
+                                    </p:animEffect>
+                                  </p:childTnLst>
+                                </p:cTn>
+                              </p:par>
+                              <p:par>
+                                <p:cTn id="39" presetID="53" presetClass="entr" presetSubtype="16" fill="hold" grpId="0" nodeType="withEffect">
+                                  <p:stCondLst>
+                                    <p:cond delay="0"/>
+                                  </p:stCondLst>
+                                  <p:childTnLst>
+                                    <p:set>
+                                      <p:cBhvr>
+                                        <p:cTn id="40" dur="1" fill="hold">
+                                          <p:stCondLst>
+                                            <p:cond delay="0"/>
+                                          </p:stCondLst>
+                                        </p:cTn>
+                                        <p:tgtEl>
+                                          <p:spTgt spid="5"/>
+                                        </p:tgtEl>
+                                        <p:attrNameLst>
+                                          <p:attrName>style.visibility</p:attrName>
+                                        </p:attrNameLst>
+                                      </p:cBhvr>
+                                      <p:to>
+                                        <p:strVal val="visible"/>
+                                      </p:to>
+                                    </p:set>
+                                    <p:anim calcmode="lin" valueType="num">
+                                      <p:cBhvr>
+                                        <p:cTn id="41" dur="500" fill="hold"/>
+                                        <p:tgtEl>
+                                          <p:spTgt spid="5"/>
+                                        </p:tgtEl>
+                                        <p:attrNameLst>
+                                          <p:attrName>ppt_w</p:attrName>
+                                        </p:attrNameLst>
+                                      </p:cBhvr>
+                                      <p:tavLst>
+                                        <p:tav tm="0">
+                                          <p:val>
+                                            <p:fltVal val="0"/>
+                                          </p:val>
+                                        </p:tav>
+                                        <p:tav tm="100000">
+                                          <p:val>
+                                            <p:strVal val="#ppt_w"/>
+                                          </p:val>
+                                        </p:tav>
+                                      </p:tavLst>
+                                    </p:anim>
+                                    <p:anim calcmode="lin" valueType="num">
+                                      <p:cBhvr>
+                                        <p:cTn id="42" dur="500" fill="hold"/>
+                                        <p:tgtEl>
+                                          <p:spTgt spid="5"/>
+                                        </p:tgtEl>
+                                        <p:attrNameLst>
+                                          <p:attrName>ppt_h</p:attrName>
+                                        </p:attrNameLst>
+                                      </p:cBhvr>
+                                      <p:tavLst>
+                                        <p:tav tm="0">
+                                          <p:val>
+                                            <p:fltVal val="0"/>
+                                          </p:val>
+                                        </p:tav>
+                                        <p:tav tm="100000">
+                                          <p:val>
+                                            <p:strVal val="#ppt_h"/>
+                                          </p:val>
+                                        </p:tav>
+                                      </p:tavLst>
+                                    </p:anim>
+                                    <p:animEffect transition="in" filter="fade">
+                                      <p:cBhvr>
+                                        <p:cTn id="43" dur="500"/>
+                                        <p:tgtEl>
+                                          <p:spTgt spid="5"/>
+                                        </p:tgtEl>
+                                      </p:cBhvr>
+                                    </p:animEffect>
+                                  </p:childTnLst>
+                                </p:cTn>
+                              </p:par>
+                              <p:par>
+                                <p:cTn id="44" presetID="53" presetClass="entr" presetSubtype="16" fill="hold" grpId="0" nodeType="withEffect">
+                                  <p:stCondLst>
+                                    <p:cond delay="0"/>
+                                  </p:stCondLst>
+                                  <p:childTnLst>
+                                    <p:set>
+                                      <p:cBhvr>
+                                        <p:cTn id="45" dur="1" fill="hold">
+                                          <p:stCondLst>
+                                            <p:cond delay="0"/>
+                                          </p:stCondLst>
+                                        </p:cTn>
+                                        <p:tgtEl>
+                                          <p:spTgt spid="4"/>
+                                        </p:tgtEl>
+                                        <p:attrNameLst>
+                                          <p:attrName>style.visibility</p:attrName>
+                                        </p:attrNameLst>
+                                      </p:cBhvr>
+                                      <p:to>
+                                        <p:strVal val="visible"/>
+                                      </p:to>
+                                    </p:set>
+                                    <p:anim calcmode="lin" valueType="num">
+                                      <p:cBhvr>
+                                        <p:cTn id="46" dur="500" fill="hold"/>
+                                        <p:tgtEl>
+                                          <p:spTgt spid="4"/>
+                                        </p:tgtEl>
+                                        <p:attrNameLst>
+                                          <p:attrName>ppt_w</p:attrName>
+                                        </p:attrNameLst>
+                                      </p:cBhvr>
+                                      <p:tavLst>
+                                        <p:tav tm="0">
+                                          <p:val>
+                                            <p:fltVal val="0"/>
+                                          </p:val>
+                                        </p:tav>
+                                        <p:tav tm="100000">
+                                          <p:val>
+                                            <p:strVal val="#ppt_w"/>
+                                          </p:val>
+                                        </p:tav>
+                                      </p:tavLst>
+                                    </p:anim>
+                                    <p:anim calcmode="lin" valueType="num">
+                                      <p:cBhvr>
+                                        <p:cTn id="47" dur="500" fill="hold"/>
+                                        <p:tgtEl>
+                                          <p:spTgt spid="4"/>
+                                        </p:tgtEl>
+                                        <p:attrNameLst>
+                                          <p:attrName>ppt_h</p:attrName>
+                                        </p:attrNameLst>
+                                      </p:cBhvr>
+                                      <p:tavLst>
+                                        <p:tav tm="0">
+                                          <p:val>
+                                            <p:fltVal val="0"/>
+                                          </p:val>
+                                        </p:tav>
+                                        <p:tav tm="100000">
+                                          <p:val>
+                                            <p:strVal val="#ppt_h"/>
+                                          </p:val>
+                                        </p:tav>
+                                      </p:tavLst>
+                                    </p:anim>
+                                    <p:animEffect transition="in" filter="fade">
+                                      <p:cBhvr>
+                                        <p:cTn id="48" dur="500"/>
+                                        <p:tgtEl>
+                                          <p:spTgt spid="4"/>
                                         </p:tgtEl>
                                       </p:cBhvr>
                                     </p:animEffect>
@@ -18378,26 +19083,26 @@
                     </p:cTn>
                   </p:par>
                   <p:par>
-                    <p:cTn id="51" fill="hold">
+                    <p:cTn id="49" fill="hold">
                       <p:stCondLst>
                         <p:cond delay="indefinite"/>
                       </p:stCondLst>
                       <p:childTnLst>
                         <p:par>
-                          <p:cTn id="52" fill="hold">
+                          <p:cTn id="50" fill="hold">
                             <p:stCondLst>
                               <p:cond delay="0"/>
                             </p:stCondLst>
                             <p:childTnLst>
                               <p:par>
-                                <p:cTn id="53" presetID="12" presetClass="entr" presetSubtype="4" fill="hold" grpId="0" nodeType="clickEffect">
+                                <p:cTn id="51" presetID="12" presetClass="entr" presetSubtype="4" fill="hold" grpId="0" nodeType="clickEffect">
                                   <p:stCondLst>
                                     <p:cond delay="0"/>
                                   </p:stCondLst>
                                   <p:childTnLst>
                                     <p:set>
                                       <p:cBhvr>
-                                        <p:cTn id="54" dur="1" fill="hold">
+                                        <p:cTn id="52" dur="1" fill="hold">
                                           <p:stCondLst>
                                             <p:cond delay="0"/>
                                           </p:stCondLst>
@@ -18419,7 +19124,7 @@
                                     </p:set>
                                     <p:anim calcmode="lin" valueType="num">
                                       <p:cBhvr additive="base">
-                                        <p:cTn id="55" dur="500"/>
+                                        <p:cTn id="53" dur="500"/>
                                         <p:tgtEl>
                                           <p:spTgt spid="3">
                                             <p:txEl>
@@ -18446,7 +19151,7 @@
                                     </p:anim>
                                     <p:animEffect transition="in" filter="wipe(up)">
                                       <p:cBhvr>
-                                        <p:cTn id="56" dur="500"/>
+                                        <p:cTn id="54" dur="500"/>
                                         <p:tgtEl>
                                           <p:spTgt spid="3">
                                             <p:txEl>
@@ -18460,14 +19165,14 @@
                                 </p:cTn>
                               </p:par>
                               <p:par>
-                                <p:cTn id="57" presetID="12" presetClass="entr" presetSubtype="4" fill="hold" grpId="0" nodeType="withEffect">
+                                <p:cTn id="55" presetID="12" presetClass="entr" presetSubtype="4" fill="hold" grpId="0" nodeType="withEffect">
                                   <p:stCondLst>
                                     <p:cond delay="0"/>
                                   </p:stCondLst>
                                   <p:childTnLst>
                                     <p:set>
                                       <p:cBhvr>
-                                        <p:cTn id="58" dur="1" fill="hold">
+                                        <p:cTn id="56" dur="1" fill="hold">
                                           <p:stCondLst>
                                             <p:cond delay="0"/>
                                           </p:stCondLst>
@@ -18489,7 +19194,7 @@
                                     </p:set>
                                     <p:anim calcmode="lin" valueType="num">
                                       <p:cBhvr additive="base">
-                                        <p:cTn id="59" dur="500"/>
+                                        <p:cTn id="57" dur="500"/>
                                         <p:tgtEl>
                                           <p:spTgt spid="3">
                                             <p:txEl>
@@ -18516,7 +19221,7 @@
                                     </p:anim>
                                     <p:animEffect transition="in" filter="wipe(up)">
                                       <p:cBhvr>
-                                        <p:cTn id="60" dur="500"/>
+                                        <p:cTn id="58" dur="500"/>
                                         <p:tgtEl>
                                           <p:spTgt spid="3">
                                             <p:txEl>
@@ -18530,14 +19235,14 @@
                                 </p:cTn>
                               </p:par>
                               <p:par>
-                                <p:cTn id="61" presetID="12" presetClass="entr" presetSubtype="4" fill="hold" grpId="0" nodeType="withEffect">
+                                <p:cTn id="59" presetID="12" presetClass="entr" presetSubtype="4" fill="hold" grpId="0" nodeType="withEffect">
                                   <p:stCondLst>
                                     <p:cond delay="0"/>
                                   </p:stCondLst>
                                   <p:childTnLst>
                                     <p:set>
                                       <p:cBhvr>
-                                        <p:cTn id="62" dur="1" fill="hold">
+                                        <p:cTn id="60" dur="1" fill="hold">
                                           <p:stCondLst>
                                             <p:cond delay="0"/>
                                           </p:stCondLst>
@@ -18559,7 +19264,7 @@
                                     </p:set>
                                     <p:anim calcmode="lin" valueType="num">
                                       <p:cBhvr additive="base">
-                                        <p:cTn id="63" dur="500"/>
+                                        <p:cTn id="61" dur="500"/>
                                         <p:tgtEl>
                                           <p:spTgt spid="3">
                                             <p:txEl>
@@ -18586,7 +19291,7 @@
                                     </p:anim>
                                     <p:animEffect transition="in" filter="wipe(up)">
                                       <p:cBhvr>
-                                        <p:cTn id="64" dur="500"/>
+                                        <p:cTn id="62" dur="500"/>
                                         <p:tgtEl>
                                           <p:spTgt spid="3">
                                             <p:txEl>
@@ -18606,26 +19311,26 @@
                     </p:cTn>
                   </p:par>
                   <p:par>
-                    <p:cTn id="65" fill="hold">
+                    <p:cTn id="63" fill="hold">
                       <p:stCondLst>
                         <p:cond delay="indefinite"/>
                       </p:stCondLst>
                       <p:childTnLst>
                         <p:par>
-                          <p:cTn id="66" fill="hold">
+                          <p:cTn id="64" fill="hold">
                             <p:stCondLst>
                               <p:cond delay="0"/>
                             </p:stCondLst>
                             <p:childTnLst>
                               <p:par>
-                                <p:cTn id="67" presetID="12" presetClass="entr" presetSubtype="4" fill="hold" grpId="0" nodeType="clickEffect">
+                                <p:cTn id="65" presetID="12" presetClass="entr" presetSubtype="4" fill="hold" grpId="0" nodeType="clickEffect">
                                   <p:stCondLst>
                                     <p:cond delay="0"/>
                                   </p:stCondLst>
                                   <p:childTnLst>
                                     <p:set>
                                       <p:cBhvr>
-                                        <p:cTn id="68" dur="1" fill="hold">
+                                        <p:cTn id="66" dur="1" fill="hold">
                                           <p:stCondLst>
                                             <p:cond delay="0"/>
                                           </p:stCondLst>
@@ -18647,7 +19352,7 @@
                                     </p:set>
                                     <p:anim calcmode="lin" valueType="num">
                                       <p:cBhvr additive="base">
-                                        <p:cTn id="69" dur="500"/>
+                                        <p:cTn id="67" dur="500"/>
                                         <p:tgtEl>
                                           <p:spTgt spid="3">
                                             <p:txEl>
@@ -18674,7 +19379,7 @@
                                     </p:anim>
                                     <p:animEffect transition="in" filter="wipe(up)">
                                       <p:cBhvr>
-                                        <p:cTn id="70" dur="500"/>
+                                        <p:cTn id="68" dur="500"/>
                                         <p:tgtEl>
                                           <p:spTgt spid="3">
                                             <p:txEl>
@@ -18688,14 +19393,14 @@
                                 </p:cTn>
                               </p:par>
                               <p:par>
-                                <p:cTn id="71" presetID="12" presetClass="entr" presetSubtype="4" fill="hold" grpId="0" nodeType="withEffect">
+                                <p:cTn id="69" presetID="12" presetClass="entr" presetSubtype="4" fill="hold" grpId="0" nodeType="withEffect">
                                   <p:stCondLst>
                                     <p:cond delay="0"/>
                                   </p:stCondLst>
                                   <p:childTnLst>
                                     <p:set>
                                       <p:cBhvr>
-                                        <p:cTn id="72" dur="1" fill="hold">
+                                        <p:cTn id="70" dur="1" fill="hold">
                                           <p:stCondLst>
                                             <p:cond delay="0"/>
                                           </p:stCondLst>
@@ -18717,7 +19422,7 @@
                                     </p:set>
                                     <p:anim calcmode="lin" valueType="num">
                                       <p:cBhvr additive="base">
-                                        <p:cTn id="73" dur="500"/>
+                                        <p:cTn id="71" dur="500"/>
                                         <p:tgtEl>
                                           <p:spTgt spid="3">
                                             <p:txEl>
@@ -18744,7 +19449,7 @@
                                     </p:anim>
                                     <p:animEffect transition="in" filter="wipe(up)">
                                       <p:cBhvr>
-                                        <p:cTn id="74" dur="500"/>
+                                        <p:cTn id="72" dur="500"/>
                                         <p:tgtEl>
                                           <p:spTgt spid="3">
                                             <p:txEl>
@@ -18758,14 +19463,14 @@
                                 </p:cTn>
                               </p:par>
                               <p:par>
-                                <p:cTn id="75" presetID="12" presetClass="entr" presetSubtype="4" fill="hold" grpId="0" nodeType="withEffect">
+                                <p:cTn id="73" presetID="12" presetClass="entr" presetSubtype="4" fill="hold" grpId="0" nodeType="withEffect">
                                   <p:stCondLst>
                                     <p:cond delay="0"/>
                                   </p:stCondLst>
                                   <p:childTnLst>
                                     <p:set>
                                       <p:cBhvr>
-                                        <p:cTn id="76" dur="1" fill="hold">
+                                        <p:cTn id="74" dur="1" fill="hold">
                                           <p:stCondLst>
                                             <p:cond delay="0"/>
                                           </p:stCondLst>
@@ -18787,7 +19492,7 @@
                                     </p:set>
                                     <p:anim calcmode="lin" valueType="num">
                                       <p:cBhvr additive="base">
-                                        <p:cTn id="77" dur="500"/>
+                                        <p:cTn id="75" dur="500"/>
                                         <p:tgtEl>
                                           <p:spTgt spid="3">
                                             <p:txEl>
@@ -18814,7 +19519,7 @@
                                     </p:anim>
                                     <p:animEffect transition="in" filter="wipe(up)">
                                       <p:cBhvr>
-                                        <p:cTn id="78" dur="500"/>
+                                        <p:cTn id="76" dur="500"/>
                                         <p:tgtEl>
                                           <p:spTgt spid="3">
                                             <p:txEl>
@@ -18834,26 +19539,26 @@
                     </p:cTn>
                   </p:par>
                   <p:par>
-                    <p:cTn id="79" fill="hold">
+                    <p:cTn id="77" fill="hold">
                       <p:stCondLst>
                         <p:cond delay="indefinite"/>
                       </p:stCondLst>
                       <p:childTnLst>
                         <p:par>
-                          <p:cTn id="80" fill="hold">
+                          <p:cTn id="78" fill="hold">
                             <p:stCondLst>
                               <p:cond delay="0"/>
                             </p:stCondLst>
                             <p:childTnLst>
                               <p:par>
-                                <p:cTn id="81" presetID="12" presetClass="entr" presetSubtype="4" fill="hold" grpId="0" nodeType="clickEffect">
+                                <p:cTn id="79" presetID="12" presetClass="entr" presetSubtype="4" fill="hold" grpId="0" nodeType="clickEffect">
                                   <p:stCondLst>
                                     <p:cond delay="0"/>
                                   </p:stCondLst>
                                   <p:childTnLst>
                                     <p:set>
                                       <p:cBhvr>
-                                        <p:cTn id="82" dur="1" fill="hold">
+                                        <p:cTn id="80" dur="1" fill="hold">
                                           <p:stCondLst>
                                             <p:cond delay="0"/>
                                           </p:stCondLst>
@@ -18875,7 +19580,7 @@
                                     </p:set>
                                     <p:anim calcmode="lin" valueType="num">
                                       <p:cBhvr additive="base">
-                                        <p:cTn id="83" dur="500"/>
+                                        <p:cTn id="81" dur="500"/>
                                         <p:tgtEl>
                                           <p:spTgt spid="3">
                                             <p:txEl>
@@ -18902,7 +19607,7 @@
                                     </p:anim>
                                     <p:animEffect transition="in" filter="wipe(up)">
                                       <p:cBhvr>
-                                        <p:cTn id="84" dur="500"/>
+                                        <p:cTn id="82" dur="500"/>
                                         <p:tgtEl>
                                           <p:spTgt spid="3">
                                             <p:txEl>
@@ -19457,7 +20162,27 @@
                 <a:latin typeface="+mn-lt"/>
                 <a:cs typeface="Courier New"/>
               </a:rPr>
-              <a:t>false | true | 'element' &gt;</a:t>
+              <a:t>false | </a:t>
+            </a:r>
+            <a:r>
+              <a:rPr lang="en-US" sz="1200" b="1" dirty="0" smtClean="0">
+                <a:solidFill>
+                  <a:srgbClr val="0000FF"/>
+                </a:solidFill>
+                <a:latin typeface="+mn-lt"/>
+                <a:cs typeface="Courier New"/>
+              </a:rPr>
+              <a:t>true </a:t>
+            </a:r>
+            <a:r>
+              <a:rPr lang="en-US" sz="1200" b="1" dirty="0">
+                <a:solidFill>
+                  <a:srgbClr val="0000FF"/>
+                </a:solidFill>
+                <a:latin typeface="+mn-lt"/>
+                <a:cs typeface="Courier New"/>
+              </a:rPr>
+              <a:t>&gt;</a:t>
             </a:r>
           </a:p>
           <a:p>
@@ -19801,10 +20526,20 @@
                 <a:latin typeface="Courier New"/>
                 <a:cs typeface="Courier New"/>
               </a:rPr>
-              <a:t>: function(</a:t>
-            </a:r>
-            <a:r>
-              <a:rPr lang="en-US" sz="1200" dirty="0" err="1">
+              <a:t>: function</a:t>
+            </a:r>
+            <a:r>
+              <a:rPr lang="en-US" sz="1200" dirty="0" smtClean="0">
+                <a:solidFill>
+                  <a:srgbClr val="000000"/>
+                </a:solidFill>
+                <a:latin typeface="Courier New"/>
+                <a:cs typeface="Courier New"/>
+              </a:rPr>
+              <a:t>($scope, </a:t>
+            </a:r>
+            <a:r>
+              <a:rPr lang="en-US" sz="1200" dirty="0" err="1" smtClean="0">
                 <a:solidFill>
                   <a:srgbClr val="000000"/>
                 </a:solidFill>
@@ -20048,7 +20783,27 @@
                 <a:latin typeface="Courier New"/>
                 <a:cs typeface="Courier New"/>
               </a:rPr>
-              <a:t>, controller, ... ) { ... }</a:t>
+              <a:t>, </a:t>
+            </a:r>
+            <a:r>
+              <a:rPr lang="en-US" sz="1200" dirty="0" err="1" smtClean="0">
+                <a:solidFill>
+                  <a:srgbClr val="000000"/>
+                </a:solidFill>
+                <a:latin typeface="Courier New"/>
+                <a:cs typeface="Courier New"/>
+              </a:rPr>
+              <a:t>otherController</a:t>
+            </a:r>
+            <a:r>
+              <a:rPr lang="en-US" sz="1200" dirty="0">
+                <a:solidFill>
+                  <a:srgbClr val="000000"/>
+                </a:solidFill>
+                <a:latin typeface="Courier New"/>
+                <a:cs typeface="Courier New"/>
+              </a:rPr>
+              <a:t>, ... ) { ... }</a:t>
             </a:r>
           </a:p>
           <a:p>

</xml_diff>

<commit_message>
1. Added basic examples for pre-start phase of presentation 	a. Basic text update example 	b. Tab directive example 2. Incporporated feedback about sample display 	a. Added background-color to pages 	b. Added padding so as to have enough gutter space 3. Beautified data-binding and directives example along with tabs example 4. Updated presentation with few animation changes and added demo example links in all demo slides for easier access
Change-Id: I75eed9a669ddef46cafbf03314ec93861750f8d2
</commit_message>
<xml_diff>
--- a/Introduction to AngularJs.pptx
+++ b/Introduction to AngularJs.pptx
@@ -4,6 +4,9 @@
   <p:sldMasterIdLst>
     <p:sldMasterId id="2147483877" r:id="rId1"/>
   </p:sldMasterIdLst>
+  <p:notesMasterIdLst>
+    <p:notesMasterId r:id="rId30"/>
+  </p:notesMasterIdLst>
   <p:sldIdLst>
     <p:sldId id="257" r:id="rId2"/>
     <p:sldId id="283" r:id="rId3"/>
@@ -132,6 +135,440 @@
     </a:lvl9pPr>
   </p:defaultTextStyle>
 </p:presentation>
+</file>
+
+<file path=ppt/notesMasters/notesMaster1.xml><?xml version="1.0" encoding="utf-8"?>
+<p:notesMaster xmlns:a="http://schemas.openxmlformats.org/drawingml/2006/main" xmlns:r="http://schemas.openxmlformats.org/officeDocument/2006/relationships" xmlns:p="http://schemas.openxmlformats.org/presentationml/2006/main">
+  <p:cSld>
+    <p:bg>
+      <p:bgRef idx="1001">
+        <a:schemeClr val="bg1"/>
+      </p:bgRef>
+    </p:bg>
+    <p:spTree>
+      <p:nvGrpSpPr>
+        <p:cNvPr id="1" name=""/>
+        <p:cNvGrpSpPr/>
+        <p:nvPr/>
+      </p:nvGrpSpPr>
+      <p:grpSpPr>
+        <a:xfrm>
+          <a:off x="0" y="0"/>
+          <a:ext cx="0" cy="0"/>
+          <a:chOff x="0" y="0"/>
+          <a:chExt cx="0" cy="0"/>
+        </a:xfrm>
+      </p:grpSpPr>
+      <p:sp>
+        <p:nvSpPr>
+          <p:cNvPr id="2" name="Header Placeholder 1"/>
+          <p:cNvSpPr>
+            <a:spLocks noGrp="1"/>
+          </p:cNvSpPr>
+          <p:nvPr>
+            <p:ph type="hdr" sz="quarter"/>
+          </p:nvPr>
+        </p:nvSpPr>
+        <p:spPr>
+          <a:xfrm>
+            <a:off x="0" y="0"/>
+            <a:ext cx="2971800" cy="457200"/>
+          </a:xfrm>
+          <a:prstGeom prst="rect">
+            <a:avLst/>
+          </a:prstGeom>
+        </p:spPr>
+        <p:txBody>
+          <a:bodyPr vert="horz" lIns="91440" tIns="45720" rIns="91440" bIns="45720" rtlCol="0"/>
+          <a:lstStyle>
+            <a:lvl1pPr algn="l">
+              <a:defRPr sz="1200"/>
+            </a:lvl1pPr>
+          </a:lstStyle>
+          <a:p>
+            <a:endParaRPr lang="en-US"/>
+          </a:p>
+        </p:txBody>
+      </p:sp>
+      <p:sp>
+        <p:nvSpPr>
+          <p:cNvPr id="3" name="Date Placeholder 2"/>
+          <p:cNvSpPr>
+            <a:spLocks noGrp="1"/>
+          </p:cNvSpPr>
+          <p:nvPr>
+            <p:ph type="dt" idx="1"/>
+          </p:nvPr>
+        </p:nvSpPr>
+        <p:spPr>
+          <a:xfrm>
+            <a:off x="3884613" y="0"/>
+            <a:ext cx="2971800" cy="457200"/>
+          </a:xfrm>
+          <a:prstGeom prst="rect">
+            <a:avLst/>
+          </a:prstGeom>
+        </p:spPr>
+        <p:txBody>
+          <a:bodyPr vert="horz" lIns="91440" tIns="45720" rIns="91440" bIns="45720" rtlCol="0"/>
+          <a:lstStyle>
+            <a:lvl1pPr algn="r">
+              <a:defRPr sz="1200"/>
+            </a:lvl1pPr>
+          </a:lstStyle>
+          <a:p>
+            <a:fld id="{072E2175-0F4C-9A42-9E53-322D85371293}" type="datetimeFigureOut">
+              <a:rPr lang="en-US" smtClean="0"/>
+              <a:t>4/11/14</a:t>
+            </a:fld>
+            <a:endParaRPr lang="en-US"/>
+          </a:p>
+        </p:txBody>
+      </p:sp>
+      <p:sp>
+        <p:nvSpPr>
+          <p:cNvPr id="4" name="Slide Image Placeholder 3"/>
+          <p:cNvSpPr>
+            <a:spLocks noGrp="1" noRot="1" noChangeAspect="1"/>
+          </p:cNvSpPr>
+          <p:nvPr>
+            <p:ph type="sldImg" idx="2"/>
+          </p:nvPr>
+        </p:nvSpPr>
+        <p:spPr>
+          <a:xfrm>
+            <a:off x="1143000" y="685800"/>
+            <a:ext cx="4572000" cy="3429000"/>
+          </a:xfrm>
+          <a:prstGeom prst="rect">
+            <a:avLst/>
+          </a:prstGeom>
+          <a:noFill/>
+          <a:ln w="12700">
+            <a:solidFill>
+              <a:prstClr val="black"/>
+            </a:solidFill>
+          </a:ln>
+        </p:spPr>
+        <p:txBody>
+          <a:bodyPr vert="horz" lIns="91440" tIns="45720" rIns="91440" bIns="45720" rtlCol="0" anchor="ctr"/>
+          <a:lstStyle/>
+          <a:p>
+            <a:endParaRPr lang="en-US"/>
+          </a:p>
+        </p:txBody>
+      </p:sp>
+      <p:sp>
+        <p:nvSpPr>
+          <p:cNvPr id="5" name="Notes Placeholder 4"/>
+          <p:cNvSpPr>
+            <a:spLocks noGrp="1"/>
+          </p:cNvSpPr>
+          <p:nvPr>
+            <p:ph type="body" sz="quarter" idx="3"/>
+          </p:nvPr>
+        </p:nvSpPr>
+        <p:spPr>
+          <a:xfrm>
+            <a:off x="685800" y="4343400"/>
+            <a:ext cx="5486400" cy="4114800"/>
+          </a:xfrm>
+          <a:prstGeom prst="rect">
+            <a:avLst/>
+          </a:prstGeom>
+        </p:spPr>
+        <p:txBody>
+          <a:bodyPr vert="horz" lIns="91440" tIns="45720" rIns="91440" bIns="45720" rtlCol="0"/>
+          <a:lstStyle/>
+          <a:p>
+            <a:pPr lvl="0"/>
+            <a:r>
+              <a:rPr lang="en-US" smtClean="0"/>
+              <a:t>Click to edit Master text styles</a:t>
+            </a:r>
+          </a:p>
+          <a:p>
+            <a:pPr lvl="1"/>
+            <a:r>
+              <a:rPr lang="en-US" smtClean="0"/>
+              <a:t>Second level</a:t>
+            </a:r>
+          </a:p>
+          <a:p>
+            <a:pPr lvl="2"/>
+            <a:r>
+              <a:rPr lang="en-US" smtClean="0"/>
+              <a:t>Third level</a:t>
+            </a:r>
+          </a:p>
+          <a:p>
+            <a:pPr lvl="3"/>
+            <a:r>
+              <a:rPr lang="en-US" smtClean="0"/>
+              <a:t>Fourth level</a:t>
+            </a:r>
+          </a:p>
+          <a:p>
+            <a:pPr lvl="4"/>
+            <a:r>
+              <a:rPr lang="en-US" smtClean="0"/>
+              <a:t>Fifth level</a:t>
+            </a:r>
+            <a:endParaRPr lang="en-US"/>
+          </a:p>
+        </p:txBody>
+      </p:sp>
+      <p:sp>
+        <p:nvSpPr>
+          <p:cNvPr id="6" name="Footer Placeholder 5"/>
+          <p:cNvSpPr>
+            <a:spLocks noGrp="1"/>
+          </p:cNvSpPr>
+          <p:nvPr>
+            <p:ph type="ftr" sz="quarter" idx="4"/>
+          </p:nvPr>
+        </p:nvSpPr>
+        <p:spPr>
+          <a:xfrm>
+            <a:off x="0" y="8685213"/>
+            <a:ext cx="2971800" cy="457200"/>
+          </a:xfrm>
+          <a:prstGeom prst="rect">
+            <a:avLst/>
+          </a:prstGeom>
+        </p:spPr>
+        <p:txBody>
+          <a:bodyPr vert="horz" lIns="91440" tIns="45720" rIns="91440" bIns="45720" rtlCol="0" anchor="b"/>
+          <a:lstStyle>
+            <a:lvl1pPr algn="l">
+              <a:defRPr sz="1200"/>
+            </a:lvl1pPr>
+          </a:lstStyle>
+          <a:p>
+            <a:endParaRPr lang="en-US"/>
+          </a:p>
+        </p:txBody>
+      </p:sp>
+      <p:sp>
+        <p:nvSpPr>
+          <p:cNvPr id="7" name="Slide Number Placeholder 6"/>
+          <p:cNvSpPr>
+            <a:spLocks noGrp="1"/>
+          </p:cNvSpPr>
+          <p:nvPr>
+            <p:ph type="sldNum" sz="quarter" idx="5"/>
+          </p:nvPr>
+        </p:nvSpPr>
+        <p:spPr>
+          <a:xfrm>
+            <a:off x="3884613" y="8685213"/>
+            <a:ext cx="2971800" cy="457200"/>
+          </a:xfrm>
+          <a:prstGeom prst="rect">
+            <a:avLst/>
+          </a:prstGeom>
+        </p:spPr>
+        <p:txBody>
+          <a:bodyPr vert="horz" lIns="91440" tIns="45720" rIns="91440" bIns="45720" rtlCol="0" anchor="b"/>
+          <a:lstStyle>
+            <a:lvl1pPr algn="r">
+              <a:defRPr sz="1200"/>
+            </a:lvl1pPr>
+          </a:lstStyle>
+          <a:p>
+            <a:fld id="{D4BDC383-B54D-3540-8CC3-B9AA19E9BE5D}" type="slidenum">
+              <a:rPr lang="en-US" smtClean="0"/>
+              <a:t>‹#›</a:t>
+            </a:fld>
+            <a:endParaRPr lang="en-US"/>
+          </a:p>
+        </p:txBody>
+      </p:sp>
+    </p:spTree>
+    <p:extLst>
+      <p:ext uri="{BB962C8B-B14F-4D97-AF65-F5344CB8AC3E}">
+        <p14:creationId xmlns:p14="http://schemas.microsoft.com/office/powerpoint/2010/main" val="691597868"/>
+      </p:ext>
+    </p:extLst>
+  </p:cSld>
+  <p:clrMap bg1="lt1" tx1="dk1" bg2="lt2" tx2="dk2" accent1="accent1" accent2="accent2" accent3="accent3" accent4="accent4" accent5="accent5" accent6="accent6" hlink="hlink" folHlink="folHlink"/>
+  <p:notesStyle>
+    <a:lvl1pPr marL="0" algn="l" defTabSz="457200" rtl="0" eaLnBrk="1" latinLnBrk="0" hangingPunct="1">
+      <a:defRPr sz="1200" kern="1200">
+        <a:solidFill>
+          <a:schemeClr val="tx1"/>
+        </a:solidFill>
+        <a:latin typeface="+mn-lt"/>
+        <a:ea typeface="+mn-ea"/>
+        <a:cs typeface="+mn-cs"/>
+      </a:defRPr>
+    </a:lvl1pPr>
+    <a:lvl2pPr marL="457200" algn="l" defTabSz="457200" rtl="0" eaLnBrk="1" latinLnBrk="0" hangingPunct="1">
+      <a:defRPr sz="1200" kern="1200">
+        <a:solidFill>
+          <a:schemeClr val="tx1"/>
+        </a:solidFill>
+        <a:latin typeface="+mn-lt"/>
+        <a:ea typeface="+mn-ea"/>
+        <a:cs typeface="+mn-cs"/>
+      </a:defRPr>
+    </a:lvl2pPr>
+    <a:lvl3pPr marL="914400" algn="l" defTabSz="457200" rtl="0" eaLnBrk="1" latinLnBrk="0" hangingPunct="1">
+      <a:defRPr sz="1200" kern="1200">
+        <a:solidFill>
+          <a:schemeClr val="tx1"/>
+        </a:solidFill>
+        <a:latin typeface="+mn-lt"/>
+        <a:ea typeface="+mn-ea"/>
+        <a:cs typeface="+mn-cs"/>
+      </a:defRPr>
+    </a:lvl3pPr>
+    <a:lvl4pPr marL="1371600" algn="l" defTabSz="457200" rtl="0" eaLnBrk="1" latinLnBrk="0" hangingPunct="1">
+      <a:defRPr sz="1200" kern="1200">
+        <a:solidFill>
+          <a:schemeClr val="tx1"/>
+        </a:solidFill>
+        <a:latin typeface="+mn-lt"/>
+        <a:ea typeface="+mn-ea"/>
+        <a:cs typeface="+mn-cs"/>
+      </a:defRPr>
+    </a:lvl4pPr>
+    <a:lvl5pPr marL="1828800" algn="l" defTabSz="457200" rtl="0" eaLnBrk="1" latinLnBrk="0" hangingPunct="1">
+      <a:defRPr sz="1200" kern="1200">
+        <a:solidFill>
+          <a:schemeClr val="tx1"/>
+        </a:solidFill>
+        <a:latin typeface="+mn-lt"/>
+        <a:ea typeface="+mn-ea"/>
+        <a:cs typeface="+mn-cs"/>
+      </a:defRPr>
+    </a:lvl5pPr>
+    <a:lvl6pPr marL="2286000" algn="l" defTabSz="457200" rtl="0" eaLnBrk="1" latinLnBrk="0" hangingPunct="1">
+      <a:defRPr sz="1200" kern="1200">
+        <a:solidFill>
+          <a:schemeClr val="tx1"/>
+        </a:solidFill>
+        <a:latin typeface="+mn-lt"/>
+        <a:ea typeface="+mn-ea"/>
+        <a:cs typeface="+mn-cs"/>
+      </a:defRPr>
+    </a:lvl6pPr>
+    <a:lvl7pPr marL="2743200" algn="l" defTabSz="457200" rtl="0" eaLnBrk="1" latinLnBrk="0" hangingPunct="1">
+      <a:defRPr sz="1200" kern="1200">
+        <a:solidFill>
+          <a:schemeClr val="tx1"/>
+        </a:solidFill>
+        <a:latin typeface="+mn-lt"/>
+        <a:ea typeface="+mn-ea"/>
+        <a:cs typeface="+mn-cs"/>
+      </a:defRPr>
+    </a:lvl7pPr>
+    <a:lvl8pPr marL="3200400" algn="l" defTabSz="457200" rtl="0" eaLnBrk="1" latinLnBrk="0" hangingPunct="1">
+      <a:defRPr sz="1200" kern="1200">
+        <a:solidFill>
+          <a:schemeClr val="tx1"/>
+        </a:solidFill>
+        <a:latin typeface="+mn-lt"/>
+        <a:ea typeface="+mn-ea"/>
+        <a:cs typeface="+mn-cs"/>
+      </a:defRPr>
+    </a:lvl8pPr>
+    <a:lvl9pPr marL="3657600" algn="l" defTabSz="457200" rtl="0" eaLnBrk="1" latinLnBrk="0" hangingPunct="1">
+      <a:defRPr sz="1200" kern="1200">
+        <a:solidFill>
+          <a:schemeClr val="tx1"/>
+        </a:solidFill>
+        <a:latin typeface="+mn-lt"/>
+        <a:ea typeface="+mn-ea"/>
+        <a:cs typeface="+mn-cs"/>
+      </a:defRPr>
+    </a:lvl9pPr>
+  </p:notesStyle>
+</p:notesMaster>
+</file>
+
+<file path=ppt/notesSlides/notesSlide1.xml><?xml version="1.0" encoding="utf-8"?>
+<p:notes xmlns:a="http://schemas.openxmlformats.org/drawingml/2006/main" xmlns:r="http://schemas.openxmlformats.org/officeDocument/2006/relationships" xmlns:p="http://schemas.openxmlformats.org/presentationml/2006/main">
+  <p:cSld>
+    <p:spTree>
+      <p:nvGrpSpPr>
+        <p:cNvPr id="1" name=""/>
+        <p:cNvGrpSpPr/>
+        <p:nvPr/>
+      </p:nvGrpSpPr>
+      <p:grpSpPr>
+        <a:xfrm>
+          <a:off x="0" y="0"/>
+          <a:ext cx="0" cy="0"/>
+          <a:chOff x="0" y="0"/>
+          <a:chExt cx="0" cy="0"/>
+        </a:xfrm>
+      </p:grpSpPr>
+      <p:sp>
+        <p:nvSpPr>
+          <p:cNvPr id="2" name="Slide Image Placeholder 1"/>
+          <p:cNvSpPr>
+            <a:spLocks noGrp="1" noRot="1" noChangeAspect="1"/>
+          </p:cNvSpPr>
+          <p:nvPr>
+            <p:ph type="sldImg"/>
+          </p:nvPr>
+        </p:nvSpPr>
+        <p:spPr/>
+      </p:sp>
+      <p:sp>
+        <p:nvSpPr>
+          <p:cNvPr id="3" name="Notes Placeholder 2"/>
+          <p:cNvSpPr>
+            <a:spLocks noGrp="1"/>
+          </p:cNvSpPr>
+          <p:nvPr>
+            <p:ph type="body" idx="1"/>
+          </p:nvPr>
+        </p:nvSpPr>
+        <p:spPr/>
+        <p:txBody>
+          <a:bodyPr/>
+          <a:lstStyle/>
+          <a:p>
+            <a:endParaRPr lang="en-US" dirty="0"/>
+          </a:p>
+        </p:txBody>
+      </p:sp>
+      <p:sp>
+        <p:nvSpPr>
+          <p:cNvPr id="4" name="Slide Number Placeholder 3"/>
+          <p:cNvSpPr>
+            <a:spLocks noGrp="1"/>
+          </p:cNvSpPr>
+          <p:nvPr>
+            <p:ph type="sldNum" sz="quarter" idx="10"/>
+          </p:nvPr>
+        </p:nvSpPr>
+        <p:spPr/>
+        <p:txBody>
+          <a:bodyPr/>
+          <a:lstStyle/>
+          <a:p>
+            <a:fld id="{D4BDC383-B54D-3540-8CC3-B9AA19E9BE5D}" type="slidenum">
+              <a:rPr lang="en-US" smtClean="0"/>
+              <a:t>17</a:t>
+            </a:fld>
+            <a:endParaRPr lang="en-US"/>
+          </a:p>
+        </p:txBody>
+      </p:sp>
+    </p:spTree>
+    <p:extLst>
+      <p:ext uri="{BB962C8B-B14F-4D97-AF65-F5344CB8AC3E}">
+        <p14:creationId xmlns:p14="http://schemas.microsoft.com/office/powerpoint/2010/main" val="3242113312"/>
+      </p:ext>
+    </p:extLst>
+  </p:cSld>
+  <p:clrMapOvr>
+    <a:masterClrMapping/>
+  </p:clrMapOvr>
+</p:notes>
 </file>
 
 <file path=ppt/slideLayouts/slideLayout1.xml><?xml version="1.0" encoding="utf-8"?>
@@ -7552,6 +7989,8 @@
               </a:rPr>
               <a:t>handling</a:t>
             </a:r>
+          </a:p>
+          <a:p>
             <a:endParaRPr lang="en-US" dirty="0" smtClean="0">
               <a:solidFill>
                 <a:schemeClr val="tx1"/>
@@ -7559,28 +7998,24 @@
             </a:endParaRPr>
           </a:p>
           <a:p>
-            <a:endParaRPr lang="en-US" dirty="0" smtClean="0">
-              <a:solidFill>
-                <a:schemeClr val="tx1"/>
-              </a:solidFill>
-            </a:endParaRPr>
-          </a:p>
-          <a:p>
             <a:r>
               <a:rPr lang="en-US" dirty="0" smtClean="0">
                 <a:solidFill>
                   <a:schemeClr val="tx1"/>
                 </a:solidFill>
               </a:rPr>
-              <a:t>Achieved </a:t>
-            </a:r>
+              <a:t>Achieved through </a:t>
+            </a:r>
+          </a:p>
+          <a:p>
+            <a:pPr lvl="1"/>
             <a:r>
               <a:rPr lang="en-US" dirty="0" smtClean="0">
                 <a:solidFill>
                   <a:schemeClr val="tx1"/>
                 </a:solidFill>
               </a:rPr>
-              <a:t>through </a:t>
+              <a:t>ng-model directive,</a:t>
             </a:r>
           </a:p>
           <a:p>
@@ -7591,7 +8026,7 @@
                   <a:schemeClr val="tx1"/>
                 </a:solidFill>
               </a:rPr>
-              <a:t>ng-model directive,</a:t>
+              <a:t>$scope object</a:t>
             </a:r>
           </a:p>
           <a:p>
@@ -7602,7 +8037,7 @@
                   <a:schemeClr val="tx1"/>
                 </a:solidFill>
               </a:rPr>
-              <a:t>$scope object</a:t>
+              <a:t> {{ }} bindings, </a:t>
             </a:r>
           </a:p>
           <a:p>
@@ -7613,51 +8048,27 @@
                   <a:schemeClr val="tx1"/>
                 </a:solidFill>
               </a:rPr>
-              <a:t> {{ }} bindings, </a:t>
+              <a:t>$watch method</a:t>
             </a:r>
           </a:p>
           <a:p>
             <a:pPr lvl="1"/>
             <a:r>
+              <a:rPr lang="en-US" dirty="0">
+                <a:solidFill>
+                  <a:schemeClr val="tx1"/>
+                </a:solidFill>
+              </a:rPr>
+              <a:t>e</a:t>
+            </a:r>
+            <a:r>
               <a:rPr lang="en-US" dirty="0" smtClean="0">
                 <a:solidFill>
                   <a:schemeClr val="tx1"/>
                 </a:solidFill>
               </a:rPr>
-              <a:t>$watch method</a:t>
-            </a:r>
-          </a:p>
-          <a:p>
-            <a:pPr lvl="1"/>
-            <a:r>
-              <a:rPr lang="en-US" dirty="0">
-                <a:solidFill>
-                  <a:schemeClr val="tx1"/>
-                </a:solidFill>
-              </a:rPr>
-              <a:t>e</a:t>
-            </a:r>
-            <a:r>
-              <a:rPr lang="en-US" dirty="0" smtClean="0">
-                <a:solidFill>
-                  <a:schemeClr val="tx1"/>
-                </a:solidFill>
-              </a:rPr>
-              <a:t>tc.</a:t>
-            </a:r>
-            <a:r>
-              <a:rPr lang="en-US" dirty="0" smtClean="0">
-                <a:solidFill>
-                  <a:schemeClr val="tx1"/>
-                </a:solidFill>
-              </a:rPr>
-              <a:t>.</a:t>
-            </a:r>
-            <a:endParaRPr lang="en-US" dirty="0" smtClean="0">
-              <a:solidFill>
-                <a:schemeClr val="tx1"/>
-              </a:solidFill>
-            </a:endParaRPr>
+              <a:t>tc..</a:t>
+            </a:r>
           </a:p>
         </p:txBody>
       </p:sp>
@@ -8344,7 +8755,7 @@
                                 </p:cTn>
                               </p:par>
                               <p:par>
-                                <p:cTn id="25" presetID="35" presetClass="emph" presetSubtype="0" repeatCount="5000" fill="hold" grpId="1" nodeType="withEffect">
+                                <p:cTn id="25" presetID="35" presetClass="emph" presetSubtype="0" repeatCount="3000" fill="hold" grpId="1" nodeType="withEffect">
                                   <p:stCondLst>
                                     <p:cond delay="1000"/>
                                   </p:stCondLst>
@@ -8354,7 +8765,7 @@
                                   <p:childTnLst>
                                     <p:anim calcmode="discrete" valueType="str">
                                       <p:cBhvr>
-                                        <p:cTn id="26" dur="2000" fill="hold"/>
+                                        <p:cTn id="26" dur="1000" fill="hold"/>
                                         <p:tgtEl>
                                           <p:spTgt spid="14"/>
                                         </p:tgtEl>
@@ -13912,7 +14323,7 @@
           <a:lstStyle/>
           <a:p>
             <a:r>
-              <a:rPr lang="en-US" sz="2400" dirty="0" smtClean="0"/>
+              <a:rPr lang="en-US" sz="2800" dirty="0" smtClean="0"/>
               <a:t>Mini</a:t>
             </a:r>
             <a:r>
@@ -13945,37 +14356,27 @@
           <a:bodyPr/>
           <a:lstStyle/>
           <a:p>
-            <a:r>
-              <a:rPr lang="de-DE" dirty="0">
-                <a:hlinkClick r:id="rId2"/>
-              </a:rPr>
-              <a:t>http://</a:t>
-            </a:r>
-            <a:r>
-              <a:rPr lang="de-DE" dirty="0" err="1">
-                <a:hlinkClick r:id="rId2"/>
-              </a:rPr>
-              <a:t>jsbin.com</a:t>
-            </a:r>
-            <a:r>
-              <a:rPr lang="de-DE" dirty="0">
-                <a:hlinkClick r:id="rId2"/>
-              </a:rPr>
-              <a:t>/</a:t>
-            </a:r>
-            <a:r>
-              <a:rPr lang="de-DE" dirty="0" err="1">
-                <a:hlinkClick r:id="rId2"/>
-              </a:rPr>
-              <a:t>welcome</a:t>
-            </a:r>
-            <a:r>
-              <a:rPr lang="de-DE" dirty="0">
-                <a:hlinkClick r:id="rId2"/>
-              </a:rPr>
-              <a:t>/1/</a:t>
-            </a:r>
-            <a:endParaRPr lang="en-US" dirty="0"/>
+            <a:endParaRPr lang="pt-BR" dirty="0">
+              <a:hlinkClick r:id="rId3"/>
+            </a:endParaRPr>
+          </a:p>
+          <a:p>
+            <a:r>
+              <a:rPr lang="pt-BR" dirty="0" smtClean="0">
+                <a:hlinkClick r:id="rId3"/>
+              </a:rPr>
+              <a:t>Basic Anatomy</a:t>
+            </a:r>
+            <a:endParaRPr lang="pt-BR" dirty="0" smtClean="0"/>
+          </a:p>
+          <a:p>
+            <a:r>
+              <a:rPr lang="en-US" dirty="0" smtClean="0">
+                <a:hlinkClick r:id="rId4"/>
+              </a:rPr>
+              <a:t>Data-binding, Directives &amp; Filters</a:t>
+            </a:r>
+            <a:endParaRPr lang="pt-BR" dirty="0" smtClean="0"/>
           </a:p>
         </p:txBody>
       </p:sp>
@@ -13988,7 +14389,7 @@
           <p:nvPr/>
         </p:nvPicPr>
         <p:blipFill rotWithShape="1">
-          <a:blip r:embed="rId3">
+          <a:blip r:embed="rId5">
             <a:alphaModFix amt="24000"/>
             <a:extLst>
               <a:ext uri="{28A0092B-C50C-407E-A947-70E740481C1C}">
@@ -16294,21 +16695,20 @@
           </a:bodyPr>
           <a:lstStyle/>
           <a:p>
+            <a:endParaRPr lang="en-US" sz="1200" dirty="0" smtClean="0">
+              <a:solidFill>
+                <a:srgbClr val="000000"/>
+              </a:solidFill>
+            </a:endParaRPr>
+          </a:p>
+          <a:p>
             <a:r>
               <a:rPr lang="en-US" dirty="0" smtClean="0">
                 <a:solidFill>
                   <a:srgbClr val="000000"/>
                 </a:solidFill>
               </a:rPr>
-              <a:t>Software</a:t>
-            </a:r>
-            <a:r>
-              <a:rPr lang="en-US" dirty="0" smtClean="0">
-                <a:solidFill>
-                  <a:srgbClr val="000000"/>
-                </a:solidFill>
-              </a:rPr>
-              <a:t>/UI Developer @ </a:t>
+              <a:t>Software/UI Developer @ </a:t>
             </a:r>
             <a:r>
               <a:rPr lang="en-US" dirty="0" err="1" smtClean="0">
@@ -16610,7 +17010,7 @@
                                         <p:tgtEl>
                                           <p:spTgt spid="3">
                                             <p:txEl>
-                                              <p:pRg st="0" end="0"/>
+                                              <p:pRg st="1" end="1"/>
                                             </p:txEl>
                                           </p:spTgt>
                                         </p:tgtEl>
@@ -16628,7 +17028,7 @@
                                         <p:tgtEl>
                                           <p:spTgt spid="3">
                                             <p:txEl>
-                                              <p:pRg st="0" end="0"/>
+                                              <p:pRg st="1" end="1"/>
                                             </p:txEl>
                                           </p:spTgt>
                                         </p:tgtEl>
@@ -16655,7 +17055,7 @@
                                         <p:tgtEl>
                                           <p:spTgt spid="3">
                                             <p:txEl>
-                                              <p:pRg st="0" end="0"/>
+                                              <p:pRg st="1" end="1"/>
                                             </p:txEl>
                                           </p:spTgt>
                                         </p:tgtEl>
@@ -16698,7 +17098,7 @@
                                         <p:tgtEl>
                                           <p:spTgt spid="3">
                                             <p:txEl>
-                                              <p:pRg st="1" end="1"/>
+                                              <p:pRg st="2" end="2"/>
                                             </p:txEl>
                                           </p:spTgt>
                                         </p:tgtEl>
@@ -16716,7 +17116,7 @@
                                         <p:tgtEl>
                                           <p:spTgt spid="3">
                                             <p:txEl>
-                                              <p:pRg st="1" end="1"/>
+                                              <p:pRg st="2" end="2"/>
                                             </p:txEl>
                                           </p:spTgt>
                                         </p:tgtEl>
@@ -16743,7 +17143,7 @@
                                         <p:tgtEl>
                                           <p:spTgt spid="3">
                                             <p:txEl>
-                                              <p:pRg st="1" end="1"/>
+                                              <p:pRg st="2" end="2"/>
                                             </p:txEl>
                                           </p:spTgt>
                                         </p:tgtEl>
@@ -16768,7 +17168,7 @@
                                         <p:tgtEl>
                                           <p:spTgt spid="3">
                                             <p:txEl>
-                                              <p:pRg st="2" end="2"/>
+                                              <p:pRg st="3" end="3"/>
                                             </p:txEl>
                                           </p:spTgt>
                                         </p:tgtEl>
@@ -16786,7 +17186,7 @@
                                         <p:tgtEl>
                                           <p:spTgt spid="3">
                                             <p:txEl>
-                                              <p:pRg st="2" end="2"/>
+                                              <p:pRg st="3" end="3"/>
                                             </p:txEl>
                                           </p:spTgt>
                                         </p:tgtEl>
@@ -16813,7 +17213,7 @@
                                         <p:tgtEl>
                                           <p:spTgt spid="3">
                                             <p:txEl>
-                                              <p:pRg st="2" end="2"/>
+                                              <p:pRg st="3" end="3"/>
                                             </p:txEl>
                                           </p:spTgt>
                                         </p:tgtEl>
@@ -16838,7 +17238,7 @@
                                         <p:tgtEl>
                                           <p:spTgt spid="3">
                                             <p:txEl>
-                                              <p:pRg st="3" end="3"/>
+                                              <p:pRg st="4" end="4"/>
                                             </p:txEl>
                                           </p:spTgt>
                                         </p:tgtEl>
@@ -16856,7 +17256,7 @@
                                         <p:tgtEl>
                                           <p:spTgt spid="3">
                                             <p:txEl>
-                                              <p:pRg st="3" end="3"/>
+                                              <p:pRg st="4" end="4"/>
                                             </p:txEl>
                                           </p:spTgt>
                                         </p:tgtEl>
@@ -16883,7 +17283,7 @@
                                         <p:tgtEl>
                                           <p:spTgt spid="3">
                                             <p:txEl>
-                                              <p:pRg st="3" end="3"/>
+                                              <p:pRg st="4" end="4"/>
                                             </p:txEl>
                                           </p:spTgt>
                                         </p:tgtEl>
@@ -16908,7 +17308,7 @@
                                         <p:tgtEl>
                                           <p:spTgt spid="3">
                                             <p:txEl>
-                                              <p:pRg st="5" end="5"/>
+                                              <p:pRg st="6" end="6"/>
                                             </p:txEl>
                                           </p:spTgt>
                                         </p:tgtEl>
@@ -16926,7 +17326,7 @@
                                         <p:tgtEl>
                                           <p:spTgt spid="3">
                                             <p:txEl>
-                                              <p:pRg st="5" end="5"/>
+                                              <p:pRg st="6" end="6"/>
                                             </p:txEl>
                                           </p:spTgt>
                                         </p:tgtEl>
@@ -16953,7 +17353,7 @@
                                         <p:tgtEl>
                                           <p:spTgt spid="3">
                                             <p:txEl>
-                                              <p:pRg st="5" end="5"/>
+                                              <p:pRg st="6" end="6"/>
                                             </p:txEl>
                                           </p:spTgt>
                                         </p:tgtEl>
@@ -16996,7 +17396,7 @@
                                         <p:tgtEl>
                                           <p:spTgt spid="3">
                                             <p:txEl>
-                                              <p:pRg st="7" end="7"/>
+                                              <p:pRg st="8" end="8"/>
                                             </p:txEl>
                                           </p:spTgt>
                                         </p:tgtEl>
@@ -17014,7 +17414,7 @@
                                         <p:tgtEl>
                                           <p:spTgt spid="3">
                                             <p:txEl>
-                                              <p:pRg st="7" end="7"/>
+                                              <p:pRg st="8" end="8"/>
                                             </p:txEl>
                                           </p:spTgt>
                                         </p:tgtEl>
@@ -17041,7 +17441,7 @@
                                         <p:tgtEl>
                                           <p:spTgt spid="3">
                                             <p:txEl>
-                                              <p:pRg st="7" end="7"/>
+                                              <p:pRg st="8" end="8"/>
                                             </p:txEl>
                                           </p:spTgt>
                                         </p:tgtEl>
@@ -17066,7 +17466,7 @@
                                         <p:tgtEl>
                                           <p:spTgt spid="3">
                                             <p:txEl>
-                                              <p:pRg st="8" end="8"/>
+                                              <p:pRg st="9" end="9"/>
                                             </p:txEl>
                                           </p:spTgt>
                                         </p:tgtEl>
@@ -17084,7 +17484,7 @@
                                         <p:tgtEl>
                                           <p:spTgt spid="3">
                                             <p:txEl>
-                                              <p:pRg st="8" end="8"/>
+                                              <p:pRg st="9" end="9"/>
                                             </p:txEl>
                                           </p:spTgt>
                                         </p:tgtEl>
@@ -17111,7 +17511,7 @@
                                         <p:tgtEl>
                                           <p:spTgt spid="3">
                                             <p:txEl>
-                                              <p:pRg st="8" end="8"/>
+                                              <p:pRg st="9" end="9"/>
                                             </p:txEl>
                                           </p:spTgt>
                                         </p:tgtEl>
@@ -17136,7 +17536,7 @@
                                         <p:tgtEl>
                                           <p:spTgt spid="3">
                                             <p:txEl>
-                                              <p:pRg st="9" end="9"/>
+                                              <p:pRg st="10" end="10"/>
                                             </p:txEl>
                                           </p:spTgt>
                                         </p:tgtEl>
@@ -17154,7 +17554,7 @@
                                         <p:tgtEl>
                                           <p:spTgt spid="3">
                                             <p:txEl>
-                                              <p:pRg st="9" end="9"/>
+                                              <p:pRg st="10" end="10"/>
                                             </p:txEl>
                                           </p:spTgt>
                                         </p:tgtEl>
@@ -17181,7 +17581,7 @@
                                         <p:tgtEl>
                                           <p:spTgt spid="3">
                                             <p:txEl>
-                                              <p:pRg st="9" end="9"/>
+                                              <p:pRg st="10" end="10"/>
                                             </p:txEl>
                                           </p:spTgt>
                                         </p:tgtEl>
@@ -17206,7 +17606,7 @@
                                         <p:tgtEl>
                                           <p:spTgt spid="3">
                                             <p:txEl>
-                                              <p:pRg st="10" end="10"/>
+                                              <p:pRg st="11" end="11"/>
                                             </p:txEl>
                                           </p:spTgt>
                                         </p:tgtEl>
@@ -17224,7 +17624,7 @@
                                         <p:tgtEl>
                                           <p:spTgt spid="3">
                                             <p:txEl>
-                                              <p:pRg st="10" end="10"/>
+                                              <p:pRg st="11" end="11"/>
                                             </p:txEl>
                                           </p:spTgt>
                                         </p:tgtEl>
@@ -17251,7 +17651,7 @@
                                         <p:tgtEl>
                                           <p:spTgt spid="3">
                                             <p:txEl>
-                                              <p:pRg st="10" end="10"/>
+                                              <p:pRg st="11" end="11"/>
                                             </p:txEl>
                                           </p:spTgt>
                                         </p:tgtEl>
@@ -17371,12 +17771,49 @@
             <p:ph type="body" idx="1"/>
           </p:nvPr>
         </p:nvSpPr>
-        <p:spPr/>
+        <p:spPr>
+          <a:xfrm>
+            <a:off x="722313" y="4068763"/>
+            <a:ext cx="7772400" cy="1667456"/>
+          </a:xfrm>
+        </p:spPr>
         <p:txBody>
-          <a:bodyPr/>
+          <a:bodyPr>
+            <a:normAutofit/>
+          </a:bodyPr>
           <a:lstStyle/>
           <a:p>
-            <a:endParaRPr lang="en-US"/>
+            <a:endParaRPr lang="en-US" dirty="0" smtClean="0"/>
+          </a:p>
+          <a:p>
+            <a:r>
+              <a:rPr lang="en-US" dirty="0" smtClean="0">
+                <a:hlinkClick r:id="rId3"/>
+              </a:rPr>
+              <a:t>Simple TODO App</a:t>
+            </a:r>
+            <a:endParaRPr lang="en-US" dirty="0" smtClean="0"/>
+          </a:p>
+          <a:p>
+            <a:r>
+              <a:rPr lang="en-US" dirty="0" smtClean="0">
+                <a:hlinkClick r:id="rId4"/>
+              </a:rPr>
+              <a:t>Single Page App - TODO App</a:t>
+            </a:r>
+            <a:endParaRPr lang="en-US" dirty="0" smtClean="0"/>
+          </a:p>
+          <a:p>
+            <a:r>
+              <a:rPr lang="en-US" dirty="0" smtClean="0">
+                <a:hlinkClick r:id="rId5"/>
+              </a:rPr>
+              <a:t>Ajax Serviced TODO App</a:t>
+            </a:r>
+            <a:endParaRPr lang="en-US" dirty="0" smtClean="0"/>
+          </a:p>
+          <a:p>
+            <a:endParaRPr lang="en-US" dirty="0"/>
           </a:p>
         </p:txBody>
       </p:sp>
@@ -17622,15 +18059,7 @@
                   <a:schemeClr val="tx1"/>
                 </a:solidFill>
               </a:rPr>
-              <a:t>by - adding ‘name’ attribute to ‘form’ and ‘form </a:t>
-            </a:r>
-            <a:r>
-              <a:rPr lang="en-US" dirty="0" smtClean="0">
-                <a:solidFill>
-                  <a:schemeClr val="tx1"/>
-                </a:solidFill>
-              </a:rPr>
-              <a:t>elements’</a:t>
+              <a:t>by - adding ‘name’ attribute to ‘form’ and ‘form elements’</a:t>
             </a:r>
           </a:p>
           <a:p>
@@ -17688,15 +18117,18 @@
                   <a:schemeClr val="tx1"/>
                 </a:solidFill>
               </a:rPr>
-              <a:t> </a:t>
-            </a:r>
+              <a:t> as</a:t>
+            </a:r>
+          </a:p>
+          <a:p>
+            <a:pPr lvl="1"/>
             <a:r>
               <a:rPr lang="en-US" dirty="0" smtClean="0">
                 <a:solidFill>
                   <a:schemeClr val="tx1"/>
                 </a:solidFill>
               </a:rPr>
-              <a:t>as</a:t>
+              <a:t>Form: &lt;form name&gt;.&lt;property&gt;</a:t>
             </a:r>
           </a:p>
           <a:p>
@@ -17707,28 +18139,60 @@
                   <a:schemeClr val="tx1"/>
                 </a:solidFill>
               </a:rPr>
-              <a:t>Form: &lt;form name&gt;.&lt;property&gt;</a:t>
+              <a:t>Individual form element: &lt;form name&gt;.&lt;element name&gt;.&lt;property&gt;</a:t>
+            </a:r>
+          </a:p>
+          <a:p>
+            <a:r>
+              <a:rPr lang="en-US" b="1" dirty="0" smtClean="0">
+                <a:solidFill>
+                  <a:schemeClr val="tx1"/>
+                </a:solidFill>
+              </a:rPr>
+              <a:t>Applies</a:t>
+            </a:r>
+            <a:r>
+              <a:rPr lang="en-US" dirty="0" smtClean="0">
+                <a:solidFill>
+                  <a:schemeClr val="tx1"/>
+                </a:solidFill>
+              </a:rPr>
+              <a:t> these styling classes </a:t>
+            </a:r>
+            <a:r>
+              <a:rPr lang="en-US" dirty="0">
+                <a:solidFill>
+                  <a:schemeClr val="tx1"/>
+                </a:solidFill>
+              </a:rPr>
+              <a:t>–</a:t>
             </a:r>
           </a:p>
           <a:p>
             <a:pPr lvl="1"/>
             <a:r>
+              <a:rPr lang="en-US" dirty="0">
+                <a:solidFill>
+                  <a:schemeClr val="tx1"/>
+                </a:solidFill>
+              </a:rPr>
+              <a:t>.ng-valid, </a:t>
+            </a:r>
+            <a:r>
               <a:rPr lang="en-US" dirty="0" smtClean="0">
                 <a:solidFill>
                   <a:schemeClr val="tx1"/>
                 </a:solidFill>
               </a:rPr>
-              <a:t>Individual form element: &lt;form name&gt;.&lt;element name&gt;.&lt;property&gt;</a:t>
-            </a:r>
-          </a:p>
-          <a:p>
-            <a:r>
-              <a:rPr lang="en-US" b="1" dirty="0" smtClean="0">
+              <a:t>       .</a:t>
+            </a:r>
+            <a:r>
+              <a:rPr lang="en-US" dirty="0">
                 <a:solidFill>
                   <a:schemeClr val="tx1"/>
                 </a:solidFill>
               </a:rPr>
-              <a:t>Applies</a:t>
+              <a:t>ng-invalid, </a:t>
             </a:r>
             <a:r>
               <a:rPr lang="en-US" dirty="0" smtClean="0">
@@ -17736,7 +18200,7 @@
                   <a:schemeClr val="tx1"/>
                 </a:solidFill>
               </a:rPr>
-              <a:t> these styling classes </a:t>
+              <a:t>       .</a:t>
             </a:r>
             <a:r>
               <a:rPr lang="en-US" dirty="0">
@@ -17744,7 +18208,23 @@
                   <a:schemeClr val="tx1"/>
                 </a:solidFill>
               </a:rPr>
-              <a:t>–</a:t>
+              <a:t>ng-pristine, </a:t>
+            </a:r>
+            <a:r>
+              <a:rPr lang="en-US" dirty="0" smtClean="0">
+                <a:solidFill>
+                  <a:schemeClr val="tx1"/>
+                </a:solidFill>
+              </a:rPr>
+              <a:t>         .</a:t>
+            </a:r>
+            <a:r>
+              <a:rPr lang="en-US" dirty="0">
+                <a:solidFill>
+                  <a:schemeClr val="tx1"/>
+                </a:solidFill>
+              </a:rPr>
+              <a:t>ng-dirty</a:t>
             </a:r>
           </a:p>
           <a:p>
@@ -17755,7 +18235,7 @@
                   <a:schemeClr val="tx1"/>
                 </a:solidFill>
               </a:rPr>
-              <a:t>.ng-valid, </a:t>
+              <a:t>.ng-invalid-required, </a:t>
             </a:r>
             <a:r>
               <a:rPr lang="en-US" dirty="0" smtClean="0">
@@ -17771,7 +18251,7 @@
                   <a:schemeClr val="tx1"/>
                 </a:solidFill>
               </a:rPr>
-              <a:t>ng-invalid, </a:t>
+              <a:t>ng-valid-max-</a:t>
             </a:r>
             <a:r>
               <a:rPr lang="en-US" dirty="0" smtClean="0">
@@ -17779,84 +18259,17 @@
                   <a:schemeClr val="tx1"/>
                 </a:solidFill>
               </a:rPr>
-              <a:t>       .</a:t>
-            </a:r>
-            <a:r>
-              <a:rPr lang="en-US" dirty="0">
+              <a:t>length,     etc. </a:t>
+            </a:r>
+          </a:p>
+          <a:p>
+            <a:r>
+              <a:rPr lang="en-US" sz="2200" dirty="0" smtClean="0">
                 <a:solidFill>
                   <a:schemeClr val="tx1"/>
                 </a:solidFill>
               </a:rPr>
-              <a:t>ng-pristine, </a:t>
-            </a:r>
-            <a:r>
-              <a:rPr lang="en-US" dirty="0" smtClean="0">
-                <a:solidFill>
-                  <a:schemeClr val="tx1"/>
-                </a:solidFill>
-              </a:rPr>
-              <a:t>         .</a:t>
-            </a:r>
-            <a:r>
-              <a:rPr lang="en-US" dirty="0">
-                <a:solidFill>
-                  <a:schemeClr val="tx1"/>
-                </a:solidFill>
-              </a:rPr>
-              <a:t>ng-dirty</a:t>
-            </a:r>
-          </a:p>
-          <a:p>
-            <a:pPr lvl="1"/>
-            <a:r>
-              <a:rPr lang="en-US" dirty="0">
-                <a:solidFill>
-                  <a:schemeClr val="tx1"/>
-                </a:solidFill>
-              </a:rPr>
-              <a:t>.ng-invalid-required, </a:t>
-            </a:r>
-            <a:r>
-              <a:rPr lang="en-US" dirty="0" smtClean="0">
-                <a:solidFill>
-                  <a:schemeClr val="tx1"/>
-                </a:solidFill>
-              </a:rPr>
-              <a:t>       .</a:t>
-            </a:r>
-            <a:r>
-              <a:rPr lang="en-US" dirty="0">
-                <a:solidFill>
-                  <a:schemeClr val="tx1"/>
-                </a:solidFill>
-              </a:rPr>
-              <a:t>ng-valid-max-</a:t>
-            </a:r>
-            <a:r>
-              <a:rPr lang="en-US" dirty="0" smtClean="0">
-                <a:solidFill>
-                  <a:schemeClr val="tx1"/>
-                </a:solidFill>
-              </a:rPr>
-              <a:t>length,     etc. </a:t>
-            </a:r>
-          </a:p>
-          <a:p>
-            <a:r>
-              <a:rPr lang="en-US" sz="2200" dirty="0" smtClean="0">
-                <a:solidFill>
-                  <a:schemeClr val="tx1"/>
-                </a:solidFill>
-              </a:rPr>
-              <a:t>Use </a:t>
-            </a:r>
-            <a:r>
-              <a:rPr lang="en-US" sz="2200" dirty="0" smtClean="0">
-                <a:solidFill>
-                  <a:schemeClr val="tx1"/>
-                </a:solidFill>
-              </a:rPr>
-              <a:t>‘</a:t>
+              <a:t>Use ‘</a:t>
             </a:r>
             <a:r>
               <a:rPr lang="en-US" sz="2200" i="1" dirty="0" err="1" smtClean="0">
@@ -19687,7 +20100,7 @@
         </p:nvSpPr>
         <p:spPr>
           <a:xfrm>
-            <a:off x="457200" y="-530064"/>
+            <a:off x="457200" y="-800100"/>
             <a:ext cx="8229600" cy="1600200"/>
           </a:xfrm>
         </p:spPr>
@@ -19719,7 +20132,7 @@
         </p:nvSpPr>
         <p:spPr>
           <a:xfrm>
-            <a:off x="479286" y="2120350"/>
+            <a:off x="479286" y="1834711"/>
             <a:ext cx="8229600" cy="4649306"/>
           </a:xfrm>
           <a:solidFill>
@@ -20863,7 +21276,7 @@
         </p:nvSpPr>
         <p:spPr>
           <a:xfrm>
-            <a:off x="457201" y="1147437"/>
+            <a:off x="457201" y="951026"/>
             <a:ext cx="8251686" cy="884568"/>
           </a:xfrm>
           <a:prstGeom prst="rect">
@@ -27265,8 +27678,21 @@
                   <a:srgbClr val="000000"/>
                 </a:solidFill>
               </a:rPr>
-              <a:t>Well organized - highly modular</a:t>
-            </a:r>
+              <a:t>Well organized - </a:t>
+            </a:r>
+            <a:r>
+              <a:rPr lang="en-US" sz="1800" dirty="0" smtClean="0">
+                <a:solidFill>
+                  <a:srgbClr val="000000"/>
+                </a:solidFill>
+              </a:rPr>
+              <a:t>highly modular</a:t>
+            </a:r>
+            <a:endParaRPr lang="en-US" dirty="0" smtClean="0">
+              <a:solidFill>
+                <a:srgbClr val="000000"/>
+              </a:solidFill>
+            </a:endParaRPr>
           </a:p>
           <a:p>
             <a:endParaRPr lang="en-US" dirty="0">
@@ -27331,10 +27757,16 @@
                   <a:srgbClr val="000000"/>
                 </a:solidFill>
               </a:rPr>
-              <a:t>testing – Jasmine, Karma, Protractor etc.</a:t>
-            </a:r>
-          </a:p>
-          <a:p>
+              <a:t>testing – </a:t>
+            </a:r>
+            <a:r>
+              <a:rPr lang="en-US" sz="1800" dirty="0" smtClean="0">
+                <a:solidFill>
+                  <a:srgbClr val="000000"/>
+                </a:solidFill>
+              </a:rPr>
+              <a:t>Jasmine, Karma, Protractor etc.</a:t>
+            </a:r>
             <a:endParaRPr lang="en-US" dirty="0" smtClean="0">
               <a:solidFill>
                 <a:srgbClr val="000000"/>
@@ -27342,14 +27774,34 @@
             </a:endParaRPr>
           </a:p>
           <a:p>
+            <a:endParaRPr lang="en-US" dirty="0" smtClean="0">
+              <a:solidFill>
+                <a:srgbClr val="000000"/>
+              </a:solidFill>
+            </a:endParaRPr>
+          </a:p>
+          <a:p>
             <a:r>
               <a:rPr lang="en-US" dirty="0" smtClean="0">
                 <a:solidFill>
                   <a:srgbClr val="000000"/>
                 </a:solidFill>
               </a:rPr>
-              <a:t>Versatile - works well with other libraries</a:t>
-            </a:r>
+              <a:t>Versatile - </a:t>
+            </a:r>
+            <a:r>
+              <a:rPr lang="en-US" sz="1800" dirty="0" smtClean="0">
+                <a:solidFill>
+                  <a:srgbClr val="000000"/>
+                </a:solidFill>
+              </a:rPr>
+              <a:t>works well with other libraries</a:t>
+            </a:r>
+            <a:endParaRPr lang="en-US" dirty="0" smtClean="0">
+              <a:solidFill>
+                <a:srgbClr val="000000"/>
+              </a:solidFill>
+            </a:endParaRPr>
           </a:p>
           <a:p>
             <a:endParaRPr lang="en-US" dirty="0">
@@ -29290,7 +29742,7 @@
         </p:nvSpPr>
         <p:spPr>
           <a:xfrm>
-            <a:off x="2648237" y="1885861"/>
+            <a:off x="2203075" y="1885861"/>
             <a:ext cx="1144103" cy="461665"/>
           </a:xfrm>
           <a:prstGeom prst="rect">
@@ -29791,7 +30243,7 @@
         </p:nvSpPr>
         <p:spPr>
           <a:xfrm>
-            <a:off x="3993332" y="1885765"/>
+            <a:off x="3548170" y="1885765"/>
             <a:ext cx="1144103" cy="461665"/>
           </a:xfrm>
           <a:prstGeom prst="rect">
@@ -29879,8 +30331,8 @@
         </p:nvSpPr>
         <p:spPr>
           <a:xfrm>
-            <a:off x="5360516" y="1885669"/>
-            <a:ext cx="1144103" cy="461665"/>
+            <a:off x="4915353" y="1885669"/>
+            <a:ext cx="2115731" cy="461665"/>
           </a:xfrm>
           <a:prstGeom prst="rect">
             <a:avLst/>
@@ -29908,7 +30360,7 @@
           <a:p>
             <a:pPr algn="ctr"/>
             <a:r>
-              <a:rPr lang="en-US" sz="2400" b="1" dirty="0" smtClean="0">
+              <a:rPr lang="en-US" sz="2400" b="1" dirty="0" err="1" smtClean="0">
                 <a:ln w="12700">
                   <a:solidFill>
                     <a:schemeClr val="tx2">
@@ -29933,25 +30385,41 @@
               </a:rPr>
               <a:t>MVW</a:t>
             </a:r>
-            <a:endParaRPr lang="en-US" sz="2400" b="1" dirty="0">
-              <a:ln w="12700">
-                <a:solidFill>
-                  <a:schemeClr val="tx2">
-                    <a:satMod val="155000"/>
-                  </a:schemeClr>
+            <a:r>
+              <a:rPr lang="en-US" sz="2400" dirty="0" err="1" smtClean="0">
+                <a:ln w="18415" cmpd="sng">
+                  <a:solidFill>
+                    <a:srgbClr val="FFFFFF"/>
+                  </a:solidFill>
+                  <a:prstDash val="solid"/>
+                </a:ln>
+                <a:solidFill>
+                  <a:srgbClr val="FFFFFF"/>
+                </a:solidFill>
+                <a:effectLst>
+                  <a:outerShdw blurRad="63500" dir="3600000" algn="tl" rotWithShape="0">
+                    <a:srgbClr val="000000">
+                      <a:alpha val="70000"/>
+                    </a:srgbClr>
+                  </a:outerShdw>
+                </a:effectLst>
+              </a:rPr>
+              <a:t>hatever</a:t>
+            </a:r>
+            <a:endParaRPr lang="en-US" sz="2400" dirty="0">
+              <a:ln w="18415" cmpd="sng">
+                <a:solidFill>
+                  <a:srgbClr val="FFFFFF"/>
                 </a:solidFill>
                 <a:prstDash val="solid"/>
               </a:ln>
               <a:solidFill>
-                <a:schemeClr val="bg2">
-                  <a:tint val="85000"/>
-                  <a:satMod val="155000"/>
-                </a:schemeClr>
+                <a:srgbClr val="FFFFFF"/>
               </a:solidFill>
               <a:effectLst>
-                <a:outerShdw blurRad="41275" dist="20320" dir="1800000" algn="tl" rotWithShape="0">
+                <a:outerShdw blurRad="63500" dir="3600000" algn="tl" rotWithShape="0">
                   <a:srgbClr val="000000">
-                    <a:alpha val="40000"/>
+                    <a:alpha val="70000"/>
                   </a:srgbClr>
                 </a:outerShdw>
               </a:effectLst>
@@ -30105,15 +30573,33 @@
                                   </p:childTnLst>
                                 </p:cTn>
                               </p:par>
+                            </p:childTnLst>
+                          </p:cTn>
+                        </p:par>
+                      </p:childTnLst>
+                    </p:cTn>
+                  </p:par>
+                  <p:par>
+                    <p:cTn id="13" fill="hold">
+                      <p:stCondLst>
+                        <p:cond delay="indefinite"/>
+                      </p:stCondLst>
+                      <p:childTnLst>
+                        <p:par>
+                          <p:cTn id="14" fill="hold">
+                            <p:stCondLst>
+                              <p:cond delay="0"/>
+                            </p:stCondLst>
+                            <p:childTnLst>
                               <p:par>
-                                <p:cTn id="13" presetID="12" presetClass="entr" presetSubtype="4" fill="hold" grpId="0" nodeType="withEffect">
+                                <p:cTn id="15" presetID="53" presetClass="entr" presetSubtype="16" fill="hold" grpId="0" nodeType="clickEffect">
                                   <p:stCondLst>
                                     <p:cond delay="0"/>
                                   </p:stCondLst>
                                   <p:childTnLst>
                                     <p:set>
                                       <p:cBhvr>
-                                        <p:cTn id="14" dur="1" fill="hold">
+                                        <p:cTn id="16" dur="1" fill="hold">
                                           <p:stCondLst>
                                             <p:cond delay="0"/>
                                           </p:stCondLst>
@@ -30130,31 +30616,54 @@
                                       </p:to>
                                     </p:set>
                                     <p:anim calcmode="lin" valueType="num">
-                                      <p:cBhvr additive="base">
-                                        <p:cTn id="15" dur="500"/>
+                                      <p:cBhvr>
+                                        <p:cTn id="17" dur="500" fill="hold"/>
                                         <p:tgtEl>
                                           <p:spTgt spid="16"/>
                                         </p:tgtEl>
                                         <p:attrNameLst>
-                                          <p:attrName>ppt_y</p:attrName>
+                                          <p:attrName>ppt_w</p:attrName>
                                         </p:attrNameLst>
                                       </p:cBhvr>
                                       <p:tavLst>
                                         <p:tav tm="0">
                                           <p:val>
-                                            <p:strVal val="#ppt_y+#ppt_h*1.125000"/>
+                                            <p:fltVal val="0"/>
                                           </p:val>
                                         </p:tav>
                                         <p:tav tm="100000">
                                           <p:val>
-                                            <p:strVal val="#ppt_y"/>
+                                            <p:strVal val="#ppt_w"/>
                                           </p:val>
                                         </p:tav>
                                       </p:tavLst>
                                     </p:anim>
-                                    <p:animEffect transition="in" filter="wipe(up)">
-                                      <p:cBhvr>
-                                        <p:cTn id="16" dur="500"/>
+                                    <p:anim calcmode="lin" valueType="num">
+                                      <p:cBhvr>
+                                        <p:cTn id="18" dur="500" fill="hold"/>
+                                        <p:tgtEl>
+                                          <p:spTgt spid="16"/>
+                                        </p:tgtEl>
+                                        <p:attrNameLst>
+                                          <p:attrName>ppt_h</p:attrName>
+                                        </p:attrNameLst>
+                                      </p:cBhvr>
+                                      <p:tavLst>
+                                        <p:tav tm="0">
+                                          <p:val>
+                                            <p:fltVal val="0"/>
+                                          </p:val>
+                                        </p:tav>
+                                        <p:tav tm="100000">
+                                          <p:val>
+                                            <p:strVal val="#ppt_h"/>
+                                          </p:val>
+                                        </p:tav>
+                                      </p:tavLst>
+                                    </p:anim>
+                                    <p:animEffect transition="in" filter="fade">
+                                      <p:cBhvr>
+                                        <p:cTn id="19" dur="500"/>
                                         <p:tgtEl>
                                           <p:spTgt spid="16"/>
                                         </p:tgtEl>
@@ -30170,26 +30679,26 @@
                     </p:cTn>
                   </p:par>
                   <p:par>
-                    <p:cTn id="17" fill="hold">
+                    <p:cTn id="20" fill="hold">
                       <p:stCondLst>
                         <p:cond delay="indefinite"/>
                       </p:stCondLst>
                       <p:childTnLst>
                         <p:par>
-                          <p:cTn id="18" fill="hold">
+                          <p:cTn id="21" fill="hold">
                             <p:stCondLst>
                               <p:cond delay="0"/>
                             </p:stCondLst>
                             <p:childTnLst>
                               <p:par>
-                                <p:cTn id="19" presetID="12" presetClass="entr" presetSubtype="4" fill="hold" grpId="0" nodeType="clickEffect">
+                                <p:cTn id="22" presetID="12" presetClass="entr" presetSubtype="4" fill="hold" grpId="0" nodeType="clickEffect">
                                   <p:stCondLst>
                                     <p:cond delay="0"/>
                                   </p:stCondLst>
                                   <p:childTnLst>
                                     <p:set>
                                       <p:cBhvr>
-                                        <p:cTn id="20" dur="1" fill="hold">
+                                        <p:cTn id="23" dur="1" fill="hold">
                                           <p:stCondLst>
                                             <p:cond delay="0"/>
                                           </p:stCondLst>
@@ -30207,7 +30716,7 @@
                                     </p:set>
                                     <p:anim calcmode="lin" valueType="num">
                                       <p:cBhvr additive="base">
-                                        <p:cTn id="21" dur="500"/>
+                                        <p:cTn id="24" dur="500"/>
                                         <p:tgtEl>
                                           <p:spTgt spid="6"/>
                                         </p:tgtEl>
@@ -30230,7 +30739,7 @@
                                     </p:anim>
                                     <p:animEffect transition="in" filter="wipe(up)">
                                       <p:cBhvr>
-                                        <p:cTn id="22" dur="500"/>
+                                        <p:cTn id="25" dur="500"/>
                                         <p:tgtEl>
                                           <p:spTgt spid="6"/>
                                         </p:tgtEl>
@@ -30246,26 +30755,26 @@
                     </p:cTn>
                   </p:par>
                   <p:par>
-                    <p:cTn id="23" fill="hold">
+                    <p:cTn id="26" fill="hold">
                       <p:stCondLst>
                         <p:cond delay="indefinite"/>
                       </p:stCondLst>
                       <p:childTnLst>
                         <p:par>
-                          <p:cTn id="24" fill="hold">
+                          <p:cTn id="27" fill="hold">
                             <p:stCondLst>
                               <p:cond delay="0"/>
                             </p:stCondLst>
                             <p:childTnLst>
                               <p:par>
-                                <p:cTn id="25" presetID="12" presetClass="entr" presetSubtype="4" fill="hold" grpId="0" nodeType="clickEffect">
+                                <p:cTn id="28" presetID="12" presetClass="entr" presetSubtype="4" fill="hold" grpId="0" nodeType="clickEffect">
                                   <p:stCondLst>
                                     <p:cond delay="0"/>
                                   </p:stCondLst>
                                   <p:childTnLst>
                                     <p:set>
                                       <p:cBhvr>
-                                        <p:cTn id="26" dur="1" fill="hold">
+                                        <p:cTn id="29" dur="1" fill="hold">
                                           <p:stCondLst>
                                             <p:cond delay="0"/>
                                           </p:stCondLst>
@@ -30283,7 +30792,7 @@
                                     </p:set>
                                     <p:anim calcmode="lin" valueType="num">
                                       <p:cBhvr additive="base">
-                                        <p:cTn id="27" dur="500"/>
+                                        <p:cTn id="30" dur="500"/>
                                         <p:tgtEl>
                                           <p:spTgt spid="9"/>
                                         </p:tgtEl>
@@ -30306,7 +30815,7 @@
                                     </p:anim>
                                     <p:animEffect transition="in" filter="wipe(up)">
                                       <p:cBhvr>
-                                        <p:cTn id="28" dur="500"/>
+                                        <p:cTn id="31" dur="500"/>
                                         <p:tgtEl>
                                           <p:spTgt spid="9"/>
                                         </p:tgtEl>
@@ -30316,14 +30825,14 @@
                                 </p:cTn>
                               </p:par>
                               <p:par>
-                                <p:cTn id="29" presetID="12" presetClass="entr" presetSubtype="4" fill="hold" grpId="0" nodeType="withEffect">
+                                <p:cTn id="32" presetID="12" presetClass="entr" presetSubtype="4" fill="hold" grpId="0" nodeType="withEffect">
                                   <p:stCondLst>
                                     <p:cond delay="0"/>
                                   </p:stCondLst>
                                   <p:childTnLst>
                                     <p:set>
                                       <p:cBhvr>
-                                        <p:cTn id="30" dur="1" fill="hold">
+                                        <p:cTn id="33" dur="1" fill="hold">
                                           <p:stCondLst>
                                             <p:cond delay="0"/>
                                           </p:stCondLst>
@@ -30341,7 +30850,7 @@
                                     </p:set>
                                     <p:anim calcmode="lin" valueType="num">
                                       <p:cBhvr additive="base">
-                                        <p:cTn id="31" dur="500"/>
+                                        <p:cTn id="34" dur="500"/>
                                         <p:tgtEl>
                                           <p:spTgt spid="10"/>
                                         </p:tgtEl>
@@ -30364,7 +30873,7 @@
                                     </p:anim>
                                     <p:animEffect transition="in" filter="wipe(up)">
                                       <p:cBhvr>
-                                        <p:cTn id="32" dur="500"/>
+                                        <p:cTn id="35" dur="500"/>
                                         <p:tgtEl>
                                           <p:spTgt spid="10"/>
                                         </p:tgtEl>
@@ -30374,14 +30883,14 @@
                                 </p:cTn>
                               </p:par>
                               <p:par>
-                                <p:cTn id="33" presetID="12" presetClass="entr" presetSubtype="4" fill="hold" grpId="0" nodeType="withEffect">
+                                <p:cTn id="36" presetID="12" presetClass="entr" presetSubtype="4" fill="hold" grpId="0" nodeType="withEffect">
                                   <p:stCondLst>
                                     <p:cond delay="0"/>
                                   </p:stCondLst>
                                   <p:childTnLst>
                                     <p:set>
                                       <p:cBhvr>
-                                        <p:cTn id="34" dur="1" fill="hold">
+                                        <p:cTn id="37" dur="1" fill="hold">
                                           <p:stCondLst>
                                             <p:cond delay="0"/>
                                           </p:stCondLst>
@@ -30399,7 +30908,7 @@
                                     </p:set>
                                     <p:anim calcmode="lin" valueType="num">
                                       <p:cBhvr additive="base">
-                                        <p:cTn id="35" dur="500"/>
+                                        <p:cTn id="38" dur="500"/>
                                         <p:tgtEl>
                                           <p:spTgt spid="11"/>
                                         </p:tgtEl>
@@ -30422,7 +30931,7 @@
                                     </p:anim>
                                     <p:animEffect transition="in" filter="wipe(up)">
                                       <p:cBhvr>
-                                        <p:cTn id="36" dur="500"/>
+                                        <p:cTn id="39" dur="500"/>
                                         <p:tgtEl>
                                           <p:spTgt spid="11"/>
                                         </p:tgtEl>
@@ -30432,14 +30941,14 @@
                                 </p:cTn>
                               </p:par>
                               <p:par>
-                                <p:cTn id="37" presetID="12" presetClass="entr" presetSubtype="4" fill="hold" grpId="0" nodeType="withEffect">
+                                <p:cTn id="40" presetID="12" presetClass="entr" presetSubtype="4" fill="hold" grpId="0" nodeType="withEffect">
                                   <p:stCondLst>
                                     <p:cond delay="0"/>
                                   </p:stCondLst>
                                   <p:childTnLst>
                                     <p:set>
                                       <p:cBhvr>
-                                        <p:cTn id="38" dur="1" fill="hold">
+                                        <p:cTn id="41" dur="1" fill="hold">
                                           <p:stCondLst>
                                             <p:cond delay="0"/>
                                           </p:stCondLst>
@@ -30457,7 +30966,7 @@
                                     </p:set>
                                     <p:anim calcmode="lin" valueType="num">
                                       <p:cBhvr additive="base">
-                                        <p:cTn id="39" dur="500"/>
+                                        <p:cTn id="42" dur="500"/>
                                         <p:tgtEl>
                                           <p:spTgt spid="13"/>
                                         </p:tgtEl>
@@ -30480,7 +30989,7 @@
                                     </p:anim>
                                     <p:animEffect transition="in" filter="wipe(up)">
                                       <p:cBhvr>
-                                        <p:cTn id="40" dur="500"/>
+                                        <p:cTn id="43" dur="500"/>
                                         <p:tgtEl>
                                           <p:spTgt spid="13"/>
                                         </p:tgtEl>
@@ -30490,14 +30999,14 @@
                                 </p:cTn>
                               </p:par>
                               <p:par>
-                                <p:cTn id="41" presetID="12" presetClass="entr" presetSubtype="4" fill="hold" grpId="0" nodeType="withEffect">
+                                <p:cTn id="44" presetID="12" presetClass="entr" presetSubtype="4" fill="hold" grpId="0" nodeType="withEffect">
                                   <p:stCondLst>
                                     <p:cond delay="0"/>
                                   </p:stCondLst>
                                   <p:childTnLst>
                                     <p:set>
                                       <p:cBhvr>
-                                        <p:cTn id="42" dur="1" fill="hold">
+                                        <p:cTn id="45" dur="1" fill="hold">
                                           <p:stCondLst>
                                             <p:cond delay="0"/>
                                           </p:stCondLst>
@@ -30515,7 +31024,7 @@
                                     </p:set>
                                     <p:anim calcmode="lin" valueType="num">
                                       <p:cBhvr additive="base">
-                                        <p:cTn id="43" dur="500"/>
+                                        <p:cTn id="46" dur="500"/>
                                         <p:tgtEl>
                                           <p:spTgt spid="14"/>
                                         </p:tgtEl>
@@ -30538,7 +31047,7 @@
                                     </p:anim>
                                     <p:animEffect transition="in" filter="wipe(up)">
                                       <p:cBhvr>
-                                        <p:cTn id="44" dur="500"/>
+                                        <p:cTn id="47" dur="500"/>
                                         <p:tgtEl>
                                           <p:spTgt spid="14"/>
                                         </p:tgtEl>
@@ -30548,14 +31057,14 @@
                                 </p:cTn>
                               </p:par>
                               <p:par>
-                                <p:cTn id="45" presetID="12" presetClass="entr" presetSubtype="4" fill="hold" grpId="0" nodeType="withEffect">
+                                <p:cTn id="48" presetID="12" presetClass="entr" presetSubtype="4" fill="hold" grpId="0" nodeType="withEffect">
                                   <p:stCondLst>
                                     <p:cond delay="0"/>
                                   </p:stCondLst>
                                   <p:childTnLst>
                                     <p:set>
                                       <p:cBhvr>
-                                        <p:cTn id="46" dur="1" fill="hold">
+                                        <p:cTn id="49" dur="1" fill="hold">
                                           <p:stCondLst>
                                             <p:cond delay="0"/>
                                           </p:stCondLst>
@@ -30573,7 +31082,7 @@
                                     </p:set>
                                     <p:anim calcmode="lin" valueType="num">
                                       <p:cBhvr additive="base">
-                                        <p:cTn id="47" dur="500"/>
+                                        <p:cTn id="50" dur="500"/>
                                         <p:tgtEl>
                                           <p:spTgt spid="12"/>
                                         </p:tgtEl>
@@ -30596,7 +31105,7 @@
                                     </p:anim>
                                     <p:animEffect transition="in" filter="wipe(up)">
                                       <p:cBhvr>
-                                        <p:cTn id="48" dur="500"/>
+                                        <p:cTn id="51" dur="500"/>
                                         <p:tgtEl>
                                           <p:spTgt spid="12"/>
                                         </p:tgtEl>
@@ -34532,4 +35041,324 @@
   <a:objectDefaults/>
   <a:extraClrSchemeLst/>
 </a:theme>
+</file>
+
+<file path=ppt/theme/theme2.xml><?xml version="1.0" encoding="utf-8"?>
+<a:theme xmlns:a="http://schemas.openxmlformats.org/drawingml/2006/main" name="Office Theme">
+  <a:themeElements>
+    <a:clrScheme name="Office">
+      <a:dk1>
+        <a:sysClr val="windowText" lastClr="000000"/>
+      </a:dk1>
+      <a:lt1>
+        <a:sysClr val="window" lastClr="FFFFFF"/>
+      </a:lt1>
+      <a:dk2>
+        <a:srgbClr val="1F497D"/>
+      </a:dk2>
+      <a:lt2>
+        <a:srgbClr val="EEECE1"/>
+      </a:lt2>
+      <a:accent1>
+        <a:srgbClr val="4F81BD"/>
+      </a:accent1>
+      <a:accent2>
+        <a:srgbClr val="C0504D"/>
+      </a:accent2>
+      <a:accent3>
+        <a:srgbClr val="9BBB59"/>
+      </a:accent3>
+      <a:accent4>
+        <a:srgbClr val="8064A2"/>
+      </a:accent4>
+      <a:accent5>
+        <a:srgbClr val="4BACC6"/>
+      </a:accent5>
+      <a:accent6>
+        <a:srgbClr val="F79646"/>
+      </a:accent6>
+      <a:hlink>
+        <a:srgbClr val="0000FF"/>
+      </a:hlink>
+      <a:folHlink>
+        <a:srgbClr val="800080"/>
+      </a:folHlink>
+    </a:clrScheme>
+    <a:fontScheme name="Office">
+      <a:majorFont>
+        <a:latin typeface="Calibri"/>
+        <a:ea typeface=""/>
+        <a:cs typeface=""/>
+        <a:font script="Jpan" typeface="ＭＳ Ｐゴシック"/>
+        <a:font script="Hang" typeface="맑은 고딕"/>
+        <a:font script="Hans" typeface="宋体"/>
+        <a:font script="Hant" typeface="新細明體"/>
+        <a:font script="Arab" typeface="Times New Roman"/>
+        <a:font script="Hebr" typeface="Times New Roman"/>
+        <a:font script="Thai" typeface="Angsana New"/>
+        <a:font script="Ethi" typeface="Nyala"/>
+        <a:font script="Beng" typeface="Vrinda"/>
+        <a:font script="Gujr" typeface="Shruti"/>
+        <a:font script="Khmr" typeface="MoolBoran"/>
+        <a:font script="Knda" typeface="Tunga"/>
+        <a:font script="Guru" typeface="Raavi"/>
+        <a:font script="Cans" typeface="Euphemia"/>
+        <a:font script="Cher" typeface="Plantagenet Cherokee"/>
+        <a:font script="Yiii" typeface="Microsoft Yi Baiti"/>
+        <a:font script="Tibt" typeface="Microsoft Himalaya"/>
+        <a:font script="Thaa" typeface="MV Boli"/>
+        <a:font script="Deva" typeface="Mangal"/>
+        <a:font script="Telu" typeface="Gautami"/>
+        <a:font script="Taml" typeface="Latha"/>
+        <a:font script="Syrc" typeface="Estrangelo Edessa"/>
+        <a:font script="Orya" typeface="Kalinga"/>
+        <a:font script="Mlym" typeface="Kartika"/>
+        <a:font script="Laoo" typeface="DokChampa"/>
+        <a:font script="Sinh" typeface="Iskoola Pota"/>
+        <a:font script="Mong" typeface="Mongolian Baiti"/>
+        <a:font script="Viet" typeface="Times New Roman"/>
+        <a:font script="Uigh" typeface="Microsoft Uighur"/>
+        <a:font script="Geor" typeface="Sylfaen"/>
+      </a:majorFont>
+      <a:minorFont>
+        <a:latin typeface="Calibri"/>
+        <a:ea typeface=""/>
+        <a:cs typeface=""/>
+        <a:font script="Jpan" typeface="ＭＳ Ｐゴシック"/>
+        <a:font script="Hang" typeface="맑은 고딕"/>
+        <a:font script="Hans" typeface="宋体"/>
+        <a:font script="Hant" typeface="新細明體"/>
+        <a:font script="Arab" typeface="Arial"/>
+        <a:font script="Hebr" typeface="Arial"/>
+        <a:font script="Thai" typeface="Cordia New"/>
+        <a:font script="Ethi" typeface="Nyala"/>
+        <a:font script="Beng" typeface="Vrinda"/>
+        <a:font script="Gujr" typeface="Shruti"/>
+        <a:font script="Khmr" typeface="DaunPenh"/>
+        <a:font script="Knda" typeface="Tunga"/>
+        <a:font script="Guru" typeface="Raavi"/>
+        <a:font script="Cans" typeface="Euphemia"/>
+        <a:font script="Cher" typeface="Plantagenet Cherokee"/>
+        <a:font script="Yiii" typeface="Microsoft Yi Baiti"/>
+        <a:font script="Tibt" typeface="Microsoft Himalaya"/>
+        <a:font script="Thaa" typeface="MV Boli"/>
+        <a:font script="Deva" typeface="Mangal"/>
+        <a:font script="Telu" typeface="Gautami"/>
+        <a:font script="Taml" typeface="Latha"/>
+        <a:font script="Syrc" typeface="Estrangelo Edessa"/>
+        <a:font script="Orya" typeface="Kalinga"/>
+        <a:font script="Mlym" typeface="Kartika"/>
+        <a:font script="Laoo" typeface="DokChampa"/>
+        <a:font script="Sinh" typeface="Iskoola Pota"/>
+        <a:font script="Mong" typeface="Mongolian Baiti"/>
+        <a:font script="Viet" typeface="Arial"/>
+        <a:font script="Uigh" typeface="Microsoft Uighur"/>
+        <a:font script="Geor" typeface="Sylfaen"/>
+      </a:minorFont>
+    </a:fontScheme>
+    <a:fmtScheme name="Office">
+      <a:fillStyleLst>
+        <a:solidFill>
+          <a:schemeClr val="phClr"/>
+        </a:solidFill>
+        <a:gradFill rotWithShape="1">
+          <a:gsLst>
+            <a:gs pos="0">
+              <a:schemeClr val="phClr">
+                <a:tint val="50000"/>
+                <a:satMod val="300000"/>
+              </a:schemeClr>
+            </a:gs>
+            <a:gs pos="35000">
+              <a:schemeClr val="phClr">
+                <a:tint val="37000"/>
+                <a:satMod val="300000"/>
+              </a:schemeClr>
+            </a:gs>
+            <a:gs pos="100000">
+              <a:schemeClr val="phClr">
+                <a:tint val="15000"/>
+                <a:satMod val="350000"/>
+              </a:schemeClr>
+            </a:gs>
+          </a:gsLst>
+          <a:lin ang="16200000" scaled="1"/>
+        </a:gradFill>
+        <a:gradFill rotWithShape="1">
+          <a:gsLst>
+            <a:gs pos="0">
+              <a:schemeClr val="phClr">
+                <a:tint val="100000"/>
+                <a:shade val="100000"/>
+                <a:satMod val="130000"/>
+              </a:schemeClr>
+            </a:gs>
+            <a:gs pos="100000">
+              <a:schemeClr val="phClr">
+                <a:tint val="50000"/>
+                <a:shade val="100000"/>
+                <a:satMod val="350000"/>
+              </a:schemeClr>
+            </a:gs>
+          </a:gsLst>
+          <a:lin ang="16200000" scaled="0"/>
+        </a:gradFill>
+      </a:fillStyleLst>
+      <a:lnStyleLst>
+        <a:ln w="9525" cap="flat" cmpd="sng" algn="ctr">
+          <a:solidFill>
+            <a:schemeClr val="phClr">
+              <a:shade val="95000"/>
+              <a:satMod val="105000"/>
+            </a:schemeClr>
+          </a:solidFill>
+          <a:prstDash val="solid"/>
+        </a:ln>
+        <a:ln w="25400" cap="flat" cmpd="sng" algn="ctr">
+          <a:solidFill>
+            <a:schemeClr val="phClr"/>
+          </a:solidFill>
+          <a:prstDash val="solid"/>
+        </a:ln>
+        <a:ln w="38100" cap="flat" cmpd="sng" algn="ctr">
+          <a:solidFill>
+            <a:schemeClr val="phClr"/>
+          </a:solidFill>
+          <a:prstDash val="solid"/>
+        </a:ln>
+      </a:lnStyleLst>
+      <a:effectStyleLst>
+        <a:effectStyle>
+          <a:effectLst>
+            <a:outerShdw blurRad="40000" dist="20000" dir="5400000" rotWithShape="0">
+              <a:srgbClr val="000000">
+                <a:alpha val="38000"/>
+              </a:srgbClr>
+            </a:outerShdw>
+          </a:effectLst>
+        </a:effectStyle>
+        <a:effectStyle>
+          <a:effectLst>
+            <a:outerShdw blurRad="40000" dist="23000" dir="5400000" rotWithShape="0">
+              <a:srgbClr val="000000">
+                <a:alpha val="35000"/>
+              </a:srgbClr>
+            </a:outerShdw>
+          </a:effectLst>
+        </a:effectStyle>
+        <a:effectStyle>
+          <a:effectLst>
+            <a:outerShdw blurRad="40000" dist="23000" dir="5400000" rotWithShape="0">
+              <a:srgbClr val="000000">
+                <a:alpha val="35000"/>
+              </a:srgbClr>
+            </a:outerShdw>
+          </a:effectLst>
+          <a:scene3d>
+            <a:camera prst="orthographicFront">
+              <a:rot lat="0" lon="0" rev="0"/>
+            </a:camera>
+            <a:lightRig rig="threePt" dir="t">
+              <a:rot lat="0" lon="0" rev="1200000"/>
+            </a:lightRig>
+          </a:scene3d>
+          <a:sp3d>
+            <a:bevelT w="63500" h="25400"/>
+          </a:sp3d>
+        </a:effectStyle>
+      </a:effectStyleLst>
+      <a:bgFillStyleLst>
+        <a:solidFill>
+          <a:schemeClr val="phClr"/>
+        </a:solidFill>
+        <a:gradFill rotWithShape="1">
+          <a:gsLst>
+            <a:gs pos="0">
+              <a:schemeClr val="phClr">
+                <a:tint val="40000"/>
+                <a:satMod val="350000"/>
+              </a:schemeClr>
+            </a:gs>
+            <a:gs pos="40000">
+              <a:schemeClr val="phClr">
+                <a:tint val="45000"/>
+                <a:shade val="99000"/>
+                <a:satMod val="350000"/>
+              </a:schemeClr>
+            </a:gs>
+            <a:gs pos="100000">
+              <a:schemeClr val="phClr">
+                <a:shade val="20000"/>
+                <a:satMod val="255000"/>
+              </a:schemeClr>
+            </a:gs>
+          </a:gsLst>
+          <a:path path="circle">
+            <a:fillToRect l="50000" t="-80000" r="50000" b="180000"/>
+          </a:path>
+        </a:gradFill>
+        <a:gradFill rotWithShape="1">
+          <a:gsLst>
+            <a:gs pos="0">
+              <a:schemeClr val="phClr">
+                <a:tint val="80000"/>
+                <a:satMod val="300000"/>
+              </a:schemeClr>
+            </a:gs>
+            <a:gs pos="100000">
+              <a:schemeClr val="phClr">
+                <a:shade val="30000"/>
+                <a:satMod val="200000"/>
+              </a:schemeClr>
+            </a:gs>
+          </a:gsLst>
+          <a:path path="circle">
+            <a:fillToRect l="50000" t="50000" r="50000" b="50000"/>
+          </a:path>
+        </a:gradFill>
+      </a:bgFillStyleLst>
+    </a:fmtScheme>
+  </a:themeElements>
+  <a:objectDefaults>
+    <a:spDef>
+      <a:spPr/>
+      <a:bodyPr/>
+      <a:lstStyle/>
+      <a:style>
+        <a:lnRef idx="1">
+          <a:schemeClr val="accent1"/>
+        </a:lnRef>
+        <a:fillRef idx="3">
+          <a:schemeClr val="accent1"/>
+        </a:fillRef>
+        <a:effectRef idx="2">
+          <a:schemeClr val="accent1"/>
+        </a:effectRef>
+        <a:fontRef idx="minor">
+          <a:schemeClr val="lt1"/>
+        </a:fontRef>
+      </a:style>
+    </a:spDef>
+    <a:lnDef>
+      <a:spPr/>
+      <a:bodyPr/>
+      <a:lstStyle/>
+      <a:style>
+        <a:lnRef idx="2">
+          <a:schemeClr val="accent1"/>
+        </a:lnRef>
+        <a:fillRef idx="0">
+          <a:schemeClr val="accent1"/>
+        </a:fillRef>
+        <a:effectRef idx="1">
+          <a:schemeClr val="accent1"/>
+        </a:effectRef>
+        <a:fontRef idx="minor">
+          <a:schemeClr val="tx1"/>
+        </a:fontRef>
+      </a:style>
+    </a:lnDef>
+  </a:objectDefaults>
+  <a:extraClrSchemeLst/>
+</a:theme>
 </file>
</xml_diff>